<commit_message>
done the learning setup
</commit_message>
<xml_diff>
--- a/COMET_poster.pptx
+++ b/COMET_poster.pptx
@@ -4086,6 +4086,608 @@
               </a:p>
               <a:p>
                 <a:pPr algn="l" rtl="0"/>
+                <a:r>
+                  <a:rPr lang="en-US" sz="3600" dirty="0">
+                    <a:solidFill>
+                      <a:schemeClr val="tx1"/>
+                    </a:solidFill>
+                  </a:rPr>
+                  <a:t>We aim to optimize the following </a:t>
+                </a:r>
+                <a:r>
+                  <a:rPr lang="en-US" sz="3600" dirty="0" smtClean="0">
+                    <a:solidFill>
+                      <a:schemeClr val="tx1"/>
+                    </a:solidFill>
+                  </a:rPr>
+                  <a:t>objective</a:t>
+                </a:r>
+                <a:r>
+                  <a:rPr lang="en-US" sz="3600" dirty="0">
+                    <a:solidFill>
+                      <a:schemeClr val="tx1"/>
+                    </a:solidFill>
+                  </a:rPr>
+                  <a:t>:</a:t>
+                </a:r>
+              </a:p>
+              <a:p>
+                <a:pPr algn="l" rtl="0"/>
+                <a14:m>
+                  <m:oMathPara xmlns:m="http://schemas.openxmlformats.org/officeDocument/2006/math">
+                    <m:oMathParaPr>
+                      <m:jc m:val="left"/>
+                    </m:oMathParaPr>
+                    <m:oMath xmlns:m="http://schemas.openxmlformats.org/officeDocument/2006/math">
+                      <m:r>
+                        <a:rPr lang="en-US" sz="3200" i="1">
+                          <a:solidFill>
+                            <a:schemeClr val="tx1"/>
+                          </a:solidFill>
+                        </a:rPr>
+                        <m:t>𝐿</m:t>
+                      </m:r>
+                      <m:d>
+                        <m:dPr>
+                          <m:ctrlPr>
+                            <a:rPr lang="en-US" sz="3200" i="1">
+                              <a:solidFill>
+                                <a:schemeClr val="tx1"/>
+                              </a:solidFill>
+                            </a:rPr>
+                          </m:ctrlPr>
+                        </m:dPr>
+                        <m:e>
+                          <m:r>
+                            <a:rPr lang="en-US" sz="3200" i="1">
+                              <a:solidFill>
+                                <a:schemeClr val="tx1"/>
+                              </a:solidFill>
+                            </a:rPr>
+                            <m:t>𝑊</m:t>
+                          </m:r>
+                        </m:e>
+                      </m:d>
+                      <m:r>
+                        <a:rPr lang="en-US" sz="3200" i="1">
+                          <a:solidFill>
+                            <a:schemeClr val="tx1"/>
+                          </a:solidFill>
+                        </a:rPr>
+                        <m:t>=</m:t>
+                      </m:r>
+                      <m:func>
+                        <m:funcPr>
+                          <m:ctrlPr>
+                            <a:rPr lang="en-US" sz="3200" i="1">
+                              <a:solidFill>
+                                <a:schemeClr val="tx1"/>
+                              </a:solidFill>
+                            </a:rPr>
+                          </m:ctrlPr>
+                        </m:funcPr>
+                        <m:fName>
+                          <m:limLow>
+                            <m:limLowPr>
+                              <m:ctrlPr>
+                                <a:rPr lang="en-US" sz="3200" i="1">
+                                  <a:solidFill>
+                                    <a:schemeClr val="tx1"/>
+                                  </a:solidFill>
+                                </a:rPr>
+                              </m:ctrlPr>
+                            </m:limLowPr>
+                            <m:e>
+                              <m:r>
+                                <m:rPr>
+                                  <m:sty m:val="p"/>
+                                </m:rPr>
+                                <a:rPr lang="en-US" sz="3200">
+                                  <a:solidFill>
+                                    <a:schemeClr val="tx1"/>
+                                  </a:solidFill>
+                                </a:rPr>
+                                <m:t>min</m:t>
+                              </m:r>
+                            </m:e>
+                            <m:lim>
+                              <m:r>
+                                <a:rPr lang="en-US" sz="3200" i="1">
+                                  <a:solidFill>
+                                    <a:schemeClr val="tx1"/>
+                                  </a:solidFill>
+                                </a:rPr>
+                                <m:t>𝑊</m:t>
+                              </m:r>
+                            </m:lim>
+                          </m:limLow>
+                        </m:fName>
+                        <m:e>
+                          <m:nary>
+                            <m:naryPr>
+                              <m:chr m:val="∑"/>
+                              <m:supHide m:val="on"/>
+                              <m:ctrlPr>
+                                <a:rPr lang="en-US" sz="3200" i="1">
+                                  <a:solidFill>
+                                    <a:schemeClr val="tx1"/>
+                                  </a:solidFill>
+                                </a:rPr>
+                              </m:ctrlPr>
+                            </m:naryPr>
+                            <m:sub>
+                              <m:r>
+                                <a:rPr lang="en-US" sz="3200" i="1">
+                                  <a:solidFill>
+                                    <a:schemeClr val="tx1"/>
+                                  </a:solidFill>
+                                </a:rPr>
+                                <m:t>𝑡</m:t>
+                              </m:r>
+                              <m:r>
+                                <a:rPr lang="en-US" sz="3200" i="1">
+                                  <a:solidFill>
+                                    <a:schemeClr val="tx1"/>
+                                  </a:solidFill>
+                                </a:rPr>
+                                <m:t>∈</m:t>
+                              </m:r>
+                              <m:r>
+                                <a:rPr lang="en-US" sz="3200" i="1">
+                                  <a:solidFill>
+                                    <a:schemeClr val="tx1"/>
+                                  </a:solidFill>
+                                </a:rPr>
+                                <m:t>𝒯</m:t>
+                              </m:r>
+                            </m:sub>
+                            <m:sup/>
+                            <m:e>
+                              <m:sSub>
+                                <m:sSubPr>
+                                  <m:ctrlPr>
+                                    <a:rPr lang="en-US" sz="3200" b="0" i="1" smtClean="0">
+                                      <a:solidFill>
+                                        <a:schemeClr val="tx1"/>
+                                      </a:solidFill>
+                                      <a:latin typeface="Cambria Math" panose="02040503050406030204" pitchFamily="18" charset="0"/>
+                                    </a:rPr>
+                                  </m:ctrlPr>
+                                </m:sSubPr>
+                                <m:e>
+                                  <m:d>
+                                    <m:dPr>
+                                      <m:begChr m:val="["/>
+                                      <m:endChr m:val="]"/>
+                                      <m:ctrlPr>
+                                        <a:rPr lang="en-US" sz="3200" i="1">
+                                          <a:solidFill>
+                                            <a:schemeClr val="tx1"/>
+                                          </a:solidFill>
+                                          <a:latin typeface="Cambria Math" panose="02040503050406030204" pitchFamily="18" charset="0"/>
+                                        </a:rPr>
+                                      </m:ctrlPr>
+                                    </m:dPr>
+                                    <m:e>
+                                      <m:r>
+                                        <a:rPr lang="en-US" sz="3200" i="1">
+                                          <a:solidFill>
+                                            <a:schemeClr val="tx1"/>
+                                          </a:solidFill>
+                                        </a:rPr>
+                                        <m:t>1</m:t>
+                                      </m:r>
+                                      <m:r>
+                                        <a:rPr lang="en-US" sz="3200" i="1">
+                                          <a:solidFill>
+                                            <a:schemeClr val="tx1"/>
+                                          </a:solidFill>
+                                        </a:rPr>
+                                        <m:t>−</m:t>
+                                      </m:r>
+                                      <m:sSub>
+                                        <m:sSubPr>
+                                          <m:ctrlPr>
+                                            <a:rPr lang="en-US" sz="3200" i="1">
+                                              <a:solidFill>
+                                                <a:schemeClr val="tx1"/>
+                                              </a:solidFill>
+                                            </a:rPr>
+                                          </m:ctrlPr>
+                                        </m:sSubPr>
+                                        <m:e>
+                                          <m:r>
+                                            <a:rPr lang="en-US" sz="3200" i="1">
+                                              <a:solidFill>
+                                                <a:schemeClr val="tx1"/>
+                                              </a:solidFill>
+                                            </a:rPr>
+                                            <m:t>𝑞</m:t>
+                                          </m:r>
+                                        </m:e>
+                                        <m:sub>
+                                          <m:r>
+                                            <a:rPr lang="en-US" sz="3200" i="1">
+                                              <a:solidFill>
+                                                <a:schemeClr val="tx1"/>
+                                              </a:solidFill>
+                                            </a:rPr>
+                                            <m:t>𝑡</m:t>
+                                          </m:r>
+                                        </m:sub>
+                                      </m:sSub>
+                                      <m:r>
+                                        <a:rPr lang="en-US" sz="3200" i="1">
+                                          <a:solidFill>
+                                            <a:schemeClr val="tx1"/>
+                                          </a:solidFill>
+                                        </a:rPr>
+                                        <m:t>𝑊</m:t>
+                                      </m:r>
+                                      <m:sSubSup>
+                                        <m:sSubSupPr>
+                                          <m:ctrlPr>
+                                            <a:rPr lang="en-US" sz="3200" i="1">
+                                              <a:solidFill>
+                                                <a:schemeClr val="tx1"/>
+                                              </a:solidFill>
+                                            </a:rPr>
+                                          </m:ctrlPr>
+                                        </m:sSubSupPr>
+                                        <m:e>
+                                          <m:r>
+                                            <a:rPr lang="en-US" sz="3200" i="1">
+                                              <a:solidFill>
+                                                <a:schemeClr val="tx1"/>
+                                              </a:solidFill>
+                                            </a:rPr>
+                                            <m:t>𝑝</m:t>
+                                          </m:r>
+                                        </m:e>
+                                        <m:sub>
+                                          <m:r>
+                                            <a:rPr lang="en-US" sz="3200" i="1">
+                                              <a:solidFill>
+                                                <a:schemeClr val="tx1"/>
+                                              </a:solidFill>
+                                            </a:rPr>
+                                            <m:t>𝑡</m:t>
+                                          </m:r>
+                                        </m:sub>
+                                        <m:sup>
+                                          <m:r>
+                                            <a:rPr lang="en-US" sz="3200" i="1">
+                                              <a:solidFill>
+                                                <a:schemeClr val="tx1"/>
+                                              </a:solidFill>
+                                            </a:rPr>
+                                            <m:t>+</m:t>
+                                          </m:r>
+                                        </m:sup>
+                                      </m:sSubSup>
+                                      <m:r>
+                                        <a:rPr lang="en-US" sz="3200" i="1">
+                                          <a:solidFill>
+                                            <a:schemeClr val="tx1"/>
+                                          </a:solidFill>
+                                        </a:rPr>
+                                        <m:t>+</m:t>
+                                      </m:r>
+                                      <m:sSub>
+                                        <m:sSubPr>
+                                          <m:ctrlPr>
+                                            <a:rPr lang="en-US" sz="3200" i="1">
+                                              <a:solidFill>
+                                                <a:schemeClr val="tx1"/>
+                                              </a:solidFill>
+                                            </a:rPr>
+                                          </m:ctrlPr>
+                                        </m:sSubPr>
+                                        <m:e>
+                                          <m:r>
+                                            <a:rPr lang="en-US" sz="3200" i="1">
+                                              <a:solidFill>
+                                                <a:schemeClr val="tx1"/>
+                                              </a:solidFill>
+                                            </a:rPr>
+                                            <m:t>𝑞</m:t>
+                                          </m:r>
+                                        </m:e>
+                                        <m:sub>
+                                          <m:r>
+                                            <a:rPr lang="en-US" sz="3200" i="1">
+                                              <a:solidFill>
+                                                <a:schemeClr val="tx1"/>
+                                              </a:solidFill>
+                                            </a:rPr>
+                                            <m:t>𝑡</m:t>
+                                          </m:r>
+                                        </m:sub>
+                                      </m:sSub>
+                                      <m:r>
+                                        <a:rPr lang="en-US" sz="3200" i="1">
+                                          <a:solidFill>
+                                            <a:schemeClr val="tx1"/>
+                                          </a:solidFill>
+                                        </a:rPr>
+                                        <m:t>𝑊</m:t>
+                                      </m:r>
+                                      <m:sSubSup>
+                                        <m:sSubSupPr>
+                                          <m:ctrlPr>
+                                            <a:rPr lang="en-US" sz="3200" i="1">
+                                              <a:solidFill>
+                                                <a:schemeClr val="tx1"/>
+                                              </a:solidFill>
+                                            </a:rPr>
+                                          </m:ctrlPr>
+                                        </m:sSubSupPr>
+                                        <m:e>
+                                          <m:r>
+                                            <a:rPr lang="en-US" sz="3200" i="1">
+                                              <a:solidFill>
+                                                <a:schemeClr val="tx1"/>
+                                              </a:solidFill>
+                                            </a:rPr>
+                                            <m:t>𝑝</m:t>
+                                          </m:r>
+                                        </m:e>
+                                        <m:sub>
+                                          <m:r>
+                                            <a:rPr lang="en-US" sz="3200" i="1">
+                                              <a:solidFill>
+                                                <a:schemeClr val="tx1"/>
+                                              </a:solidFill>
+                                            </a:rPr>
+                                            <m:t>𝑡</m:t>
+                                          </m:r>
+                                        </m:sub>
+                                        <m:sup>
+                                          <m:r>
+                                            <a:rPr lang="en-US" sz="3200" i="1">
+                                              <a:solidFill>
+                                                <a:schemeClr val="tx1"/>
+                                              </a:solidFill>
+                                            </a:rPr>
+                                            <m:t>−</m:t>
+                                          </m:r>
+                                        </m:sup>
+                                      </m:sSubSup>
+                                    </m:e>
+                                  </m:d>
+                                </m:e>
+                                <m:sub>
+                                  <m:r>
+                                    <a:rPr lang="en-US" sz="3200" b="0" i="1" smtClean="0">
+                                      <a:solidFill>
+                                        <a:schemeClr val="tx1"/>
+                                      </a:solidFill>
+                                      <a:latin typeface="Cambria Math" panose="02040503050406030204" pitchFamily="18" charset="0"/>
+                                    </a:rPr>
+                                    <m:t>+</m:t>
+                                  </m:r>
+                                </m:sub>
+                              </m:sSub>
+                            </m:e>
+                          </m:nary>
+                        </m:e>
+                      </m:func>
+                    </m:oMath>
+                  </m:oMathPara>
+                </a14:m>
+                <a:endParaRPr lang="en-US" sz="3200" i="1" dirty="0" smtClean="0">
+                  <a:solidFill>
+                    <a:schemeClr val="tx1"/>
+                  </a:solidFill>
+                </a:endParaRPr>
+              </a:p>
+              <a:p>
+                <a:pPr algn="l" rtl="0"/>
+                <a14:m>
+                  <m:oMathPara xmlns:m="http://schemas.openxmlformats.org/officeDocument/2006/math">
+                    <m:oMathParaPr>
+                      <m:jc m:val="left"/>
+                    </m:oMathParaPr>
+                    <m:oMath xmlns:m="http://schemas.openxmlformats.org/officeDocument/2006/math">
+                      <m:r>
+                        <a:rPr lang="en-US" sz="3200" i="1">
+                          <a:solidFill>
+                            <a:schemeClr val="tx1"/>
+                          </a:solidFill>
+                          <a:latin typeface="Cambria Math" panose="02040503050406030204" pitchFamily="18" charset="0"/>
+                        </a:rPr>
+                        <m:t>−</m:t>
+                      </m:r>
+                      <m:r>
+                        <a:rPr lang="en-US" sz="3200" i="1">
+                          <a:solidFill>
+                            <a:schemeClr val="tx1"/>
+                          </a:solidFill>
+                          <a:latin typeface="Cambria Math" panose="02040503050406030204" pitchFamily="18" charset="0"/>
+                        </a:rPr>
+                        <m:t>𝛼</m:t>
+                      </m:r>
+                      <m:func>
+                        <m:funcPr>
+                          <m:ctrlPr>
+                            <a:rPr lang="en-US" sz="3200" i="1">
+                              <a:solidFill>
+                                <a:schemeClr val="tx1"/>
+                              </a:solidFill>
+                              <a:latin typeface="Cambria Math" panose="02040503050406030204" pitchFamily="18" charset="0"/>
+                            </a:rPr>
+                          </m:ctrlPr>
+                        </m:funcPr>
+                        <m:fName>
+                          <m:r>
+                            <m:rPr>
+                              <m:sty m:val="p"/>
+                            </m:rPr>
+                            <a:rPr lang="en-US" sz="3200">
+                              <a:solidFill>
+                                <a:schemeClr val="tx1"/>
+                              </a:solidFill>
+                              <a:latin typeface="Cambria Math" panose="02040503050406030204" pitchFamily="18" charset="0"/>
+                            </a:rPr>
+                            <m:t>log</m:t>
+                          </m:r>
+                        </m:fName>
+                        <m:e>
+                          <m:func>
+                            <m:funcPr>
+                              <m:ctrlPr>
+                                <a:rPr lang="en-US" sz="3200" i="1">
+                                  <a:solidFill>
+                                    <a:schemeClr val="tx1"/>
+                                  </a:solidFill>
+                                  <a:latin typeface="Cambria Math" panose="02040503050406030204" pitchFamily="18" charset="0"/>
+                                </a:rPr>
+                              </m:ctrlPr>
+                            </m:funcPr>
+                            <m:fName>
+                              <m:r>
+                                <m:rPr>
+                                  <m:sty m:val="p"/>
+                                </m:rPr>
+                                <a:rPr lang="en-US" sz="3200">
+                                  <a:solidFill>
+                                    <a:schemeClr val="tx1"/>
+                                  </a:solidFill>
+                                  <a:latin typeface="Cambria Math" panose="02040503050406030204" pitchFamily="18" charset="0"/>
+                                </a:rPr>
+                                <m:t>det</m:t>
+                              </m:r>
+                            </m:fName>
+                            <m:e>
+                              <m:r>
+                                <a:rPr lang="en-US" sz="3200" i="1">
+                                  <a:solidFill>
+                                    <a:schemeClr val="tx1"/>
+                                  </a:solidFill>
+                                  <a:latin typeface="Cambria Math" panose="02040503050406030204" pitchFamily="18" charset="0"/>
+                                </a:rPr>
+                                <m:t>𝑊</m:t>
+                              </m:r>
+                            </m:e>
+                          </m:func>
+                        </m:e>
+                      </m:func>
+                      <m:r>
+                        <a:rPr lang="en-US" sz="3200" i="1">
+                          <a:solidFill>
+                            <a:schemeClr val="tx1"/>
+                          </a:solidFill>
+                          <a:latin typeface="Cambria Math" panose="02040503050406030204" pitchFamily="18" charset="0"/>
+                        </a:rPr>
+                        <m:t>+</m:t>
+                      </m:r>
+                      <m:f>
+                        <m:fPr>
+                          <m:ctrlPr>
+                            <a:rPr lang="en-US" sz="3200" i="1">
+                              <a:solidFill>
+                                <a:schemeClr val="tx1"/>
+                              </a:solidFill>
+                              <a:latin typeface="Cambria Math" panose="02040503050406030204" pitchFamily="18" charset="0"/>
+                            </a:rPr>
+                          </m:ctrlPr>
+                        </m:fPr>
+                        <m:num>
+                          <m:r>
+                            <a:rPr lang="en-US" sz="3200" i="1">
+                              <a:solidFill>
+                                <a:schemeClr val="tx1"/>
+                              </a:solidFill>
+                              <a:latin typeface="Cambria Math" panose="02040503050406030204" pitchFamily="18" charset="0"/>
+                            </a:rPr>
+                            <m:t>𝛽</m:t>
+                          </m:r>
+                        </m:num>
+                        <m:den>
+                          <m:r>
+                            <a:rPr lang="en-US" sz="3200" i="1">
+                              <a:solidFill>
+                                <a:schemeClr val="tx1"/>
+                              </a:solidFill>
+                              <a:latin typeface="Cambria Math" panose="02040503050406030204" pitchFamily="18" charset="0"/>
+                            </a:rPr>
+                            <m:t>2</m:t>
+                          </m:r>
+                        </m:den>
+                      </m:f>
+                      <m:r>
+                        <a:rPr lang="en-US" sz="3200" i="1">
+                          <a:solidFill>
+                            <a:schemeClr val="tx1"/>
+                          </a:solidFill>
+                          <a:latin typeface="Cambria Math" panose="02040503050406030204" pitchFamily="18" charset="0"/>
+                        </a:rPr>
+                        <m:t> </m:t>
+                      </m:r>
+                      <m:sSubSup>
+                        <m:sSubSupPr>
+                          <m:ctrlPr>
+                            <a:rPr lang="en-US" sz="3200" i="1">
+                              <a:solidFill>
+                                <a:schemeClr val="tx1"/>
+                              </a:solidFill>
+                              <a:latin typeface="Cambria Math" panose="02040503050406030204" pitchFamily="18" charset="0"/>
+                            </a:rPr>
+                          </m:ctrlPr>
+                        </m:sSubSupPr>
+                        <m:e>
+                          <m:d>
+                            <m:dPr>
+                              <m:begChr m:val="‖"/>
+                              <m:endChr m:val="‖"/>
+                              <m:ctrlPr>
+                                <a:rPr lang="en-US" sz="3200" i="1">
+                                  <a:solidFill>
+                                    <a:schemeClr val="tx1"/>
+                                  </a:solidFill>
+                                  <a:latin typeface="Cambria Math" panose="02040503050406030204" pitchFamily="18" charset="0"/>
+                                </a:rPr>
+                              </m:ctrlPr>
+                            </m:dPr>
+                            <m:e>
+                              <m:r>
+                                <a:rPr lang="en-US" sz="3200" i="1">
+                                  <a:solidFill>
+                                    <a:schemeClr val="tx1"/>
+                                  </a:solidFill>
+                                  <a:latin typeface="Cambria Math" panose="02040503050406030204" pitchFamily="18" charset="0"/>
+                                </a:rPr>
+                                <m:t>𝑊</m:t>
+                              </m:r>
+                            </m:e>
+                          </m:d>
+                        </m:e>
+                        <m:sub>
+                          <m:r>
+                            <a:rPr lang="en-US" sz="3200" i="1">
+                              <a:solidFill>
+                                <a:schemeClr val="tx1"/>
+                              </a:solidFill>
+                              <a:latin typeface="Cambria Math" panose="02040503050406030204" pitchFamily="18" charset="0"/>
+                            </a:rPr>
+                            <m:t>𝐹</m:t>
+                          </m:r>
+                        </m:sub>
+                        <m:sup>
+                          <m:r>
+                            <a:rPr lang="en-US" sz="3200" i="1">
+                              <a:solidFill>
+                                <a:schemeClr val="tx1"/>
+                              </a:solidFill>
+                              <a:latin typeface="Cambria Math" panose="02040503050406030204" pitchFamily="18" charset="0"/>
+                            </a:rPr>
+                            <m:t>2</m:t>
+                          </m:r>
+                        </m:sup>
+                      </m:sSubSup>
+                    </m:oMath>
+                  </m:oMathPara>
+                </a14:m>
                 <a:endParaRPr lang="he-IL" sz="3300" dirty="0" smtClean="0">
                   <a:solidFill>
                     <a:schemeClr val="tx1"/>

</xml_diff>

<commit_message>
added row-col matrix visualization and my QR code
</commit_message>
<xml_diff>
--- a/COMET_poster.pptx
+++ b/COMET_poster.pptx
@@ -5,11 +5,10 @@
     <p:sldMasterId id="2147483648" r:id="rId1"/>
   </p:sldMasterIdLst>
   <p:notesMasterIdLst>
-    <p:notesMasterId r:id="rId4"/>
+    <p:notesMasterId r:id="rId3"/>
   </p:notesMasterIdLst>
   <p:sldIdLst>
     <p:sldId id="256" r:id="rId2"/>
-    <p:sldId id="257" r:id="rId3"/>
   </p:sldIdLst>
   <p:sldSz cx="43205400" cy="32404050"/>
   <p:notesSz cx="6858000" cy="9144000"/>
@@ -570,98 +569,6 @@
     <p:extLst>
       <p:ext uri="{BB962C8B-B14F-4D97-AF65-F5344CB8AC3E}">
         <p14:creationId xmlns:p14="http://schemas.microsoft.com/office/powerpoint/2010/main" val="172111174"/>
-      </p:ext>
-    </p:extLst>
-  </p:cSld>
-  <p:clrMapOvr>
-    <a:masterClrMapping/>
-  </p:clrMapOvr>
-</p:notes>
-</file>
-
-<file path=ppt/notesSlides/notesSlide2.xml><?xml version="1.0" encoding="utf-8"?>
-<p:notes xmlns:a="http://schemas.openxmlformats.org/drawingml/2006/main" xmlns:r="http://schemas.openxmlformats.org/officeDocument/2006/relationships" xmlns:p="http://schemas.openxmlformats.org/presentationml/2006/main">
-  <p:cSld>
-    <p:spTree>
-      <p:nvGrpSpPr>
-        <p:cNvPr id="1" name=""/>
-        <p:cNvGrpSpPr/>
-        <p:nvPr/>
-      </p:nvGrpSpPr>
-      <p:grpSpPr>
-        <a:xfrm>
-          <a:off x="0" y="0"/>
-          <a:ext cx="0" cy="0"/>
-          <a:chOff x="0" y="0"/>
-          <a:chExt cx="0" cy="0"/>
-        </a:xfrm>
-      </p:grpSpPr>
-      <p:sp>
-        <p:nvSpPr>
-          <p:cNvPr id="2" name="Slide Image Placeholder 1"/>
-          <p:cNvSpPr>
-            <a:spLocks noGrp="1" noRot="1" noChangeAspect="1"/>
-          </p:cNvSpPr>
-          <p:nvPr>
-            <p:ph type="sldImg"/>
-          </p:nvPr>
-        </p:nvSpPr>
-        <p:spPr>
-          <a:xfrm>
-            <a:off x="1143000" y="685800"/>
-            <a:ext cx="4572000" cy="3429000"/>
-          </a:xfrm>
-        </p:spPr>
-      </p:sp>
-      <p:sp>
-        <p:nvSpPr>
-          <p:cNvPr id="3" name="Notes Placeholder 2"/>
-          <p:cNvSpPr>
-            <a:spLocks noGrp="1"/>
-          </p:cNvSpPr>
-          <p:nvPr>
-            <p:ph type="body" idx="1"/>
-          </p:nvPr>
-        </p:nvSpPr>
-        <p:spPr/>
-        <p:txBody>
-          <a:bodyPr>
-            <a:normAutofit/>
-          </a:bodyPr>
-          <a:lstStyle/>
-          <a:p>
-            <a:endParaRPr lang="he-IL" dirty="0"/>
-          </a:p>
-        </p:txBody>
-      </p:sp>
-      <p:sp>
-        <p:nvSpPr>
-          <p:cNvPr id="4" name="Slide Number Placeholder 3"/>
-          <p:cNvSpPr>
-            <a:spLocks noGrp="1"/>
-          </p:cNvSpPr>
-          <p:nvPr>
-            <p:ph type="sldNum" sz="quarter" idx="10"/>
-          </p:nvPr>
-        </p:nvSpPr>
-        <p:spPr/>
-        <p:txBody>
-          <a:bodyPr/>
-          <a:lstStyle/>
-          <a:p>
-            <a:fld id="{1A4298CF-6935-4765-8457-BD64E3322811}" type="slidenum">
-              <a:rPr lang="he-IL" smtClean="0"/>
-              <a:pPr/>
-              <a:t>2</a:t>
-            </a:fld>
-            <a:endParaRPr lang="he-IL"/>
-          </a:p>
-        </p:txBody>
-      </p:sp>
-    </p:spTree>
-    <p:extLst>
-      <p:ext uri="{BB962C8B-B14F-4D97-AF65-F5344CB8AC3E}">
-        <p14:creationId xmlns:p14="http://schemas.microsoft.com/office/powerpoint/2010/main" val="2966309188"/>
       </p:ext>
     </p:extLst>
   </p:cSld>
@@ -4766,11 +4673,9 @@
           <a:solidFill>
             <a:schemeClr val="bg1"/>
           </a:solidFill>
-          <a:ln w="146050" cmpd="sng">
+          <a:ln w="76200">
             <a:solidFill>
-              <a:schemeClr val="accent6">
-                <a:lumMod val="75000"/>
-              </a:schemeClr>
+              <a:schemeClr val="tx1"/>
             </a:solidFill>
           </a:ln>
         </p:spPr>
@@ -4791,22 +4696,22 @@
           </a:fontRef>
         </p:style>
         <p:txBody>
-          <a:bodyPr lIns="83976" tIns="41987" rIns="83976" bIns="41987" rtlCol="1" anchor="t" anchorCtr="0"/>
+          <a:bodyPr lIns="83976" tIns="41987" rIns="83976" bIns="41987" rtlCol="1" anchor="t"/>
           <a:lstStyle/>
           <a:p>
             <a:pPr algn="ctr" rtl="0"/>
             <a:r>
-              <a:rPr lang="en-US" sz="4400" b="1" dirty="0" smtClean="0">
+              <a:rPr lang="en-US" sz="4400" b="1" dirty="0">
                 <a:solidFill>
                   <a:schemeClr val="tx1"/>
                 </a:solidFill>
               </a:rPr>
-              <a:t>92% of the human genome agrees with the brain-region ontology</a:t>
-            </a:r>
-          </a:p>
-          <a:p>
-            <a:pPr algn="l" rtl="0"/>
-            <a:endParaRPr lang="en-US" sz="2800" dirty="0" smtClean="0">
+              <a:t>Sparse COMET</a:t>
+            </a:r>
+          </a:p>
+          <a:p>
+            <a:pPr algn="ctr" rtl="0"/>
+            <a:endParaRPr lang="en-US" sz="4400" b="1" dirty="0">
               <a:solidFill>
                 <a:schemeClr val="tx1"/>
               </a:solidFill>
@@ -5064,19 +4969,21 @@
                   <a:schemeClr val="tx1"/>
                 </a:solidFill>
               </a:rPr>
-              <a:t>Which gene functions agrees </a:t>
-            </a:r>
-          </a:p>
-          <a:p>
-            <a:pPr algn="ctr" rtl="0"/>
-            <a:r>
-              <a:rPr lang="en-US" sz="4400" b="1" dirty="0" smtClean="0">
+              <a:t>Precision at </a:t>
+            </a:r>
+            <a:r>
+              <a:rPr lang="en-US" sz="4400" b="1" i="1" dirty="0" smtClean="0">
                 <a:solidFill>
                   <a:schemeClr val="tx1"/>
                 </a:solidFill>
               </a:rPr>
-              <a:t>with BRO?</a:t>
-            </a:r>
+              <a:t>top k</a:t>
+            </a:r>
+            <a:endParaRPr lang="en-US" sz="4400" b="1" dirty="0" smtClean="0">
+              <a:solidFill>
+                <a:schemeClr val="tx1"/>
+              </a:solidFill>
+            </a:endParaRPr>
           </a:p>
           <a:p>
             <a:pPr algn="l" rtl="0"/>
@@ -5860,7 +5767,7 @@
         <p:spPr>
           <a:xfrm>
             <a:off x="11449571" y="4968777"/>
-            <a:ext cx="9433050" cy="15193688"/>
+            <a:ext cx="9433050" cy="11737304"/>
           </a:xfrm>
           <a:prstGeom prst="roundRect">
             <a:avLst/>
@@ -5901,7 +5808,7 @@
                   <a:schemeClr val="tx1"/>
                 </a:solidFill>
               </a:rPr>
-              <a:t>Gene expression patterns follow the embryonic origin regions</a:t>
+              <a:t>A row-column coordinate step</a:t>
             </a:r>
             <a:endParaRPr lang="en-US" sz="4300" dirty="0">
               <a:solidFill>
@@ -6377,7 +6284,7 @@
         </p:nvSpPr>
         <p:spPr>
           <a:xfrm>
-            <a:off x="11900380" y="17476911"/>
+            <a:off x="11900380" y="11017449"/>
             <a:ext cx="8334741" cy="2140380"/>
           </a:xfrm>
           <a:prstGeom prst="rect">
@@ -6415,81 +6322,6 @@
           </a:p>
         </p:txBody>
       </p:sp>
-      <p:pic>
-        <p:nvPicPr>
-          <p:cNvPr id="738" name="Picture 737"/>
-          <p:cNvPicPr/>
-          <p:nvPr/>
-        </p:nvPicPr>
-        <p:blipFill>
-          <a:blip r:embed="rId10" cstate="print"/>
-          <a:srcRect r="5968"/>
-          <a:stretch>
-            <a:fillRect/>
-          </a:stretch>
-        </p:blipFill>
-        <p:spPr>
-          <a:xfrm>
-            <a:off x="25275108" y="6912993"/>
-            <a:ext cx="5318972" cy="4248472"/>
-          </a:xfrm>
-          <a:prstGeom prst="rect">
-            <a:avLst/>
-          </a:prstGeom>
-        </p:spPr>
-      </p:pic>
-      <p:pic>
-        <p:nvPicPr>
-          <p:cNvPr id="912" name="image12.png"/>
-          <p:cNvPicPr/>
-          <p:nvPr/>
-        </p:nvPicPr>
-        <p:blipFill>
-          <a:blip r:embed="rId11" cstate="print">
-            <a:extLst>
-              <a:ext uri="{28A0092B-C50C-407E-A947-70E740481C1C}">
-                <a14:useLocalDpi xmlns:a14="http://schemas.microsoft.com/office/drawing/2010/main" val="0"/>
-              </a:ext>
-            </a:extLst>
-          </a:blip>
-          <a:srcRect l="7080" t="704" r="6069" b="1408"/>
-          <a:stretch>
-            <a:fillRect/>
-          </a:stretch>
-        </p:blipFill>
-        <p:spPr>
-          <a:xfrm>
-            <a:off x="13040983" y="12889657"/>
-            <a:ext cx="7049548" cy="4665406"/>
-          </a:xfrm>
-          <a:prstGeom prst="rect">
-            <a:avLst/>
-          </a:prstGeom>
-          <a:ln/>
-        </p:spPr>
-      </p:pic>
-      <p:pic>
-        <p:nvPicPr>
-          <p:cNvPr id="911" name="Picture 910" descr="tube.png"/>
-          <p:cNvPicPr/>
-          <p:nvPr/>
-        </p:nvPicPr>
-        <p:blipFill>
-          <a:blip r:embed="rId12" cstate="print"/>
-          <a:stretch>
-            <a:fillRect/>
-          </a:stretch>
-        </p:blipFill>
-        <p:spPr>
-          <a:xfrm>
-            <a:off x="11881623" y="13084953"/>
-            <a:ext cx="1052707" cy="4129910"/>
-          </a:xfrm>
-          <a:prstGeom prst="rect">
-            <a:avLst/>
-          </a:prstGeom>
-        </p:spPr>
-      </p:pic>
       <p:sp>
         <p:nvSpPr>
           <p:cNvPr id="19" name="Rounded Rectangle 18"/>
@@ -6568,7 +6400,7 @@
           <p:nvPr/>
         </p:nvPicPr>
         <p:blipFill>
-          <a:blip r:embed="rId13" cstate="print"/>
+          <a:blip r:embed="rId10" cstate="print"/>
           <a:srcRect l="11558" t="12764" r="15026" b="17728"/>
           <a:stretch>
             <a:fillRect/>
@@ -6585,30 +6417,6 @@
           <a:ln/>
         </p:spPr>
       </p:pic>
-      <p:pic>
-        <p:nvPicPr>
-          <p:cNvPr id="939" name="Picture 938" descr="siteQr.png"/>
-          <p:cNvPicPr>
-            <a:picLocks noChangeAspect="1"/>
-          </p:cNvPicPr>
-          <p:nvPr/>
-        </p:nvPicPr>
-        <p:blipFill>
-          <a:blip r:embed="rId14" cstate="print"/>
-          <a:stretch>
-            <a:fillRect/>
-          </a:stretch>
-        </p:blipFill>
-        <p:spPr>
-          <a:xfrm>
-            <a:off x="35356228" y="1080345"/>
-            <a:ext cx="2448276" cy="2448236"/>
-          </a:xfrm>
-          <a:prstGeom prst="rect">
-            <a:avLst/>
-          </a:prstGeom>
-        </p:spPr>
-      </p:pic>
       <p:sp>
         <p:nvSpPr>
           <p:cNvPr id="37" name="Rounded Rectangle 36"/>
@@ -6617,8 +6425,8 @@
         </p:nvSpPr>
         <p:spPr>
           <a:xfrm>
-            <a:off x="11449571" y="20882545"/>
-            <a:ext cx="9433049" cy="11089232"/>
+            <a:off x="11521579" y="17570176"/>
+            <a:ext cx="9433049" cy="14329593"/>
           </a:xfrm>
           <a:prstGeom prst="roundRect">
             <a:avLst/>
@@ -6654,53 +6462,18 @@
           <a:p>
             <a:pPr algn="ctr" rtl="0"/>
             <a:r>
-              <a:rPr lang="en-US" sz="4800" b="1" dirty="0" smtClean="0">
-                <a:solidFill>
-                  <a:srgbClr val="FF0000"/>
-                </a:solidFill>
-              </a:rPr>
-              <a:t>B</a:t>
-            </a:r>
-            <a:r>
               <a:rPr lang="en-US" sz="4000" b="1" dirty="0" smtClean="0">
                 <a:solidFill>
                   <a:schemeClr val="tx1"/>
                 </a:solidFill>
               </a:rPr>
-              <a:t>rain </a:t>
-            </a:r>
-            <a:r>
-              <a:rPr lang="en-US" sz="4800" b="1" dirty="0" smtClean="0">
-                <a:solidFill>
-                  <a:srgbClr val="FF0000"/>
-                </a:solidFill>
-              </a:rPr>
-              <a:t>R</a:t>
-            </a:r>
-            <a:r>
-              <a:rPr lang="en-US" sz="4000" b="1" dirty="0" smtClean="0">
-                <a:solidFill>
-                  <a:schemeClr val="tx1"/>
-                </a:solidFill>
-              </a:rPr>
-              <a:t>egion </a:t>
-            </a:r>
-            <a:r>
-              <a:rPr lang="en-US" sz="4800" b="1" dirty="0" smtClean="0">
-                <a:solidFill>
-                  <a:srgbClr val="FF0000"/>
-                </a:solidFill>
-              </a:rPr>
-              <a:t>O</a:t>
-            </a:r>
-            <a:r>
-              <a:rPr lang="en-US" sz="4000" b="1" dirty="0" smtClean="0">
-                <a:solidFill>
-                  <a:schemeClr val="tx1"/>
-                </a:solidFill>
-              </a:rPr>
-              <a:t>ntology score </a:t>
-            </a:r>
+              <a:t>Dense COMET</a:t>
+            </a:r>
+            <a:endParaRPr lang="en-US" sz="4000" b="1" dirty="0" smtClean="0">
+              <a:solidFill>
+                <a:schemeClr val="tx1"/>
+              </a:solidFill>
+            </a:endParaRPr>
           </a:p>
           <a:p>
             <a:pPr algn="l" rtl="0"/>
@@ -6964,7 +6737,7 @@
             <p:nvPr/>
           </p:nvPicPr>
           <p:blipFill>
-            <a:blip r:embed="rId15" cstate="print"/>
+            <a:blip r:embed="rId11" cstate="print"/>
             <a:srcRect r="7966" b="9645"/>
             <a:stretch>
               <a:fillRect/>
@@ -6987,7 +6760,7 @@
             <p:nvPr/>
           </p:nvPicPr>
           <p:blipFill>
-            <a:blip r:embed="rId16" cstate="print"/>
+            <a:blip r:embed="rId12" cstate="print"/>
             <a:srcRect l="6850" t="47949" r="6132"/>
             <a:stretch>
               <a:fillRect/>
@@ -7058,71 +6831,6 @@
           </a:p>
         </p:txBody>
       </p:sp>
-      <p:grpSp>
-        <p:nvGrpSpPr>
-          <p:cNvPr id="52" name="Group 51"/>
-          <p:cNvGrpSpPr/>
-          <p:nvPr/>
-        </p:nvGrpSpPr>
-        <p:grpSpPr>
-          <a:xfrm>
-            <a:off x="21674708" y="15769977"/>
-            <a:ext cx="4997417" cy="5288009"/>
-            <a:chOff x="22394788" y="15841985"/>
-            <a:chExt cx="4997417" cy="5288009"/>
-          </a:xfrm>
-        </p:grpSpPr>
-        <p:pic>
-          <p:nvPicPr>
-            <p:cNvPr id="906" name="Picture 905"/>
-            <p:cNvPicPr/>
-            <p:nvPr/>
-          </p:nvPicPr>
-          <p:blipFill>
-            <a:blip r:embed="rId17" cstate="print"/>
-            <a:srcRect b="10681"/>
-            <a:stretch>
-              <a:fillRect/>
-            </a:stretch>
-          </p:blipFill>
-          <p:spPr>
-            <a:xfrm>
-              <a:off x="22394788" y="15841985"/>
-              <a:ext cx="4937648" cy="3312337"/>
-            </a:xfrm>
-            <a:prstGeom prst="rect">
-              <a:avLst/>
-            </a:prstGeom>
-          </p:spPr>
-        </p:pic>
-        <p:pic>
-          <p:nvPicPr>
-            <p:cNvPr id="907" name="Picture 906"/>
-            <p:cNvPicPr/>
-            <p:nvPr/>
-          </p:nvPicPr>
-          <p:blipFill>
-            <a:blip r:embed="rId18" cstate="print"/>
-            <a:srcRect t="48006"/>
-            <a:stretch>
-              <a:fillRect/>
-            </a:stretch>
-          </p:blipFill>
-          <p:spPr bwMode="auto">
-            <a:xfrm>
-              <a:off x="22394788" y="19298369"/>
-              <a:ext cx="4997417" cy="1831625"/>
-            </a:xfrm>
-            <a:prstGeom prst="rect">
-              <a:avLst/>
-            </a:prstGeom>
-            <a:noFill/>
-            <a:ln>
-              <a:noFill/>
-            </a:ln>
-          </p:spPr>
-        </p:pic>
-      </p:grpSp>
       <p:sp>
         <p:nvSpPr>
           <p:cNvPr id="40" name="TextBox 39"/>
@@ -7366,7 +7074,7 @@
             </a:r>
             <a:r>
               <a:rPr lang="en-US" sz="3600" dirty="0" smtClean="0">
-                <a:hlinkClick r:id="rId19"/>
+                <a:hlinkClick r:id="rId13"/>
               </a:rPr>
               <a:t>lior.kirsch@gmail.com</a:t>
             </a:r>
@@ -7376,7 +7084,7 @@
             </a:r>
             <a:r>
               <a:rPr lang="en-US" sz="3600" dirty="0" smtClean="0">
-                <a:hlinkClick r:id="rId20"/>
+                <a:hlinkClick r:id="rId14"/>
               </a:rPr>
               <a:t>http://chechiklab.biu.ac.il/~lior</a:t>
             </a:r>
@@ -7409,7 +7117,7 @@
             <p:nvPr/>
           </p:nvPicPr>
           <p:blipFill>
-            <a:blip r:embed="rId21" cstate="print"/>
+            <a:blip r:embed="rId15" cstate="print"/>
             <a:srcRect l="6323" t="8661"/>
             <a:stretch>
               <a:fillRect/>
@@ -7478,7 +7186,7 @@
             <p:nvPr/>
           </p:nvPicPr>
           <p:blipFill>
-            <a:blip r:embed="rId22" cstate="print"/>
+            <a:blip r:embed="rId16" cstate="print"/>
             <a:srcRect l="5796"/>
             <a:stretch>
               <a:fillRect/>
@@ -7527,32 +7235,6 @@
       </p:grpSp>
       <p:pic>
         <p:nvPicPr>
-          <p:cNvPr id="54" name="Picture 2" descr="C:\Users\Lior\Dropbox\papers\brain region tree\Figures\figure 1\h_clustering.png"/>
-          <p:cNvPicPr>
-            <a:picLocks noChangeAspect="1" noChangeArrowheads="1"/>
-          </p:cNvPicPr>
-          <p:nvPr/>
-        </p:nvPicPr>
-        <p:blipFill>
-          <a:blip r:embed="rId23" cstate="print"/>
-          <a:srcRect t="6764" r="6676"/>
-          <a:stretch>
-            <a:fillRect/>
-          </a:stretch>
-        </p:blipFill>
-        <p:spPr bwMode="auto">
-          <a:xfrm>
-            <a:off x="11665595" y="6894577"/>
-            <a:ext cx="8352928" cy="4698936"/>
-          </a:xfrm>
-          <a:prstGeom prst="rect">
-            <a:avLst/>
-          </a:prstGeom>
-          <a:noFill/>
-        </p:spPr>
-      </p:pic>
-      <p:pic>
-        <p:nvPicPr>
           <p:cNvPr id="1027" name="Picture 3" descr="C:\Users\Lior\Dropbox\papers\brain region tree\Figures\figure 1\2dhist-NEUROD1-corr-0.65.png"/>
           <p:cNvPicPr>
             <a:picLocks noChangeAspect="1" noChangeArrowheads="1"/>
@@ -7560,7 +7242,7 @@
           <p:nvPr/>
         </p:nvPicPr>
         <p:blipFill>
-          <a:blip r:embed="rId24" cstate="print"/>
+          <a:blip r:embed="rId17" cstate="print"/>
           <a:srcRect l="2108" t="5613" r="2635"/>
           <a:stretch>
             <a:fillRect/>
@@ -7568,7 +7250,7 @@
         </p:blipFill>
         <p:spPr bwMode="auto">
           <a:xfrm>
-            <a:off x="13897844" y="27075233"/>
+            <a:off x="13969852" y="20594198"/>
             <a:ext cx="6193789" cy="4608512"/>
           </a:xfrm>
           <a:prstGeom prst="rect">
@@ -7585,7 +7267,7 @@
         </p:nvSpPr>
         <p:spPr>
           <a:xfrm>
-            <a:off x="11665594" y="27939329"/>
+            <a:off x="11737602" y="21458294"/>
             <a:ext cx="2232250" cy="2554545"/>
           </a:xfrm>
           <a:prstGeom prst="rect">
@@ -7897,7 +7579,7 @@
           <p:nvPr/>
         </p:nvPicPr>
         <p:blipFill>
-          <a:blip r:embed="rId25" cstate="print"/>
+          <a:blip r:embed="rId18" cstate="print"/>
           <a:srcRect l="5796" t="5613" r="5796"/>
           <a:stretch>
             <a:fillRect/>
@@ -7914,36 +7596,6 @@
           <a:noFill/>
         </p:spPr>
       </p:pic>
-      <p:sp>
-        <p:nvSpPr>
-          <p:cNvPr id="71" name="Rectangle 70"/>
-          <p:cNvSpPr/>
-          <p:nvPr/>
-        </p:nvSpPr>
-        <p:spPr>
-          <a:xfrm>
-            <a:off x="12097644" y="11507685"/>
-            <a:ext cx="8334741" cy="1093940"/>
-          </a:xfrm>
-          <a:prstGeom prst="rect">
-            <a:avLst/>
-          </a:prstGeom>
-        </p:spPr>
-        <p:txBody>
-          <a:bodyPr wrap="square" lIns="108000" tIns="54000" rIns="108000" bIns="54000">
-            <a:spAutoFit/>
-          </a:bodyPr>
-          <a:lstStyle/>
-          <a:p>
-            <a:pPr algn="l" rtl="0"/>
-            <a:r>
-              <a:rPr lang="en-US" sz="3200" dirty="0" smtClean="0"/>
-              <a:t>Neighboring regions in the human ontology show similar pattern of expression.</a:t>
-            </a:r>
-            <a:endParaRPr lang="en-US" sz="3200" b="1" dirty="0"/>
-          </a:p>
-        </p:txBody>
-      </p:sp>
       <p:sp>
         <p:nvSpPr>
           <p:cNvPr id="67" name="TextBox 66"/>
@@ -8024,7 +7676,7 @@
             <p:nvPr/>
           </p:nvPicPr>
           <p:blipFill>
-            <a:blip r:embed="rId26" cstate="print"/>
+            <a:blip r:embed="rId19" cstate="print"/>
             <a:srcRect/>
             <a:stretch>
               <a:fillRect/>
@@ -8050,7 +7702,7 @@
             <p:nvPr/>
           </p:nvPicPr>
           <p:blipFill>
-            <a:blip r:embed="rId27" cstate="print"/>
+            <a:blip r:embed="rId20" cstate="print"/>
             <a:srcRect/>
             <a:stretch>
               <a:fillRect/>
@@ -8075,7 +7727,7 @@
           <p:nvPr/>
         </p:nvPicPr>
         <p:blipFill>
-          <a:blip r:embed="rId28" cstate="print"/>
+          <a:blip r:embed="rId21" cstate="print"/>
           <a:srcRect l="3467"/>
           <a:stretch>
             <a:fillRect/>
@@ -8083,1280 +7735,8 @@
         </p:blipFill>
         <p:spPr>
           <a:xfrm>
-            <a:off x="13800227" y="27123674"/>
+            <a:off x="12960876" y="20594198"/>
             <a:ext cx="6213748" cy="4112432"/>
-          </a:xfrm>
-          <a:prstGeom prst="rect">
-            <a:avLst/>
-          </a:prstGeom>
-          <a:ln/>
-        </p:spPr>
-      </p:pic>
-    </p:spTree>
-  </p:cSld>
-  <p:clrMapOvr>
-    <a:masterClrMapping/>
-  </p:clrMapOvr>
-  <p:timing>
-    <p:tnLst>
-      <p:par>
-        <p:cTn id="1" dur="indefinite" restart="never" nodeType="tmRoot"/>
-      </p:par>
-    </p:tnLst>
-  </p:timing>
-</p:sld>
-</file>
-
-<file path=ppt/slides/slide2.xml><?xml version="1.0" encoding="utf-8"?>
-<p:sld xmlns:a="http://schemas.openxmlformats.org/drawingml/2006/main" xmlns:r="http://schemas.openxmlformats.org/officeDocument/2006/relationships" xmlns:p="http://schemas.openxmlformats.org/presentationml/2006/main">
-  <p:cSld>
-    <p:spTree>
-      <p:nvGrpSpPr>
-        <p:cNvPr id="1" name=""/>
-        <p:cNvGrpSpPr/>
-        <p:nvPr/>
-      </p:nvGrpSpPr>
-      <p:grpSpPr>
-        <a:xfrm>
-          <a:off x="0" y="0"/>
-          <a:ext cx="0" cy="0"/>
-          <a:chOff x="0" y="0"/>
-          <a:chExt cx="0" cy="0"/>
-        </a:xfrm>
-      </p:grpSpPr>
-      <p:sp>
-        <p:nvSpPr>
-          <p:cNvPr id="129" name="Rounded Rectangle 128"/>
-          <p:cNvSpPr/>
-          <p:nvPr/>
-        </p:nvSpPr>
-        <p:spPr>
-          <a:xfrm>
-            <a:off x="1080420" y="23762865"/>
-            <a:ext cx="9721080" cy="8193178"/>
-          </a:xfrm>
-          <a:prstGeom prst="roundRect">
-            <a:avLst/>
-          </a:prstGeom>
-          <a:solidFill>
-            <a:schemeClr val="bg1"/>
-          </a:solidFill>
-          <a:ln w="76200">
-            <a:solidFill>
-              <a:schemeClr val="tx1"/>
-            </a:solidFill>
-          </a:ln>
-        </p:spPr>
-        <p:style>
-          <a:lnRef idx="2">
-            <a:schemeClr val="accent1">
-              <a:shade val="50000"/>
-            </a:schemeClr>
-          </a:lnRef>
-          <a:fillRef idx="1">
-            <a:schemeClr val="accent1"/>
-          </a:fillRef>
-          <a:effectRef idx="0">
-            <a:schemeClr val="accent1"/>
-          </a:effectRef>
-          <a:fontRef idx="minor">
-            <a:schemeClr val="lt1"/>
-          </a:fontRef>
-        </p:style>
-        <p:txBody>
-          <a:bodyPr lIns="83976" tIns="41987" rIns="83976" bIns="41987" rtlCol="1" anchor="t" anchorCtr="0"/>
-          <a:lstStyle/>
-          <a:p>
-            <a:pPr marL="607499" lvl="0" indent="-607499" algn="ctr" rtl="0"/>
-            <a:r>
-              <a:rPr lang="en-US" sz="4400" b="1" dirty="0" smtClean="0">
-                <a:solidFill>
-                  <a:schemeClr val="tx1"/>
-                </a:solidFill>
-              </a:rPr>
-              <a:t>The Brain Region Ontology tree</a:t>
-            </a:r>
-          </a:p>
-          <a:p>
-            <a:pPr lvl="0" algn="l" rtl="0"/>
-            <a:r>
-              <a:rPr lang="en-US" sz="3200" dirty="0" smtClean="0">
-                <a:solidFill>
-                  <a:prstClr val="black"/>
-                </a:solidFill>
-              </a:rPr>
-              <a:t>We analyzed 414 regions organized in a hierarchical structure.</a:t>
-            </a:r>
-            <a:r>
-              <a:rPr lang="en-US" sz="3300" dirty="0" smtClean="0">
-                <a:solidFill>
-                  <a:prstClr val="black"/>
-                </a:solidFill>
-              </a:rPr>
-              <a:t> </a:t>
-            </a:r>
-          </a:p>
-          <a:p>
-            <a:pPr lvl="0" algn="l" rtl="0"/>
-            <a:r>
-              <a:rPr lang="en-US" sz="2400" dirty="0" smtClean="0">
-                <a:solidFill>
-                  <a:prstClr val="black"/>
-                </a:solidFill>
-              </a:rPr>
-              <a:t>The ontology was provided from the Allen Institute [1]</a:t>
-            </a:r>
-            <a:r>
-              <a:rPr lang="en-US" sz="3300" dirty="0" smtClean="0">
-                <a:solidFill>
-                  <a:prstClr val="black"/>
-                </a:solidFill>
-              </a:rPr>
-              <a:t>.</a:t>
-            </a:r>
-            <a:endParaRPr lang="he-IL" sz="3300" dirty="0" smtClean="0">
-              <a:solidFill>
-                <a:prstClr val="black"/>
-              </a:solidFill>
-            </a:endParaRPr>
-          </a:p>
-          <a:p>
-            <a:pPr marL="607499" lvl="0" indent="-607499" algn="ctr" rtl="0"/>
-            <a:endParaRPr lang="en-US" sz="4800" dirty="0" smtClean="0">
-              <a:solidFill>
-                <a:prstClr val="black"/>
-              </a:solidFill>
-            </a:endParaRPr>
-          </a:p>
-        </p:txBody>
-      </p:sp>
-      <p:sp>
-        <p:nvSpPr>
-          <p:cNvPr id="917" name="Rounded Rectangle 916"/>
-          <p:cNvSpPr/>
-          <p:nvPr/>
-        </p:nvSpPr>
-        <p:spPr>
-          <a:xfrm>
-            <a:off x="21602700" y="4968777"/>
-            <a:ext cx="9361040" cy="8568952"/>
-          </a:xfrm>
-          <a:prstGeom prst="roundRect">
-            <a:avLst/>
-          </a:prstGeom>
-          <a:solidFill>
-            <a:schemeClr val="bg1"/>
-          </a:solidFill>
-          <a:ln w="146050" cmpd="sng">
-            <a:solidFill>
-              <a:schemeClr val="accent6">
-                <a:lumMod val="75000"/>
-              </a:schemeClr>
-            </a:solidFill>
-          </a:ln>
-        </p:spPr>
-        <p:style>
-          <a:lnRef idx="2">
-            <a:schemeClr val="accent1">
-              <a:shade val="50000"/>
-            </a:schemeClr>
-          </a:lnRef>
-          <a:fillRef idx="1">
-            <a:schemeClr val="accent1"/>
-          </a:fillRef>
-          <a:effectRef idx="0">
-            <a:schemeClr val="accent1"/>
-          </a:effectRef>
-          <a:fontRef idx="minor">
-            <a:schemeClr val="lt1"/>
-          </a:fontRef>
-        </p:style>
-        <p:txBody>
-          <a:bodyPr lIns="83976" tIns="41987" rIns="83976" bIns="41987" rtlCol="1" anchor="t" anchorCtr="0"/>
-          <a:lstStyle/>
-          <a:p>
-            <a:pPr algn="ctr" rtl="0"/>
-            <a:r>
-              <a:rPr lang="en-US" sz="4400" b="1" dirty="0" smtClean="0">
-                <a:solidFill>
-                  <a:schemeClr val="tx1"/>
-                </a:solidFill>
-              </a:rPr>
-              <a:t>92% of the human genome agrees with the brain-region ontology</a:t>
-            </a:r>
-          </a:p>
-          <a:p>
-            <a:pPr algn="l" rtl="0"/>
-            <a:endParaRPr lang="en-US" sz="2800" dirty="0" smtClean="0">
-              <a:solidFill>
-                <a:schemeClr val="tx1"/>
-              </a:solidFill>
-            </a:endParaRPr>
-          </a:p>
-        </p:txBody>
-      </p:sp>
-      <p:sp>
-        <p:nvSpPr>
-          <p:cNvPr id="6" name="Rectangle 5"/>
-          <p:cNvSpPr>
-            <a:spLocks noChangeArrowheads="1"/>
-          </p:cNvSpPr>
-          <p:nvPr/>
-        </p:nvSpPr>
-        <p:spPr bwMode="auto">
-          <a:xfrm>
-            <a:off x="4252242" y="154793"/>
-            <a:ext cx="34700925" cy="2693824"/>
-          </a:xfrm>
-          <a:prstGeom prst="rect">
-            <a:avLst/>
-          </a:prstGeom>
-          <a:noFill/>
-          <a:ln w="9525">
-            <a:noFill/>
-            <a:miter lim="800000"/>
-            <a:headEnd/>
-            <a:tailEnd/>
-          </a:ln>
-          <a:effectLst/>
-        </p:spPr>
-        <p:txBody>
-          <a:bodyPr wrap="square" lIns="76973" tIns="38486" rIns="76973" bIns="38486" anchor="ctr">
-            <a:spAutoFit/>
-          </a:bodyPr>
-          <a:lstStyle/>
-          <a:p>
-            <a:pPr algn="ctr" rtl="0"/>
-            <a:r>
-              <a:rPr lang="en-US" b="1" dirty="0" smtClean="0"/>
-              <a:t>Human areal expression of most genes is </a:t>
-            </a:r>
-          </a:p>
-          <a:p>
-            <a:pPr algn="ctr" rtl="0"/>
-            <a:r>
-              <a:rPr lang="en-US" b="1" dirty="0" smtClean="0"/>
-              <a:t>governed by regionalization</a:t>
-            </a:r>
-          </a:p>
-        </p:txBody>
-      </p:sp>
-      <p:sp>
-        <p:nvSpPr>
-          <p:cNvPr id="7" name="Text Box 5"/>
-          <p:cNvSpPr txBox="1">
-            <a:spLocks noChangeArrowheads="1"/>
-          </p:cNvSpPr>
-          <p:nvPr/>
-        </p:nvSpPr>
-        <p:spPr bwMode="auto">
-          <a:xfrm>
-            <a:off x="8554618" y="3024261"/>
-            <a:ext cx="26096173" cy="1447329"/>
-          </a:xfrm>
-          <a:prstGeom prst="rect">
-            <a:avLst/>
-          </a:prstGeom>
-          <a:noFill/>
-          <a:ln w="9525">
-            <a:noFill/>
-            <a:miter lim="800000"/>
-            <a:headEnd/>
-            <a:tailEnd/>
-          </a:ln>
-          <a:effectLst/>
-        </p:spPr>
-        <p:txBody>
-          <a:bodyPr wrap="square" lIns="76973" tIns="38486" rIns="76973" bIns="38486">
-            <a:spAutoFit/>
-          </a:bodyPr>
-          <a:lstStyle/>
-          <a:p>
-            <a:pPr algn="ctr"/>
-            <a:r>
-              <a:rPr lang="en-US" sz="5100" dirty="0" err="1" smtClean="0">
-                <a:latin typeface="Arial" pitchFamily="34" charset="0"/>
-                <a:cs typeface="+mj-cs"/>
-              </a:rPr>
-              <a:t>Lior</a:t>
-            </a:r>
-            <a:r>
-              <a:rPr lang="en-US" sz="5100" dirty="0" smtClean="0">
-                <a:latin typeface="Arial" pitchFamily="34" charset="0"/>
-                <a:cs typeface="+mj-cs"/>
-              </a:rPr>
-              <a:t> Kirsch</a:t>
-            </a:r>
-            <a:r>
-              <a:rPr lang="en-US" sz="5100" dirty="0" smtClean="0">
-                <a:latin typeface="Arial" pitchFamily="34" charset="0"/>
-                <a:cs typeface="Arial" pitchFamily="34" charset="0"/>
-              </a:rPr>
-              <a:t>, Gal </a:t>
-            </a:r>
-            <a:r>
-              <a:rPr lang="en-US" sz="5100" dirty="0" err="1" smtClean="0">
-                <a:latin typeface="Arial" pitchFamily="34" charset="0"/>
-                <a:cs typeface="Arial" pitchFamily="34" charset="0"/>
-              </a:rPr>
-              <a:t>Chechik</a:t>
-            </a:r>
-            <a:endParaRPr lang="en-US" sz="5100" baseline="30000" dirty="0">
-              <a:latin typeface="Arial" pitchFamily="34" charset="0"/>
-              <a:cs typeface="Arial" pitchFamily="34" charset="0"/>
-            </a:endParaRPr>
-          </a:p>
-          <a:p>
-            <a:pPr algn="ctr" rtl="0"/>
-            <a:r>
-              <a:rPr lang="en-US" sz="3800" b="1" dirty="0" err="1" smtClean="0"/>
-              <a:t>Gonda</a:t>
-            </a:r>
-            <a:r>
-              <a:rPr lang="en-US" sz="3800" b="1" dirty="0" smtClean="0"/>
-              <a:t> </a:t>
-            </a:r>
-            <a:r>
-              <a:rPr lang="en-US" sz="3800" b="1" dirty="0"/>
-              <a:t>Multidisciplinary Brain Research Center, Bar-</a:t>
-            </a:r>
-            <a:r>
-              <a:rPr lang="en-US" sz="3800" b="1" dirty="0" err="1"/>
-              <a:t>Ilan</a:t>
-            </a:r>
-            <a:r>
-              <a:rPr lang="en-US" sz="3800" b="1" dirty="0"/>
-              <a:t> University, Ramat-</a:t>
-            </a:r>
-            <a:r>
-              <a:rPr lang="en-US" sz="3800" b="1" dirty="0" err="1"/>
-              <a:t>Gan</a:t>
-            </a:r>
-            <a:r>
-              <a:rPr lang="en-US" sz="3800" b="1" dirty="0"/>
-              <a:t>, </a:t>
-            </a:r>
-            <a:r>
-              <a:rPr lang="en-US" sz="3800" b="1" dirty="0" smtClean="0"/>
-              <a:t>Israel</a:t>
-            </a:r>
-          </a:p>
-        </p:txBody>
-      </p:sp>
-      <p:sp>
-        <p:nvSpPr>
-          <p:cNvPr id="21" name="Rounded Rectangle 20"/>
-          <p:cNvSpPr/>
-          <p:nvPr/>
-        </p:nvSpPr>
-        <p:spPr>
-          <a:xfrm>
-            <a:off x="21602700" y="14041785"/>
-            <a:ext cx="9361040" cy="17857984"/>
-          </a:xfrm>
-          <a:prstGeom prst="roundRect">
-            <a:avLst/>
-          </a:prstGeom>
-          <a:solidFill>
-            <a:schemeClr val="bg1"/>
-          </a:solidFill>
-          <a:ln w="76200">
-            <a:solidFill>
-              <a:schemeClr val="tx1"/>
-            </a:solidFill>
-          </a:ln>
-        </p:spPr>
-        <p:style>
-          <a:lnRef idx="2">
-            <a:schemeClr val="accent1">
-              <a:shade val="50000"/>
-            </a:schemeClr>
-          </a:lnRef>
-          <a:fillRef idx="1">
-            <a:schemeClr val="accent1"/>
-          </a:fillRef>
-          <a:effectRef idx="0">
-            <a:schemeClr val="accent1"/>
-          </a:effectRef>
-          <a:fontRef idx="minor">
-            <a:schemeClr val="lt1"/>
-          </a:fontRef>
-        </p:style>
-        <p:txBody>
-          <a:bodyPr lIns="83976" tIns="41987" rIns="83976" bIns="41987" rtlCol="1" anchor="t" anchorCtr="0"/>
-          <a:lstStyle/>
-          <a:p>
-            <a:pPr algn="ctr" rtl="0"/>
-            <a:r>
-              <a:rPr lang="en-US" sz="4400" b="1" dirty="0" smtClean="0">
-                <a:solidFill>
-                  <a:schemeClr val="tx1"/>
-                </a:solidFill>
-              </a:rPr>
-              <a:t>Which gene functions agrees </a:t>
-            </a:r>
-          </a:p>
-          <a:p>
-            <a:pPr algn="ctr" rtl="0"/>
-            <a:r>
-              <a:rPr lang="en-US" sz="4400" b="1" dirty="0" smtClean="0">
-                <a:solidFill>
-                  <a:schemeClr val="tx1"/>
-                </a:solidFill>
-              </a:rPr>
-              <a:t>with BRO?</a:t>
-            </a:r>
-          </a:p>
-          <a:p>
-            <a:pPr algn="l" rtl="0"/>
-            <a:endParaRPr lang="en-US" sz="3200" b="1" dirty="0" smtClean="0">
-              <a:solidFill>
-                <a:schemeClr val="tx1"/>
-              </a:solidFill>
-            </a:endParaRPr>
-          </a:p>
-          <a:p>
-            <a:pPr algn="l" rtl="0"/>
-            <a:endParaRPr lang="en-US" sz="3200" b="1" i="1" dirty="0" smtClean="0">
-              <a:solidFill>
-                <a:schemeClr val="tx1"/>
-              </a:solidFill>
-            </a:endParaRPr>
-          </a:p>
-          <a:p>
-            <a:pPr algn="l" rtl="0"/>
-            <a:endParaRPr lang="en-US" sz="3200" b="1" i="1" dirty="0" smtClean="0">
-              <a:solidFill>
-                <a:schemeClr val="tx1"/>
-              </a:solidFill>
-            </a:endParaRPr>
-          </a:p>
-          <a:p>
-            <a:pPr algn="l" rtl="0"/>
-            <a:endParaRPr lang="en-US" sz="3200" b="1" i="1" dirty="0" smtClean="0">
-              <a:solidFill>
-                <a:schemeClr val="tx1"/>
-              </a:solidFill>
-            </a:endParaRPr>
-          </a:p>
-          <a:p>
-            <a:pPr algn="l" rtl="0"/>
-            <a:endParaRPr lang="en-US" sz="3200" b="1" i="1" dirty="0" smtClean="0">
-              <a:solidFill>
-                <a:schemeClr val="tx1"/>
-              </a:solidFill>
-            </a:endParaRPr>
-          </a:p>
-          <a:p>
-            <a:pPr algn="l" rtl="0"/>
-            <a:endParaRPr lang="en-US" sz="3200" b="1" i="1" dirty="0" smtClean="0">
-              <a:solidFill>
-                <a:schemeClr val="tx1"/>
-              </a:solidFill>
-            </a:endParaRPr>
-          </a:p>
-          <a:p>
-            <a:pPr algn="l" rtl="0"/>
-            <a:endParaRPr lang="en-US" sz="3200" b="1" i="1" dirty="0" smtClean="0">
-              <a:solidFill>
-                <a:schemeClr val="tx1"/>
-              </a:solidFill>
-            </a:endParaRPr>
-          </a:p>
-          <a:p>
-            <a:pPr algn="l" rtl="0"/>
-            <a:endParaRPr lang="en-US" sz="3200" b="1" i="1" dirty="0" smtClean="0">
-              <a:solidFill>
-                <a:schemeClr val="tx1"/>
-              </a:solidFill>
-            </a:endParaRPr>
-          </a:p>
-          <a:p>
-            <a:pPr algn="l" rtl="0"/>
-            <a:endParaRPr lang="en-US" sz="3200" b="1" i="1" dirty="0" smtClean="0">
-              <a:solidFill>
-                <a:schemeClr val="tx1"/>
-              </a:solidFill>
-            </a:endParaRPr>
-          </a:p>
-          <a:p>
-            <a:pPr algn="l" rtl="0"/>
-            <a:endParaRPr lang="en-US" sz="3200" b="1" i="1" dirty="0" smtClean="0">
-              <a:solidFill>
-                <a:schemeClr val="tx1"/>
-              </a:solidFill>
-            </a:endParaRPr>
-          </a:p>
-          <a:p>
-            <a:pPr algn="l" rtl="0"/>
-            <a:endParaRPr lang="en-US" sz="3200" b="1" i="1" dirty="0" smtClean="0">
-              <a:solidFill>
-                <a:schemeClr val="tx1"/>
-              </a:solidFill>
-            </a:endParaRPr>
-          </a:p>
-          <a:p>
-            <a:pPr algn="l" rtl="0"/>
-            <a:endParaRPr lang="en-US" sz="3200" b="1" i="1" dirty="0" smtClean="0">
-              <a:solidFill>
-                <a:schemeClr val="tx1"/>
-              </a:solidFill>
-            </a:endParaRPr>
-          </a:p>
-          <a:p>
-            <a:pPr algn="l" rtl="0"/>
-            <a:endParaRPr lang="en-US" sz="3200" b="1" i="1" dirty="0" smtClean="0">
-              <a:solidFill>
-                <a:schemeClr val="tx1"/>
-              </a:solidFill>
-            </a:endParaRPr>
-          </a:p>
-          <a:p>
-            <a:pPr algn="l" rtl="0"/>
-            <a:endParaRPr lang="en-US" sz="3200" b="1" i="1" dirty="0" smtClean="0">
-              <a:solidFill>
-                <a:schemeClr val="tx1"/>
-              </a:solidFill>
-            </a:endParaRPr>
-          </a:p>
-          <a:p>
-            <a:pPr algn="l" rtl="0"/>
-            <a:endParaRPr lang="en-US" sz="3200" b="1" i="1" dirty="0" smtClean="0">
-              <a:solidFill>
-                <a:schemeClr val="tx1"/>
-              </a:solidFill>
-            </a:endParaRPr>
-          </a:p>
-          <a:p>
-            <a:pPr algn="l" rtl="0"/>
-            <a:endParaRPr lang="en-US" sz="3200" b="1" i="1" dirty="0" smtClean="0">
-              <a:solidFill>
-                <a:schemeClr val="tx1"/>
-              </a:solidFill>
-            </a:endParaRPr>
-          </a:p>
-          <a:p>
-            <a:pPr algn="l" rtl="0"/>
-            <a:endParaRPr lang="en-US" sz="3200" b="1" i="1" dirty="0" smtClean="0">
-              <a:solidFill>
-                <a:schemeClr val="tx1"/>
-              </a:solidFill>
-            </a:endParaRPr>
-          </a:p>
-          <a:p>
-            <a:pPr algn="l" rtl="0"/>
-            <a:endParaRPr lang="en-US" sz="3200" b="1" dirty="0" smtClean="0">
-              <a:solidFill>
-                <a:schemeClr val="tx1"/>
-              </a:solidFill>
-            </a:endParaRPr>
-          </a:p>
-          <a:p>
-            <a:pPr algn="l" rtl="0"/>
-            <a:endParaRPr lang="he-IL" sz="3200" b="1" i="1" dirty="0">
-              <a:solidFill>
-                <a:schemeClr val="tx1"/>
-              </a:solidFill>
-            </a:endParaRPr>
-          </a:p>
-        </p:txBody>
-      </p:sp>
-      <p:sp>
-        <p:nvSpPr>
-          <p:cNvPr id="10" name="Rounded Rectangle 9"/>
-          <p:cNvSpPr/>
-          <p:nvPr/>
-        </p:nvSpPr>
-        <p:spPr>
-          <a:xfrm>
-            <a:off x="1080420" y="4968777"/>
-            <a:ext cx="9721080" cy="8280920"/>
-          </a:xfrm>
-          <a:prstGeom prst="roundRect">
-            <a:avLst/>
-          </a:prstGeom>
-          <a:solidFill>
-            <a:schemeClr val="bg1"/>
-          </a:solidFill>
-          <a:ln w="76200">
-            <a:solidFill>
-              <a:schemeClr val="tx1"/>
-            </a:solidFill>
-          </a:ln>
-        </p:spPr>
-        <p:style>
-          <a:lnRef idx="2">
-            <a:schemeClr val="accent1">
-              <a:shade val="50000"/>
-            </a:schemeClr>
-          </a:lnRef>
-          <a:fillRef idx="1">
-            <a:schemeClr val="accent1"/>
-          </a:fillRef>
-          <a:effectRef idx="0">
-            <a:schemeClr val="accent1"/>
-          </a:effectRef>
-          <a:fontRef idx="minor">
-            <a:schemeClr val="lt1"/>
-          </a:fontRef>
-        </p:style>
-        <p:txBody>
-          <a:bodyPr lIns="83976" tIns="41987" rIns="83976" bIns="41987" rtlCol="1" anchor="t" anchorCtr="0"/>
-          <a:lstStyle/>
-          <a:p>
-            <a:pPr algn="ctr" rtl="0"/>
-            <a:r>
-              <a:rPr lang="en-US" sz="4400" b="1" dirty="0" smtClean="0">
-                <a:solidFill>
-                  <a:schemeClr val="tx1"/>
-                </a:solidFill>
-              </a:rPr>
-              <a:t>Background</a:t>
-            </a:r>
-          </a:p>
-          <a:p>
-            <a:pPr algn="l" rtl="0"/>
-            <a:endParaRPr lang="en-US" sz="1050" dirty="0" smtClean="0">
-              <a:solidFill>
-                <a:schemeClr val="tx1"/>
-              </a:solidFill>
-            </a:endParaRPr>
-          </a:p>
-          <a:p>
-            <a:pPr algn="l" rtl="0"/>
-            <a:r>
-              <a:rPr lang="en-US" sz="3200" dirty="0" smtClean="0">
-                <a:solidFill>
-                  <a:schemeClr val="tx1"/>
-                </a:solidFill>
-              </a:rPr>
-              <a:t>The human brain is organized in multiple anatomical substructures, each having its own characteristic. The differences between structures are reflected in the area-specific transcriptome signatures. These complex expression patterns raise many questions:</a:t>
-            </a:r>
-          </a:p>
-          <a:p>
-            <a:pPr algn="l" rtl="0"/>
-            <a:endParaRPr lang="en-US" sz="2000" dirty="0" smtClean="0">
-              <a:solidFill>
-                <a:schemeClr val="tx1"/>
-              </a:solidFill>
-            </a:endParaRPr>
-          </a:p>
-          <a:p>
-            <a:pPr marL="457200" indent="-457200" algn="l" rtl="0">
-              <a:buFont typeface="Arial" panose="020B0604020202020204" pitchFamily="34" charset="0"/>
-              <a:buChar char="•"/>
-            </a:pPr>
-            <a:r>
-              <a:rPr lang="en-US" sz="3200" dirty="0" smtClean="0">
-                <a:solidFill>
-                  <a:schemeClr val="tx1"/>
-                </a:solidFill>
-              </a:rPr>
-              <a:t>Which genes are expressed in which </a:t>
-            </a:r>
-            <a:r>
-              <a:rPr lang="en-US" sz="3200" dirty="0" err="1" smtClean="0">
-                <a:solidFill>
-                  <a:schemeClr val="tx1"/>
-                </a:solidFill>
-              </a:rPr>
-              <a:t>which</a:t>
-            </a:r>
-            <a:r>
-              <a:rPr lang="en-US" sz="3200" dirty="0" smtClean="0">
-                <a:solidFill>
-                  <a:schemeClr val="tx1"/>
-                </a:solidFill>
-              </a:rPr>
-              <a:t> brain regions?</a:t>
-            </a:r>
-          </a:p>
-          <a:p>
-            <a:pPr marL="457200" indent="-457200" algn="l" rtl="0">
-              <a:buFont typeface="Arial" panose="020B0604020202020204" pitchFamily="34" charset="0"/>
-              <a:buChar char="•"/>
-            </a:pPr>
-            <a:r>
-              <a:rPr lang="en-US" sz="3200" dirty="0" smtClean="0">
-                <a:solidFill>
-                  <a:schemeClr val="tx1"/>
-                </a:solidFill>
-              </a:rPr>
-              <a:t>Does expression across regions follow certain patterns?</a:t>
-            </a:r>
-          </a:p>
-          <a:p>
-            <a:pPr marL="457200" indent="-457200" algn="l" rtl="0">
-              <a:buFont typeface="Arial" panose="020B0604020202020204" pitchFamily="34" charset="0"/>
-              <a:buChar char="•"/>
-            </a:pPr>
-            <a:r>
-              <a:rPr lang="en-US" sz="3200" dirty="0" smtClean="0">
-                <a:solidFill>
-                  <a:schemeClr val="tx1"/>
-                </a:solidFill>
-              </a:rPr>
-              <a:t>To what extent does development determines expression in the adult brain?</a:t>
-            </a:r>
-          </a:p>
-          <a:p>
-            <a:pPr marL="457200" indent="-457200" algn="l" rtl="0">
-              <a:buFont typeface="Arial" panose="020B0604020202020204" pitchFamily="34" charset="0"/>
-              <a:buChar char="•"/>
-            </a:pPr>
-            <a:r>
-              <a:rPr lang="en-US" sz="3200" dirty="0" smtClean="0">
-                <a:solidFill>
-                  <a:schemeClr val="tx1"/>
-                </a:solidFill>
-              </a:rPr>
-              <a:t>What are the principles which govern spatial patterns of expression?</a:t>
-            </a:r>
-          </a:p>
-        </p:txBody>
-      </p:sp>
-      <p:pic>
-        <p:nvPicPr>
-          <p:cNvPr id="12" name="Picture 11"/>
-          <p:cNvPicPr>
-            <a:picLocks noChangeAspect="1"/>
-          </p:cNvPicPr>
-          <p:nvPr/>
-        </p:nvPicPr>
-        <p:blipFill>
-          <a:blip r:embed="rId3" cstate="print">
-            <a:extLst>
-              <a:ext uri="{28A0092B-C50C-407E-A947-70E740481C1C}">
-                <a14:useLocalDpi xmlns:a14="http://schemas.microsoft.com/office/drawing/2010/main" val="0"/>
-              </a:ext>
-            </a:extLst>
-          </a:blip>
-          <a:stretch>
-            <a:fillRect/>
-          </a:stretch>
-        </p:blipFill>
-        <p:spPr>
-          <a:xfrm>
-            <a:off x="38694580" y="825979"/>
-            <a:ext cx="3659927" cy="2846653"/>
-          </a:xfrm>
-          <a:prstGeom prst="rect">
-            <a:avLst/>
-          </a:prstGeom>
-        </p:spPr>
-      </p:pic>
-      <p:pic>
-        <p:nvPicPr>
-          <p:cNvPr id="887" name="Picture 886"/>
-          <p:cNvPicPr/>
-          <p:nvPr/>
-        </p:nvPicPr>
-        <p:blipFill>
-          <a:blip r:embed="rId4" cstate="print"/>
-          <a:srcRect l="5796"/>
-          <a:stretch>
-            <a:fillRect/>
-          </a:stretch>
-        </p:blipFill>
-        <p:spPr>
-          <a:xfrm>
-            <a:off x="22322780" y="8569177"/>
-            <a:ext cx="5904656" cy="4707669"/>
-          </a:xfrm>
-          <a:prstGeom prst="rect">
-            <a:avLst/>
-          </a:prstGeom>
-        </p:spPr>
-      </p:pic>
-      <p:sp>
-        <p:nvSpPr>
-          <p:cNvPr id="20" name="Rounded Rectangle 19"/>
-          <p:cNvSpPr/>
-          <p:nvPr/>
-        </p:nvSpPr>
-        <p:spPr>
-          <a:xfrm>
-            <a:off x="11449571" y="4968777"/>
-            <a:ext cx="9433050" cy="15193688"/>
-          </a:xfrm>
-          <a:prstGeom prst="roundRect">
-            <a:avLst/>
-          </a:prstGeom>
-          <a:solidFill>
-            <a:schemeClr val="bg1"/>
-          </a:solidFill>
-          <a:ln w="76200">
-            <a:solidFill>
-              <a:schemeClr val="tx1"/>
-            </a:solidFill>
-          </a:ln>
-        </p:spPr>
-        <p:style>
-          <a:lnRef idx="2">
-            <a:schemeClr val="accent1">
-              <a:shade val="50000"/>
-            </a:schemeClr>
-          </a:lnRef>
-          <a:fillRef idx="1">
-            <a:schemeClr val="accent1"/>
-          </a:fillRef>
-          <a:effectRef idx="0">
-            <a:schemeClr val="accent1"/>
-          </a:effectRef>
-          <a:fontRef idx="minor">
-            <a:schemeClr val="lt1"/>
-          </a:fontRef>
-        </p:style>
-        <p:txBody>
-          <a:bodyPr lIns="83976" tIns="41987" rIns="83976" bIns="41987" rtlCol="1" anchor="t"/>
-          <a:lstStyle/>
-          <a:p>
-            <a:pPr lvl="0" algn="ctr" rtl="0"/>
-            <a:r>
-              <a:rPr lang="en-US" sz="4400" b="1" dirty="0" smtClean="0">
-                <a:solidFill>
-                  <a:schemeClr val="tx1"/>
-                </a:solidFill>
-              </a:rPr>
-              <a:t>Gene expression patterns follow the embryonic origin regions</a:t>
-            </a:r>
-            <a:endParaRPr lang="en-US" sz="4300" dirty="0">
-              <a:solidFill>
-                <a:prstClr val="black"/>
-              </a:solidFill>
-            </a:endParaRPr>
-          </a:p>
-        </p:txBody>
-      </p:sp>
-      <p:sp>
-        <p:nvSpPr>
-          <p:cNvPr id="22" name="Rounded Rectangle 21"/>
-          <p:cNvSpPr/>
-          <p:nvPr/>
-        </p:nvSpPr>
-        <p:spPr>
-          <a:xfrm>
-            <a:off x="1080420" y="13969777"/>
-            <a:ext cx="9715301" cy="9001000"/>
-          </a:xfrm>
-          <a:prstGeom prst="roundRect">
-            <a:avLst/>
-          </a:prstGeom>
-          <a:solidFill>
-            <a:schemeClr val="bg1"/>
-          </a:solidFill>
-          <a:ln w="76200">
-            <a:solidFill>
-              <a:schemeClr val="tx1"/>
-            </a:solidFill>
-          </a:ln>
-        </p:spPr>
-        <p:style>
-          <a:lnRef idx="2">
-            <a:schemeClr val="accent1">
-              <a:shade val="50000"/>
-            </a:schemeClr>
-          </a:lnRef>
-          <a:fillRef idx="1">
-            <a:schemeClr val="accent1"/>
-          </a:fillRef>
-          <a:effectRef idx="0">
-            <a:schemeClr val="accent1"/>
-          </a:effectRef>
-          <a:fontRef idx="minor">
-            <a:schemeClr val="lt1"/>
-          </a:fontRef>
-        </p:style>
-        <p:txBody>
-          <a:bodyPr lIns="83976" tIns="41987" rIns="83976" bIns="41987" rtlCol="1" anchor="t" anchorCtr="0"/>
-          <a:lstStyle/>
-          <a:p>
-            <a:pPr algn="ctr" rtl="0"/>
-            <a:r>
-              <a:rPr lang="en-US" sz="4400" b="1" dirty="0" smtClean="0">
-                <a:solidFill>
-                  <a:schemeClr val="tx1"/>
-                </a:solidFill>
-              </a:rPr>
-              <a:t>The data</a:t>
-            </a:r>
-          </a:p>
-          <a:p>
-            <a:pPr algn="l" rtl="0"/>
-            <a:endParaRPr lang="en-US" sz="1600" b="1" dirty="0" smtClean="0">
-              <a:solidFill>
-                <a:schemeClr val="tx1"/>
-              </a:solidFill>
-            </a:endParaRPr>
-          </a:p>
-          <a:p>
-            <a:pPr algn="l" rtl="0"/>
-            <a:r>
-              <a:rPr lang="en-US" sz="3200" dirty="0" smtClean="0">
-                <a:solidFill>
-                  <a:schemeClr val="tx1"/>
-                </a:solidFill>
-              </a:rPr>
-              <a:t>We analyzed two brain transcriptome datasets collected from post mortem human brains.</a:t>
-            </a:r>
-          </a:p>
-          <a:p>
-            <a:pPr marL="607499" indent="-607499" algn="l" rtl="0">
-              <a:buFont typeface="+mj-lt"/>
-              <a:buAutoNum type="arabicPeriod"/>
-            </a:pPr>
-            <a:r>
-              <a:rPr lang="en-US" sz="3200" dirty="0" smtClean="0">
-                <a:solidFill>
-                  <a:schemeClr val="tx1"/>
-                </a:solidFill>
-              </a:rPr>
-              <a:t>Microarray from 6 humans and 414 distinct regions; a total of 3702 tissue samples</a:t>
-            </a:r>
-            <a:r>
-              <a:rPr lang="en-US" sz="3300" dirty="0" smtClean="0">
-                <a:solidFill>
-                  <a:schemeClr val="tx1"/>
-                </a:solidFill>
-              </a:rPr>
-              <a:t> </a:t>
-            </a:r>
-            <a:r>
-              <a:rPr lang="en-US" sz="3000" dirty="0" smtClean="0">
-                <a:solidFill>
-                  <a:schemeClr val="tx1"/>
-                </a:solidFill>
-              </a:rPr>
-              <a:t>[1] </a:t>
-            </a:r>
-          </a:p>
-          <a:p>
-            <a:pPr marL="607499" indent="-607499" algn="l" rtl="0">
-              <a:buFont typeface="+mj-lt"/>
-              <a:buAutoNum type="arabicPeriod"/>
-            </a:pPr>
-            <a:r>
-              <a:rPr lang="en-US" sz="3200" dirty="0" smtClean="0">
-                <a:solidFill>
-                  <a:schemeClr val="tx1"/>
-                </a:solidFill>
-              </a:rPr>
-              <a:t>Microarray from 20 adult donors, and 491 </a:t>
-            </a:r>
-            <a:br>
-              <a:rPr lang="en-US" sz="3200" dirty="0" smtClean="0">
-                <a:solidFill>
-                  <a:schemeClr val="tx1"/>
-                </a:solidFill>
-              </a:rPr>
-            </a:br>
-            <a:r>
-              <a:rPr lang="en-US" sz="3200" dirty="0" smtClean="0">
-                <a:solidFill>
-                  <a:schemeClr val="tx1"/>
-                </a:solidFill>
-              </a:rPr>
-              <a:t>tissue samples </a:t>
-            </a:r>
-            <a:r>
-              <a:rPr lang="en-US" sz="3000" dirty="0" smtClean="0">
-                <a:solidFill>
-                  <a:schemeClr val="tx1"/>
-                </a:solidFill>
-              </a:rPr>
-              <a:t>[2] </a:t>
-            </a:r>
-          </a:p>
-          <a:p>
-            <a:pPr marL="607499" indent="-607499" algn="l" rtl="0"/>
-            <a:endParaRPr lang="en-US" sz="3200" dirty="0" smtClean="0">
-              <a:solidFill>
-                <a:schemeClr val="tx1"/>
-              </a:solidFill>
-            </a:endParaRPr>
-          </a:p>
-          <a:p>
-            <a:pPr algn="ctr"/>
-            <a:endParaRPr lang="he-IL" sz="3200" dirty="0">
-              <a:solidFill>
-                <a:schemeClr val="tx1"/>
-              </a:solidFill>
-            </a:endParaRPr>
-          </a:p>
-        </p:txBody>
-      </p:sp>
-      <p:sp>
-        <p:nvSpPr>
-          <p:cNvPr id="191" name="Rounded Rectangle 190"/>
-          <p:cNvSpPr/>
-          <p:nvPr/>
-        </p:nvSpPr>
-        <p:spPr>
-          <a:xfrm>
-            <a:off x="31611812" y="4968777"/>
-            <a:ext cx="10441159" cy="10513168"/>
-          </a:xfrm>
-          <a:prstGeom prst="roundRect">
-            <a:avLst/>
-          </a:prstGeom>
-          <a:solidFill>
-            <a:schemeClr val="bg1"/>
-          </a:solidFill>
-          <a:ln w="76200">
-            <a:solidFill>
-              <a:schemeClr val="tx1"/>
-            </a:solidFill>
-          </a:ln>
-        </p:spPr>
-        <p:style>
-          <a:lnRef idx="2">
-            <a:schemeClr val="accent1">
-              <a:shade val="50000"/>
-            </a:schemeClr>
-          </a:lnRef>
-          <a:fillRef idx="1">
-            <a:schemeClr val="accent1"/>
-          </a:fillRef>
-          <a:effectRef idx="0">
-            <a:schemeClr val="accent1"/>
-          </a:effectRef>
-          <a:fontRef idx="minor">
-            <a:schemeClr val="lt1"/>
-          </a:fontRef>
-        </p:style>
-        <p:txBody>
-          <a:bodyPr lIns="83976" tIns="41987" rIns="83976" bIns="41987" rtlCol="1" anchor="t" anchorCtr="0"/>
-          <a:lstStyle/>
-          <a:p>
-            <a:pPr marL="539940" indent="-539940" algn="ctr" rtl="0"/>
-            <a:r>
-              <a:rPr lang="en-US" sz="4400" b="1" dirty="0" smtClean="0">
-                <a:solidFill>
-                  <a:schemeClr val="tx1"/>
-                </a:solidFill>
-              </a:rPr>
-              <a:t>	Expression across the human cortex is not homogeneous</a:t>
-            </a:r>
-            <a:endParaRPr lang="en-US" sz="4400" b="1" dirty="0">
-              <a:solidFill>
-                <a:schemeClr val="tx1"/>
-              </a:solidFill>
-            </a:endParaRPr>
-          </a:p>
-        </p:txBody>
-      </p:sp>
-      <p:grpSp>
-        <p:nvGrpSpPr>
-          <p:cNvPr id="58" name="Group 57"/>
-          <p:cNvGrpSpPr/>
-          <p:nvPr/>
-        </p:nvGrpSpPr>
-        <p:grpSpPr>
-          <a:xfrm>
-            <a:off x="1085292" y="910858"/>
-            <a:ext cx="3307496" cy="3121815"/>
-            <a:chOff x="850900" y="638181"/>
-            <a:chExt cx="2975505" cy="2808462"/>
-          </a:xfrm>
-        </p:grpSpPr>
-        <p:pic>
-          <p:nvPicPr>
-            <p:cNvPr id="11" name="Picture 10"/>
-            <p:cNvPicPr>
-              <a:picLocks noChangeAspect="1"/>
-            </p:cNvPicPr>
-            <p:nvPr/>
-          </p:nvPicPr>
-          <p:blipFill>
-            <a:blip r:embed="rId5" cstate="print">
-              <a:extLst>
-                <a:ext uri="{BEBA8EAE-BF5A-486C-A8C5-ECC9F3942E4B}">
-                  <a14:imgProps xmlns:a14="http://schemas.microsoft.com/office/drawing/2010/main">
-                    <a14:imgLayer r:embed="rId6">
-                      <a14:imgEffect>
-                        <a14:backgroundRemoval t="2174" b="100000" l="2000" r="99750"/>
-                      </a14:imgEffect>
-                    </a14:imgLayer>
-                  </a14:imgProps>
-                </a:ext>
-                <a:ext uri="{28A0092B-C50C-407E-A947-70E740481C1C}">
-                  <a14:useLocalDpi xmlns:a14="http://schemas.microsoft.com/office/drawing/2010/main" val="0"/>
-                </a:ext>
-              </a:extLst>
-            </a:blip>
-            <a:stretch>
-              <a:fillRect/>
-            </a:stretch>
-          </p:blipFill>
-          <p:spPr>
-            <a:xfrm>
-              <a:off x="1191095" y="638181"/>
-              <a:ext cx="2265743" cy="1823950"/>
-            </a:xfrm>
-            <a:prstGeom prst="rect">
-              <a:avLst/>
-            </a:prstGeom>
-          </p:spPr>
-        </p:pic>
-        <p:sp>
-          <p:nvSpPr>
-            <p:cNvPr id="145" name="TextBox 144"/>
-            <p:cNvSpPr txBox="1"/>
-            <p:nvPr/>
-          </p:nvSpPr>
-          <p:spPr>
-            <a:xfrm>
-              <a:off x="850900" y="2424221"/>
-              <a:ext cx="2975505" cy="1022422"/>
-            </a:xfrm>
-            <a:prstGeom prst="rect">
-              <a:avLst/>
-            </a:prstGeom>
-            <a:noFill/>
-            <a:ln w="38100">
-              <a:noFill/>
-            </a:ln>
-          </p:spPr>
-          <p:txBody>
-            <a:bodyPr wrap="square" lIns="107988" tIns="53994" rIns="107988" bIns="53994" rtlCol="0">
-              <a:spAutoFit/>
-            </a:bodyPr>
-            <a:lstStyle/>
-            <a:p>
-              <a:pPr algn="ctr" rtl="0"/>
-              <a:r>
-                <a:rPr lang="en-US" sz="2400" b="1" dirty="0" smtClean="0">
-                  <a:solidFill>
-                    <a:schemeClr val="bg1">
-                      <a:lumMod val="50000"/>
-                    </a:schemeClr>
-                  </a:solidFill>
-                </a:rPr>
-                <a:t>The Leslie and Susan </a:t>
-              </a:r>
-              <a:r>
-                <a:rPr lang="en-US" sz="2400" b="1" dirty="0" err="1" smtClean="0">
-                  <a:solidFill>
-                    <a:schemeClr val="bg1">
-                      <a:lumMod val="50000"/>
-                    </a:schemeClr>
-                  </a:solidFill>
-                </a:rPr>
-                <a:t>Gonda</a:t>
-              </a:r>
-              <a:r>
-                <a:rPr lang="en-US" sz="2400" b="1" dirty="0" smtClean="0">
-                  <a:solidFill>
-                    <a:schemeClr val="bg1">
-                      <a:lumMod val="50000"/>
-                    </a:schemeClr>
-                  </a:solidFill>
-                </a:rPr>
-                <a:t> Multidisciplinary Brain Research Center</a:t>
-              </a:r>
-              <a:endParaRPr lang="en-US" sz="2400" b="1" dirty="0">
-                <a:solidFill>
-                  <a:schemeClr val="bg1">
-                    <a:lumMod val="50000"/>
-                  </a:schemeClr>
-                </a:solidFill>
-              </a:endParaRPr>
-            </a:p>
-          </p:txBody>
-        </p:sp>
-      </p:grpSp>
-      <p:sp>
-        <p:nvSpPr>
-          <p:cNvPr id="931" name="Rectangle 930"/>
-          <p:cNvSpPr/>
-          <p:nvPr/>
-        </p:nvSpPr>
-        <p:spPr>
-          <a:xfrm>
-            <a:off x="11900380" y="17476911"/>
-            <a:ext cx="8334741" cy="2140380"/>
-          </a:xfrm>
-          <a:prstGeom prst="rect">
-            <a:avLst/>
-          </a:prstGeom>
-        </p:spPr>
-        <p:txBody>
-          <a:bodyPr wrap="square" lIns="108000" tIns="54000" rIns="108000" bIns="54000">
-            <a:spAutoFit/>
-          </a:bodyPr>
-          <a:lstStyle/>
-          <a:p>
-            <a:pPr algn="l" rtl="0"/>
-            <a:r>
-              <a:rPr lang="en-US" sz="3200" dirty="0" smtClean="0"/>
-              <a:t>When projecting the gene expression values on the 1</a:t>
-            </a:r>
-            <a:r>
-              <a:rPr lang="en-US" sz="3200" baseline="30000" dirty="0" smtClean="0"/>
-              <a:t>st</a:t>
-            </a:r>
-            <a:r>
-              <a:rPr lang="en-US" sz="3200" dirty="0" smtClean="0"/>
-              <a:t> and 2</a:t>
-            </a:r>
-            <a:r>
-              <a:rPr lang="en-US" sz="3200" baseline="30000" dirty="0" smtClean="0"/>
-              <a:t>nd</a:t>
-            </a:r>
-            <a:r>
-              <a:rPr lang="en-US" sz="3200" dirty="0" smtClean="0"/>
-              <a:t>  PCs, the tissue samples are ordered from the anterior to the posterior of the neural tube.</a:t>
-            </a:r>
-            <a:endParaRPr lang="en-US" sz="3200" b="1" dirty="0"/>
-          </a:p>
-        </p:txBody>
-      </p:sp>
-      <p:pic>
-        <p:nvPicPr>
-          <p:cNvPr id="738" name="Picture 737"/>
-          <p:cNvPicPr/>
-          <p:nvPr/>
-        </p:nvPicPr>
-        <p:blipFill>
-          <a:blip r:embed="rId7" cstate="print"/>
-          <a:srcRect r="5968"/>
-          <a:stretch>
-            <a:fillRect/>
-          </a:stretch>
-        </p:blipFill>
-        <p:spPr>
-          <a:xfrm>
-            <a:off x="25275108" y="6912993"/>
-            <a:ext cx="5318972" cy="4248472"/>
-          </a:xfrm>
-          <a:prstGeom prst="rect">
-            <a:avLst/>
-          </a:prstGeom>
-        </p:spPr>
-      </p:pic>
-      <p:pic>
-        <p:nvPicPr>
-          <p:cNvPr id="912" name="image12.png"/>
-          <p:cNvPicPr/>
-          <p:nvPr/>
-        </p:nvPicPr>
-        <p:blipFill>
-          <a:blip r:embed="rId8" cstate="print">
-            <a:extLst>
-              <a:ext uri="{28A0092B-C50C-407E-A947-70E740481C1C}">
-                <a14:useLocalDpi xmlns:a14="http://schemas.microsoft.com/office/drawing/2010/main" val="0"/>
-              </a:ext>
-            </a:extLst>
-          </a:blip>
-          <a:srcRect l="7080" t="704" r="6069" b="1408"/>
-          <a:stretch>
-            <a:fillRect/>
-          </a:stretch>
-        </p:blipFill>
-        <p:spPr>
-          <a:xfrm>
-            <a:off x="13040983" y="12889657"/>
-            <a:ext cx="7049548" cy="4665406"/>
           </a:xfrm>
           <a:prstGeom prst="rect">
             <a:avLst/>
@@ -9366,1679 +7746,85 @@
       </p:pic>
       <p:pic>
         <p:nvPicPr>
-          <p:cNvPr id="911" name="Picture 910" descr="tube.png"/>
-          <p:cNvPicPr/>
-          <p:nvPr/>
-        </p:nvPicPr>
-        <p:blipFill>
-          <a:blip r:embed="rId9" cstate="print"/>
-          <a:stretch>
-            <a:fillRect/>
-          </a:stretch>
-        </p:blipFill>
-        <p:spPr>
-          <a:xfrm>
-            <a:off x="11881623" y="13084953"/>
-            <a:ext cx="1052707" cy="4129910"/>
-          </a:xfrm>
-          <a:prstGeom prst="rect">
-            <a:avLst/>
-          </a:prstGeom>
-        </p:spPr>
-      </p:pic>
-      <p:sp>
-        <p:nvSpPr>
-          <p:cNvPr id="19" name="Rounded Rectangle 18"/>
-          <p:cNvSpPr/>
-          <p:nvPr/>
-        </p:nvSpPr>
-        <p:spPr>
-          <a:xfrm>
-            <a:off x="31683821" y="22682745"/>
-            <a:ext cx="10441160" cy="5646967"/>
-          </a:xfrm>
-          <a:prstGeom prst="roundRect">
-            <a:avLst/>
-          </a:prstGeom>
-          <a:solidFill>
-            <a:schemeClr val="bg1"/>
-          </a:solidFill>
-          <a:ln w="76200">
-            <a:solidFill>
-              <a:schemeClr val="tx1"/>
-            </a:solidFill>
-          </a:ln>
-        </p:spPr>
-        <p:style>
-          <a:lnRef idx="2">
-            <a:schemeClr val="accent1">
-              <a:shade val="50000"/>
-            </a:schemeClr>
-          </a:lnRef>
-          <a:fillRef idx="1">
-            <a:schemeClr val="accent1"/>
-          </a:fillRef>
-          <a:effectRef idx="0">
-            <a:schemeClr val="accent1"/>
-          </a:effectRef>
-          <a:fontRef idx="minor">
-            <a:schemeClr val="lt1"/>
-          </a:fontRef>
-        </p:style>
-        <p:txBody>
-          <a:bodyPr lIns="83976" tIns="41987" rIns="83976" bIns="41987" rtlCol="1" anchor="t" anchorCtr="0"/>
-          <a:lstStyle/>
-          <a:p>
-            <a:pPr algn="ctr" rtl="0"/>
-            <a:r>
-              <a:rPr lang="en-US" sz="4400" b="1" dirty="0" smtClean="0">
-                <a:solidFill>
-                  <a:schemeClr val="tx1"/>
-                </a:solidFill>
-              </a:rPr>
-              <a:t>Example: </a:t>
-            </a:r>
-            <a:r>
-              <a:rPr lang="en-US" sz="4400" b="1" i="1" dirty="0" smtClean="0">
-                <a:solidFill>
-                  <a:schemeClr val="tx1"/>
-                </a:solidFill>
-              </a:rPr>
-              <a:t>FEZF2 </a:t>
-            </a:r>
-            <a:r>
-              <a:rPr lang="en-US" sz="4400" b="1" dirty="0" smtClean="0">
-                <a:solidFill>
-                  <a:schemeClr val="tx1"/>
-                </a:solidFill>
-              </a:rPr>
-              <a:t>(ZNF312)</a:t>
-            </a:r>
-          </a:p>
-        </p:txBody>
-      </p:sp>
-      <p:pic>
-        <p:nvPicPr>
-          <p:cNvPr id="937" name="image04.png"/>
-          <p:cNvPicPr/>
-          <p:nvPr/>
-        </p:nvPicPr>
-        <p:blipFill>
-          <a:blip r:embed="rId10" cstate="print"/>
-          <a:srcRect l="11558" t="12764" r="15026" b="17728"/>
-          <a:stretch>
-            <a:fillRect/>
-          </a:stretch>
-        </p:blipFill>
-        <p:spPr>
-          <a:xfrm>
-            <a:off x="31827836" y="23906881"/>
-            <a:ext cx="7344816" cy="3960440"/>
-          </a:xfrm>
-          <a:prstGeom prst="rect">
-            <a:avLst/>
-          </a:prstGeom>
-          <a:ln/>
-        </p:spPr>
-      </p:pic>
-      <p:pic>
-        <p:nvPicPr>
-          <p:cNvPr id="939" name="Picture 938" descr="siteQr.png"/>
+          <p:cNvPr id="2" name="Picture 4" descr="http://chechiklab.biu.ac.il/~yuvval/figs/comet/rowcol_vis.png"/>
           <p:cNvPicPr>
-            <a:picLocks noChangeAspect="1"/>
+            <a:picLocks noChangeAspect="1" noChangeArrowheads="1"/>
           </p:cNvPicPr>
           <p:nvPr/>
         </p:nvPicPr>
-        <p:blipFill>
-          <a:blip r:embed="rId11" cstate="print"/>
-          <a:stretch>
-            <a:fillRect/>
-          </a:stretch>
+        <p:blipFill rotWithShape="1">
+          <a:blip r:embed="rId22" cstate="print">
+            <a:extLst>
+              <a:ext uri="{28A0092B-C50C-407E-A947-70E740481C1C}">
+                <a14:useLocalDpi xmlns:a14="http://schemas.microsoft.com/office/drawing/2010/main" val="0"/>
+              </a:ext>
+            </a:extLst>
+          </a:blip>
+          <a:srcRect l="7339" t="15746" r="8998" b="2607"/>
+          <a:stretch/>
         </p:blipFill>
-        <p:spPr>
+        <p:spPr bwMode="auto">
           <a:xfrm>
-            <a:off x="35356228" y="1080345"/>
-            <a:ext cx="2448276" cy="2448236"/>
-          </a:xfrm>
-          <a:prstGeom prst="rect">
-            <a:avLst/>
-          </a:prstGeom>
-        </p:spPr>
-      </p:pic>
-      <p:pic>
-        <p:nvPicPr>
-          <p:cNvPr id="35" name="image15.png"/>
-          <p:cNvPicPr/>
-          <p:nvPr/>
-        </p:nvPicPr>
-        <p:blipFill>
-          <a:blip r:embed="rId12" cstate="print"/>
-          <a:stretch>
-            <a:fillRect/>
-          </a:stretch>
-        </p:blipFill>
-        <p:spPr>
-          <a:xfrm>
-            <a:off x="1357468" y="26787201"/>
-            <a:ext cx="9156000" cy="4464496"/>
-          </a:xfrm>
-          <a:prstGeom prst="rect">
-            <a:avLst/>
-          </a:prstGeom>
-          <a:ln/>
-        </p:spPr>
-      </p:pic>
-      <p:sp>
-        <p:nvSpPr>
-          <p:cNvPr id="37" name="Rounded Rectangle 36"/>
-          <p:cNvSpPr/>
-          <p:nvPr/>
-        </p:nvSpPr>
-        <p:spPr>
-          <a:xfrm>
-            <a:off x="11449571" y="20882545"/>
-            <a:ext cx="9433049" cy="11089232"/>
-          </a:xfrm>
-          <a:prstGeom prst="roundRect">
-            <a:avLst/>
-          </a:prstGeom>
-          <a:solidFill>
-            <a:schemeClr val="bg1"/>
-          </a:solidFill>
-          <a:ln w="76200">
-            <a:solidFill>
-              <a:schemeClr val="tx1"/>
-            </a:solidFill>
-          </a:ln>
-        </p:spPr>
-        <p:style>
-          <a:lnRef idx="2">
-            <a:schemeClr val="accent1">
-              <a:shade val="50000"/>
-            </a:schemeClr>
-          </a:lnRef>
-          <a:fillRef idx="1">
-            <a:schemeClr val="accent1"/>
-          </a:fillRef>
-          <a:effectRef idx="0">
-            <a:schemeClr val="accent1"/>
-          </a:effectRef>
-          <a:fontRef idx="minor">
-            <a:schemeClr val="lt1"/>
-          </a:fontRef>
-        </p:style>
-        <p:txBody>
-          <a:bodyPr lIns="83976" tIns="41987" rIns="83976" bIns="41987" rtlCol="1" anchor="t"/>
-          <a:lstStyle/>
-          <a:p>
-            <a:pPr algn="ctr" rtl="0"/>
-            <a:r>
-              <a:rPr lang="en-US" sz="4800" b="1" dirty="0" smtClean="0">
-                <a:solidFill>
-                  <a:srgbClr val="FF0000"/>
-                </a:solidFill>
-              </a:rPr>
-              <a:t>B</a:t>
-            </a:r>
-            <a:r>
-              <a:rPr lang="en-US" sz="4000" b="1" dirty="0" smtClean="0">
-                <a:solidFill>
-                  <a:schemeClr val="tx1"/>
-                </a:solidFill>
-              </a:rPr>
-              <a:t>rain </a:t>
-            </a:r>
-            <a:r>
-              <a:rPr lang="en-US" sz="4800" b="1" dirty="0" smtClean="0">
-                <a:solidFill>
-                  <a:srgbClr val="FF0000"/>
-                </a:solidFill>
-              </a:rPr>
-              <a:t>R</a:t>
-            </a:r>
-            <a:r>
-              <a:rPr lang="en-US" sz="4000" b="1" dirty="0" smtClean="0">
-                <a:solidFill>
-                  <a:schemeClr val="tx1"/>
-                </a:solidFill>
-              </a:rPr>
-              <a:t>egion </a:t>
-            </a:r>
-            <a:r>
-              <a:rPr lang="en-US" sz="4800" b="1" dirty="0" smtClean="0">
-                <a:solidFill>
-                  <a:srgbClr val="FF0000"/>
-                </a:solidFill>
-              </a:rPr>
-              <a:t>O</a:t>
-            </a:r>
-            <a:r>
-              <a:rPr lang="en-US" sz="4000" b="1" dirty="0" smtClean="0">
-                <a:solidFill>
-                  <a:schemeClr val="tx1"/>
-                </a:solidFill>
-              </a:rPr>
-              <a:t>ntology score </a:t>
-            </a:r>
-          </a:p>
-          <a:p>
-            <a:pPr algn="l" rtl="0"/>
-            <a:r>
-              <a:rPr lang="en-US" sz="3200" dirty="0" smtClean="0">
-                <a:solidFill>
-                  <a:schemeClr val="tx1"/>
-                </a:solidFill>
-              </a:rPr>
-              <a:t>We define a measure of agreement between the expression of a single gene across regions and the brain region ontology</a:t>
-            </a:r>
-            <a:r>
-              <a:rPr lang="en-US" sz="3300" dirty="0" smtClean="0">
-                <a:solidFill>
-                  <a:schemeClr val="tx1"/>
-                </a:solidFill>
-              </a:rPr>
-              <a:t> </a:t>
-            </a:r>
-            <a:r>
-              <a:rPr lang="en-US" sz="2400" dirty="0" smtClean="0">
-                <a:solidFill>
-                  <a:schemeClr val="tx1"/>
-                </a:solidFill>
-              </a:rPr>
-              <a:t>(similar results with other scores)</a:t>
-            </a:r>
-            <a:endParaRPr lang="en-US" sz="3300" dirty="0" smtClean="0">
-              <a:solidFill>
-                <a:schemeClr val="tx1"/>
-              </a:solidFill>
-            </a:endParaRPr>
-          </a:p>
-          <a:p>
-            <a:pPr algn="l" rtl="0"/>
-            <a:endParaRPr lang="en-US" sz="1600" dirty="0" smtClean="0">
-              <a:solidFill>
-                <a:schemeClr val="tx1"/>
-              </a:solidFill>
-            </a:endParaRPr>
-          </a:p>
-          <a:p>
-            <a:pPr algn="l" rtl="0"/>
-            <a:r>
-              <a:rPr lang="en-US" sz="3600" b="1" dirty="0" err="1" smtClean="0">
-                <a:solidFill>
-                  <a:srgbClr val="FF0000"/>
-                </a:solidFill>
-              </a:rPr>
-              <a:t>BRO</a:t>
-            </a:r>
-            <a:r>
-              <a:rPr lang="en-US" sz="3600" b="1" baseline="-25000" dirty="0" err="1" smtClean="0">
-                <a:solidFill>
-                  <a:srgbClr val="FF0000"/>
-                </a:solidFill>
-              </a:rPr>
-              <a:t>score</a:t>
-            </a:r>
-            <a:r>
-              <a:rPr lang="en-US" sz="3600" b="1" baseline="-25000" dirty="0" smtClean="0">
-                <a:solidFill>
-                  <a:schemeClr val="tx1"/>
-                </a:solidFill>
-              </a:rPr>
-              <a:t> </a:t>
-            </a:r>
-            <a:r>
-              <a:rPr lang="en-US" sz="3600" b="1" i="1" dirty="0" smtClean="0">
-                <a:solidFill>
-                  <a:schemeClr val="tx1"/>
-                </a:solidFill>
-              </a:rPr>
-              <a:t>= Correlation (</a:t>
-            </a:r>
-            <a:r>
-              <a:rPr lang="en-US" sz="3600" b="1" i="1" dirty="0" err="1" smtClean="0">
-                <a:solidFill>
-                  <a:schemeClr val="tx1"/>
-                </a:solidFill>
-              </a:rPr>
-              <a:t>d</a:t>
-            </a:r>
-            <a:r>
-              <a:rPr lang="en-US" sz="3600" b="1" i="1" baseline="-25000" dirty="0" err="1" smtClean="0">
-                <a:solidFill>
-                  <a:schemeClr val="tx1"/>
-                </a:solidFill>
-              </a:rPr>
-              <a:t>expression</a:t>
-            </a:r>
-            <a:r>
-              <a:rPr lang="en-US" sz="3600" b="1" i="1" dirty="0" smtClean="0">
-                <a:solidFill>
-                  <a:schemeClr val="tx1"/>
-                </a:solidFill>
-              </a:rPr>
-              <a:t> , </a:t>
-            </a:r>
-            <a:r>
-              <a:rPr lang="en-US" sz="3600" b="1" i="1" dirty="0" err="1" smtClean="0">
-                <a:solidFill>
-                  <a:schemeClr val="tx1"/>
-                </a:solidFill>
-              </a:rPr>
-              <a:t>d</a:t>
-            </a:r>
-            <a:r>
-              <a:rPr lang="en-US" sz="3600" b="1" i="1" baseline="-25000" dirty="0" err="1" smtClean="0">
-                <a:solidFill>
-                  <a:schemeClr val="tx1"/>
-                </a:solidFill>
-              </a:rPr>
-              <a:t>tree</a:t>
-            </a:r>
-            <a:r>
-              <a:rPr lang="en-US" sz="3600" b="1" i="1" dirty="0" smtClean="0">
-                <a:solidFill>
-                  <a:schemeClr val="tx1"/>
-                </a:solidFill>
-              </a:rPr>
-              <a:t> )</a:t>
-            </a:r>
-            <a:endParaRPr lang="en-US" sz="4000" b="1" i="1" dirty="0" smtClean="0">
-              <a:solidFill>
-                <a:schemeClr val="tx1"/>
-              </a:solidFill>
-            </a:endParaRPr>
-          </a:p>
-          <a:p>
-            <a:pPr algn="l" rtl="0"/>
-            <a:endParaRPr lang="en-US" sz="1800" dirty="0" smtClean="0">
-              <a:solidFill>
-                <a:schemeClr val="tx1"/>
-              </a:solidFill>
-            </a:endParaRPr>
-          </a:p>
-          <a:p>
-            <a:pPr algn="l" rtl="0">
-              <a:buFont typeface="Arial" pitchFamily="34" charset="0"/>
-              <a:buChar char="•"/>
-            </a:pPr>
-            <a:r>
-              <a:rPr lang="en-US" sz="3300" dirty="0" smtClean="0">
-                <a:solidFill>
-                  <a:schemeClr val="tx1"/>
-                </a:solidFill>
-              </a:rPr>
-              <a:t>  </a:t>
-            </a:r>
-            <a:r>
-              <a:rPr lang="en-US" sz="2800" dirty="0" smtClean="0">
-                <a:solidFill>
-                  <a:schemeClr val="tx1"/>
-                </a:solidFill>
-              </a:rPr>
-              <a:t>correlation is across pairs of tissue samples</a:t>
-            </a:r>
-          </a:p>
-          <a:p>
-            <a:pPr algn="l" rtl="0">
-              <a:buFont typeface="Arial" pitchFamily="34" charset="0"/>
-              <a:buChar char="•"/>
-            </a:pPr>
-            <a:r>
-              <a:rPr lang="en-US" sz="2800" dirty="0" smtClean="0">
-                <a:solidFill>
-                  <a:schemeClr val="tx1"/>
-                </a:solidFill>
-              </a:rPr>
-              <a:t>  </a:t>
-            </a:r>
-            <a:r>
-              <a:rPr lang="en-US" sz="2800" dirty="0" err="1" smtClean="0">
-                <a:solidFill>
-                  <a:schemeClr val="tx1"/>
-                </a:solidFill>
-              </a:rPr>
-              <a:t>d</a:t>
-            </a:r>
-            <a:r>
-              <a:rPr lang="en-US" sz="2800" baseline="-25000" dirty="0" err="1" smtClean="0">
-                <a:solidFill>
-                  <a:schemeClr val="tx1"/>
-                </a:solidFill>
-              </a:rPr>
-              <a:t>expression</a:t>
-            </a:r>
-            <a:r>
-              <a:rPr lang="en-US" sz="2800" dirty="0" smtClean="0">
-                <a:solidFill>
-                  <a:schemeClr val="tx1"/>
-                </a:solidFill>
-              </a:rPr>
-              <a:t>   is the vector of absolute differences of expression levels in two regions.</a:t>
-            </a:r>
-          </a:p>
-          <a:p>
-            <a:pPr algn="l" rtl="0">
-              <a:buFont typeface="Arial" pitchFamily="34" charset="0"/>
-              <a:buChar char="•"/>
-            </a:pPr>
-            <a:r>
-              <a:rPr lang="en-US" sz="2800" dirty="0" smtClean="0">
-                <a:solidFill>
-                  <a:schemeClr val="tx1"/>
-                </a:solidFill>
-              </a:rPr>
-              <a:t>  </a:t>
-            </a:r>
-            <a:r>
-              <a:rPr lang="en-US" sz="2800" dirty="0" err="1" smtClean="0">
-                <a:solidFill>
-                  <a:schemeClr val="tx1"/>
-                </a:solidFill>
-              </a:rPr>
-              <a:t>d</a:t>
-            </a:r>
-            <a:r>
-              <a:rPr lang="en-US" sz="2800" baseline="-25000" dirty="0" err="1" smtClean="0">
-                <a:solidFill>
-                  <a:schemeClr val="tx1"/>
-                </a:solidFill>
-              </a:rPr>
-              <a:t>tree</a:t>
-            </a:r>
-            <a:r>
-              <a:rPr lang="en-US" sz="2800" dirty="0" smtClean="0">
-                <a:solidFill>
-                  <a:schemeClr val="tx1"/>
-                </a:solidFill>
-              </a:rPr>
-              <a:t>   is the vector of number of edges in the ontology tree that connect two regions.</a:t>
-            </a:r>
-            <a:endParaRPr lang="he-IL" sz="2800" i="1" dirty="0">
-              <a:solidFill>
-                <a:schemeClr val="tx1"/>
-              </a:solidFill>
-            </a:endParaRPr>
-          </a:p>
-        </p:txBody>
-      </p:sp>
-      <p:grpSp>
-        <p:nvGrpSpPr>
-          <p:cNvPr id="46" name="Group 45"/>
-          <p:cNvGrpSpPr/>
-          <p:nvPr/>
-        </p:nvGrpSpPr>
-        <p:grpSpPr>
-          <a:xfrm>
-            <a:off x="21674708" y="26139129"/>
-            <a:ext cx="4665044" cy="5285649"/>
-            <a:chOff x="26283220" y="22178689"/>
-            <a:chExt cx="4665044" cy="5285649"/>
-          </a:xfrm>
-        </p:grpSpPr>
-        <p:pic>
-          <p:nvPicPr>
-            <p:cNvPr id="888" name="Picture 887"/>
-            <p:cNvPicPr/>
-            <p:nvPr/>
-          </p:nvPicPr>
-          <p:blipFill>
-            <a:blip r:embed="rId13" cstate="print"/>
-            <a:srcRect r="7966" b="9645"/>
-            <a:stretch>
-              <a:fillRect/>
-            </a:stretch>
-          </p:blipFill>
-          <p:spPr>
-            <a:xfrm>
-              <a:off x="26283220" y="22178689"/>
-              <a:ext cx="4574663" cy="3373261"/>
-            </a:xfrm>
-            <a:prstGeom prst="rect">
-              <a:avLst/>
-            </a:prstGeom>
-          </p:spPr>
-        </p:pic>
-        <p:pic>
-          <p:nvPicPr>
-            <p:cNvPr id="901" name="Picture 900"/>
-            <p:cNvPicPr/>
-            <p:nvPr/>
-          </p:nvPicPr>
-          <p:blipFill>
-            <a:blip r:embed="rId14" cstate="print"/>
-            <a:srcRect l="6850" t="47949" r="6132"/>
-            <a:stretch>
-              <a:fillRect/>
-            </a:stretch>
-          </p:blipFill>
-          <p:spPr>
-            <a:xfrm>
-              <a:off x="26643260" y="25627889"/>
-              <a:ext cx="4305004" cy="1836449"/>
-            </a:xfrm>
-            <a:prstGeom prst="rect">
-              <a:avLst/>
-            </a:prstGeom>
-          </p:spPr>
-        </p:pic>
-      </p:grpSp>
-      <p:sp>
-        <p:nvSpPr>
-          <p:cNvPr id="39" name="TextBox 38"/>
-          <p:cNvSpPr txBox="1"/>
-          <p:nvPr/>
-        </p:nvSpPr>
-        <p:spPr>
-          <a:xfrm>
-            <a:off x="26859284" y="27147241"/>
-            <a:ext cx="3816424" cy="4093428"/>
+            <a:off x="15603095" y="7516205"/>
+            <a:ext cx="3336199" cy="3255809"/>
           </a:xfrm>
           <a:prstGeom prst="rect">
             <a:avLst/>
           </a:prstGeom>
           <a:noFill/>
+          <a:extLst>
+            <a:ext uri="{909E8E84-426E-40DD-AFC4-6F175D3DCCD1}">
+              <a14:hiddenFill xmlns:a14="http://schemas.microsoft.com/office/drawing/2010/main">
+                <a:solidFill>
+                  <a:srgbClr val="FFFFFF"/>
+                </a:solidFill>
+              </a14:hiddenFill>
+            </a:ext>
+          </a:extLst>
         </p:spPr>
-        <p:txBody>
-          <a:bodyPr wrap="square" rtlCol="1">
-            <a:spAutoFit/>
-          </a:bodyPr>
-          <a:lstStyle/>
-          <a:p>
-            <a:pPr algn="l" rtl="0"/>
-            <a:r>
-              <a:rPr lang="en-US" sz="2800" b="1" dirty="0" smtClean="0"/>
-              <a:t>House keeping genes</a:t>
-            </a:r>
-            <a:r>
-              <a:rPr lang="en-US" sz="2800" dirty="0" smtClean="0"/>
-              <a:t> are expressed in all cell types. In the adult brain, their scores are significantly higher than random, and match the BRO scores of all genes.</a:t>
-            </a:r>
-          </a:p>
-          <a:p>
-            <a:pPr algn="l" rtl="0"/>
-            <a:endParaRPr lang="en-US" sz="1000" dirty="0" smtClean="0"/>
-          </a:p>
-          <a:p>
-            <a:pPr algn="l" rtl="0"/>
-            <a:r>
-              <a:rPr lang="en-US" sz="2400" dirty="0" smtClean="0"/>
-              <a:t>Markers from</a:t>
-            </a:r>
-            <a:r>
-              <a:rPr lang="en-US" sz="2400" b="1" dirty="0" smtClean="0"/>
-              <a:t> </a:t>
-            </a:r>
-            <a:r>
-              <a:rPr lang="en-US" sz="2400" i="1" dirty="0" smtClean="0"/>
-              <a:t>Eisenberg et al. [4]</a:t>
-            </a:r>
-            <a:endParaRPr lang="en-US" sz="2800" i="1" dirty="0" smtClean="0"/>
-          </a:p>
-        </p:txBody>
-      </p:sp>
-      <p:grpSp>
-        <p:nvGrpSpPr>
-          <p:cNvPr id="52" name="Group 51"/>
-          <p:cNvGrpSpPr/>
-          <p:nvPr/>
-        </p:nvGrpSpPr>
-        <p:grpSpPr>
-          <a:xfrm>
-            <a:off x="21674708" y="15769977"/>
-            <a:ext cx="4997417" cy="5288009"/>
-            <a:chOff x="22394788" y="15841985"/>
-            <a:chExt cx="4997417" cy="5288009"/>
-          </a:xfrm>
-        </p:grpSpPr>
-        <p:pic>
-          <p:nvPicPr>
-            <p:cNvPr id="906" name="Picture 905"/>
-            <p:cNvPicPr/>
-            <p:nvPr/>
-          </p:nvPicPr>
-          <p:blipFill>
-            <a:blip r:embed="rId15" cstate="print"/>
-            <a:srcRect b="10681"/>
-            <a:stretch>
-              <a:fillRect/>
-            </a:stretch>
-          </p:blipFill>
-          <p:spPr>
-            <a:xfrm>
-              <a:off x="22394788" y="15841985"/>
-              <a:ext cx="4937648" cy="3312337"/>
-            </a:xfrm>
-            <a:prstGeom prst="rect">
-              <a:avLst/>
-            </a:prstGeom>
-          </p:spPr>
-        </p:pic>
-        <p:pic>
-          <p:nvPicPr>
-            <p:cNvPr id="907" name="Picture 906"/>
-            <p:cNvPicPr/>
-            <p:nvPr/>
-          </p:nvPicPr>
-          <p:blipFill>
-            <a:blip r:embed="rId16" cstate="print"/>
-            <a:srcRect t="48006"/>
-            <a:stretch>
-              <a:fillRect/>
-            </a:stretch>
-          </p:blipFill>
-          <p:spPr bwMode="auto">
-            <a:xfrm>
-              <a:off x="22394788" y="19298369"/>
-              <a:ext cx="4997417" cy="1831625"/>
-            </a:xfrm>
-            <a:prstGeom prst="rect">
-              <a:avLst/>
-            </a:prstGeom>
-            <a:noFill/>
-            <a:ln>
-              <a:noFill/>
-            </a:ln>
-          </p:spPr>
-        </p:pic>
-      </p:grpSp>
-      <p:sp>
-        <p:nvSpPr>
-          <p:cNvPr id="40" name="TextBox 39"/>
-          <p:cNvSpPr txBox="1"/>
-          <p:nvPr/>
-        </p:nvSpPr>
-        <p:spPr>
-          <a:xfrm>
-            <a:off x="26859284" y="16150337"/>
-            <a:ext cx="3672408" cy="3724096"/>
-          </a:xfrm>
-          <a:prstGeom prst="rect">
-            <a:avLst/>
-          </a:prstGeom>
-          <a:noFill/>
-        </p:spPr>
-        <p:txBody>
-          <a:bodyPr wrap="square" rtlCol="1">
-            <a:spAutoFit/>
-          </a:bodyPr>
-          <a:lstStyle/>
-          <a:p>
-            <a:pPr algn="l" rtl="0"/>
-            <a:r>
-              <a:rPr lang="en-US" sz="2800" b="1" dirty="0" smtClean="0"/>
-              <a:t>Cell-type specific genes</a:t>
-            </a:r>
-            <a:r>
-              <a:rPr lang="en-US" sz="2800" dirty="0" smtClean="0"/>
-              <a:t> are in stronger agreement with the tree structure than genes on average.</a:t>
-            </a:r>
-            <a:r>
-              <a:rPr lang="en-US" sz="2800" b="1" dirty="0" smtClean="0"/>
-              <a:t> </a:t>
-            </a:r>
-          </a:p>
-          <a:p>
-            <a:pPr algn="l" rtl="0"/>
-            <a:endParaRPr lang="en-US" sz="2400" dirty="0" smtClean="0"/>
-          </a:p>
-          <a:p>
-            <a:pPr algn="l" rtl="0"/>
-            <a:endParaRPr lang="en-US" sz="2400" dirty="0" smtClean="0"/>
-          </a:p>
-          <a:p>
-            <a:pPr algn="l" rtl="0"/>
-            <a:r>
-              <a:rPr lang="en-US" sz="2400" dirty="0" smtClean="0"/>
-              <a:t>Markers from</a:t>
-            </a:r>
-            <a:r>
-              <a:rPr lang="en-US" sz="2400" b="1" dirty="0" smtClean="0"/>
-              <a:t> </a:t>
-            </a:r>
-            <a:r>
-              <a:rPr lang="en-US" sz="2400" i="1" dirty="0" smtClean="0"/>
-              <a:t>Cahoy et al. [3]</a:t>
-            </a:r>
-            <a:r>
-              <a:rPr lang="en-US" sz="2400" dirty="0" smtClean="0"/>
-              <a:t>. </a:t>
-            </a:r>
-            <a:endParaRPr lang="he-IL" sz="2400" b="1" dirty="0" smtClean="0"/>
-          </a:p>
-        </p:txBody>
-      </p:sp>
-      <p:sp>
-        <p:nvSpPr>
-          <p:cNvPr id="42" name="TextBox 41"/>
-          <p:cNvSpPr txBox="1"/>
-          <p:nvPr/>
-        </p:nvSpPr>
-        <p:spPr>
-          <a:xfrm>
-            <a:off x="30963739" y="28299369"/>
-            <a:ext cx="11449272" cy="3770263"/>
-          </a:xfrm>
-          <a:prstGeom prst="rect">
-            <a:avLst/>
-          </a:prstGeom>
-          <a:noFill/>
-        </p:spPr>
-        <p:txBody>
-          <a:bodyPr wrap="square" rtlCol="1">
-            <a:spAutoFit/>
-          </a:bodyPr>
-          <a:lstStyle/>
-          <a:p>
-            <a:pPr algn="l" rtl="0"/>
-            <a:endParaRPr lang="en-US" sz="900" dirty="0" smtClean="0"/>
-          </a:p>
-          <a:p>
-            <a:pPr marL="997140" indent="-457200" algn="l" rtl="0">
-              <a:buAutoNum type="arabicPeriod"/>
-            </a:pPr>
-            <a:r>
-              <a:rPr lang="en-US" sz="2400" dirty="0" err="1" smtClean="0"/>
-              <a:t>Hawrylycz</a:t>
-            </a:r>
-            <a:r>
-              <a:rPr lang="en-US" sz="2400" dirty="0" smtClean="0"/>
-              <a:t> et al., An </a:t>
-            </a:r>
-            <a:r>
-              <a:rPr lang="en-US" sz="2400" dirty="0"/>
-              <a:t>anatomically comprehensive atlas of the adult human </a:t>
-            </a:r>
-            <a:r>
-              <a:rPr lang="en-US" sz="2400" dirty="0" smtClean="0"/>
-              <a:t>brain transcriptome, </a:t>
-            </a:r>
-            <a:r>
-              <a:rPr lang="en-US" sz="2400" i="1" dirty="0" smtClean="0"/>
-              <a:t>Nature </a:t>
-            </a:r>
-            <a:r>
-              <a:rPr lang="en-US" sz="2400" dirty="0" smtClean="0"/>
-              <a:t>2012</a:t>
-            </a:r>
-          </a:p>
-          <a:p>
-            <a:pPr marL="997140" indent="-457200" algn="l" rtl="0">
-              <a:buAutoNum type="arabicPeriod"/>
-            </a:pPr>
-            <a:r>
-              <a:rPr lang="en-US" sz="2400" dirty="0" smtClean="0"/>
-              <a:t>Kang et al., </a:t>
-            </a:r>
-            <a:r>
-              <a:rPr lang="en-US" sz="2400" dirty="0" err="1" smtClean="0"/>
-              <a:t>Spatio</a:t>
-            </a:r>
-            <a:r>
-              <a:rPr lang="en-US" sz="2400" dirty="0" smtClean="0"/>
-              <a:t>-temporal </a:t>
-            </a:r>
-            <a:r>
-              <a:rPr lang="en-US" sz="2400" dirty="0"/>
-              <a:t>transcriptome of the human </a:t>
-            </a:r>
-            <a:r>
-              <a:rPr lang="en-US" sz="2400" dirty="0" smtClean="0"/>
-              <a:t>brain, </a:t>
-            </a:r>
-            <a:r>
-              <a:rPr lang="en-US" sz="2400" i="1" dirty="0" smtClean="0"/>
-              <a:t>Nature</a:t>
-            </a:r>
-            <a:r>
-              <a:rPr lang="en-US" sz="2400" dirty="0" smtClean="0"/>
-              <a:t> 2011</a:t>
-            </a:r>
-          </a:p>
-          <a:p>
-            <a:pPr marL="997140" indent="-457200" algn="l" rtl="0">
-              <a:buAutoNum type="arabicPeriod"/>
-            </a:pPr>
-            <a:r>
-              <a:rPr lang="en-US" sz="2400" dirty="0" err="1" smtClean="0"/>
-              <a:t>Cahoy</a:t>
-            </a:r>
-            <a:r>
-              <a:rPr lang="en-US" sz="2400" dirty="0" smtClean="0"/>
-              <a:t> et al., A </a:t>
-            </a:r>
-            <a:r>
-              <a:rPr lang="en-US" sz="2400" dirty="0"/>
-              <a:t>transcriptome database for astrocytes, neurons, and </a:t>
-            </a:r>
-            <a:r>
-              <a:rPr lang="en-US" sz="2400" dirty="0" err="1" smtClean="0"/>
-              <a:t>oligodendrocytes</a:t>
-            </a:r>
-            <a:r>
-              <a:rPr lang="en-US" sz="2400" dirty="0" smtClean="0"/>
-              <a:t>, </a:t>
-            </a:r>
-            <a:r>
-              <a:rPr lang="en-US" sz="2400" i="1" dirty="0" smtClean="0"/>
-              <a:t>J. neuroscience </a:t>
-            </a:r>
-            <a:r>
-              <a:rPr lang="en-US" sz="2400" dirty="0" smtClean="0"/>
-              <a:t> 2008.</a:t>
-            </a:r>
-          </a:p>
-          <a:p>
-            <a:pPr marL="997140" indent="-457200" algn="l" rtl="0">
-              <a:buAutoNum type="arabicPeriod"/>
-            </a:pPr>
-            <a:r>
-              <a:rPr lang="en-US" sz="2400" dirty="0" smtClean="0"/>
-              <a:t>Eisenberg et al., Human </a:t>
-            </a:r>
-            <a:r>
-              <a:rPr lang="en-US" sz="2400" dirty="0"/>
-              <a:t>housekeeping genes are </a:t>
-            </a:r>
-            <a:r>
-              <a:rPr lang="en-US" sz="2400" dirty="0" smtClean="0"/>
-              <a:t>compact, </a:t>
-            </a:r>
-            <a:r>
-              <a:rPr lang="en-US" sz="2400" i="1" dirty="0" smtClean="0"/>
-              <a:t>Trends </a:t>
-            </a:r>
-            <a:r>
-              <a:rPr lang="en-US" sz="2400" i="1" dirty="0"/>
-              <a:t>in </a:t>
-            </a:r>
-            <a:r>
-              <a:rPr lang="en-US" sz="2400" i="1" dirty="0" smtClean="0"/>
-              <a:t>genetics</a:t>
-            </a:r>
-            <a:r>
-              <a:rPr lang="en-US" sz="2400" dirty="0" smtClean="0"/>
-              <a:t>. </a:t>
-            </a:r>
-            <a:r>
-              <a:rPr lang="en-US" sz="2400" dirty="0"/>
-              <a:t>2003</a:t>
-            </a:r>
-            <a:endParaRPr lang="en-US" sz="2400" dirty="0" smtClean="0"/>
-          </a:p>
-          <a:p>
-            <a:pPr marL="539940" indent="-539940" algn="l" rtl="0">
-              <a:buFont typeface="+mj-lt"/>
-              <a:buAutoNum type="arabicPeriod"/>
-            </a:pPr>
-            <a:endParaRPr lang="en-US" sz="1400" dirty="0" smtClean="0"/>
-          </a:p>
-          <a:p>
-            <a:pPr marL="539940" indent="-539940" algn="l" rtl="0"/>
-            <a:r>
-              <a:rPr lang="en-US" sz="3600" b="1" dirty="0" smtClean="0"/>
-              <a:t>	Contact</a:t>
-            </a:r>
-            <a:r>
-              <a:rPr lang="en-US" sz="3600" dirty="0" smtClean="0"/>
-              <a:t>: </a:t>
-            </a:r>
-            <a:r>
-              <a:rPr lang="en-US" sz="3600" dirty="0" smtClean="0">
-                <a:hlinkClick r:id="rId17"/>
-              </a:rPr>
-              <a:t>lior.kirsch@gmail.com</a:t>
-            </a:r>
-            <a:r>
-              <a:rPr lang="en-US" sz="3600" dirty="0" smtClean="0"/>
-              <a:t>, </a:t>
-            </a:r>
-            <a:r>
-              <a:rPr lang="en-US" sz="3600" dirty="0" smtClean="0">
-                <a:hlinkClick r:id="rId18"/>
-              </a:rPr>
-              <a:t>http://chechiklab.biu.ac.il/~lior</a:t>
-            </a:r>
-            <a:r>
-              <a:rPr lang="en-US" sz="3600" dirty="0" smtClean="0"/>
-              <a:t> </a:t>
-            </a:r>
-            <a:endParaRPr lang="he-IL" sz="3600" dirty="0"/>
-          </a:p>
-        </p:txBody>
-      </p:sp>
-      <p:grpSp>
-        <p:nvGrpSpPr>
-          <p:cNvPr id="63" name="Group 62"/>
-          <p:cNvGrpSpPr/>
-          <p:nvPr/>
-        </p:nvGrpSpPr>
-        <p:grpSpPr>
-          <a:xfrm>
-            <a:off x="32043861" y="6912993"/>
-            <a:ext cx="9208489" cy="4340892"/>
-            <a:chOff x="31969868" y="7959285"/>
-            <a:chExt cx="9950361" cy="3638562"/>
-          </a:xfrm>
-        </p:grpSpPr>
-        <p:pic>
-          <p:nvPicPr>
-            <p:cNvPr id="47" name="Picture 46" descr="distCortex-random.png"/>
-            <p:cNvPicPr/>
-            <p:nvPr/>
-          </p:nvPicPr>
-          <p:blipFill>
-            <a:blip r:embed="rId19" cstate="print"/>
-            <a:srcRect l="6323" t="8661"/>
-            <a:stretch>
-              <a:fillRect/>
-            </a:stretch>
-          </p:blipFill>
-          <p:spPr>
-            <a:xfrm>
-              <a:off x="31969868" y="7959285"/>
-              <a:ext cx="5213220" cy="3638562"/>
-            </a:xfrm>
-            <a:prstGeom prst="rect">
-              <a:avLst/>
-            </a:prstGeom>
-          </p:spPr>
-        </p:pic>
-        <p:sp>
-          <p:nvSpPr>
-            <p:cNvPr id="50" name="TextBox 49"/>
-            <p:cNvSpPr txBox="1"/>
-            <p:nvPr/>
-          </p:nvSpPr>
-          <p:spPr>
-            <a:xfrm>
-              <a:off x="36148315" y="8882913"/>
-              <a:ext cx="5771914" cy="1815882"/>
-            </a:xfrm>
-            <a:prstGeom prst="rect">
-              <a:avLst/>
-            </a:prstGeom>
-            <a:noFill/>
-          </p:spPr>
-          <p:txBody>
-            <a:bodyPr wrap="square" rtlCol="1">
-              <a:spAutoFit/>
-            </a:bodyPr>
-            <a:lstStyle/>
-            <a:p>
-              <a:pPr algn="l" rtl="0"/>
-              <a:r>
-                <a:rPr lang="en-US" sz="2800" dirty="0" smtClean="0"/>
-                <a:t>11% of the human genes show distinct expression patterns that agree with the cortex region ontology</a:t>
-              </a:r>
-              <a:endParaRPr lang="he-IL" sz="2800" b="1" dirty="0"/>
-            </a:p>
-          </p:txBody>
-        </p:sp>
-      </p:grpSp>
-      <p:grpSp>
-        <p:nvGrpSpPr>
-          <p:cNvPr id="61" name="Group 60"/>
-          <p:cNvGrpSpPr/>
-          <p:nvPr/>
-        </p:nvGrpSpPr>
-        <p:grpSpPr>
-          <a:xfrm>
-            <a:off x="32187875" y="10801424"/>
-            <a:ext cx="9096561" cy="4105077"/>
-            <a:chOff x="32440318" y="11890515"/>
-            <a:chExt cx="10220424" cy="3697754"/>
-          </a:xfrm>
-        </p:grpSpPr>
-        <p:pic>
-          <p:nvPicPr>
-            <p:cNvPr id="48" name="Picture 47" descr="distCortex-Celltype.png"/>
-            <p:cNvPicPr/>
-            <p:nvPr/>
-          </p:nvPicPr>
-          <p:blipFill>
-            <a:blip r:embed="rId20" cstate="print"/>
-            <a:srcRect l="5796"/>
-            <a:stretch>
-              <a:fillRect/>
-            </a:stretch>
-          </p:blipFill>
-          <p:spPr>
-            <a:xfrm>
-              <a:off x="38022727" y="11890515"/>
-              <a:ext cx="4638015" cy="3697754"/>
-            </a:xfrm>
-            <a:prstGeom prst="rect">
-              <a:avLst/>
-            </a:prstGeom>
-          </p:spPr>
-        </p:pic>
-        <p:sp>
-          <p:nvSpPr>
-            <p:cNvPr id="51" name="TextBox 50"/>
-            <p:cNvSpPr txBox="1"/>
-            <p:nvPr/>
-          </p:nvSpPr>
-          <p:spPr>
-            <a:xfrm>
-              <a:off x="32440318" y="12863462"/>
-              <a:ext cx="5218643" cy="1815882"/>
-            </a:xfrm>
-            <a:prstGeom prst="rect">
-              <a:avLst/>
-            </a:prstGeom>
-            <a:noFill/>
-          </p:spPr>
-          <p:txBody>
-            <a:bodyPr wrap="square" rtlCol="1">
-              <a:spAutoFit/>
-            </a:bodyPr>
-            <a:lstStyle/>
-            <a:p>
-              <a:pPr algn="l" rtl="0"/>
-              <a:r>
-                <a:rPr lang="en-US" sz="2800" dirty="0" smtClean="0"/>
-                <a:t>Astrocytes and neuronal markers are in stronger agreement with BRO than the average gene. </a:t>
-              </a:r>
-            </a:p>
-          </p:txBody>
-        </p:sp>
-      </p:grpSp>
-      <p:sp>
-        <p:nvSpPr>
-          <p:cNvPr id="49" name="TextBox 48"/>
-          <p:cNvSpPr txBox="1"/>
-          <p:nvPr/>
-        </p:nvSpPr>
-        <p:spPr>
-          <a:xfrm>
-            <a:off x="7798883" y="30171577"/>
-            <a:ext cx="2930609" cy="769441"/>
-          </a:xfrm>
-          <a:prstGeom prst="rect">
-            <a:avLst/>
-          </a:prstGeom>
-          <a:noFill/>
-        </p:spPr>
-        <p:txBody>
-          <a:bodyPr wrap="none" rtlCol="1">
-            <a:spAutoFit/>
-          </a:bodyPr>
-          <a:lstStyle/>
-          <a:p>
-            <a:r>
-              <a:rPr lang="en-US" sz="4400" dirty="0" smtClean="0">
-                <a:solidFill>
-                  <a:schemeClr val="tx1">
-                    <a:lumMod val="65000"/>
-                    <a:lumOff val="35000"/>
-                  </a:schemeClr>
-                </a:solidFill>
-                <a:latin typeface="Baskerville Old Face" pitchFamily="18" charset="0"/>
-              </a:rPr>
-              <a:t>414 Regions</a:t>
-            </a:r>
-            <a:endParaRPr lang="he-IL" sz="4400" dirty="0">
-              <a:solidFill>
-                <a:schemeClr val="tx1">
-                  <a:lumMod val="65000"/>
-                  <a:lumOff val="35000"/>
-                </a:schemeClr>
-              </a:solidFill>
-              <a:latin typeface="Baskerville Old Face" pitchFamily="18" charset="0"/>
-            </a:endParaRPr>
-          </a:p>
-        </p:txBody>
-      </p:sp>
+      </p:pic>
       <p:pic>
         <p:nvPicPr>
-          <p:cNvPr id="54" name="Picture 2" descr="C:\Users\Lior\Dropbox\papers\brain region tree\Figures\figure 1\h_clustering.png"/>
+          <p:cNvPr id="1030" name="Picture 6" descr="Preview of your QR Code"/>
           <p:cNvPicPr>
             <a:picLocks noChangeAspect="1" noChangeArrowheads="1"/>
           </p:cNvPicPr>
           <p:nvPr/>
         </p:nvPicPr>
         <p:blipFill>
-          <a:blip r:embed="rId21" cstate="print"/>
-          <a:srcRect t="6764" r="6676"/>
+          <a:blip r:embed="rId23">
+            <a:extLst>
+              <a:ext uri="{28A0092B-C50C-407E-A947-70E740481C1C}">
+                <a14:useLocalDpi xmlns:a14="http://schemas.microsoft.com/office/drawing/2010/main" val="0"/>
+              </a:ext>
+            </a:extLst>
+          </a:blip>
+          <a:srcRect/>
           <a:stretch>
             <a:fillRect/>
           </a:stretch>
         </p:blipFill>
         <p:spPr bwMode="auto">
           <a:xfrm>
-            <a:off x="11665595" y="6894577"/>
-            <a:ext cx="8352928" cy="4698936"/>
+            <a:off x="35737310" y="1113156"/>
+            <a:ext cx="2095500" cy="2095501"/>
           </a:xfrm>
           <a:prstGeom prst="rect">
             <a:avLst/>
           </a:prstGeom>
           <a:noFill/>
+          <a:extLst>
+            <a:ext uri="{909E8E84-426E-40DD-AFC4-6F175D3DCCD1}">
+              <a14:hiddenFill xmlns:a14="http://schemas.microsoft.com/office/drawing/2010/main">
+                <a:solidFill>
+                  <a:srgbClr val="FFFFFF"/>
+                </a:solidFill>
+              </a14:hiddenFill>
+            </a:ext>
+          </a:extLst>
         </p:spPr>
       </p:pic>
-      <p:pic>
-        <p:nvPicPr>
-          <p:cNvPr id="1027" name="Picture 3" descr="C:\Users\Lior\Dropbox\papers\brain region tree\Figures\figure 1\2dhist-NEUROD1-corr-0.65.png"/>
-          <p:cNvPicPr>
-            <a:picLocks noChangeAspect="1" noChangeArrowheads="1"/>
-          </p:cNvPicPr>
-          <p:nvPr/>
-        </p:nvPicPr>
-        <p:blipFill>
-          <a:blip r:embed="rId22" cstate="print"/>
-          <a:srcRect l="2108" t="5613" r="2635"/>
-          <a:stretch>
-            <a:fillRect/>
-          </a:stretch>
-        </p:blipFill>
-        <p:spPr bwMode="auto">
-          <a:xfrm>
-            <a:off x="13897844" y="27075233"/>
-            <a:ext cx="6193789" cy="4608512"/>
-          </a:xfrm>
-          <a:prstGeom prst="rect">
-            <a:avLst/>
-          </a:prstGeom>
-          <a:noFill/>
-        </p:spPr>
-      </p:pic>
-      <p:sp>
-        <p:nvSpPr>
-          <p:cNvPr id="57" name="TextBox 56"/>
-          <p:cNvSpPr txBox="1"/>
-          <p:nvPr/>
-        </p:nvSpPr>
-        <p:spPr>
-          <a:xfrm>
-            <a:off x="11665594" y="27939329"/>
-            <a:ext cx="2232250" cy="2554545"/>
-          </a:xfrm>
-          <a:prstGeom prst="rect">
-            <a:avLst/>
-          </a:prstGeom>
-          <a:noFill/>
-        </p:spPr>
-        <p:txBody>
-          <a:bodyPr wrap="square" rtlCol="1">
-            <a:spAutoFit/>
-          </a:bodyPr>
-          <a:lstStyle/>
-          <a:p>
-            <a:pPr algn="l" rtl="0"/>
-            <a:r>
-              <a:rPr lang="en-US" sz="3200" b="1" dirty="0" smtClean="0"/>
-              <a:t>Example:</a:t>
-            </a:r>
-            <a:br>
-              <a:rPr lang="en-US" sz="3200" b="1" dirty="0" smtClean="0"/>
-            </a:br>
-            <a:r>
-              <a:rPr lang="en-US" sz="3200" b="1" dirty="0" smtClean="0"/>
-              <a:t>Neurod1 receives  a high BRO score</a:t>
-            </a:r>
-            <a:endParaRPr lang="he-IL" sz="2800" b="1" dirty="0" smtClean="0"/>
-          </a:p>
-        </p:txBody>
-      </p:sp>
-      <p:sp>
-        <p:nvSpPr>
-          <p:cNvPr id="59" name="TextBox 58"/>
-          <p:cNvSpPr txBox="1"/>
-          <p:nvPr/>
-        </p:nvSpPr>
-        <p:spPr>
-          <a:xfrm>
-            <a:off x="26355228" y="11521505"/>
-            <a:ext cx="3888432" cy="954107"/>
-          </a:xfrm>
-          <a:prstGeom prst="rect">
-            <a:avLst/>
-          </a:prstGeom>
-          <a:noFill/>
-        </p:spPr>
-        <p:txBody>
-          <a:bodyPr wrap="square" rtlCol="1">
-            <a:spAutoFit/>
-          </a:bodyPr>
-          <a:lstStyle/>
-          <a:p>
-            <a:pPr algn="l" rtl="0"/>
-            <a:r>
-              <a:rPr lang="en-US" sz="2800" dirty="0" smtClean="0"/>
-              <a:t>Significance was assets using permutation test.</a:t>
-            </a:r>
-            <a:endParaRPr lang="he-IL" sz="2800" dirty="0"/>
-          </a:p>
-        </p:txBody>
-      </p:sp>
-      <p:sp>
-        <p:nvSpPr>
-          <p:cNvPr id="66" name="Rounded Rectangle 65"/>
-          <p:cNvSpPr/>
-          <p:nvPr/>
-        </p:nvSpPr>
-        <p:spPr>
-          <a:xfrm>
-            <a:off x="31683820" y="16202026"/>
-            <a:ext cx="10441160" cy="5760639"/>
-          </a:xfrm>
-          <a:prstGeom prst="roundRect">
-            <a:avLst/>
-          </a:prstGeom>
-          <a:solidFill>
-            <a:schemeClr val="bg1"/>
-          </a:solidFill>
-          <a:ln w="76200">
-            <a:solidFill>
-              <a:schemeClr val="tx1"/>
-            </a:solidFill>
-          </a:ln>
-        </p:spPr>
-        <p:style>
-          <a:lnRef idx="2">
-            <a:schemeClr val="accent1">
-              <a:shade val="50000"/>
-            </a:schemeClr>
-          </a:lnRef>
-          <a:fillRef idx="1">
-            <a:schemeClr val="accent1"/>
-          </a:fillRef>
-          <a:effectRef idx="0">
-            <a:schemeClr val="accent1"/>
-          </a:effectRef>
-          <a:fontRef idx="minor">
-            <a:schemeClr val="lt1"/>
-          </a:fontRef>
-        </p:style>
-        <p:txBody>
-          <a:bodyPr lIns="83976" tIns="41987" rIns="83976" bIns="41987" rtlCol="1" anchor="t" anchorCtr="0"/>
-          <a:lstStyle/>
-          <a:p>
-            <a:pPr algn="ctr" rtl="0"/>
-            <a:r>
-              <a:rPr lang="en-US" sz="4400" b="1" dirty="0" smtClean="0">
-                <a:solidFill>
-                  <a:schemeClr val="tx1"/>
-                </a:solidFill>
-              </a:rPr>
-              <a:t>Robustness across subjects</a:t>
-            </a:r>
-          </a:p>
-          <a:p>
-            <a:pPr algn="l" rtl="0"/>
-            <a:r>
-              <a:rPr lang="en-US" sz="1800" b="1" dirty="0" smtClean="0">
-                <a:solidFill>
-                  <a:schemeClr val="tx1"/>
-                </a:solidFill>
-              </a:rPr>
-              <a:t>  </a:t>
-            </a:r>
-            <a:endParaRPr lang="en-US" sz="3200" dirty="0" smtClean="0">
-              <a:solidFill>
-                <a:schemeClr val="tx1"/>
-              </a:solidFill>
-            </a:endParaRPr>
-          </a:p>
-          <a:p>
-            <a:pPr algn="l" rtl="0"/>
-            <a:endParaRPr lang="en-US" sz="3200" dirty="0" smtClean="0">
-              <a:solidFill>
-                <a:schemeClr val="tx1"/>
-              </a:solidFill>
-            </a:endParaRPr>
-          </a:p>
-          <a:p>
-            <a:pPr algn="l" rtl="0"/>
-            <a:endParaRPr lang="en-US" sz="3200" dirty="0" smtClean="0">
-              <a:solidFill>
-                <a:schemeClr val="tx1"/>
-              </a:solidFill>
-            </a:endParaRPr>
-          </a:p>
-          <a:p>
-            <a:pPr algn="l" rtl="0"/>
-            <a:endParaRPr lang="en-US" sz="3200" dirty="0" smtClean="0">
-              <a:solidFill>
-                <a:schemeClr val="tx1"/>
-              </a:solidFill>
-            </a:endParaRPr>
-          </a:p>
-          <a:p>
-            <a:pPr algn="l" rtl="0"/>
-            <a:endParaRPr lang="en-US" sz="3200" dirty="0" smtClean="0">
-              <a:solidFill>
-                <a:schemeClr val="tx1"/>
-              </a:solidFill>
-            </a:endParaRPr>
-          </a:p>
-          <a:p>
-            <a:pPr algn="l" rtl="0"/>
-            <a:endParaRPr lang="en-US" sz="3200" dirty="0" smtClean="0">
-              <a:solidFill>
-                <a:schemeClr val="tx1"/>
-              </a:solidFill>
-            </a:endParaRPr>
-          </a:p>
-          <a:p>
-            <a:pPr algn="l" rtl="0"/>
-            <a:endParaRPr lang="en-US" sz="3200" dirty="0" smtClean="0">
-              <a:solidFill>
-                <a:schemeClr val="tx1"/>
-              </a:solidFill>
-            </a:endParaRPr>
-          </a:p>
-          <a:p>
-            <a:pPr algn="l" rtl="0"/>
-            <a:endParaRPr lang="en-US" sz="3200" dirty="0" smtClean="0">
-              <a:solidFill>
-                <a:schemeClr val="tx1"/>
-              </a:solidFill>
-            </a:endParaRPr>
-          </a:p>
-          <a:p>
-            <a:pPr algn="l" rtl="0"/>
-            <a:endParaRPr lang="en-US" sz="3200" dirty="0" smtClean="0">
-              <a:solidFill>
-                <a:schemeClr val="tx1"/>
-              </a:solidFill>
-            </a:endParaRPr>
-          </a:p>
-          <a:p>
-            <a:pPr algn="l" rtl="0"/>
-            <a:endParaRPr lang="en-US" sz="3200" dirty="0" smtClean="0">
-              <a:solidFill>
-                <a:schemeClr val="tx1"/>
-              </a:solidFill>
-            </a:endParaRPr>
-          </a:p>
-          <a:p>
-            <a:pPr algn="l" rtl="0"/>
-            <a:endParaRPr lang="en-US" sz="3200" dirty="0" smtClean="0">
-              <a:solidFill>
-                <a:schemeClr val="tx1"/>
-              </a:solidFill>
-            </a:endParaRPr>
-          </a:p>
-          <a:p>
-            <a:pPr algn="l" rtl="0"/>
-            <a:endParaRPr lang="en-US" sz="3200" dirty="0" smtClean="0">
-              <a:solidFill>
-                <a:schemeClr val="tx1"/>
-              </a:solidFill>
-            </a:endParaRPr>
-          </a:p>
-        </p:txBody>
-      </p:sp>
-      <p:sp>
-        <p:nvSpPr>
-          <p:cNvPr id="69" name="TextBox 68"/>
-          <p:cNvSpPr txBox="1"/>
-          <p:nvPr/>
-        </p:nvSpPr>
-        <p:spPr>
-          <a:xfrm>
-            <a:off x="37660484" y="17570176"/>
-            <a:ext cx="4183913" cy="3108543"/>
-          </a:xfrm>
-          <a:prstGeom prst="rect">
-            <a:avLst/>
-          </a:prstGeom>
-          <a:noFill/>
-        </p:spPr>
-        <p:txBody>
-          <a:bodyPr wrap="square" rtlCol="1">
-            <a:spAutoFit/>
-          </a:bodyPr>
-          <a:lstStyle/>
-          <a:p>
-            <a:pPr algn="l" rtl="0"/>
-            <a:r>
-              <a:rPr lang="en-US" sz="2800" dirty="0" smtClean="0"/>
-              <a:t>The percent of BRO-significant genes is stable  when we compute the BRO score for each subject separately</a:t>
-            </a:r>
-          </a:p>
-          <a:p>
-            <a:pPr algn="l" rtl="0"/>
-            <a:r>
-              <a:rPr lang="en-US" sz="2800" dirty="0" smtClean="0"/>
-              <a:t>(89%, 90%, 76%, 91%, 83%, 86%).</a:t>
-            </a:r>
-          </a:p>
-        </p:txBody>
-      </p:sp>
-      <p:sp>
-        <p:nvSpPr>
-          <p:cNvPr id="70" name="TextBox 69"/>
-          <p:cNvSpPr txBox="1"/>
-          <p:nvPr/>
-        </p:nvSpPr>
-        <p:spPr>
-          <a:xfrm>
-            <a:off x="39316668" y="24122905"/>
-            <a:ext cx="2808312" cy="3108543"/>
-          </a:xfrm>
-          <a:prstGeom prst="rect">
-            <a:avLst/>
-          </a:prstGeom>
-          <a:noFill/>
-        </p:spPr>
-        <p:txBody>
-          <a:bodyPr wrap="square" rtlCol="1">
-            <a:spAutoFit/>
-          </a:bodyPr>
-          <a:lstStyle/>
-          <a:p>
-            <a:pPr algn="l" rtl="0"/>
-            <a:r>
-              <a:rPr lang="en-US" sz="2800" i="1" dirty="0" smtClean="0"/>
-              <a:t>FEZF2</a:t>
-            </a:r>
-            <a:r>
-              <a:rPr lang="en-US" sz="2800" dirty="0" smtClean="0"/>
-              <a:t> is known to regulate the axon targeting of layer 5 </a:t>
-            </a:r>
-            <a:r>
-              <a:rPr lang="en-US" sz="2800" dirty="0" err="1" smtClean="0"/>
-              <a:t>subcortical</a:t>
-            </a:r>
-            <a:r>
-              <a:rPr lang="en-US" sz="2800" dirty="0" smtClean="0"/>
-              <a:t> projection neurons.</a:t>
-            </a:r>
-          </a:p>
-          <a:p>
-            <a:pPr algn="l" rtl="0"/>
-            <a:endParaRPr lang="en-US" sz="2800" dirty="0" smtClean="0"/>
-          </a:p>
-        </p:txBody>
-      </p:sp>
-      <p:pic>
-        <p:nvPicPr>
-          <p:cNvPr id="1028" name="Picture 4" descr="C:\Users\Lior\Downloads\seprateSubjects\joint_figure_dist.png"/>
-          <p:cNvPicPr>
-            <a:picLocks noChangeAspect="1" noChangeArrowheads="1"/>
-          </p:cNvPicPr>
-          <p:nvPr/>
-        </p:nvPicPr>
-        <p:blipFill>
-          <a:blip r:embed="rId23" cstate="print"/>
-          <a:srcRect l="5796" t="5613" r="5796"/>
-          <a:stretch>
-            <a:fillRect/>
-          </a:stretch>
-        </p:blipFill>
-        <p:spPr bwMode="auto">
-          <a:xfrm>
-            <a:off x="32043859" y="17215071"/>
-            <a:ext cx="5472609" cy="4387555"/>
-          </a:xfrm>
-          <a:prstGeom prst="rect">
-            <a:avLst/>
-          </a:prstGeom>
-          <a:noFill/>
-        </p:spPr>
-      </p:pic>
-      <p:sp>
-        <p:nvSpPr>
-          <p:cNvPr id="71" name="Rectangle 70"/>
-          <p:cNvSpPr/>
-          <p:nvPr/>
-        </p:nvSpPr>
-        <p:spPr>
-          <a:xfrm>
-            <a:off x="12097644" y="11507685"/>
-            <a:ext cx="8334741" cy="1093940"/>
-          </a:xfrm>
-          <a:prstGeom prst="rect">
-            <a:avLst/>
-          </a:prstGeom>
-        </p:spPr>
-        <p:txBody>
-          <a:bodyPr wrap="square" lIns="108000" tIns="54000" rIns="108000" bIns="54000">
-            <a:spAutoFit/>
-          </a:bodyPr>
-          <a:lstStyle/>
-          <a:p>
-            <a:pPr algn="l" rtl="0"/>
-            <a:r>
-              <a:rPr lang="en-US" sz="3200" dirty="0" smtClean="0"/>
-              <a:t>Neighboring regions in the human ontology show similar pattern of expression.</a:t>
-            </a:r>
-            <a:endParaRPr lang="en-US" sz="3200" b="1" dirty="0"/>
-          </a:p>
-        </p:txBody>
-      </p:sp>
-      <p:sp>
-        <p:nvSpPr>
-          <p:cNvPr id="67" name="TextBox 66"/>
-          <p:cNvSpPr txBox="1"/>
-          <p:nvPr/>
-        </p:nvSpPr>
-        <p:spPr>
-          <a:xfrm>
-            <a:off x="22178764" y="21890657"/>
-            <a:ext cx="3888432" cy="4278094"/>
-          </a:xfrm>
-          <a:prstGeom prst="rect">
-            <a:avLst/>
-          </a:prstGeom>
-          <a:noFill/>
-        </p:spPr>
-        <p:txBody>
-          <a:bodyPr wrap="square" rtlCol="1">
-            <a:spAutoFit/>
-          </a:bodyPr>
-          <a:lstStyle/>
-          <a:p>
-            <a:pPr algn="l" rtl="0"/>
-            <a:r>
-              <a:rPr lang="en-US" sz="2800" b="1" dirty="0" smtClean="0"/>
-              <a:t>Development genes</a:t>
-            </a:r>
-            <a:r>
-              <a:rPr lang="en-US" sz="2800" dirty="0" smtClean="0"/>
-              <a:t> </a:t>
-            </a:r>
-            <a:br>
-              <a:rPr lang="en-US" sz="2800" dirty="0" smtClean="0"/>
-            </a:br>
-            <a:r>
-              <a:rPr lang="en-US" sz="2800" dirty="0" smtClean="0"/>
-              <a:t>are in strong agreement with the tree structure suggesting that they may have important functions in the adult brain.</a:t>
-            </a:r>
-          </a:p>
-          <a:p>
-            <a:pPr algn="l" rtl="0"/>
-            <a:endParaRPr lang="en-US" sz="2800" dirty="0" smtClean="0"/>
-          </a:p>
-          <a:p>
-            <a:pPr algn="l" rtl="0"/>
-            <a:r>
-              <a:rPr lang="en-US" sz="2400" dirty="0" smtClean="0"/>
-              <a:t>Axon guidance markers from KEGG.</a:t>
-            </a:r>
-            <a:endParaRPr lang="en-US" sz="2400" i="1" dirty="0" smtClean="0"/>
-          </a:p>
-          <a:p>
-            <a:pPr algn="l" rtl="0"/>
-            <a:endParaRPr lang="en-US" sz="2800" dirty="0" smtClean="0"/>
-          </a:p>
-        </p:txBody>
-      </p:sp>
-      <p:grpSp>
-        <p:nvGrpSpPr>
-          <p:cNvPr id="73" name="Group 72"/>
-          <p:cNvGrpSpPr/>
-          <p:nvPr/>
-        </p:nvGrpSpPr>
-        <p:grpSpPr>
-          <a:xfrm>
-            <a:off x="26427236" y="20954553"/>
-            <a:ext cx="4392488" cy="5760640"/>
-            <a:chOff x="26427236" y="20882545"/>
-            <a:chExt cx="4392488" cy="5760640"/>
-          </a:xfrm>
-        </p:grpSpPr>
-        <p:pic>
-          <p:nvPicPr>
-            <p:cNvPr id="1032" name="Picture 8" descr="C:\Users\Lior\Dropbox\papers\brain region tree\Figures\figure 3\dist_axon.png"/>
-            <p:cNvPicPr>
-              <a:picLocks noChangeAspect="1" noChangeArrowheads="1"/>
-            </p:cNvPicPr>
-            <p:nvPr/>
-          </p:nvPicPr>
-          <p:blipFill>
-            <a:blip r:embed="rId24" cstate="print"/>
-            <a:srcRect/>
-            <a:stretch>
-              <a:fillRect/>
-            </a:stretch>
-          </p:blipFill>
-          <p:spPr bwMode="auto">
-            <a:xfrm>
-              <a:off x="26427236" y="23344737"/>
-              <a:ext cx="4392488" cy="3298448"/>
-            </a:xfrm>
-            <a:prstGeom prst="rect">
-              <a:avLst/>
-            </a:prstGeom>
-            <a:noFill/>
-          </p:spPr>
-        </p:pic>
-        <p:pic>
-          <p:nvPicPr>
-            <p:cNvPr id="72" name="Picture 7" descr="C:\Users\Lior\Documents\AxonScatter.png"/>
-            <p:cNvPicPr>
-              <a:picLocks noChangeAspect="1" noChangeArrowheads="1"/>
-            </p:cNvPicPr>
-            <p:nvPr/>
-          </p:nvPicPr>
-          <p:blipFill>
-            <a:blip r:embed="rId25" cstate="print"/>
-            <a:srcRect/>
-            <a:stretch>
-              <a:fillRect/>
-            </a:stretch>
-          </p:blipFill>
-          <p:spPr bwMode="auto">
-            <a:xfrm>
-              <a:off x="26427236" y="20882545"/>
-              <a:ext cx="4172871" cy="3168352"/>
-            </a:xfrm>
-            <a:prstGeom prst="rect">
-              <a:avLst/>
-            </a:prstGeom>
-            <a:noFill/>
-          </p:spPr>
-        </p:pic>
-      </p:grpSp>
     </p:spTree>
-    <p:extLst>
-      <p:ext uri="{BB962C8B-B14F-4D97-AF65-F5344CB8AC3E}">
-        <p14:creationId xmlns:p14="http://schemas.microsoft.com/office/powerpoint/2010/main" val="422258078"/>
-      </p:ext>
-    </p:extLst>
   </p:cSld>
   <p:clrMapOvr>
     <a:masterClrMapping/>

</xml_diff>

<commit_message>
added content to row-col update, and replaced BIU logo
</commit_message>
<xml_diff>
--- a/COMET_poster.pptx
+++ b/COMET_poster.pptx
@@ -5707,42 +5707,12 @@
       </mc:AlternateContent>
       <p:pic>
         <p:nvPicPr>
-          <p:cNvPr id="12" name="Picture 11"/>
-          <p:cNvPicPr>
-            <a:picLocks noChangeAspect="1"/>
-          </p:cNvPicPr>
-          <p:nvPr/>
-        </p:nvPicPr>
-        <p:blipFill>
-          <a:blip r:embed="rId5" cstate="print">
-            <a:extLst>
-              <a:ext uri="{28A0092B-C50C-407E-A947-70E740481C1C}">
-                <a14:useLocalDpi xmlns:a14="http://schemas.microsoft.com/office/drawing/2010/main" val="0"/>
-              </a:ext>
-            </a:extLst>
-          </a:blip>
-          <a:stretch>
-            <a:fillRect/>
-          </a:stretch>
-        </p:blipFill>
-        <p:spPr>
-          <a:xfrm>
-            <a:off x="38694580" y="825979"/>
-            <a:ext cx="3659927" cy="2846653"/>
-          </a:xfrm>
-          <a:prstGeom prst="rect">
-            <a:avLst/>
-          </a:prstGeom>
-        </p:spPr>
-      </p:pic>
-      <p:pic>
-        <p:nvPicPr>
           <p:cNvPr id="887" name="Picture 886"/>
           <p:cNvPicPr/>
           <p:nvPr/>
         </p:nvPicPr>
         <p:blipFill>
-          <a:blip r:embed="rId6" cstate="print"/>
+          <a:blip r:embed="rId5" cstate="print"/>
           <a:srcRect l="5796"/>
           <a:stretch>
             <a:fillRect/>
@@ -5803,7 +5773,7 @@
           <a:p>
             <a:pPr lvl="0" algn="ctr" rtl="0"/>
             <a:r>
-              <a:rPr lang="en-US" sz="4400" b="1" dirty="0" smtClean="0">
+              <a:rPr lang="en-US" sz="4400" b="1" smtClean="0">
                 <a:solidFill>
                   <a:schemeClr val="tx1"/>
                 </a:solidFill>
@@ -6070,7 +6040,7 @@
                 <a:avLst/>
               </a:prstGeom>
               <a:blipFill rotWithShape="0">
-                <a:blip r:embed="rId7"/>
+                <a:blip r:embed="rId6"/>
                 <a:stretch>
                   <a:fillRect/>
                 </a:stretch>
@@ -6179,11 +6149,11 @@
             <p:nvPr/>
           </p:nvPicPr>
           <p:blipFill>
-            <a:blip r:embed="rId8" cstate="print">
+            <a:blip r:embed="rId7" cstate="print">
               <a:extLst>
                 <a:ext uri="{BEBA8EAE-BF5A-486C-A8C5-ECC9F3942E4B}">
                   <a14:imgProps xmlns:a14="http://schemas.microsoft.com/office/drawing/2010/main">
-                    <a14:imgLayer r:embed="rId9">
+                    <a14:imgLayer r:embed="rId8">
                       <a14:imgEffect>
                         <a14:backgroundRemoval t="2174" b="100000" l="2000" r="99750"/>
                       </a14:imgEffect>
@@ -6284,8 +6254,8 @@
         </p:nvSpPr>
         <p:spPr>
           <a:xfrm>
-            <a:off x="11900380" y="11017449"/>
-            <a:ext cx="8334741" cy="2140380"/>
+            <a:off x="11900380" y="6192913"/>
+            <a:ext cx="8334741" cy="1586382"/>
           </a:xfrm>
           <a:prstGeom prst="rect">
             <a:avLst/>
@@ -6299,24 +6269,8 @@
           <a:p>
             <a:pPr algn="l" rtl="0"/>
             <a:r>
-              <a:rPr lang="en-US" sz="3200" dirty="0" smtClean="0"/>
-              <a:t>When projecting the gene expression values on the 1</a:t>
-            </a:r>
-            <a:r>
-              <a:rPr lang="en-US" sz="3200" baseline="30000" dirty="0" smtClean="0"/>
-              <a:t>st</a:t>
-            </a:r>
-            <a:r>
-              <a:rPr lang="en-US" sz="3200" dirty="0" smtClean="0"/>
-              <a:t> and 2</a:t>
-            </a:r>
-            <a:r>
-              <a:rPr lang="en-US" sz="3200" baseline="30000" dirty="0" smtClean="0"/>
-              <a:t>nd</a:t>
-            </a:r>
-            <a:r>
-              <a:rPr lang="en-US" sz="3200" dirty="0" smtClean="0"/>
-              <a:t>  PCs, the tissue samples are ordered from the anterior to the posterior of the neural tube.</a:t>
+              <a:rPr lang="en-US" sz="3200" dirty="0"/>
+              <a:t>COMET operates by updating the learned matrix one column and row at a time, thus updating the terms relating to one feature at each iteration. </a:t>
             </a:r>
             <a:endParaRPr lang="en-US" sz="3200" b="1" dirty="0"/>
           </a:p>
@@ -6400,7 +6354,7 @@
           <p:nvPr/>
         </p:nvPicPr>
         <p:blipFill>
-          <a:blip r:embed="rId10" cstate="print"/>
+          <a:blip r:embed="rId9" cstate="print"/>
           <a:srcRect l="11558" t="12764" r="15026" b="17728"/>
           <a:stretch>
             <a:fillRect/>
@@ -6737,7 +6691,7 @@
             <p:nvPr/>
           </p:nvPicPr>
           <p:blipFill>
-            <a:blip r:embed="rId11" cstate="print"/>
+            <a:blip r:embed="rId10" cstate="print"/>
             <a:srcRect r="7966" b="9645"/>
             <a:stretch>
               <a:fillRect/>
@@ -6760,7 +6714,7 @@
             <p:nvPr/>
           </p:nvPicPr>
           <p:blipFill>
-            <a:blip r:embed="rId12" cstate="print"/>
+            <a:blip r:embed="rId11" cstate="print"/>
             <a:srcRect l="6850" t="47949" r="6132"/>
             <a:stretch>
               <a:fillRect/>
@@ -7074,7 +7028,7 @@
             </a:r>
             <a:r>
               <a:rPr lang="en-US" sz="3600" dirty="0" smtClean="0">
-                <a:hlinkClick r:id="rId13"/>
+                <a:hlinkClick r:id="rId12"/>
               </a:rPr>
               <a:t>lior.kirsch@gmail.com</a:t>
             </a:r>
@@ -7084,7 +7038,7 @@
             </a:r>
             <a:r>
               <a:rPr lang="en-US" sz="3600" dirty="0" smtClean="0">
-                <a:hlinkClick r:id="rId14"/>
+                <a:hlinkClick r:id="rId13"/>
               </a:rPr>
               <a:t>http://chechiklab.biu.ac.il/~lior</a:t>
             </a:r>
@@ -7117,7 +7071,7 @@
             <p:nvPr/>
           </p:nvPicPr>
           <p:blipFill>
-            <a:blip r:embed="rId15" cstate="print"/>
+            <a:blip r:embed="rId14" cstate="print"/>
             <a:srcRect l="6323" t="8661"/>
             <a:stretch>
               <a:fillRect/>
@@ -7186,7 +7140,7 @@
             <p:nvPr/>
           </p:nvPicPr>
           <p:blipFill>
-            <a:blip r:embed="rId16" cstate="print"/>
+            <a:blip r:embed="rId15" cstate="print"/>
             <a:srcRect l="5796"/>
             <a:stretch>
               <a:fillRect/>
@@ -7242,7 +7196,7 @@
           <p:nvPr/>
         </p:nvPicPr>
         <p:blipFill>
-          <a:blip r:embed="rId17" cstate="print"/>
+          <a:blip r:embed="rId16" cstate="print"/>
           <a:srcRect l="2108" t="5613" r="2635"/>
           <a:stretch>
             <a:fillRect/>
@@ -7579,7 +7533,7 @@
           <p:nvPr/>
         </p:nvPicPr>
         <p:blipFill>
-          <a:blip r:embed="rId18" cstate="print"/>
+          <a:blip r:embed="rId17" cstate="print"/>
           <a:srcRect l="5796" t="5613" r="5796"/>
           <a:stretch>
             <a:fillRect/>
@@ -7676,7 +7630,7 @@
             <p:nvPr/>
           </p:nvPicPr>
           <p:blipFill>
-            <a:blip r:embed="rId19" cstate="print"/>
+            <a:blip r:embed="rId18" cstate="print"/>
             <a:srcRect/>
             <a:stretch>
               <a:fillRect/>
@@ -7702,7 +7656,7 @@
             <p:nvPr/>
           </p:nvPicPr>
           <p:blipFill>
-            <a:blip r:embed="rId20" cstate="print"/>
+            <a:blip r:embed="rId19" cstate="print"/>
             <a:srcRect/>
             <a:stretch>
               <a:fillRect/>
@@ -7727,7 +7681,7 @@
           <p:nvPr/>
         </p:nvPicPr>
         <p:blipFill>
-          <a:blip r:embed="rId21" cstate="print"/>
+          <a:blip r:embed="rId20" cstate="print"/>
           <a:srcRect l="3467"/>
           <a:stretch>
             <a:fillRect/>
@@ -7753,7 +7707,7 @@
           <p:nvPr/>
         </p:nvPicPr>
         <p:blipFill rotWithShape="1">
-          <a:blip r:embed="rId22" cstate="print">
+          <a:blip r:embed="rId21" cstate="print">
             <a:extLst>
               <a:ext uri="{28A0092B-C50C-407E-A947-70E740481C1C}">
                 <a14:useLocalDpi xmlns:a14="http://schemas.microsoft.com/office/drawing/2010/main" val="0"/>
@@ -7765,7 +7719,7 @@
         </p:blipFill>
         <p:spPr bwMode="auto">
           <a:xfrm>
-            <a:off x="15603095" y="7516205"/>
+            <a:off x="16454386" y="7779295"/>
             <a:ext cx="3336199" cy="3255809"/>
           </a:xfrm>
           <a:prstGeom prst="rect">
@@ -7792,7 +7746,7 @@
           <p:nvPr/>
         </p:nvPicPr>
         <p:blipFill>
-          <a:blip r:embed="rId23">
+          <a:blip r:embed="rId22">
             <a:extLst>
               <a:ext uri="{28A0092B-C50C-407E-A947-70E740481C1C}">
                 <a14:useLocalDpi xmlns:a14="http://schemas.microsoft.com/office/drawing/2010/main" val="0"/>
@@ -7808,6 +7762,634 @@
           <a:xfrm>
             <a:off x="35737310" y="1113156"/>
             <a:ext cx="2095500" cy="2095501"/>
+          </a:xfrm>
+          <a:prstGeom prst="rect">
+            <a:avLst/>
+          </a:prstGeom>
+          <a:noFill/>
+          <a:extLst>
+            <a:ext uri="{909E8E84-426E-40DD-AFC4-6F175D3DCCD1}">
+              <a14:hiddenFill xmlns:a14="http://schemas.microsoft.com/office/drawing/2010/main">
+                <a:solidFill>
+                  <a:srgbClr val="FFFFFF"/>
+                </a:solidFill>
+              </a14:hiddenFill>
+            </a:ext>
+          </a:extLst>
+        </p:spPr>
+      </p:pic>
+      <mc:AlternateContent xmlns:mc="http://schemas.openxmlformats.org/markup-compatibility/2006">
+        <mc:Choice xmlns:a14="http://schemas.microsoft.com/office/drawing/2010/main" Requires="a14">
+          <p:sp>
+            <p:nvSpPr>
+              <p:cNvPr id="60" name="Rectangle 59"/>
+              <p:cNvSpPr/>
+              <p:nvPr/>
+            </p:nvSpPr>
+            <p:spPr>
+              <a:xfrm>
+                <a:off x="12070732" y="11213726"/>
+                <a:ext cx="8334741" cy="5189420"/>
+              </a:xfrm>
+              <a:prstGeom prst="rect">
+                <a:avLst/>
+              </a:prstGeom>
+            </p:spPr>
+            <p:txBody>
+              <a:bodyPr wrap="square" lIns="108000" tIns="54000" rIns="108000" bIns="54000">
+                <a:spAutoFit/>
+              </a:bodyPr>
+              <a:lstStyle/>
+              <a:p>
+                <a:pPr algn="l" rtl="0"/>
+                <a:r>
+                  <a:rPr lang="en-US" sz="3200" dirty="0" smtClean="0"/>
+                  <a:t>We employ the PD condition of the </a:t>
+                </a:r>
+                <a:r>
+                  <a:rPr lang="en-US" sz="3200" dirty="0" err="1" smtClean="0"/>
+                  <a:t>Schur</a:t>
+                </a:r>
+                <a:r>
+                  <a:rPr lang="en-US" sz="3200" dirty="0" smtClean="0"/>
+                  <a:t> </a:t>
+                </a:r>
+                <a:r>
+                  <a:rPr lang="en-US" sz="3200" dirty="0"/>
+                  <a:t>complement </a:t>
+                </a:r>
+                <a:r>
+                  <a:rPr lang="en-US" sz="3200" dirty="0" smtClean="0"/>
+                  <a:t>to </a:t>
+                </a:r>
+                <a:r>
+                  <a:rPr lang="en-US" sz="3200" dirty="0"/>
+                  <a:t>efficiently calculate an exact bound over the step size that guarantees that the model remains within the PD </a:t>
+                </a:r>
+                <a:r>
+                  <a:rPr lang="en-US" sz="3200" dirty="0" smtClean="0"/>
+                  <a:t>cone:</a:t>
+                </a:r>
+              </a:p>
+              <a:p>
+                <a:pPr algn="l" rtl="0"/>
+                <a:endParaRPr lang="en-US" sz="3200" dirty="0" smtClean="0"/>
+              </a:p>
+              <a:p>
+                <a:pPr algn="l" rtl="0"/>
+                <a14:m>
+                  <m:oMathPara xmlns:m="http://schemas.openxmlformats.org/officeDocument/2006/math">
+                    <m:oMathParaPr>
+                      <m:jc m:val="centerGroup"/>
+                    </m:oMathParaPr>
+                    <m:oMath xmlns:m="http://schemas.openxmlformats.org/officeDocument/2006/math">
+                      <m:sSup>
+                        <m:sSupPr>
+                          <m:ctrlPr>
+                            <a:rPr lang="en-US" sz="3200" i="1"/>
+                          </m:ctrlPr>
+                        </m:sSupPr>
+                        <m:e>
+                          <m:r>
+                            <a:rPr lang="en-US" sz="3200" i="1"/>
+                            <m:t>𝑊</m:t>
+                          </m:r>
+                        </m:e>
+                        <m:sup>
+                          <m:r>
+                            <a:rPr lang="en-US" sz="3200" i="1"/>
+                            <m:t>𝑛𝑒𝑤</m:t>
+                          </m:r>
+                        </m:sup>
+                      </m:sSup>
+                      <m:r>
+                        <a:rPr lang="en-US" sz="3200" i="1"/>
+                        <m:t>≻</m:t>
+                      </m:r>
+                      <m:r>
+                        <a:rPr lang="en-US" sz="3200" i="1"/>
+                        <m:t>0</m:t>
+                      </m:r>
+                      <m:r>
+                        <a:rPr lang="en-US" sz="3200" i="1"/>
+                        <m:t> ⟺ </m:t>
+                      </m:r>
+                      <m:sSup>
+                        <m:sSupPr>
+                          <m:ctrlPr>
+                            <a:rPr lang="en-US" sz="3200" i="1" smtClean="0"/>
+                          </m:ctrlPr>
+                        </m:sSupPr>
+                        <m:e>
+                          <m:r>
+                            <a:rPr lang="en-US" sz="3200" b="0" i="1" smtClean="0">
+                              <a:latin typeface="Cambria Math" panose="02040503050406030204" pitchFamily="18" charset="0"/>
+                            </a:rPr>
+                            <m:t>𝑐</m:t>
+                          </m:r>
+                        </m:e>
+                        <m:sup>
+                          <m:r>
+                            <a:rPr lang="en-US" sz="3200" i="1"/>
+                            <m:t>∗</m:t>
+                          </m:r>
+                        </m:sup>
+                      </m:sSup>
+                      <m:r>
+                        <a:rPr lang="en-US" sz="3200" i="1"/>
+                        <m:t>−</m:t>
+                      </m:r>
+                      <m:sSup>
+                        <m:sSupPr>
+                          <m:ctrlPr>
+                            <a:rPr lang="en-US" sz="3200" i="1"/>
+                          </m:ctrlPr>
+                        </m:sSupPr>
+                        <m:e>
+                          <m:sSup>
+                            <m:sSupPr>
+                              <m:ctrlPr>
+                                <a:rPr lang="en-US" sz="3200" i="1"/>
+                              </m:ctrlPr>
+                            </m:sSupPr>
+                            <m:e>
+                              <m:r>
+                                <a:rPr lang="en-US" sz="3200" b="1" i="0" smtClean="0">
+                                  <a:latin typeface="Cambria Math" panose="02040503050406030204" pitchFamily="18" charset="0"/>
+                                </a:rPr>
+                                <m:t>𝐛</m:t>
+                              </m:r>
+                            </m:e>
+                            <m:sup>
+                              <m:r>
+                                <a:rPr lang="en-US" sz="3200" i="1"/>
+                                <m:t>∗</m:t>
+                              </m:r>
+                            </m:sup>
+                          </m:sSup>
+                        </m:e>
+                        <m:sup>
+                          <m:r>
+                            <a:rPr lang="en-US" sz="3200" i="1"/>
+                            <m:t>𝑇</m:t>
+                          </m:r>
+                        </m:sup>
+                      </m:sSup>
+                      <m:sSup>
+                        <m:sSupPr>
+                          <m:ctrlPr>
+                            <a:rPr lang="en-US" sz="3200" i="1"/>
+                          </m:ctrlPr>
+                        </m:sSupPr>
+                        <m:e>
+                          <m:r>
+                            <a:rPr lang="en-US" sz="3200" i="1"/>
+                            <m:t>𝐴</m:t>
+                          </m:r>
+                        </m:e>
+                        <m:sup>
+                          <m:r>
+                            <a:rPr lang="en-US" sz="3200" i="1"/>
+                            <m:t>−</m:t>
+                          </m:r>
+                          <m:r>
+                            <a:rPr lang="en-US" sz="3200" i="1"/>
+                            <m:t>1</m:t>
+                          </m:r>
+                        </m:sup>
+                      </m:sSup>
+                      <m:sSup>
+                        <m:sSupPr>
+                          <m:ctrlPr>
+                            <a:rPr lang="en-US" sz="3200" i="1"/>
+                          </m:ctrlPr>
+                        </m:sSupPr>
+                        <m:e>
+                          <m:r>
+                            <a:rPr lang="en-US" sz="3200" b="1" i="0" smtClean="0">
+                              <a:latin typeface="Cambria Math" panose="02040503050406030204" pitchFamily="18" charset="0"/>
+                            </a:rPr>
+                            <m:t>𝐛</m:t>
+                          </m:r>
+                        </m:e>
+                        <m:sup>
+                          <m:r>
+                            <a:rPr lang="en-US" sz="3200" i="1"/>
+                            <m:t>∗</m:t>
+                          </m:r>
+                        </m:sup>
+                      </m:sSup>
+                      <m:r>
+                        <a:rPr lang="en-US" sz="3200" i="1"/>
+                        <m:t>&gt;</m:t>
+                      </m:r>
+                      <m:r>
+                        <a:rPr lang="en-US" sz="3200" i="1"/>
+                        <m:t>0</m:t>
+                      </m:r>
+                      <m:r>
+                        <a:rPr lang="en-US" sz="3200" b="0" i="1" smtClean="0">
+                          <a:latin typeface="Cambria Math" panose="02040503050406030204" pitchFamily="18" charset="0"/>
+                        </a:rPr>
+                        <m:t>,</m:t>
+                      </m:r>
+                    </m:oMath>
+                  </m:oMathPara>
+                </a14:m>
+                <a:endParaRPr lang="en-US" sz="3200" dirty="0" smtClean="0"/>
+              </a:p>
+              <a:p>
+                <a:pPr algn="l" rtl="0"/>
+                <a:endParaRPr lang="en-US" sz="3200" dirty="0" smtClean="0"/>
+              </a:p>
+              <a:p>
+                <a:pPr algn="l" rtl="0"/>
+                <a:r>
+                  <a:rPr lang="en-US" sz="3200" dirty="0" smtClean="0"/>
+                  <a:t>where  </a:t>
+                </a:r>
+                <a14:m>
+                  <m:oMath xmlns:m="http://schemas.openxmlformats.org/officeDocument/2006/math">
+                    <m:sSup>
+                      <m:sSupPr>
+                        <m:ctrlPr>
+                          <a:rPr lang="en-US" sz="3200" i="1"/>
+                        </m:ctrlPr>
+                      </m:sSupPr>
+                      <m:e>
+                        <m:r>
+                          <a:rPr lang="en-US" sz="3200" i="1"/>
+                          <m:t>𝑐</m:t>
+                        </m:r>
+                      </m:e>
+                      <m:sup>
+                        <m:r>
+                          <a:rPr lang="en-US" sz="3200" i="1"/>
+                          <m:t>∗</m:t>
+                        </m:r>
+                      </m:sup>
+                    </m:sSup>
+                    <m:r>
+                      <a:rPr lang="en-US" sz="3200" i="1"/>
+                      <m:t>=</m:t>
+                    </m:r>
+                    <m:sSubSup>
+                      <m:sSubSupPr>
+                        <m:ctrlPr>
+                          <a:rPr lang="en-US" sz="3200" i="1"/>
+                        </m:ctrlPr>
+                      </m:sSubSupPr>
+                      <m:e>
+                        <m:r>
+                          <a:rPr lang="en-US" sz="3200" i="1"/>
+                          <m:t>𝑊</m:t>
+                        </m:r>
+                      </m:e>
+                      <m:sub>
+                        <m:d>
+                          <m:dPr>
+                            <m:ctrlPr>
+                              <a:rPr lang="en-US" sz="3200" i="1"/>
+                            </m:ctrlPr>
+                          </m:dPr>
+                          <m:e>
+                            <m:r>
+                              <a:rPr lang="en-US" sz="3200" i="1"/>
+                              <m:t>1</m:t>
+                            </m:r>
+                            <m:r>
+                              <a:rPr lang="en-US" sz="3200" i="1"/>
+                              <m:t>,</m:t>
+                            </m:r>
+                            <m:r>
+                              <a:rPr lang="en-US" sz="3200" i="1"/>
+                              <m:t>1</m:t>
+                            </m:r>
+                          </m:e>
+                        </m:d>
+                      </m:sub>
+                      <m:sup>
+                        <m:r>
+                          <a:rPr lang="en-US" sz="3200" i="1"/>
+                          <m:t>𝑛𝑒𝑤</m:t>
+                        </m:r>
+                      </m:sup>
+                    </m:sSubSup>
+                    <m:r>
+                      <a:rPr lang="en-US" sz="3200" b="0" i="0" smtClean="0">
+                        <a:latin typeface="Cambria Math" panose="02040503050406030204" pitchFamily="18" charset="0"/>
+                      </a:rPr>
+                      <m:t> </m:t>
+                    </m:r>
+                  </m:oMath>
+                </a14:m>
+                <a:r>
+                  <a:rPr lang="en-US" sz="3200" dirty="0" smtClean="0"/>
+                  <a:t>(</a:t>
+                </a:r>
+                <a:r>
+                  <a:rPr lang="en-US" sz="3200" dirty="0"/>
+                  <a:t>a scalar), </a:t>
+                </a:r>
+                <a14:m>
+                  <m:oMath xmlns:m="http://schemas.openxmlformats.org/officeDocument/2006/math">
+                    <m:sSup>
+                      <m:sSupPr>
+                        <m:ctrlPr>
+                          <a:rPr lang="en-US" sz="3200" i="1"/>
+                        </m:ctrlPr>
+                      </m:sSupPr>
+                      <m:e>
+                        <m:r>
+                          <a:rPr lang="en-US" sz="3200" b="1" i="1"/>
+                          <m:t>𝐛</m:t>
+                        </m:r>
+                      </m:e>
+                      <m:sup>
+                        <m:r>
+                          <a:rPr lang="en-US" sz="3200" i="1"/>
+                          <m:t>∗</m:t>
+                        </m:r>
+                      </m:sup>
+                    </m:sSup>
+                    <m:r>
+                      <a:rPr lang="en-US" sz="3200" i="1"/>
+                      <m:t>=</m:t>
+                    </m:r>
+                    <m:sSubSup>
+                      <m:sSubSupPr>
+                        <m:ctrlPr>
+                          <a:rPr lang="en-US" sz="3200" i="1"/>
+                        </m:ctrlPr>
+                      </m:sSubSupPr>
+                      <m:e>
+                        <m:r>
+                          <a:rPr lang="en-US" sz="3200" i="1"/>
+                          <m:t>𝑊</m:t>
+                        </m:r>
+                      </m:e>
+                      <m:sub>
+                        <m:d>
+                          <m:dPr>
+                            <m:ctrlPr>
+                              <a:rPr lang="en-US" sz="3200" i="1"/>
+                            </m:ctrlPr>
+                          </m:dPr>
+                          <m:e>
+                            <m:r>
+                              <a:rPr lang="en-US" sz="3200" i="1"/>
+                              <m:t>2</m:t>
+                            </m:r>
+                            <m:r>
+                              <a:rPr lang="en-US" sz="3200" i="1"/>
+                              <m:t>:</m:t>
+                            </m:r>
+                            <m:r>
+                              <a:rPr lang="en-US" sz="3200" i="1"/>
+                              <m:t>𝑑</m:t>
+                            </m:r>
+                            <m:r>
+                              <a:rPr lang="en-US" sz="3200" i="1"/>
+                              <m:t>,</m:t>
+                            </m:r>
+                            <m:r>
+                              <a:rPr lang="en-US" sz="3200" i="1"/>
+                              <m:t>1</m:t>
+                            </m:r>
+                          </m:e>
+                        </m:d>
+                      </m:sub>
+                      <m:sup>
+                        <m:r>
+                          <a:rPr lang="en-US" sz="3200" i="1"/>
+                          <m:t>𝑛𝑒𝑤</m:t>
+                        </m:r>
+                      </m:sup>
+                    </m:sSubSup>
+                  </m:oMath>
+                </a14:m>
+                <a:r>
+                  <a:rPr lang="en-US" sz="3200" dirty="0"/>
+                  <a:t> and </a:t>
+                </a:r>
+                <a14:m>
+                  <m:oMath xmlns:m="http://schemas.openxmlformats.org/officeDocument/2006/math">
+                    <m:sSup>
+                      <m:sSupPr>
+                        <m:ctrlPr>
+                          <a:rPr lang="en-US" sz="3200" i="1"/>
+                        </m:ctrlPr>
+                      </m:sSupPr>
+                      <m:e>
+                        <m:r>
+                          <a:rPr lang="en-US" sz="3200" i="1"/>
+                          <m:t>𝐴</m:t>
+                        </m:r>
+                      </m:e>
+                      <m:sup>
+                        <m:r>
+                          <a:rPr lang="en-US" sz="3200" i="1"/>
+                          <m:t>∗</m:t>
+                        </m:r>
+                      </m:sup>
+                    </m:sSup>
+                    <m:r>
+                      <a:rPr lang="en-US" sz="3200" i="1"/>
+                      <m:t>=</m:t>
+                    </m:r>
+                    <m:r>
+                      <a:rPr lang="en-US" sz="3200" i="1"/>
+                      <m:t>𝐴</m:t>
+                    </m:r>
+                    <m:r>
+                      <a:rPr lang="en-US" sz="3200" i="1"/>
+                      <m:t>=</m:t>
+                    </m:r>
+                    <m:sSub>
+                      <m:sSubPr>
+                        <m:ctrlPr>
+                          <a:rPr lang="en-US" sz="3200" i="1"/>
+                        </m:ctrlPr>
+                      </m:sSubPr>
+                      <m:e>
+                        <m:r>
+                          <a:rPr lang="en-US" sz="3200" i="1"/>
+                          <m:t>𝑊</m:t>
+                        </m:r>
+                      </m:e>
+                      <m:sub>
+                        <m:r>
+                          <a:rPr lang="en-US" sz="3200" i="1"/>
+                          <m:t>(</m:t>
+                        </m:r>
+                        <m:r>
+                          <a:rPr lang="en-US" sz="3200" i="1"/>
+                          <m:t>2</m:t>
+                        </m:r>
+                        <m:r>
+                          <a:rPr lang="en-US" sz="3200" i="1"/>
+                          <m:t>:</m:t>
+                        </m:r>
+                        <m:r>
+                          <a:rPr lang="en-US" sz="3200" i="1"/>
+                          <m:t>𝑑</m:t>
+                        </m:r>
+                        <m:r>
+                          <a:rPr lang="en-US" sz="3200" i="1"/>
+                          <m:t>,</m:t>
+                        </m:r>
+                        <m:r>
+                          <a:rPr lang="en-US" sz="3200" i="1"/>
+                          <m:t>2</m:t>
+                        </m:r>
+                        <m:r>
+                          <a:rPr lang="en-US" sz="3200" i="1"/>
+                          <m:t>:</m:t>
+                        </m:r>
+                        <m:r>
+                          <a:rPr lang="en-US" sz="3200" i="1"/>
+                          <m:t>𝑑</m:t>
+                        </m:r>
+                        <m:r>
+                          <a:rPr lang="en-US" sz="3200" i="1"/>
+                          <m:t>)</m:t>
+                        </m:r>
+                      </m:sub>
+                    </m:sSub>
+                  </m:oMath>
+                </a14:m>
+                <a:r>
+                  <a:rPr lang="en-US" sz="3200" dirty="0"/>
+                  <a:t>. </a:t>
+                </a:r>
+                <a:r>
+                  <a:rPr lang="en-US" sz="3200" dirty="0" smtClean="0"/>
+                  <a:t> Resulting with </a:t>
+                </a:r>
+                <a14:m>
+                  <m:oMath xmlns:m="http://schemas.openxmlformats.org/officeDocument/2006/math">
+                    <m:sSup>
+                      <m:sSupPr>
+                        <m:ctrlPr>
+                          <a:rPr lang="en-US" sz="3200" b="0" i="1" smtClean="0">
+                            <a:latin typeface="Cambria Math" panose="02040503050406030204" pitchFamily="18" charset="0"/>
+                          </a:rPr>
+                        </m:ctrlPr>
+                      </m:sSupPr>
+                      <m:e>
+                        <m:r>
+                          <a:rPr lang="en-US" sz="3200" b="0" i="1" smtClean="0">
+                            <a:latin typeface="Cambria Math" panose="02040503050406030204" pitchFamily="18" charset="0"/>
+                          </a:rPr>
+                          <m:t>𝜂</m:t>
+                        </m:r>
+                      </m:e>
+                      <m:sup>
+                        <m:r>
+                          <a:rPr lang="en-US" sz="3200" b="0" i="1" smtClean="0">
+                            <a:latin typeface="Cambria Math" panose="02040503050406030204" pitchFamily="18" charset="0"/>
+                          </a:rPr>
+                          <m:t>𝑚𝑎𝑥</m:t>
+                        </m:r>
+                      </m:sup>
+                    </m:sSup>
+                    <m:r>
+                      <a:rPr lang="en-US" sz="3200" i="1">
+                        <a:latin typeface="Cambria Math" panose="02040503050406030204" pitchFamily="18" charset="0"/>
+                      </a:rPr>
+                      <m:t> </m:t>
+                    </m:r>
+                  </m:oMath>
+                </a14:m>
+                <a:r>
+                  <a:rPr lang="en-US" sz="3200" dirty="0" smtClean="0"/>
+                  <a:t>an </a:t>
+                </a:r>
+                <a:r>
+                  <a:rPr lang="en-US" sz="3200" dirty="0"/>
+                  <a:t>upper limit to the allowable step </a:t>
+                </a:r>
+                <a:r>
+                  <a:rPr lang="en-US" sz="3200" dirty="0" smtClean="0"/>
+                  <a:t>size.</a:t>
+                </a:r>
+                <a:endParaRPr lang="en-US" sz="3200" dirty="0"/>
+              </a:p>
+            </p:txBody>
+          </p:sp>
+        </mc:Choice>
+        <mc:Fallback>
+          <p:sp>
+            <p:nvSpPr>
+              <p:cNvPr id="60" name="Rectangle 59"/>
+              <p:cNvSpPr>
+                <a:spLocks noRot="1" noChangeAspect="1" noMove="1" noResize="1" noEditPoints="1" noAdjustHandles="1" noChangeArrowheads="1" noChangeShapeType="1" noTextEdit="1"/>
+              </p:cNvSpPr>
+              <p:nvPr/>
+            </p:nvSpPr>
+            <p:spPr>
+              <a:xfrm>
+                <a:off x="12070732" y="11213726"/>
+                <a:ext cx="8334741" cy="5189420"/>
+              </a:xfrm>
+              <a:prstGeom prst="rect">
+                <a:avLst/>
+              </a:prstGeom>
+              <a:blipFill rotWithShape="0">
+                <a:blip r:embed="rId23"/>
+                <a:stretch>
+                  <a:fillRect l="-1683" t="-1410" b="-2820"/>
+                </a:stretch>
+              </a:blipFill>
+            </p:spPr>
+            <p:txBody>
+              <a:bodyPr/>
+              <a:lstStyle/>
+              <a:p>
+                <a:r>
+                  <a:rPr lang="en-US">
+                    <a:noFill/>
+                  </a:rPr>
+                  <a:t> </a:t>
+                </a:r>
+              </a:p>
+            </p:txBody>
+          </p:sp>
+        </mc:Fallback>
+      </mc:AlternateContent>
+      <p:pic>
+        <p:nvPicPr>
+          <p:cNvPr id="62" name="Picture 61" descr="http://www.afbiu.org/image/about-biu/circle-logo-330x330.gif"/>
+          <p:cNvPicPr/>
+          <p:nvPr/>
+        </p:nvPicPr>
+        <p:blipFill>
+          <a:blip r:embed="rId24">
+            <a:clrChange>
+              <a:clrFrom>
+                <a:srgbClr val="FFFFFF"/>
+              </a:clrFrom>
+              <a:clrTo>
+                <a:srgbClr val="FFFFFF">
+                  <a:alpha val="0"/>
+                </a:srgbClr>
+              </a:clrTo>
+            </a:clrChange>
+            <a:extLst>
+              <a:ext uri="{28A0092B-C50C-407E-A947-70E740481C1C}">
+                <a14:useLocalDpi xmlns:a14="http://schemas.microsoft.com/office/drawing/2010/main" val="0"/>
+              </a:ext>
+            </a:extLst>
+          </a:blip>
+          <a:srcRect/>
+          <a:stretch>
+            <a:fillRect/>
+          </a:stretch>
+        </p:blipFill>
+        <p:spPr bwMode="auto">
+          <a:xfrm>
+            <a:off x="38701147" y="604675"/>
+            <a:ext cx="3143250" cy="3143250"/>
           </a:xfrm>
           <a:prstGeom prst="rect">
             <a:avLst/>

</xml_diff>

<commit_message>
dense/sparse comet and comp complexity
</commit_message>
<xml_diff>
--- a/COMET_poster.pptx
+++ b/COMET_poster.pptx
@@ -3016,27 +3016,9 @@
   <p:cSld>
     <p:bg>
       <p:bgPr>
-        <a:gradFill flip="none" rotWithShape="1">
-          <a:gsLst>
-            <a:gs pos="0">
-              <a:schemeClr val="tx2">
-                <a:lumMod val="60000"/>
-                <a:lumOff val="40000"/>
-              </a:schemeClr>
-            </a:gs>
-            <a:gs pos="39999">
-              <a:srgbClr val="85C2FF"/>
-            </a:gs>
-            <a:gs pos="70000">
-              <a:srgbClr val="C4D6EB"/>
-            </a:gs>
-            <a:gs pos="100000">
-              <a:srgbClr val="FFEBFA"/>
-            </a:gs>
-          </a:gsLst>
-          <a:lin ang="16200000" scaled="0"/>
-          <a:tileRect/>
-        </a:gradFill>
+        <a:solidFill>
+          <a:schemeClr val="bg1"/>
+        </a:solidFill>
         <a:effectLst/>
       </p:bgPr>
     </p:bg>
@@ -3542,29 +3524,6 @@
 <file path=ppt/slides/slide1.xml><?xml version="1.0" encoding="utf-8"?>
 <p:sld xmlns:a="http://schemas.openxmlformats.org/drawingml/2006/main" xmlns:r="http://schemas.openxmlformats.org/officeDocument/2006/relationships" xmlns:p="http://schemas.openxmlformats.org/presentationml/2006/main">
   <p:cSld>
-    <p:bg>
-      <p:bgPr>
-        <a:gradFill flip="none" rotWithShape="1">
-          <a:gsLst>
-            <a:gs pos="100000">
-              <a:schemeClr val="bg1"/>
-            </a:gs>
-            <a:gs pos="53000">
-              <a:srgbClr val="D4DEFF"/>
-            </a:gs>
-            <a:gs pos="83000">
-              <a:srgbClr val="D4DEFF"/>
-            </a:gs>
-            <a:gs pos="100000">
-              <a:srgbClr val="96AB94"/>
-            </a:gs>
-          </a:gsLst>
-          <a:lin ang="16200000" scaled="0"/>
-          <a:tileRect/>
-        </a:gradFill>
-        <a:effectLst/>
-      </p:bgPr>
-    </p:bg>
     <p:spTree>
       <p:nvGrpSpPr>
         <p:cNvPr id="1" name=""/>
@@ -3866,7 +3825,23 @@
                       <a:schemeClr val="tx1"/>
                     </a:solidFill>
                   </a:rPr>
-                  <a:t> is more similar to </a:t>
+                  <a:t> is </a:t>
+                </a:r>
+                <a:r>
+                  <a:rPr lang="en-US" sz="4200" dirty="0">
+                    <a:solidFill>
+                      <a:schemeClr val="tx1"/>
+                    </a:solidFill>
+                  </a:rPr>
+                  <a:t>more similar </a:t>
+                </a:r>
+                <a:r>
+                  <a:rPr lang="en-US" sz="3600" dirty="0">
+                    <a:solidFill>
+                      <a:schemeClr val="tx1"/>
+                    </a:solidFill>
+                  </a:rPr>
+                  <a:t>to </a:t>
                 </a:r>
                 <a14:m>
                   <m:oMath xmlns:m="http://schemas.openxmlformats.org/officeDocument/2006/math">
@@ -4391,210 +4366,213 @@
               <a:p>
                 <a:pPr algn="l" rtl="0"/>
                 <a14:m>
-                  <m:oMathPara xmlns:m="http://schemas.openxmlformats.org/officeDocument/2006/math">
-                    <m:oMathParaPr>
-                      <m:jc m:val="left"/>
-                    </m:oMathParaPr>
-                    <m:oMath xmlns:m="http://schemas.openxmlformats.org/officeDocument/2006/math">
-                      <m:r>
-                        <a:rPr lang="en-US" sz="3200" i="1">
-                          <a:solidFill>
-                            <a:schemeClr val="tx1"/>
-                          </a:solidFill>
-                          <a:latin typeface="Cambria Math" panose="02040503050406030204" pitchFamily="18" charset="0"/>
-                        </a:rPr>
-                        <m:t>−</m:t>
-                      </m:r>
-                      <m:r>
-                        <a:rPr lang="en-US" sz="3200" i="1">
-                          <a:solidFill>
-                            <a:schemeClr val="tx1"/>
-                          </a:solidFill>
-                          <a:latin typeface="Cambria Math" panose="02040503050406030204" pitchFamily="18" charset="0"/>
-                        </a:rPr>
-                        <m:t>𝛼</m:t>
-                      </m:r>
-                      <m:func>
-                        <m:funcPr>
-                          <m:ctrlPr>
-                            <a:rPr lang="en-US" sz="3200" i="1">
-                              <a:solidFill>
-                                <a:schemeClr val="tx1"/>
-                              </a:solidFill>
-                              <a:latin typeface="Cambria Math" panose="02040503050406030204" pitchFamily="18" charset="0"/>
-                            </a:rPr>
-                          </m:ctrlPr>
-                        </m:funcPr>
-                        <m:fName>
-                          <m:r>
-                            <m:rPr>
-                              <m:sty m:val="p"/>
-                            </m:rPr>
-                            <a:rPr lang="en-US" sz="3200">
-                              <a:solidFill>
-                                <a:schemeClr val="tx1"/>
-                              </a:solidFill>
-                              <a:latin typeface="Cambria Math" panose="02040503050406030204" pitchFamily="18" charset="0"/>
-                            </a:rPr>
-                            <m:t>log</m:t>
-                          </m:r>
-                        </m:fName>
-                        <m:e>
-                          <m:func>
-                            <m:funcPr>
-                              <m:ctrlPr>
-                                <a:rPr lang="en-US" sz="3200" i="1">
-                                  <a:solidFill>
-                                    <a:schemeClr val="tx1"/>
-                                  </a:solidFill>
-                                  <a:latin typeface="Cambria Math" panose="02040503050406030204" pitchFamily="18" charset="0"/>
-                                </a:rPr>
-                              </m:ctrlPr>
-                            </m:funcPr>
-                            <m:fName>
-                              <m:r>
-                                <m:rPr>
-                                  <m:sty m:val="p"/>
-                                </m:rPr>
-                                <a:rPr lang="en-US" sz="3200">
-                                  <a:solidFill>
-                                    <a:schemeClr val="tx1"/>
-                                  </a:solidFill>
-                                  <a:latin typeface="Cambria Math" panose="02040503050406030204" pitchFamily="18" charset="0"/>
-                                </a:rPr>
-                                <m:t>det</m:t>
-                              </m:r>
-                            </m:fName>
-                            <m:e>
-                              <m:r>
-                                <a:rPr lang="en-US" sz="3200" i="1">
-                                  <a:solidFill>
-                                    <a:schemeClr val="tx1"/>
-                                  </a:solidFill>
-                                  <a:latin typeface="Cambria Math" panose="02040503050406030204" pitchFamily="18" charset="0"/>
-                                </a:rPr>
-                                <m:t>𝑊</m:t>
-                              </m:r>
-                            </m:e>
-                          </m:func>
-                        </m:e>
-                      </m:func>
-                      <m:r>
-                        <a:rPr lang="en-US" sz="3200" i="1">
-                          <a:solidFill>
-                            <a:schemeClr val="tx1"/>
-                          </a:solidFill>
-                          <a:latin typeface="Cambria Math" panose="02040503050406030204" pitchFamily="18" charset="0"/>
-                        </a:rPr>
-                        <m:t>+</m:t>
-                      </m:r>
-                      <m:f>
-                        <m:fPr>
-                          <m:ctrlPr>
-                            <a:rPr lang="en-US" sz="3200" i="1">
-                              <a:solidFill>
-                                <a:schemeClr val="tx1"/>
-                              </a:solidFill>
-                              <a:latin typeface="Cambria Math" panose="02040503050406030204" pitchFamily="18" charset="0"/>
-                            </a:rPr>
-                          </m:ctrlPr>
-                        </m:fPr>
-                        <m:num>
-                          <m:r>
-                            <a:rPr lang="en-US" sz="3200" i="1">
-                              <a:solidFill>
-                                <a:schemeClr val="tx1"/>
-                              </a:solidFill>
-                              <a:latin typeface="Cambria Math" panose="02040503050406030204" pitchFamily="18" charset="0"/>
-                            </a:rPr>
-                            <m:t>𝛽</m:t>
-                          </m:r>
-                        </m:num>
-                        <m:den>
-                          <m:r>
-                            <a:rPr lang="en-US" sz="3200" i="1">
-                              <a:solidFill>
-                                <a:schemeClr val="tx1"/>
-                              </a:solidFill>
-                              <a:latin typeface="Cambria Math" panose="02040503050406030204" pitchFamily="18" charset="0"/>
-                            </a:rPr>
-                            <m:t>2</m:t>
-                          </m:r>
-                        </m:den>
-                      </m:f>
-                      <m:r>
-                        <a:rPr lang="en-US" sz="3200" i="1">
-                          <a:solidFill>
-                            <a:schemeClr val="tx1"/>
-                          </a:solidFill>
-                          <a:latin typeface="Cambria Math" panose="02040503050406030204" pitchFamily="18" charset="0"/>
-                        </a:rPr>
-                        <m:t> </m:t>
-                      </m:r>
-                      <m:sSubSup>
-                        <m:sSubSupPr>
-                          <m:ctrlPr>
-                            <a:rPr lang="en-US" sz="3200" i="1">
-                              <a:solidFill>
-                                <a:schemeClr val="tx1"/>
-                              </a:solidFill>
-                              <a:latin typeface="Cambria Math" panose="02040503050406030204" pitchFamily="18" charset="0"/>
-                            </a:rPr>
-                          </m:ctrlPr>
-                        </m:sSubSupPr>
-                        <m:e>
-                          <m:d>
-                            <m:dPr>
-                              <m:begChr m:val="‖"/>
-                              <m:endChr m:val="‖"/>
-                              <m:ctrlPr>
-                                <a:rPr lang="en-US" sz="3200" i="1">
-                                  <a:solidFill>
-                                    <a:schemeClr val="tx1"/>
-                                  </a:solidFill>
-                                  <a:latin typeface="Cambria Math" panose="02040503050406030204" pitchFamily="18" charset="0"/>
-                                </a:rPr>
-                              </m:ctrlPr>
-                            </m:dPr>
-                            <m:e>
-                              <m:r>
-                                <a:rPr lang="en-US" sz="3200" i="1">
-                                  <a:solidFill>
-                                    <a:schemeClr val="tx1"/>
-                                  </a:solidFill>
-                                  <a:latin typeface="Cambria Math" panose="02040503050406030204" pitchFamily="18" charset="0"/>
-                                </a:rPr>
-                                <m:t>𝑊</m:t>
-                              </m:r>
-                            </m:e>
-                          </m:d>
-                        </m:e>
-                        <m:sub>
-                          <m:r>
-                            <a:rPr lang="en-US" sz="3200" i="1">
-                              <a:solidFill>
-                                <a:schemeClr val="tx1"/>
-                              </a:solidFill>
-                              <a:latin typeface="Cambria Math" panose="02040503050406030204" pitchFamily="18" charset="0"/>
-                            </a:rPr>
-                            <m:t>𝐹</m:t>
-                          </m:r>
-                        </m:sub>
-                        <m:sup>
-                          <m:r>
-                            <a:rPr lang="en-US" sz="3200" i="1">
-                              <a:solidFill>
-                                <a:schemeClr val="tx1"/>
-                              </a:solidFill>
-                              <a:latin typeface="Cambria Math" panose="02040503050406030204" pitchFamily="18" charset="0"/>
-                            </a:rPr>
-                            <m:t>2</m:t>
-                          </m:r>
-                        </m:sup>
-                      </m:sSubSup>
-                    </m:oMath>
-                  </m:oMathPara>
+                  <m:oMath xmlns:m="http://schemas.openxmlformats.org/officeDocument/2006/math">
+                    <m:r>
+                      <a:rPr lang="en-US" sz="3200" i="1">
+                        <a:solidFill>
+                          <a:schemeClr val="tx1"/>
+                        </a:solidFill>
+                        <a:latin typeface="Cambria Math" panose="02040503050406030204" pitchFamily="18" charset="0"/>
+                      </a:rPr>
+                      <m:t>−</m:t>
+                    </m:r>
+                    <m:r>
+                      <a:rPr lang="en-US" sz="3200" i="1">
+                        <a:solidFill>
+                          <a:schemeClr val="tx1"/>
+                        </a:solidFill>
+                        <a:latin typeface="Cambria Math" panose="02040503050406030204" pitchFamily="18" charset="0"/>
+                      </a:rPr>
+                      <m:t>𝛼</m:t>
+                    </m:r>
+                    <m:func>
+                      <m:funcPr>
+                        <m:ctrlPr>
+                          <a:rPr lang="en-US" sz="3200" i="1">
+                            <a:solidFill>
+                              <a:schemeClr val="tx1"/>
+                            </a:solidFill>
+                            <a:latin typeface="Cambria Math" panose="02040503050406030204" pitchFamily="18" charset="0"/>
+                          </a:rPr>
+                        </m:ctrlPr>
+                      </m:funcPr>
+                      <m:fName>
+                        <m:r>
+                          <m:rPr>
+                            <m:sty m:val="p"/>
+                          </m:rPr>
+                          <a:rPr lang="en-US" sz="3200">
+                            <a:solidFill>
+                              <a:schemeClr val="tx1"/>
+                            </a:solidFill>
+                            <a:latin typeface="Cambria Math" panose="02040503050406030204" pitchFamily="18" charset="0"/>
+                          </a:rPr>
+                          <m:t>log</m:t>
+                        </m:r>
+                      </m:fName>
+                      <m:e>
+                        <m:func>
+                          <m:funcPr>
+                            <m:ctrlPr>
+                              <a:rPr lang="en-US" sz="3200" i="1">
+                                <a:solidFill>
+                                  <a:schemeClr val="tx1"/>
+                                </a:solidFill>
+                                <a:latin typeface="Cambria Math" panose="02040503050406030204" pitchFamily="18" charset="0"/>
+                              </a:rPr>
+                            </m:ctrlPr>
+                          </m:funcPr>
+                          <m:fName>
+                            <m:r>
+                              <m:rPr>
+                                <m:sty m:val="p"/>
+                              </m:rPr>
+                              <a:rPr lang="en-US" sz="3200">
+                                <a:solidFill>
+                                  <a:schemeClr val="tx1"/>
+                                </a:solidFill>
+                                <a:latin typeface="Cambria Math" panose="02040503050406030204" pitchFamily="18" charset="0"/>
+                              </a:rPr>
+                              <m:t>det</m:t>
+                            </m:r>
+                          </m:fName>
+                          <m:e>
+                            <m:r>
+                              <a:rPr lang="en-US" sz="3200" i="1">
+                                <a:solidFill>
+                                  <a:schemeClr val="tx1"/>
+                                </a:solidFill>
+                                <a:latin typeface="Cambria Math" panose="02040503050406030204" pitchFamily="18" charset="0"/>
+                              </a:rPr>
+                              <m:t>𝑊</m:t>
+                            </m:r>
+                          </m:e>
+                        </m:func>
+                      </m:e>
+                    </m:func>
+                    <m:r>
+                      <a:rPr lang="en-US" sz="3200" i="1">
+                        <a:solidFill>
+                          <a:schemeClr val="tx1"/>
+                        </a:solidFill>
+                        <a:latin typeface="Cambria Math" panose="02040503050406030204" pitchFamily="18" charset="0"/>
+                      </a:rPr>
+                      <m:t>+</m:t>
+                    </m:r>
+                    <m:f>
+                      <m:fPr>
+                        <m:ctrlPr>
+                          <a:rPr lang="en-US" sz="3200" i="1">
+                            <a:solidFill>
+                              <a:schemeClr val="tx1"/>
+                            </a:solidFill>
+                            <a:latin typeface="Cambria Math" panose="02040503050406030204" pitchFamily="18" charset="0"/>
+                          </a:rPr>
+                        </m:ctrlPr>
+                      </m:fPr>
+                      <m:num>
+                        <m:r>
+                          <a:rPr lang="en-US" sz="3200" i="1">
+                            <a:solidFill>
+                              <a:schemeClr val="tx1"/>
+                            </a:solidFill>
+                            <a:latin typeface="Cambria Math" panose="02040503050406030204" pitchFamily="18" charset="0"/>
+                          </a:rPr>
+                          <m:t>𝛽</m:t>
+                        </m:r>
+                      </m:num>
+                      <m:den>
+                        <m:r>
+                          <a:rPr lang="en-US" sz="3200" i="1">
+                            <a:solidFill>
+                              <a:schemeClr val="tx1"/>
+                            </a:solidFill>
+                            <a:latin typeface="Cambria Math" panose="02040503050406030204" pitchFamily="18" charset="0"/>
+                          </a:rPr>
+                          <m:t>2</m:t>
+                        </m:r>
+                      </m:den>
+                    </m:f>
+                    <m:r>
+                      <a:rPr lang="en-US" sz="3200" i="1">
+                        <a:solidFill>
+                          <a:schemeClr val="tx1"/>
+                        </a:solidFill>
+                        <a:latin typeface="Cambria Math" panose="02040503050406030204" pitchFamily="18" charset="0"/>
+                      </a:rPr>
+                      <m:t> </m:t>
+                    </m:r>
+                    <m:sSubSup>
+                      <m:sSubSupPr>
+                        <m:ctrlPr>
+                          <a:rPr lang="en-US" sz="3200" i="1">
+                            <a:solidFill>
+                              <a:schemeClr val="tx1"/>
+                            </a:solidFill>
+                            <a:latin typeface="Cambria Math" panose="02040503050406030204" pitchFamily="18" charset="0"/>
+                          </a:rPr>
+                        </m:ctrlPr>
+                      </m:sSubSupPr>
+                      <m:e>
+                        <m:d>
+                          <m:dPr>
+                            <m:begChr m:val="‖"/>
+                            <m:endChr m:val="‖"/>
+                            <m:ctrlPr>
+                              <a:rPr lang="en-US" sz="3200" i="1">
+                                <a:solidFill>
+                                  <a:schemeClr val="tx1"/>
+                                </a:solidFill>
+                                <a:latin typeface="Cambria Math" panose="02040503050406030204" pitchFamily="18" charset="0"/>
+                              </a:rPr>
+                            </m:ctrlPr>
+                          </m:dPr>
+                          <m:e>
+                            <m:r>
+                              <a:rPr lang="en-US" sz="3200" i="1">
+                                <a:solidFill>
+                                  <a:schemeClr val="tx1"/>
+                                </a:solidFill>
+                                <a:latin typeface="Cambria Math" panose="02040503050406030204" pitchFamily="18" charset="0"/>
+                              </a:rPr>
+                              <m:t>𝑊</m:t>
+                            </m:r>
+                          </m:e>
+                        </m:d>
+                      </m:e>
+                      <m:sub>
+                        <m:r>
+                          <a:rPr lang="en-US" sz="3200" i="1">
+                            <a:solidFill>
+                              <a:schemeClr val="tx1"/>
+                            </a:solidFill>
+                            <a:latin typeface="Cambria Math" panose="02040503050406030204" pitchFamily="18" charset="0"/>
+                          </a:rPr>
+                          <m:t>𝐹</m:t>
+                        </m:r>
+                      </m:sub>
+                      <m:sup>
+                        <m:r>
+                          <a:rPr lang="en-US" sz="3200" i="1">
+                            <a:solidFill>
+                              <a:schemeClr val="tx1"/>
+                            </a:solidFill>
+                            <a:latin typeface="Cambria Math" panose="02040503050406030204" pitchFamily="18" charset="0"/>
+                          </a:rPr>
+                          <m:t>2</m:t>
+                        </m:r>
+                      </m:sup>
+                    </m:sSubSup>
+                  </m:oMath>
                 </a14:m>
+                <a:r>
+                  <a:rPr lang="en-US" sz="3300" dirty="0" smtClean="0">
+                    <a:solidFill>
+                      <a:schemeClr val="tx1"/>
+                    </a:solidFill>
+                  </a:rPr>
+                  <a:t>, with gradient steps inside the PD cone.</a:t>
+                </a:r>
                 <a:endParaRPr lang="he-IL" sz="3300" dirty="0" smtClean="0">
                   <a:solidFill>
                     <a:schemeClr val="tx1"/>
@@ -4665,7 +4643,7 @@
         <p:spPr>
           <a:xfrm>
             <a:off x="21602700" y="4968777"/>
-            <a:ext cx="9361040" cy="8568952"/>
+            <a:ext cx="9361040" cy="19298144"/>
           </a:xfrm>
           <a:prstGeom prst="roundRect">
             <a:avLst/>
@@ -4701,17 +4679,14 @@
           <a:p>
             <a:pPr algn="ctr" rtl="0"/>
             <a:r>
-              <a:rPr lang="en-US" sz="4400" b="1" dirty="0">
+              <a:rPr lang="en-US" sz="4400" b="1" smtClean="0">
                 <a:solidFill>
                   <a:schemeClr val="tx1"/>
                 </a:solidFill>
               </a:rPr>
               <a:t>Sparse COMET</a:t>
             </a:r>
-          </a:p>
-          <a:p>
-            <a:pPr algn="ctr" rtl="0"/>
-            <a:endParaRPr lang="en-US" sz="4400" b="1" dirty="0">
+            <a:endParaRPr lang="en-US" sz="4400" b="1" dirty="0" smtClean="0">
               <a:solidFill>
                 <a:schemeClr val="tx1"/>
               </a:solidFill>
@@ -4729,8 +4704,8 @@
         </p:nvSpPr>
         <p:spPr bwMode="auto">
           <a:xfrm>
-            <a:off x="4252242" y="154793"/>
-            <a:ext cx="34700925" cy="2693824"/>
+            <a:off x="4252242" y="-37567"/>
+            <a:ext cx="34700925" cy="3078545"/>
           </a:xfrm>
           <a:prstGeom prst="rect">
             <a:avLst/>
@@ -4753,15 +4728,19 @@
             <a:pPr algn="ctr" rtl="0"/>
             <a:r>
               <a:rPr lang="en-US" b="1" dirty="0" smtClean="0"/>
-              <a:t>COMET – Learning Sparse Metrics</a:t>
-            </a:r>
-            <a:endParaRPr lang="en-US" b="1" dirty="0" smtClean="0"/>
+              <a:t>Learning</a:t>
+            </a:r>
+            <a:r>
+              <a:rPr lang="en-US" sz="11000" b="1" dirty="0" smtClean="0"/>
+              <a:t> Sparse Metrics</a:t>
+            </a:r>
+            <a:endParaRPr lang="en-US" sz="11000" b="1" dirty="0" smtClean="0"/>
           </a:p>
           <a:p>
             <a:pPr algn="ctr" rtl="0"/>
             <a:r>
               <a:rPr lang="en-US" b="1" dirty="0" smtClean="0"/>
-              <a:t>One Feature at a Time</a:t>
+              <a:t>One Feature at a Time - COMET</a:t>
             </a:r>
             <a:endParaRPr lang="en-US" b="1" dirty="0" smtClean="0"/>
           </a:p>
@@ -4927,8 +4906,8 @@
         </p:nvSpPr>
         <p:spPr>
           <a:xfrm>
-            <a:off x="21602700" y="14041785"/>
-            <a:ext cx="9361040" cy="17857984"/>
+            <a:off x="21602700" y="24764108"/>
+            <a:ext cx="9361040" cy="7135661"/>
           </a:xfrm>
           <a:prstGeom prst="roundRect">
             <a:avLst/>
@@ -4969,15 +4948,7 @@
                   <a:schemeClr val="tx1"/>
                 </a:solidFill>
               </a:rPr>
-              <a:t>Precision at </a:t>
-            </a:r>
-            <a:r>
-              <a:rPr lang="en-US" sz="4400" b="1" i="1" dirty="0" smtClean="0">
-                <a:solidFill>
-                  <a:schemeClr val="tx1"/>
-                </a:solidFill>
-              </a:rPr>
-              <a:t>top k</a:t>
+              <a:t>Computational Complexity</a:t>
             </a:r>
             <a:endParaRPr lang="en-US" sz="4400" b="1" dirty="0" smtClean="0">
               <a:solidFill>
@@ -4987,7 +4958,34 @@
           </a:p>
           <a:p>
             <a:pPr algn="l" rtl="0"/>
-            <a:endParaRPr lang="en-US" sz="3200" b="1" dirty="0" smtClean="0">
+            <a:endParaRPr lang="en-US" sz="3200" smtClean="0">
+              <a:solidFill>
+                <a:schemeClr val="tx1"/>
+              </a:solidFill>
+            </a:endParaRPr>
+          </a:p>
+          <a:p>
+            <a:pPr algn="l" rtl="0"/>
+            <a:r>
+              <a:rPr lang="en-US" sz="3200" smtClean="0">
+                <a:solidFill>
+                  <a:schemeClr val="tx1"/>
+                </a:solidFill>
+              </a:rPr>
+              <a:t>We </a:t>
+            </a:r>
+            <a:r>
+              <a:rPr lang="en-US" sz="3200" dirty="0" smtClean="0">
+                <a:solidFill>
+                  <a:schemeClr val="tx1"/>
+                </a:solidFill>
+              </a:rPr>
+              <a:t>compared COMET with LEGO, HDSL and the Euclidean metric baseline.</a:t>
+            </a:r>
+          </a:p>
+          <a:p>
+            <a:pPr algn="l" rtl="0"/>
+            <a:endParaRPr lang="en-US" sz="3200" dirty="0" smtClean="0">
               <a:solidFill>
                 <a:schemeClr val="tx1"/>
               </a:solidFill>
@@ -5705,29 +5703,6 @@
           </p:sp>
         </mc:Fallback>
       </mc:AlternateContent>
-      <p:pic>
-        <p:nvPicPr>
-          <p:cNvPr id="887" name="Picture 886"/>
-          <p:cNvPicPr/>
-          <p:nvPr/>
-        </p:nvPicPr>
-        <p:blipFill>
-          <a:blip r:embed="rId5" cstate="print"/>
-          <a:srcRect l="5796"/>
-          <a:stretch>
-            <a:fillRect/>
-          </a:stretch>
-        </p:blipFill>
-        <p:spPr>
-          <a:xfrm>
-            <a:off x="22322780" y="8569177"/>
-            <a:ext cx="5904656" cy="4707669"/>
-          </a:xfrm>
-          <a:prstGeom prst="rect">
-            <a:avLst/>
-          </a:prstGeom>
-        </p:spPr>
-      </p:pic>
       <p:sp>
         <p:nvSpPr>
           <p:cNvPr id="20" name="Rounded Rectangle 19"/>
@@ -5736,8 +5711,8 @@
         </p:nvSpPr>
         <p:spPr>
           <a:xfrm>
-            <a:off x="11449571" y="4968777"/>
-            <a:ext cx="9433050" cy="11737304"/>
+            <a:off x="11449571" y="4968776"/>
+            <a:ext cx="9433050" cy="15203237"/>
           </a:xfrm>
           <a:prstGeom prst="roundRect">
             <a:avLst/>
@@ -6040,7 +6015,7 @@
                 <a:avLst/>
               </a:prstGeom>
               <a:blipFill rotWithShape="0">
-                <a:blip r:embed="rId6"/>
+                <a:blip r:embed="rId5"/>
                 <a:stretch>
                   <a:fillRect/>
                 </a:stretch>
@@ -6116,7 +6091,15 @@
                   <a:schemeClr val="tx1"/>
                 </a:solidFill>
               </a:rPr>
-              <a:t>	Expression across the human cortex is not homogeneous</a:t>
+              <a:t>	</a:t>
+            </a:r>
+            <a:r>
+              <a:rPr lang="en-US" sz="4400" b="1" dirty="0" smtClean="0">
+                <a:solidFill>
+                  <a:schemeClr val="tx1"/>
+                </a:solidFill>
+              </a:rPr>
+              <a:t>Precision-Density-Runtime</a:t>
             </a:r>
             <a:endParaRPr lang="en-US" sz="4400" b="1" dirty="0">
               <a:solidFill>
@@ -6149,11 +6132,11 @@
             <p:nvPr/>
           </p:nvPicPr>
           <p:blipFill>
-            <a:blip r:embed="rId7" cstate="print">
+            <a:blip r:embed="rId6" cstate="print">
               <a:extLst>
                 <a:ext uri="{BEBA8EAE-BF5A-486C-A8C5-ECC9F3942E4B}">
                   <a14:imgProps xmlns:a14="http://schemas.microsoft.com/office/drawing/2010/main">
-                    <a14:imgLayer r:embed="rId8">
+                    <a14:imgLayer r:embed="rId7">
                       <a14:imgEffect>
                         <a14:backgroundRemoval t="2174" b="100000" l="2000" r="99750"/>
                       </a14:imgEffect>
@@ -6255,7 +6238,7 @@
         <p:spPr>
           <a:xfrm>
             <a:off x="11900380" y="6192913"/>
-            <a:ext cx="8334741" cy="1586382"/>
+            <a:ext cx="4710275" cy="3556152"/>
           </a:xfrm>
           <a:prstGeom prst="rect">
             <a:avLst/>
@@ -6267,7 +6250,7 @@
           </a:bodyPr>
           <a:lstStyle/>
           <a:p>
-            <a:pPr algn="l" rtl="0"/>
+            <a:pPr algn="just" rtl="0"/>
             <a:r>
               <a:rPr lang="en-US" sz="3200" dirty="0"/>
               <a:t>COMET operates by updating the learned matrix one column and row at a time, thus updating the terms relating to one feature at each iteration. </a:t>
@@ -6354,7 +6337,7 @@
           <p:nvPr/>
         </p:nvPicPr>
         <p:blipFill>
-          <a:blip r:embed="rId9" cstate="print"/>
+          <a:blip r:embed="rId8" cstate="print"/>
           <a:srcRect l="11558" t="12764" r="15026" b="17728"/>
           <a:stretch>
             <a:fillRect/>
@@ -6371,486 +6354,178 @@
           <a:ln/>
         </p:spPr>
       </p:pic>
-      <p:sp>
-        <p:nvSpPr>
-          <p:cNvPr id="37" name="Rounded Rectangle 36"/>
-          <p:cNvSpPr/>
-          <p:nvPr/>
-        </p:nvSpPr>
-        <p:spPr>
-          <a:xfrm>
-            <a:off x="11521579" y="17570176"/>
-            <a:ext cx="9433049" cy="14329593"/>
-          </a:xfrm>
-          <a:prstGeom prst="roundRect">
-            <a:avLst/>
-          </a:prstGeom>
-          <a:solidFill>
-            <a:schemeClr val="bg1"/>
-          </a:solidFill>
-          <a:ln w="76200">
-            <a:solidFill>
-              <a:schemeClr val="tx1"/>
-            </a:solidFill>
-          </a:ln>
-        </p:spPr>
-        <p:style>
-          <a:lnRef idx="2">
-            <a:schemeClr val="accent1">
-              <a:shade val="50000"/>
-            </a:schemeClr>
-          </a:lnRef>
-          <a:fillRef idx="1">
-            <a:schemeClr val="accent1"/>
-          </a:fillRef>
-          <a:effectRef idx="0">
-            <a:schemeClr val="accent1"/>
-          </a:effectRef>
-          <a:fontRef idx="minor">
-            <a:schemeClr val="lt1"/>
-          </a:fontRef>
-        </p:style>
-        <p:txBody>
-          <a:bodyPr lIns="83976" tIns="41987" rIns="83976" bIns="41987" rtlCol="1" anchor="t"/>
-          <a:lstStyle/>
-          <a:p>
-            <a:pPr algn="ctr" rtl="0"/>
-            <a:r>
-              <a:rPr lang="en-US" sz="4000" b="1" dirty="0" smtClean="0">
+      <mc:AlternateContent xmlns:mc="http://schemas.openxmlformats.org/markup-compatibility/2006">
+        <mc:Choice xmlns:a14="http://schemas.microsoft.com/office/drawing/2010/main" Requires="a14">
+          <p:sp>
+            <p:nvSpPr>
+              <p:cNvPr id="37" name="Rounded Rectangle 36"/>
+              <p:cNvSpPr/>
+              <p:nvPr/>
+            </p:nvSpPr>
+            <p:spPr>
+              <a:xfrm>
+                <a:off x="11449571" y="20669200"/>
+                <a:ext cx="9433049" cy="2937244"/>
+              </a:xfrm>
+              <a:prstGeom prst="roundRect">
+                <a:avLst/>
+              </a:prstGeom>
+              <a:solidFill>
+                <a:schemeClr val="bg1"/>
+              </a:solidFill>
+              <a:ln w="76200">
                 <a:solidFill>
                   <a:schemeClr val="tx1"/>
                 </a:solidFill>
-              </a:rPr>
-              <a:t>Dense COMET</a:t>
-            </a:r>
-            <a:endParaRPr lang="en-US" sz="4000" b="1" dirty="0" smtClean="0">
-              <a:solidFill>
-                <a:schemeClr val="tx1"/>
-              </a:solidFill>
-            </a:endParaRPr>
-          </a:p>
-          <a:p>
-            <a:pPr algn="l" rtl="0"/>
-            <a:r>
-              <a:rPr lang="en-US" sz="3200" dirty="0" smtClean="0">
+              </a:ln>
+            </p:spPr>
+            <p:style>
+              <a:lnRef idx="2">
+                <a:schemeClr val="accent1">
+                  <a:shade val="50000"/>
+                </a:schemeClr>
+              </a:lnRef>
+              <a:fillRef idx="1">
+                <a:schemeClr val="accent1"/>
+              </a:fillRef>
+              <a:effectRef idx="0">
+                <a:schemeClr val="accent1"/>
+              </a:effectRef>
+              <a:fontRef idx="minor">
+                <a:schemeClr val="lt1"/>
+              </a:fontRef>
+            </p:style>
+            <p:txBody>
+              <a:bodyPr lIns="83976" tIns="41987" rIns="83976" bIns="41987" rtlCol="1" anchor="t"/>
+              <a:lstStyle/>
+              <a:p>
+                <a:pPr algn="ctr" rtl="0"/>
+                <a:r>
+                  <a:rPr lang="en-US" sz="4000" b="1" dirty="0" smtClean="0">
+                    <a:solidFill>
+                      <a:schemeClr val="tx1"/>
+                    </a:solidFill>
+                  </a:rPr>
+                  <a:t>Dense COMET</a:t>
+                </a:r>
+                <a:endParaRPr lang="en-US" sz="4000" b="1" dirty="0" smtClean="0">
+                  <a:solidFill>
+                    <a:schemeClr val="tx1"/>
+                  </a:solidFill>
+                </a:endParaRPr>
+              </a:p>
+              <a:p>
+                <a:pPr algn="l" rtl="0"/>
+                <a:r>
+                  <a:rPr lang="en-US" sz="3200" dirty="0" smtClean="0">
+                    <a:solidFill>
+                      <a:schemeClr val="tx1"/>
+                    </a:solidFill>
+                  </a:rPr>
+                  <a:t>We randomly draw a coordinate for each step, and take a row-column gradient step accordingly. We repeat it </a:t>
+                </a:r>
+                <a14:m>
+                  <m:oMath xmlns:m="http://schemas.openxmlformats.org/officeDocument/2006/math">
+                    <m:r>
+                      <a:rPr lang="en-US" sz="2800" b="0" i="1" smtClean="0">
+                        <a:solidFill>
+                          <a:schemeClr val="tx1"/>
+                        </a:solidFill>
+                        <a:latin typeface="Cambria Math" panose="02040503050406030204" pitchFamily="18" charset="0"/>
+                      </a:rPr>
+                      <m:t>𝑁</m:t>
+                    </m:r>
+                    <m:r>
+                      <a:rPr lang="en-US" sz="2800" b="0" i="1" smtClean="0">
+                        <a:solidFill>
+                          <a:schemeClr val="tx1"/>
+                        </a:solidFill>
+                        <a:latin typeface="Cambria Math" panose="02040503050406030204" pitchFamily="18" charset="0"/>
+                        <a:ea typeface="Cambria Math" panose="02040503050406030204" pitchFamily="18" charset="0"/>
+                      </a:rPr>
+                      <m:t>∙</m:t>
+                    </m:r>
+                    <m:r>
+                      <a:rPr lang="en-US" sz="2800" b="0" i="1" smtClean="0">
+                        <a:solidFill>
+                          <a:schemeClr val="tx1"/>
+                        </a:solidFill>
+                        <a:latin typeface="Cambria Math" panose="02040503050406030204" pitchFamily="18" charset="0"/>
+                        <a:ea typeface="Cambria Math" panose="02040503050406030204" pitchFamily="18" charset="0"/>
+                      </a:rPr>
+                      <m:t>𝑑</m:t>
+                    </m:r>
+                  </m:oMath>
+                </a14:m>
+                <a:r>
+                  <a:rPr lang="en-US" sz="2800" i="1" dirty="0" smtClean="0">
+                    <a:solidFill>
+                      <a:schemeClr val="tx1"/>
+                    </a:solidFill>
+                  </a:rPr>
+                  <a:t> </a:t>
+                </a:r>
+                <a:r>
+                  <a:rPr lang="en-US" sz="2800" dirty="0" smtClean="0">
+                    <a:solidFill>
+                      <a:schemeClr val="tx1"/>
+                    </a:solidFill>
+                  </a:rPr>
+                  <a:t>times.</a:t>
+                </a:r>
+                <a:endParaRPr lang="he-IL" sz="2800" i="1" dirty="0">
+                  <a:solidFill>
+                    <a:schemeClr val="tx1"/>
+                  </a:solidFill>
+                </a:endParaRPr>
+              </a:p>
+            </p:txBody>
+          </p:sp>
+        </mc:Choice>
+        <mc:Fallback>
+          <p:sp>
+            <p:nvSpPr>
+              <p:cNvPr id="37" name="Rounded Rectangle 36"/>
+              <p:cNvSpPr>
+                <a:spLocks noRot="1" noChangeAspect="1" noMove="1" noResize="1" noEditPoints="1" noAdjustHandles="1" noChangeArrowheads="1" noChangeShapeType="1" noTextEdit="1"/>
+              </p:cNvSpPr>
+              <p:nvPr/>
+            </p:nvSpPr>
+            <p:spPr>
+              <a:xfrm>
+                <a:off x="11449571" y="20669200"/>
+                <a:ext cx="9433049" cy="2937244"/>
+              </a:xfrm>
+              <a:prstGeom prst="roundRect">
+                <a:avLst/>
+              </a:prstGeom>
+              <a:blipFill rotWithShape="0">
+                <a:blip r:embed="rId9"/>
+                <a:stretch>
+                  <a:fillRect/>
+                </a:stretch>
+              </a:blipFill>
+              <a:ln w="76200">
                 <a:solidFill>
                   <a:schemeClr val="tx1"/>
                 </a:solidFill>
-              </a:rPr>
-              <a:t>We define a measure of agreement between the expression of a single gene across regions and the brain region ontology</a:t>
-            </a:r>
-            <a:r>
-              <a:rPr lang="en-US" sz="3300" dirty="0" smtClean="0">
-                <a:solidFill>
-                  <a:schemeClr val="tx1"/>
-                </a:solidFill>
-              </a:rPr>
-              <a:t> </a:t>
-            </a:r>
-            <a:r>
-              <a:rPr lang="en-US" sz="2400" dirty="0" smtClean="0">
-                <a:solidFill>
-                  <a:schemeClr val="tx1"/>
-                </a:solidFill>
-              </a:rPr>
-              <a:t>(similar results with other scores)</a:t>
-            </a:r>
-            <a:endParaRPr lang="en-US" sz="3300" dirty="0" smtClean="0">
-              <a:solidFill>
-                <a:schemeClr val="tx1"/>
-              </a:solidFill>
-            </a:endParaRPr>
-          </a:p>
-          <a:p>
-            <a:pPr algn="l" rtl="0"/>
-            <a:endParaRPr lang="en-US" sz="1600" dirty="0" smtClean="0">
-              <a:solidFill>
-                <a:schemeClr val="tx1"/>
-              </a:solidFill>
-            </a:endParaRPr>
-          </a:p>
-          <a:p>
-            <a:pPr algn="l" rtl="0"/>
-            <a:r>
-              <a:rPr lang="en-US" sz="3600" b="1" dirty="0" err="1" smtClean="0">
-                <a:solidFill>
-                  <a:srgbClr val="FF0000"/>
-                </a:solidFill>
-              </a:rPr>
-              <a:t>BRO</a:t>
-            </a:r>
-            <a:r>
-              <a:rPr lang="en-US" sz="3600" b="1" baseline="-25000" dirty="0" err="1" smtClean="0">
-                <a:solidFill>
-                  <a:srgbClr val="FF0000"/>
-                </a:solidFill>
-              </a:rPr>
-              <a:t>score</a:t>
-            </a:r>
-            <a:r>
-              <a:rPr lang="en-US" sz="3600" b="1" baseline="-25000" dirty="0" smtClean="0">
-                <a:solidFill>
-                  <a:schemeClr val="tx1"/>
-                </a:solidFill>
-              </a:rPr>
-              <a:t> </a:t>
-            </a:r>
-            <a:r>
-              <a:rPr lang="en-US" sz="3600" b="1" i="1" dirty="0" smtClean="0">
-                <a:solidFill>
-                  <a:schemeClr val="tx1"/>
-                </a:solidFill>
-              </a:rPr>
-              <a:t>= Correlation (</a:t>
-            </a:r>
-            <a:r>
-              <a:rPr lang="en-US" sz="3600" b="1" i="1" dirty="0" err="1" smtClean="0">
-                <a:solidFill>
-                  <a:schemeClr val="tx1"/>
-                </a:solidFill>
-              </a:rPr>
-              <a:t>d</a:t>
-            </a:r>
-            <a:r>
-              <a:rPr lang="en-US" sz="3600" b="1" i="1" baseline="-25000" dirty="0" err="1" smtClean="0">
-                <a:solidFill>
-                  <a:schemeClr val="tx1"/>
-                </a:solidFill>
-              </a:rPr>
-              <a:t>expression</a:t>
-            </a:r>
-            <a:r>
-              <a:rPr lang="en-US" sz="3600" b="1" i="1" dirty="0" smtClean="0">
-                <a:solidFill>
-                  <a:schemeClr val="tx1"/>
-                </a:solidFill>
-              </a:rPr>
-              <a:t> , </a:t>
-            </a:r>
-            <a:r>
-              <a:rPr lang="en-US" sz="3600" b="1" i="1" dirty="0" err="1" smtClean="0">
-                <a:solidFill>
-                  <a:schemeClr val="tx1"/>
-                </a:solidFill>
-              </a:rPr>
-              <a:t>d</a:t>
-            </a:r>
-            <a:r>
-              <a:rPr lang="en-US" sz="3600" b="1" i="1" baseline="-25000" dirty="0" err="1" smtClean="0">
-                <a:solidFill>
-                  <a:schemeClr val="tx1"/>
-                </a:solidFill>
-              </a:rPr>
-              <a:t>tree</a:t>
-            </a:r>
-            <a:r>
-              <a:rPr lang="en-US" sz="3600" b="1" i="1" dirty="0" smtClean="0">
-                <a:solidFill>
-                  <a:schemeClr val="tx1"/>
-                </a:solidFill>
-              </a:rPr>
-              <a:t> )</a:t>
-            </a:r>
-            <a:endParaRPr lang="en-US" sz="4000" b="1" i="1" dirty="0" smtClean="0">
-              <a:solidFill>
-                <a:schemeClr val="tx1"/>
-              </a:solidFill>
-            </a:endParaRPr>
-          </a:p>
-          <a:p>
-            <a:pPr algn="l" rtl="0"/>
-            <a:endParaRPr lang="en-US" sz="1800" dirty="0" smtClean="0">
-              <a:solidFill>
-                <a:schemeClr val="tx1"/>
-              </a:solidFill>
-            </a:endParaRPr>
-          </a:p>
-          <a:p>
-            <a:pPr algn="l" rtl="0">
-              <a:buFont typeface="Arial" pitchFamily="34" charset="0"/>
-              <a:buChar char="•"/>
-            </a:pPr>
-            <a:r>
-              <a:rPr lang="en-US" sz="3300" dirty="0" smtClean="0">
-                <a:solidFill>
-                  <a:schemeClr val="tx1"/>
-                </a:solidFill>
-              </a:rPr>
-              <a:t>  </a:t>
-            </a:r>
-            <a:r>
-              <a:rPr lang="en-US" sz="2800" dirty="0" smtClean="0">
-                <a:solidFill>
-                  <a:schemeClr val="tx1"/>
-                </a:solidFill>
-              </a:rPr>
-              <a:t>correlation is across pairs of tissue samples</a:t>
-            </a:r>
-          </a:p>
-          <a:p>
-            <a:pPr algn="l" rtl="0">
-              <a:buFont typeface="Arial" pitchFamily="34" charset="0"/>
-              <a:buChar char="•"/>
-            </a:pPr>
-            <a:r>
-              <a:rPr lang="en-US" sz="2800" dirty="0" smtClean="0">
-                <a:solidFill>
-                  <a:schemeClr val="tx1"/>
-                </a:solidFill>
-              </a:rPr>
-              <a:t>  </a:t>
-            </a:r>
-            <a:r>
-              <a:rPr lang="en-US" sz="2800" dirty="0" err="1" smtClean="0">
-                <a:solidFill>
-                  <a:schemeClr val="tx1"/>
-                </a:solidFill>
-              </a:rPr>
-              <a:t>d</a:t>
-            </a:r>
-            <a:r>
-              <a:rPr lang="en-US" sz="2800" baseline="-25000" dirty="0" err="1" smtClean="0">
-                <a:solidFill>
-                  <a:schemeClr val="tx1"/>
-                </a:solidFill>
-              </a:rPr>
-              <a:t>expression</a:t>
-            </a:r>
-            <a:r>
-              <a:rPr lang="en-US" sz="2800" dirty="0" smtClean="0">
-                <a:solidFill>
-                  <a:schemeClr val="tx1"/>
-                </a:solidFill>
-              </a:rPr>
-              <a:t>   is the vector of absolute differences of expression levels in two regions.</a:t>
-            </a:r>
-          </a:p>
-          <a:p>
-            <a:pPr algn="l" rtl="0">
-              <a:buFont typeface="Arial" pitchFamily="34" charset="0"/>
-              <a:buChar char="•"/>
-            </a:pPr>
-            <a:r>
-              <a:rPr lang="en-US" sz="2800" dirty="0" smtClean="0">
-                <a:solidFill>
-                  <a:schemeClr val="tx1"/>
-                </a:solidFill>
-              </a:rPr>
-              <a:t>  </a:t>
-            </a:r>
-            <a:r>
-              <a:rPr lang="en-US" sz="2800" dirty="0" err="1" smtClean="0">
-                <a:solidFill>
-                  <a:schemeClr val="tx1"/>
-                </a:solidFill>
-              </a:rPr>
-              <a:t>d</a:t>
-            </a:r>
-            <a:r>
-              <a:rPr lang="en-US" sz="2800" baseline="-25000" dirty="0" err="1" smtClean="0">
-                <a:solidFill>
-                  <a:schemeClr val="tx1"/>
-                </a:solidFill>
-              </a:rPr>
-              <a:t>tree</a:t>
-            </a:r>
-            <a:r>
-              <a:rPr lang="en-US" sz="2800" dirty="0" smtClean="0">
-                <a:solidFill>
-                  <a:schemeClr val="tx1"/>
-                </a:solidFill>
-              </a:rPr>
-              <a:t>   is the vector of number of edges in the ontology tree that connect two regions.</a:t>
-            </a:r>
-            <a:endParaRPr lang="he-IL" sz="2800" i="1" dirty="0">
-              <a:solidFill>
-                <a:schemeClr val="tx1"/>
-              </a:solidFill>
-            </a:endParaRPr>
-          </a:p>
-        </p:txBody>
-      </p:sp>
-      <p:grpSp>
-        <p:nvGrpSpPr>
-          <p:cNvPr id="46" name="Group 45"/>
-          <p:cNvGrpSpPr/>
-          <p:nvPr/>
-        </p:nvGrpSpPr>
-        <p:grpSpPr>
-          <a:xfrm>
-            <a:off x="21674708" y="26139129"/>
-            <a:ext cx="4665044" cy="5285649"/>
-            <a:chOff x="26283220" y="22178689"/>
-            <a:chExt cx="4665044" cy="5285649"/>
-          </a:xfrm>
-        </p:grpSpPr>
-        <p:pic>
-          <p:nvPicPr>
-            <p:cNvPr id="888" name="Picture 887"/>
-            <p:cNvPicPr/>
-            <p:nvPr/>
-          </p:nvPicPr>
-          <p:blipFill>
-            <a:blip r:embed="rId10" cstate="print"/>
-            <a:srcRect r="7966" b="9645"/>
-            <a:stretch>
-              <a:fillRect/>
-            </a:stretch>
-          </p:blipFill>
-          <p:spPr>
-            <a:xfrm>
-              <a:off x="26283220" y="22178689"/>
-              <a:ext cx="4574663" cy="3373261"/>
-            </a:xfrm>
-            <a:prstGeom prst="rect">
-              <a:avLst/>
-            </a:prstGeom>
-          </p:spPr>
-        </p:pic>
-        <p:pic>
-          <p:nvPicPr>
-            <p:cNvPr id="901" name="Picture 900"/>
-            <p:cNvPicPr/>
-            <p:nvPr/>
-          </p:nvPicPr>
-          <p:blipFill>
-            <a:blip r:embed="rId11" cstate="print"/>
-            <a:srcRect l="6850" t="47949" r="6132"/>
-            <a:stretch>
-              <a:fillRect/>
-            </a:stretch>
-          </p:blipFill>
-          <p:spPr>
-            <a:xfrm>
-              <a:off x="26643260" y="25627889"/>
-              <a:ext cx="4305004" cy="1836449"/>
-            </a:xfrm>
-            <a:prstGeom prst="rect">
-              <a:avLst/>
-            </a:prstGeom>
-          </p:spPr>
-        </p:pic>
-      </p:grpSp>
-      <p:sp>
-        <p:nvSpPr>
-          <p:cNvPr id="39" name="TextBox 38"/>
-          <p:cNvSpPr txBox="1"/>
-          <p:nvPr/>
-        </p:nvSpPr>
-        <p:spPr>
-          <a:xfrm>
-            <a:off x="26859284" y="27147241"/>
-            <a:ext cx="3816424" cy="4093428"/>
-          </a:xfrm>
-          <a:prstGeom prst="rect">
-            <a:avLst/>
-          </a:prstGeom>
-          <a:noFill/>
-        </p:spPr>
-        <p:txBody>
-          <a:bodyPr wrap="square" rtlCol="1">
-            <a:spAutoFit/>
-          </a:bodyPr>
-          <a:lstStyle/>
-          <a:p>
-            <a:pPr algn="l" rtl="0"/>
-            <a:r>
-              <a:rPr lang="en-US" sz="2800" b="1" dirty="0" smtClean="0"/>
-              <a:t>House keeping genes</a:t>
-            </a:r>
-            <a:r>
-              <a:rPr lang="en-US" sz="2800" dirty="0" smtClean="0"/>
-              <a:t> are expressed in all cell types. In the adult brain, their scores are significantly higher than random, and match the BRO scores of all genes.</a:t>
-            </a:r>
-          </a:p>
-          <a:p>
-            <a:pPr algn="l" rtl="0"/>
-            <a:endParaRPr lang="en-US" sz="1000" dirty="0" smtClean="0"/>
-          </a:p>
-          <a:p>
-            <a:pPr algn="l" rtl="0"/>
-            <a:r>
-              <a:rPr lang="en-US" sz="2400" dirty="0" smtClean="0"/>
-              <a:t>Markers from</a:t>
-            </a:r>
-            <a:r>
-              <a:rPr lang="en-US" sz="2400" b="1" dirty="0" smtClean="0"/>
-              <a:t> </a:t>
-            </a:r>
-            <a:r>
-              <a:rPr lang="en-US" sz="2400" i="1" dirty="0" smtClean="0"/>
-              <a:t>Eisenberg et al. [4]</a:t>
-            </a:r>
-            <a:endParaRPr lang="en-US" sz="2800" i="1" dirty="0" smtClean="0"/>
-          </a:p>
-        </p:txBody>
-      </p:sp>
-      <p:sp>
-        <p:nvSpPr>
-          <p:cNvPr id="40" name="TextBox 39"/>
-          <p:cNvSpPr txBox="1"/>
-          <p:nvPr/>
-        </p:nvSpPr>
-        <p:spPr>
-          <a:xfrm>
-            <a:off x="26859284" y="16150337"/>
-            <a:ext cx="3672408" cy="3724096"/>
-          </a:xfrm>
-          <a:prstGeom prst="rect">
-            <a:avLst/>
-          </a:prstGeom>
-          <a:noFill/>
-        </p:spPr>
-        <p:txBody>
-          <a:bodyPr wrap="square" rtlCol="1">
-            <a:spAutoFit/>
-          </a:bodyPr>
-          <a:lstStyle/>
-          <a:p>
-            <a:pPr algn="l" rtl="0"/>
-            <a:r>
-              <a:rPr lang="en-US" sz="2800" b="1" dirty="0" smtClean="0"/>
-              <a:t>Cell-type specific genes</a:t>
-            </a:r>
-            <a:r>
-              <a:rPr lang="en-US" sz="2800" dirty="0" smtClean="0"/>
-              <a:t> are in stronger agreement with the tree structure than genes on average.</a:t>
-            </a:r>
-            <a:r>
-              <a:rPr lang="en-US" sz="2800" b="1" dirty="0" smtClean="0"/>
-              <a:t> </a:t>
-            </a:r>
-          </a:p>
-          <a:p>
-            <a:pPr algn="l" rtl="0"/>
-            <a:endParaRPr lang="en-US" sz="2400" dirty="0" smtClean="0"/>
-          </a:p>
-          <a:p>
-            <a:pPr algn="l" rtl="0"/>
-            <a:endParaRPr lang="en-US" sz="2400" dirty="0" smtClean="0"/>
-          </a:p>
-          <a:p>
-            <a:pPr algn="l" rtl="0"/>
-            <a:r>
-              <a:rPr lang="en-US" sz="2400" dirty="0" smtClean="0"/>
-              <a:t>Markers from</a:t>
-            </a:r>
-            <a:r>
-              <a:rPr lang="en-US" sz="2400" b="1" dirty="0" smtClean="0"/>
-              <a:t> </a:t>
-            </a:r>
-            <a:r>
-              <a:rPr lang="en-US" sz="2400" i="1" dirty="0" smtClean="0"/>
-              <a:t>Cahoy et al. [3]</a:t>
-            </a:r>
-            <a:r>
-              <a:rPr lang="en-US" sz="2400" dirty="0" smtClean="0"/>
-              <a:t>. </a:t>
-            </a:r>
-            <a:endParaRPr lang="he-IL" sz="2400" b="1" dirty="0" smtClean="0"/>
-          </a:p>
-        </p:txBody>
-      </p:sp>
+              </a:ln>
+            </p:spPr>
+            <p:txBody>
+              <a:bodyPr/>
+              <a:lstStyle/>
+              <a:p>
+                <a:r>
+                  <a:rPr lang="en-US">
+                    <a:noFill/>
+                  </a:rPr>
+                  <a:t> </a:t>
+                </a:r>
+              </a:p>
+            </p:txBody>
+          </p:sp>
+        </mc:Fallback>
+      </mc:AlternateContent>
       <p:sp>
         <p:nvSpPr>
           <p:cNvPr id="42" name="TextBox 41"/>
@@ -7028,9 +6703,9 @@
             </a:r>
             <a:r>
               <a:rPr lang="en-US" sz="3600" dirty="0" smtClean="0">
-                <a:hlinkClick r:id="rId12"/>
+                <a:hlinkClick r:id="rId10"/>
               </a:rPr>
-              <a:t>lior.kirsch@gmail.com</a:t>
+              <a:t>yuval.atzmon@biu.ac.il</a:t>
             </a:r>
             <a:r>
               <a:rPr lang="en-US" sz="3600" dirty="0" smtClean="0"/>
@@ -7038,9 +6713,9 @@
             </a:r>
             <a:r>
               <a:rPr lang="en-US" sz="3600" dirty="0" smtClean="0">
-                <a:hlinkClick r:id="rId13"/>
+                <a:hlinkClick r:id="rId11"/>
               </a:rPr>
-              <a:t>http://chechiklab.biu.ac.il/~lior</a:t>
+              <a:t>http://chechiklab.biu.ac.il/yuvval</a:t>
             </a:r>
             <a:r>
               <a:rPr lang="en-US" sz="3600" dirty="0" smtClean="0"/>
@@ -7071,7 +6746,7 @@
             <p:nvPr/>
           </p:nvPicPr>
           <p:blipFill>
-            <a:blip r:embed="rId14" cstate="print"/>
+            <a:blip r:embed="rId12" cstate="print"/>
             <a:srcRect l="6323" t="8661"/>
             <a:stretch>
               <a:fillRect/>
@@ -7140,7 +6815,7 @@
             <p:nvPr/>
           </p:nvPicPr>
           <p:blipFill>
-            <a:blip r:embed="rId15" cstate="print"/>
+            <a:blip r:embed="rId13" cstate="print"/>
             <a:srcRect l="5796"/>
             <a:stretch>
               <a:fillRect/>
@@ -7187,101 +6862,6 @@
           </p:txBody>
         </p:sp>
       </p:grpSp>
-      <p:pic>
-        <p:nvPicPr>
-          <p:cNvPr id="1027" name="Picture 3" descr="C:\Users\Lior\Dropbox\papers\brain region tree\Figures\figure 1\2dhist-NEUROD1-corr-0.65.png"/>
-          <p:cNvPicPr>
-            <a:picLocks noChangeAspect="1" noChangeArrowheads="1"/>
-          </p:cNvPicPr>
-          <p:nvPr/>
-        </p:nvPicPr>
-        <p:blipFill>
-          <a:blip r:embed="rId16" cstate="print"/>
-          <a:srcRect l="2108" t="5613" r="2635"/>
-          <a:stretch>
-            <a:fillRect/>
-          </a:stretch>
-        </p:blipFill>
-        <p:spPr bwMode="auto">
-          <a:xfrm>
-            <a:off x="13969852" y="20594198"/>
-            <a:ext cx="6193789" cy="4608512"/>
-          </a:xfrm>
-          <a:prstGeom prst="rect">
-            <a:avLst/>
-          </a:prstGeom>
-          <a:noFill/>
-        </p:spPr>
-      </p:pic>
-      <p:sp>
-        <p:nvSpPr>
-          <p:cNvPr id="57" name="TextBox 56"/>
-          <p:cNvSpPr txBox="1"/>
-          <p:nvPr/>
-        </p:nvSpPr>
-        <p:spPr>
-          <a:xfrm>
-            <a:off x="11737602" y="21458294"/>
-            <a:ext cx="2232250" cy="2554545"/>
-          </a:xfrm>
-          <a:prstGeom prst="rect">
-            <a:avLst/>
-          </a:prstGeom>
-          <a:noFill/>
-        </p:spPr>
-        <p:txBody>
-          <a:bodyPr wrap="square" rtlCol="1">
-            <a:spAutoFit/>
-          </a:bodyPr>
-          <a:lstStyle/>
-          <a:p>
-            <a:pPr algn="l" rtl="0"/>
-            <a:r>
-              <a:rPr lang="en-US" sz="3200" b="1" dirty="0" smtClean="0"/>
-              <a:t>Example:</a:t>
-            </a:r>
-            <a:br>
-              <a:rPr lang="en-US" sz="3200" b="1" dirty="0" smtClean="0"/>
-            </a:br>
-            <a:r>
-              <a:rPr lang="en-US" sz="3200" b="1" dirty="0" smtClean="0"/>
-              <a:t>Neurod1 receives  a high BRO score</a:t>
-            </a:r>
-            <a:endParaRPr lang="he-IL" sz="2800" b="1" dirty="0" smtClean="0"/>
-          </a:p>
-        </p:txBody>
-      </p:sp>
-      <p:sp>
-        <p:nvSpPr>
-          <p:cNvPr id="59" name="TextBox 58"/>
-          <p:cNvSpPr txBox="1"/>
-          <p:nvPr/>
-        </p:nvSpPr>
-        <p:spPr>
-          <a:xfrm>
-            <a:off x="26355228" y="11521505"/>
-            <a:ext cx="3888432" cy="954107"/>
-          </a:xfrm>
-          <a:prstGeom prst="rect">
-            <a:avLst/>
-          </a:prstGeom>
-          <a:noFill/>
-        </p:spPr>
-        <p:txBody>
-          <a:bodyPr wrap="square" rtlCol="1">
-            <a:spAutoFit/>
-          </a:bodyPr>
-          <a:lstStyle/>
-          <a:p>
-            <a:pPr algn="l" rtl="0"/>
-            <a:r>
-              <a:rPr lang="en-US" sz="2800" dirty="0" smtClean="0"/>
-              <a:t>Significance was assets using permutation test.</a:t>
-            </a:r>
-            <a:endParaRPr lang="he-IL" sz="2800" dirty="0"/>
-          </a:p>
-        </p:txBody>
-      </p:sp>
       <p:sp>
         <p:nvSpPr>
           <p:cNvPr id="66" name="Rounded Rectangle 65"/>
@@ -7332,8 +6912,13 @@
                   <a:schemeClr val="tx1"/>
                 </a:solidFill>
               </a:rPr>
-              <a:t>Robustness across subjects</a:t>
-            </a:r>
+              <a:t>Sparsity Structure</a:t>
+            </a:r>
+            <a:endParaRPr lang="en-US" sz="4400" b="1" dirty="0" smtClean="0">
+              <a:solidFill>
+                <a:schemeClr val="tx1"/>
+              </a:solidFill>
+            </a:endParaRPr>
           </a:p>
           <a:p>
             <a:pPr algn="l" rtl="0"/>
@@ -7533,7 +7118,7 @@
           <p:nvPr/>
         </p:nvPicPr>
         <p:blipFill>
-          <a:blip r:embed="rId17" cstate="print"/>
+          <a:blip r:embed="rId14" cstate="print"/>
           <a:srcRect l="5796" t="5613" r="5796"/>
           <a:stretch>
             <a:fillRect/>
@@ -7550,193 +7135,6 @@
           <a:noFill/>
         </p:spPr>
       </p:pic>
-      <p:sp>
-        <p:nvSpPr>
-          <p:cNvPr id="67" name="TextBox 66"/>
-          <p:cNvSpPr txBox="1"/>
-          <p:nvPr/>
-        </p:nvSpPr>
-        <p:spPr>
-          <a:xfrm>
-            <a:off x="22178764" y="21890657"/>
-            <a:ext cx="3888432" cy="4278094"/>
-          </a:xfrm>
-          <a:prstGeom prst="rect">
-            <a:avLst/>
-          </a:prstGeom>
-          <a:noFill/>
-        </p:spPr>
-        <p:txBody>
-          <a:bodyPr wrap="square" rtlCol="1">
-            <a:spAutoFit/>
-          </a:bodyPr>
-          <a:lstStyle/>
-          <a:p>
-            <a:pPr algn="l" rtl="0"/>
-            <a:r>
-              <a:rPr lang="en-US" sz="2800" b="1" dirty="0" smtClean="0"/>
-              <a:t>Development genes</a:t>
-            </a:r>
-            <a:r>
-              <a:rPr lang="en-US" sz="2800" dirty="0" smtClean="0"/>
-              <a:t> </a:t>
-            </a:r>
-            <a:br>
-              <a:rPr lang="en-US" sz="2800" dirty="0" smtClean="0"/>
-            </a:br>
-            <a:r>
-              <a:rPr lang="en-US" sz="2800" dirty="0" smtClean="0"/>
-              <a:t>are in strong agreement with the tree structure suggesting that they may have important functions in the adult brain.</a:t>
-            </a:r>
-          </a:p>
-          <a:p>
-            <a:pPr algn="l" rtl="0"/>
-            <a:endParaRPr lang="en-US" sz="2800" dirty="0" smtClean="0"/>
-          </a:p>
-          <a:p>
-            <a:pPr algn="l" rtl="0"/>
-            <a:r>
-              <a:rPr lang="en-US" sz="2400" dirty="0" smtClean="0"/>
-              <a:t>Axon guidance markers from KEGG.</a:t>
-            </a:r>
-            <a:endParaRPr lang="en-US" sz="2400" i="1" dirty="0" smtClean="0"/>
-          </a:p>
-          <a:p>
-            <a:pPr algn="l" rtl="0"/>
-            <a:endParaRPr lang="en-US" sz="2800" dirty="0" smtClean="0"/>
-          </a:p>
-        </p:txBody>
-      </p:sp>
-      <p:grpSp>
-        <p:nvGrpSpPr>
-          <p:cNvPr id="73" name="Group 72"/>
-          <p:cNvGrpSpPr/>
-          <p:nvPr/>
-        </p:nvGrpSpPr>
-        <p:grpSpPr>
-          <a:xfrm>
-            <a:off x="26427236" y="20954553"/>
-            <a:ext cx="4392488" cy="5760640"/>
-            <a:chOff x="26427236" y="20882545"/>
-            <a:chExt cx="4392488" cy="5760640"/>
-          </a:xfrm>
-        </p:grpSpPr>
-        <p:pic>
-          <p:nvPicPr>
-            <p:cNvPr id="1032" name="Picture 8" descr="C:\Users\Lior\Dropbox\papers\brain region tree\Figures\figure 3\dist_axon.png"/>
-            <p:cNvPicPr>
-              <a:picLocks noChangeAspect="1" noChangeArrowheads="1"/>
-            </p:cNvPicPr>
-            <p:nvPr/>
-          </p:nvPicPr>
-          <p:blipFill>
-            <a:blip r:embed="rId18" cstate="print"/>
-            <a:srcRect/>
-            <a:stretch>
-              <a:fillRect/>
-            </a:stretch>
-          </p:blipFill>
-          <p:spPr bwMode="auto">
-            <a:xfrm>
-              <a:off x="26427236" y="23344737"/>
-              <a:ext cx="4392488" cy="3298448"/>
-            </a:xfrm>
-            <a:prstGeom prst="rect">
-              <a:avLst/>
-            </a:prstGeom>
-            <a:noFill/>
-          </p:spPr>
-        </p:pic>
-        <p:pic>
-          <p:nvPicPr>
-            <p:cNvPr id="72" name="Picture 7" descr="C:\Users\Lior\Documents\AxonScatter.png"/>
-            <p:cNvPicPr>
-              <a:picLocks noChangeAspect="1" noChangeArrowheads="1"/>
-            </p:cNvPicPr>
-            <p:nvPr/>
-          </p:nvPicPr>
-          <p:blipFill>
-            <a:blip r:embed="rId19" cstate="print"/>
-            <a:srcRect/>
-            <a:stretch>
-              <a:fillRect/>
-            </a:stretch>
-          </p:blipFill>
-          <p:spPr bwMode="auto">
-            <a:xfrm>
-              <a:off x="26427236" y="20882545"/>
-              <a:ext cx="4172871" cy="3168352"/>
-            </a:xfrm>
-            <a:prstGeom prst="rect">
-              <a:avLst/>
-            </a:prstGeom>
-            <a:noFill/>
-          </p:spPr>
-        </p:pic>
-      </p:grpSp>
-      <p:pic>
-        <p:nvPicPr>
-          <p:cNvPr id="55" name="image20.png"/>
-          <p:cNvPicPr/>
-          <p:nvPr/>
-        </p:nvPicPr>
-        <p:blipFill>
-          <a:blip r:embed="rId20" cstate="print"/>
-          <a:srcRect l="3467"/>
-          <a:stretch>
-            <a:fillRect/>
-          </a:stretch>
-        </p:blipFill>
-        <p:spPr>
-          <a:xfrm>
-            <a:off x="12960876" y="20594198"/>
-            <a:ext cx="6213748" cy="4112432"/>
-          </a:xfrm>
-          <a:prstGeom prst="rect">
-            <a:avLst/>
-          </a:prstGeom>
-          <a:ln/>
-        </p:spPr>
-      </p:pic>
-      <p:pic>
-        <p:nvPicPr>
-          <p:cNvPr id="2" name="Picture 4" descr="http://chechiklab.biu.ac.il/~yuvval/figs/comet/rowcol_vis.png"/>
-          <p:cNvPicPr>
-            <a:picLocks noChangeAspect="1" noChangeArrowheads="1"/>
-          </p:cNvPicPr>
-          <p:nvPr/>
-        </p:nvPicPr>
-        <p:blipFill rotWithShape="1">
-          <a:blip r:embed="rId21" cstate="print">
-            <a:extLst>
-              <a:ext uri="{28A0092B-C50C-407E-A947-70E740481C1C}">
-                <a14:useLocalDpi xmlns:a14="http://schemas.microsoft.com/office/drawing/2010/main" val="0"/>
-              </a:ext>
-            </a:extLst>
-          </a:blip>
-          <a:srcRect l="7339" t="15746" r="8998" b="2607"/>
-          <a:stretch/>
-        </p:blipFill>
-        <p:spPr bwMode="auto">
-          <a:xfrm>
-            <a:off x="16454386" y="7779295"/>
-            <a:ext cx="3336199" cy="3255809"/>
-          </a:xfrm>
-          <a:prstGeom prst="rect">
-            <a:avLst/>
-          </a:prstGeom>
-          <a:noFill/>
-          <a:extLst>
-            <a:ext uri="{909E8E84-426E-40DD-AFC4-6F175D3DCCD1}">
-              <a14:hiddenFill xmlns:a14="http://schemas.microsoft.com/office/drawing/2010/main">
-                <a:solidFill>
-                  <a:srgbClr val="FFFFFF"/>
-                </a:solidFill>
-              </a14:hiddenFill>
-            </a:ext>
-          </a:extLst>
-        </p:spPr>
-      </p:pic>
       <p:pic>
         <p:nvPicPr>
           <p:cNvPr id="1030" name="Picture 6" descr="Preview of your QR Code"/>
@@ -7746,7 +7144,7 @@
           <p:nvPr/>
         </p:nvPicPr>
         <p:blipFill>
-          <a:blip r:embed="rId22">
+          <a:blip r:embed="rId15">
             <a:extLst>
               <a:ext uri="{28A0092B-C50C-407E-A947-70E740481C1C}">
                 <a14:useLocalDpi xmlns:a14="http://schemas.microsoft.com/office/drawing/2010/main" val="0"/>
@@ -7788,8 +7186,8 @@
             </p:nvSpPr>
             <p:spPr>
               <a:xfrm>
-                <a:off x="12070732" y="11213726"/>
-                <a:ext cx="8334741" cy="5189420"/>
+                <a:off x="12070732" y="10369377"/>
+                <a:ext cx="8334741" cy="7651632"/>
               </a:xfrm>
               <a:prstGeom prst="rect">
                 <a:avLst/>
@@ -7824,7 +7222,15 @@
                 </a:r>
                 <a:r>
                   <a:rPr lang="en-US" sz="3200" dirty="0"/>
-                  <a:t>efficiently calculate an exact bound over the step size that guarantees that the model remains within the PD </a:t>
+                  <a:t>efficiently calculate an exact bound over the step size that guarantees that the model </a:t>
+                </a:r>
+                <a:r>
+                  <a:rPr lang="en-US" sz="3200" dirty="0" smtClean="0"/>
+                  <a:t>takes steps inside the </a:t>
+                </a:r>
+                <a:r>
+                  <a:rPr lang="en-US" sz="3200" dirty="0"/>
+                  <a:t>PD </a:t>
                 </a:r>
                 <a:r>
                   <a:rPr lang="en-US" sz="3200" dirty="0" smtClean="0"/>
@@ -8313,6 +7719,47 @@
                   <a:rPr lang="en-US" sz="3200" dirty="0" smtClean="0"/>
                   <a:t>size.</a:t>
                 </a:r>
+              </a:p>
+              <a:p>
+                <a:pPr algn="l" rtl="0"/>
+                <a:endParaRPr lang="en-US" sz="3200" dirty="0"/>
+              </a:p>
+              <a:p>
+                <a:pPr algn="l" rtl="0"/>
+                <a:r>
+                  <a:rPr lang="en-US" sz="3200" dirty="0" smtClean="0"/>
+                  <a:t>We use a </a:t>
+                </a:r>
+                <a:r>
+                  <a:rPr lang="en-US" sz="3200" dirty="0" err="1" smtClean="0"/>
+                  <a:t>Cholesky</a:t>
+                </a:r>
+                <a:r>
+                  <a:rPr lang="en-US" sz="3200" dirty="0" smtClean="0"/>
+                  <a:t> solver, and following a row-column step we update the </a:t>
+                </a:r>
+                <a:r>
+                  <a:rPr lang="en-US" sz="3200" dirty="0" err="1" smtClean="0"/>
+                  <a:t>Cholesky</a:t>
+                </a:r>
+                <a:r>
+                  <a:rPr lang="en-US" sz="3200" dirty="0" smtClean="0"/>
+                  <a:t> root of </a:t>
+                </a:r>
+                <a14:m>
+                  <m:oMath xmlns:m="http://schemas.openxmlformats.org/officeDocument/2006/math">
+                    <m:r>
+                      <a:rPr lang="en-US" sz="3200" i="1">
+                        <a:latin typeface="Cambria Math" panose="02040503050406030204" pitchFamily="18" charset="0"/>
+                      </a:rPr>
+                      <m:t>𝑊</m:t>
+                    </m:r>
+                  </m:oMath>
+                </a14:m>
+                <a:r>
+                  <a:rPr lang="en-US" sz="3200" dirty="0" smtClean="0"/>
+                  <a:t>. Hence we also have a continues embedding of the features into the metric space.</a:t>
+                </a:r>
                 <a:endParaRPr lang="en-US" sz="3200" dirty="0"/>
               </a:p>
             </p:txBody>
@@ -8329,16 +7776,16 @@
             </p:nvSpPr>
             <p:spPr>
               <a:xfrm>
-                <a:off x="12070732" y="11213726"/>
-                <a:ext cx="8334741" cy="5189420"/>
+                <a:off x="12070732" y="10369377"/>
+                <a:ext cx="8334741" cy="7651632"/>
               </a:xfrm>
               <a:prstGeom prst="rect">
                 <a:avLst/>
               </a:prstGeom>
               <a:blipFill rotWithShape="0">
-                <a:blip r:embed="rId23"/>
+                <a:blip r:embed="rId16"/>
                 <a:stretch>
-                  <a:fillRect l="-1683" t="-1410" b="-2820"/>
+                  <a:fillRect l="-1683" t="-956" b="-1594"/>
                 </a:stretch>
               </a:blipFill>
             </p:spPr>
@@ -8364,7 +7811,7 @@
           <p:nvPr/>
         </p:nvPicPr>
         <p:blipFill>
-          <a:blip r:embed="rId24">
+          <a:blip r:embed="rId17">
             <a:clrChange>
               <a:clrFrom>
                 <a:srgbClr val="FFFFFF"/>
@@ -8404,6 +7851,1856 @@
               </a14:hiddenFill>
             </a:ext>
           </a:extLst>
+        </p:spPr>
+      </p:pic>
+      <p:pic>
+        <p:nvPicPr>
+          <p:cNvPr id="64" name="Picture 120"/>
+          <p:cNvPicPr>
+            <a:picLocks noChangeAspect="1" noChangeArrowheads="1"/>
+          </p:cNvPicPr>
+          <p:nvPr/>
+        </p:nvPicPr>
+        <p:blipFill>
+          <a:blip r:embed="rId18">
+            <a:extLst>
+              <a:ext uri="{28A0092B-C50C-407E-A947-70E740481C1C}">
+                <a14:useLocalDpi xmlns:a14="http://schemas.microsoft.com/office/drawing/2010/main" val="0"/>
+              </a:ext>
+            </a:extLst>
+          </a:blip>
+          <a:srcRect/>
+          <a:stretch>
+            <a:fillRect/>
+          </a:stretch>
+        </p:blipFill>
+        <p:spPr bwMode="auto">
+          <a:xfrm>
+            <a:off x="4663043" y="1190943"/>
+            <a:ext cx="4619625" cy="1939925"/>
+          </a:xfrm>
+          <a:prstGeom prst="rect">
+            <a:avLst/>
+          </a:prstGeom>
+          <a:noFill/>
+          <a:ln>
+            <a:noFill/>
+          </a:ln>
+          <a:effectLst/>
+          <a:extLst>
+            <a:ext uri="{909E8E84-426E-40DD-AFC4-6F175D3DCCD1}">
+              <a14:hiddenFill xmlns:a14="http://schemas.microsoft.com/office/drawing/2010/main">
+                <a:blipFill dpi="0" rotWithShape="0">
+                  <a:blip/>
+                  <a:srcRect/>
+                  <a:stretch>
+                    <a:fillRect/>
+                  </a:stretch>
+                </a:blipFill>
+              </a14:hiddenFill>
+            </a:ext>
+            <a:ext uri="{91240B29-F687-4F45-9708-019B960494DF}">
+              <a14:hiddenLine xmlns:a14="http://schemas.microsoft.com/office/drawing/2010/main" w="9525">
+                <a:solidFill>
+                  <a:srgbClr val="000000"/>
+                </a:solidFill>
+                <a:round/>
+                <a:headEnd/>
+                <a:tailEnd/>
+              </a14:hiddenLine>
+            </a:ext>
+            <a:ext uri="{AF507438-7753-43E0-B8FC-AC1667EBCBE1}">
+              <a14:hiddenEffects xmlns:a14="http://schemas.microsoft.com/office/drawing/2010/main">
+                <a:effectLst>
+                  <a:outerShdw dist="35921" dir="2700000" algn="ctr" rotWithShape="0">
+                    <a:srgbClr val="808080"/>
+                  </a:outerShdw>
+                </a:effectLst>
+              </a14:hiddenEffects>
+            </a:ext>
+          </a:extLst>
+        </p:spPr>
+      </p:pic>
+      <p:sp>
+        <p:nvSpPr>
+          <p:cNvPr id="65" name="Rounded Rectangle 64"/>
+          <p:cNvSpPr/>
+          <p:nvPr/>
+        </p:nvSpPr>
+        <p:spPr>
+          <a:xfrm>
+            <a:off x="11482686" y="24122905"/>
+            <a:ext cx="9433049" cy="7776864"/>
+          </a:xfrm>
+          <a:prstGeom prst="roundRect">
+            <a:avLst/>
+          </a:prstGeom>
+          <a:solidFill>
+            <a:schemeClr val="bg1"/>
+          </a:solidFill>
+          <a:ln w="76200">
+            <a:solidFill>
+              <a:schemeClr val="tx1"/>
+            </a:solidFill>
+          </a:ln>
+        </p:spPr>
+        <p:style>
+          <a:lnRef idx="2">
+            <a:schemeClr val="accent1">
+              <a:shade val="50000"/>
+            </a:schemeClr>
+          </a:lnRef>
+          <a:fillRef idx="1">
+            <a:schemeClr val="accent1"/>
+          </a:fillRef>
+          <a:effectRef idx="0">
+            <a:schemeClr val="accent1"/>
+          </a:effectRef>
+          <a:fontRef idx="minor">
+            <a:schemeClr val="lt1"/>
+          </a:fontRef>
+        </p:style>
+        <p:txBody>
+          <a:bodyPr lIns="83976" tIns="41987" rIns="83976" bIns="41987" rtlCol="1" anchor="t"/>
+          <a:lstStyle/>
+          <a:p>
+            <a:pPr algn="ctr" rtl="0"/>
+            <a:r>
+              <a:rPr lang="en-US" sz="4000" b="1" dirty="0" smtClean="0">
+                <a:solidFill>
+                  <a:schemeClr val="tx1"/>
+                </a:solidFill>
+              </a:rPr>
+              <a:t>Sparse COMET</a:t>
+            </a:r>
+            <a:endParaRPr lang="en-US" sz="4000" b="1" dirty="0" smtClean="0">
+              <a:solidFill>
+                <a:schemeClr val="tx1"/>
+              </a:solidFill>
+            </a:endParaRPr>
+          </a:p>
+          <a:p>
+            <a:pPr algn="l" rtl="0"/>
+            <a:r>
+              <a:rPr lang="en-US" sz="3200" dirty="0" smtClean="0">
+                <a:solidFill>
+                  <a:schemeClr val="tx1"/>
+                </a:solidFill>
+              </a:rPr>
+              <a:t>We propose a new </a:t>
+            </a:r>
+            <a:r>
+              <a:rPr lang="en-US" sz="3200" dirty="0">
+                <a:solidFill>
+                  <a:schemeClr val="tx1"/>
+                </a:solidFill>
+              </a:rPr>
+              <a:t>type of structured sparsity, </a:t>
+            </a:r>
+            <a:r>
+              <a:rPr lang="en-US" sz="3200" dirty="0" smtClean="0">
+                <a:solidFill>
+                  <a:schemeClr val="tx1"/>
+                </a:solidFill>
+              </a:rPr>
+              <a:t>that allows </a:t>
+            </a:r>
+            <a:r>
+              <a:rPr lang="en-US" sz="3200" dirty="0">
+                <a:solidFill>
+                  <a:schemeClr val="tx1"/>
+                </a:solidFill>
+              </a:rPr>
+              <a:t>only a small set of features to interact with </a:t>
+            </a:r>
+            <a:r>
+              <a:rPr lang="en-US" sz="3200" i="1" dirty="0" smtClean="0">
+                <a:solidFill>
+                  <a:schemeClr val="tx1"/>
+                </a:solidFill>
+              </a:rPr>
+              <a:t>any</a:t>
+            </a:r>
+            <a:r>
+              <a:rPr lang="en-US" sz="3200" dirty="0" smtClean="0">
+                <a:solidFill>
+                  <a:schemeClr val="tx1"/>
+                </a:solidFill>
+              </a:rPr>
+              <a:t> </a:t>
+            </a:r>
+            <a:r>
+              <a:rPr lang="en-US" sz="3200" dirty="0">
+                <a:solidFill>
+                  <a:schemeClr val="tx1"/>
+                </a:solidFill>
+              </a:rPr>
+              <a:t>of the other </a:t>
+            </a:r>
+            <a:r>
+              <a:rPr lang="en-US" sz="3200" dirty="0" smtClean="0">
+                <a:solidFill>
+                  <a:schemeClr val="tx1"/>
+                </a:solidFill>
+              </a:rPr>
+              <a:t>features. We </a:t>
+            </a:r>
+            <a:r>
+              <a:rPr lang="en-US" sz="3200" dirty="0">
+                <a:solidFill>
+                  <a:schemeClr val="tx1"/>
+                </a:solidFill>
+              </a:rPr>
+              <a:t>also maintain weights for the individual features, corresponding to the diagonal of </a:t>
+            </a:r>
+            <a:r>
+              <a:rPr lang="en-US" sz="3200" dirty="0" smtClean="0">
+                <a:solidFill>
+                  <a:schemeClr val="tx1"/>
+                </a:solidFill>
+              </a:rPr>
+              <a:t>the </a:t>
+            </a:r>
+            <a:br>
+              <a:rPr lang="en-US" sz="3200" dirty="0" smtClean="0">
+                <a:solidFill>
+                  <a:schemeClr val="tx1"/>
+                </a:solidFill>
+              </a:rPr>
+            </a:br>
+            <a:r>
+              <a:rPr lang="en-US" sz="3200" dirty="0" smtClean="0">
+                <a:solidFill>
+                  <a:schemeClr val="tx1"/>
+                </a:solidFill>
+              </a:rPr>
+              <a:t>learned </a:t>
+            </a:r>
+            <a:r>
+              <a:rPr lang="en-US" sz="3200" dirty="0">
+                <a:solidFill>
+                  <a:schemeClr val="tx1"/>
+                </a:solidFill>
+              </a:rPr>
+              <a:t>similarity </a:t>
+            </a:r>
+            <a:r>
+              <a:rPr lang="en-US" sz="3200" dirty="0" smtClean="0">
+                <a:solidFill>
+                  <a:schemeClr val="tx1"/>
+                </a:solidFill>
+              </a:rPr>
+              <a:t/>
+            </a:r>
+            <a:br>
+              <a:rPr lang="en-US" sz="3200" dirty="0" smtClean="0">
+                <a:solidFill>
+                  <a:schemeClr val="tx1"/>
+                </a:solidFill>
+              </a:rPr>
+            </a:br>
+            <a:r>
+              <a:rPr lang="en-US" sz="3200" dirty="0" smtClean="0">
+                <a:solidFill>
+                  <a:schemeClr val="tx1"/>
+                </a:solidFill>
+              </a:rPr>
+              <a:t>matrix.</a:t>
+            </a:r>
+            <a:endParaRPr lang="he-IL" sz="2800" i="1" dirty="0">
+              <a:solidFill>
+                <a:schemeClr val="tx1"/>
+              </a:solidFill>
+            </a:endParaRPr>
+          </a:p>
+        </p:txBody>
+      </p:sp>
+      <p:pic>
+        <p:nvPicPr>
+          <p:cNvPr id="5" name="Picture 4"/>
+          <p:cNvPicPr>
+            <a:picLocks noChangeAspect="1"/>
+          </p:cNvPicPr>
+          <p:nvPr/>
+        </p:nvPicPr>
+        <p:blipFill>
+          <a:blip r:embed="rId19"/>
+          <a:stretch>
+            <a:fillRect/>
+          </a:stretch>
+        </p:blipFill>
+        <p:spPr>
+          <a:xfrm>
+            <a:off x="15697471" y="27231447"/>
+            <a:ext cx="4609085" cy="4414609"/>
+          </a:xfrm>
+          <a:prstGeom prst="rect">
+            <a:avLst/>
+          </a:prstGeom>
+        </p:spPr>
+      </p:pic>
+      <p:pic>
+        <p:nvPicPr>
+          <p:cNvPr id="68" name="Picture 4" descr="http://chechiklab.biu.ac.il/~yuvval/figs/comet/rowcol_vis.png"/>
+          <p:cNvPicPr>
+            <a:picLocks noChangeAspect="1" noChangeArrowheads="1"/>
+          </p:cNvPicPr>
+          <p:nvPr/>
+        </p:nvPicPr>
+        <p:blipFill rotWithShape="1">
+          <a:blip r:embed="rId20" cstate="print">
+            <a:extLst>
+              <a:ext uri="{28A0092B-C50C-407E-A947-70E740481C1C}">
+                <a14:useLocalDpi xmlns:a14="http://schemas.microsoft.com/office/drawing/2010/main" val="0"/>
+              </a:ext>
+            </a:extLst>
+          </a:blip>
+          <a:srcRect l="7339" t="15746" r="8998" b="2607"/>
+          <a:stretch/>
+        </p:blipFill>
+        <p:spPr bwMode="auto">
+          <a:xfrm>
+            <a:off x="27263908" y="6256069"/>
+            <a:ext cx="3336199" cy="3255809"/>
+          </a:xfrm>
+          <a:prstGeom prst="rect">
+            <a:avLst/>
+          </a:prstGeom>
+          <a:noFill/>
+          <a:extLst>
+            <a:ext uri="{909E8E84-426E-40DD-AFC4-6F175D3DCCD1}">
+              <a14:hiddenFill xmlns:a14="http://schemas.microsoft.com/office/drawing/2010/main">
+                <a:solidFill>
+                  <a:srgbClr val="FFFFFF"/>
+                </a:solidFill>
+              </a14:hiddenFill>
+            </a:ext>
+          </a:extLst>
+        </p:spPr>
+      </p:pic>
+      <p:pic>
+        <p:nvPicPr>
+          <p:cNvPr id="8" name="Picture 7"/>
+          <p:cNvPicPr>
+            <a:picLocks noChangeAspect="1"/>
+          </p:cNvPicPr>
+          <p:nvPr/>
+        </p:nvPicPr>
+        <p:blipFill>
+          <a:blip r:embed="rId21"/>
+          <a:stretch>
+            <a:fillRect/>
+          </a:stretch>
+        </p:blipFill>
+        <p:spPr>
+          <a:xfrm>
+            <a:off x="16898688" y="6462476"/>
+            <a:ext cx="3333750" cy="3257550"/>
+          </a:xfrm>
+          <a:prstGeom prst="rect">
+            <a:avLst/>
+          </a:prstGeom>
+        </p:spPr>
+      </p:pic>
+      <mc:AlternateContent xmlns:mc="http://schemas.openxmlformats.org/markup-compatibility/2006">
+        <mc:Choice xmlns:a14="http://schemas.microsoft.com/office/drawing/2010/main" Requires="a14">
+          <p:sp>
+            <p:nvSpPr>
+              <p:cNvPr id="74" name="Rectangle 73"/>
+              <p:cNvSpPr/>
+              <p:nvPr/>
+            </p:nvSpPr>
+            <p:spPr>
+              <a:xfrm>
+                <a:off x="22034748" y="6119548"/>
+                <a:ext cx="5193111" cy="6093001"/>
+              </a:xfrm>
+              <a:prstGeom prst="rect">
+                <a:avLst/>
+              </a:prstGeom>
+            </p:spPr>
+            <p:txBody>
+              <a:bodyPr wrap="square" lIns="108000" tIns="54000" rIns="108000" bIns="54000">
+                <a:spAutoFit/>
+              </a:bodyPr>
+              <a:lstStyle/>
+              <a:p>
+                <a:pPr algn="just" rtl="0"/>
+                <a:r>
+                  <a:rPr lang="en-US" sz="3200" dirty="0"/>
+                  <a:t>We use an overlapping decomposition of </a:t>
+                </a:r>
+                <a14:m>
+                  <m:oMath xmlns:m="http://schemas.openxmlformats.org/officeDocument/2006/math">
+                    <m:r>
+                      <a:rPr lang="en-US" sz="3200">
+                        <a:latin typeface="Cambria Math" panose="02040503050406030204" pitchFamily="18" charset="0"/>
+                      </a:rPr>
+                      <m:t>𝑊</m:t>
+                    </m:r>
+                  </m:oMath>
+                </a14:m>
+                <a:r>
+                  <a:rPr lang="en-US" sz="3200" dirty="0"/>
+                  <a:t> into </a:t>
+                </a:r>
+                <a14:m>
+                  <m:oMath xmlns:m="http://schemas.openxmlformats.org/officeDocument/2006/math">
+                    <m:sSubSup>
+                      <m:sSubSupPr>
+                        <m:ctrlPr>
+                          <a:rPr lang="en-US" sz="3200" i="1">
+                            <a:latin typeface="Cambria Math" panose="02040503050406030204" pitchFamily="18" charset="0"/>
+                          </a:rPr>
+                        </m:ctrlPr>
+                      </m:sSubSupPr>
+                      <m:e>
+                        <m:d>
+                          <m:dPr>
+                            <m:begChr m:val="{"/>
+                            <m:endChr m:val="}"/>
+                            <m:ctrlPr>
+                              <a:rPr lang="en-US" sz="3200" i="1">
+                                <a:latin typeface="Cambria Math" panose="02040503050406030204" pitchFamily="18" charset="0"/>
+                              </a:rPr>
+                            </m:ctrlPr>
+                          </m:dPr>
+                          <m:e>
+                            <m:sSub>
+                              <m:sSubPr>
+                                <m:ctrlPr>
+                                  <a:rPr lang="en-US" sz="3200" i="1">
+                                    <a:latin typeface="Cambria Math" panose="02040503050406030204" pitchFamily="18" charset="0"/>
+                                  </a:rPr>
+                                </m:ctrlPr>
+                              </m:sSubPr>
+                              <m:e>
+                                <m:r>
+                                  <a:rPr lang="en-US" sz="3200">
+                                    <a:latin typeface="Cambria Math" panose="02040503050406030204" pitchFamily="18" charset="0"/>
+                                  </a:rPr>
+                                  <m:t>𝑉</m:t>
+                                </m:r>
+                              </m:e>
+                              <m:sub>
+                                <m:r>
+                                  <a:rPr lang="en-US" sz="3200">
+                                    <a:latin typeface="Cambria Math" panose="02040503050406030204" pitchFamily="18" charset="0"/>
+                                  </a:rPr>
+                                  <m:t>𝑘</m:t>
+                                </m:r>
+                              </m:sub>
+                            </m:sSub>
+                          </m:e>
+                        </m:d>
+                      </m:e>
+                      <m:sub>
+                        <m:r>
+                          <a:rPr lang="en-US" sz="3200">
+                            <a:latin typeface="Cambria Math" panose="02040503050406030204" pitchFamily="18" charset="0"/>
+                          </a:rPr>
+                          <m:t>𝑘</m:t>
+                        </m:r>
+                        <m:r>
+                          <a:rPr lang="en-US" sz="3200">
+                            <a:latin typeface="Cambria Math" panose="02040503050406030204" pitchFamily="18" charset="0"/>
+                          </a:rPr>
+                          <m:t>=</m:t>
+                        </m:r>
+                        <m:r>
+                          <a:rPr lang="en-US" sz="3200">
+                            <a:latin typeface="Cambria Math" panose="02040503050406030204" pitchFamily="18" charset="0"/>
+                          </a:rPr>
+                          <m:t>0</m:t>
+                        </m:r>
+                      </m:sub>
+                      <m:sup>
+                        <m:r>
+                          <a:rPr lang="en-US" sz="3200">
+                            <a:latin typeface="Cambria Math" panose="02040503050406030204" pitchFamily="18" charset="0"/>
+                          </a:rPr>
+                          <m:t>𝑑</m:t>
+                        </m:r>
+                      </m:sup>
+                    </m:sSubSup>
+                  </m:oMath>
+                </a14:m>
+                <a:r>
+                  <a:rPr lang="en-US" sz="3200" dirty="0"/>
+                  <a:t> group components: The matrix </a:t>
+                </a:r>
+                <a14:m>
+                  <m:oMath xmlns:m="http://schemas.openxmlformats.org/officeDocument/2006/math">
+                    <m:sSub>
+                      <m:sSubPr>
+                        <m:ctrlPr>
+                          <a:rPr lang="en-US" sz="3200" i="1">
+                            <a:latin typeface="Cambria Math" panose="02040503050406030204" pitchFamily="18" charset="0"/>
+                          </a:rPr>
+                        </m:ctrlPr>
+                      </m:sSubPr>
+                      <m:e>
+                        <m:r>
+                          <a:rPr lang="en-US" sz="3200">
+                            <a:latin typeface="Cambria Math" panose="02040503050406030204" pitchFamily="18" charset="0"/>
+                          </a:rPr>
+                          <m:t>𝑉</m:t>
+                        </m:r>
+                      </m:e>
+                      <m:sub>
+                        <m:r>
+                          <a:rPr lang="en-US" sz="3200">
+                            <a:latin typeface="Cambria Math" panose="02040503050406030204" pitchFamily="18" charset="0"/>
+                          </a:rPr>
+                          <m:t>0</m:t>
+                        </m:r>
+                      </m:sub>
+                    </m:sSub>
+                  </m:oMath>
+                </a14:m>
+                <a:r>
+                  <a:rPr lang="en-US" sz="3200" dirty="0"/>
+                  <a:t> is a diagonal matrix, and each matrix </a:t>
+                </a:r>
+                <a:r>
+                  <a:rPr lang="en-US" sz="3200" dirty="0" smtClean="0"/>
+                  <a:t/>
+                </a:r>
+                <a:br>
+                  <a:rPr lang="en-US" sz="3200" dirty="0" smtClean="0"/>
+                </a:br>
+                <a14:m>
+                  <m:oMath xmlns:m="http://schemas.openxmlformats.org/officeDocument/2006/math">
+                    <m:sSub>
+                      <m:sSubPr>
+                        <m:ctrlPr>
+                          <a:rPr lang="en-US" sz="3200" i="1">
+                            <a:latin typeface="Cambria Math" panose="02040503050406030204" pitchFamily="18" charset="0"/>
+                          </a:rPr>
+                        </m:ctrlPr>
+                      </m:sSubPr>
+                      <m:e>
+                        <m:r>
+                          <a:rPr lang="en-US" sz="3200">
+                            <a:latin typeface="Cambria Math" panose="02040503050406030204" pitchFamily="18" charset="0"/>
+                          </a:rPr>
+                          <m:t>𝑉</m:t>
+                        </m:r>
+                      </m:e>
+                      <m:sub>
+                        <m:r>
+                          <a:rPr lang="en-US" sz="3200">
+                            <a:latin typeface="Cambria Math" panose="02040503050406030204" pitchFamily="18" charset="0"/>
+                          </a:rPr>
+                          <m:t>𝑘</m:t>
+                        </m:r>
+                      </m:sub>
+                    </m:sSub>
+                    <m:r>
+                      <a:rPr lang="en-US" sz="3200">
+                        <a:latin typeface="Cambria Math" panose="02040503050406030204" pitchFamily="18" charset="0"/>
+                      </a:rPr>
+                      <m:t> </m:t>
+                    </m:r>
+                    <m:d>
+                      <m:dPr>
+                        <m:ctrlPr>
+                          <a:rPr lang="en-US" sz="3200" i="1">
+                            <a:latin typeface="Cambria Math" panose="02040503050406030204" pitchFamily="18" charset="0"/>
+                          </a:rPr>
+                        </m:ctrlPr>
+                      </m:dPr>
+                      <m:e>
+                        <m:r>
+                          <a:rPr lang="en-US" sz="3200">
+                            <a:latin typeface="Cambria Math" panose="02040503050406030204" pitchFamily="18" charset="0"/>
+                          </a:rPr>
+                          <m:t>𝑘</m:t>
+                        </m:r>
+                        <m:r>
+                          <a:rPr lang="en-US" sz="3200">
+                            <a:latin typeface="Cambria Math" panose="02040503050406030204" pitchFamily="18" charset="0"/>
+                          </a:rPr>
+                          <m:t>&gt;</m:t>
+                        </m:r>
+                        <m:r>
+                          <a:rPr lang="en-US" sz="3200">
+                            <a:latin typeface="Cambria Math" panose="02040503050406030204" pitchFamily="18" charset="0"/>
+                          </a:rPr>
+                          <m:t>0</m:t>
+                        </m:r>
+                      </m:e>
+                    </m:d>
+                  </m:oMath>
+                </a14:m>
+                <a:r>
+                  <a:rPr lang="en-US" sz="3200" dirty="0"/>
+                  <a:t> is a symmetric matrix of non-zero values only on the </a:t>
+                </a:r>
+                <a14:m>
+                  <m:oMath xmlns:m="http://schemas.openxmlformats.org/officeDocument/2006/math">
+                    <m:sSup>
+                      <m:sSupPr>
+                        <m:ctrlPr>
+                          <a:rPr lang="en-US" sz="3200" i="1">
+                            <a:latin typeface="Cambria Math" panose="02040503050406030204" pitchFamily="18" charset="0"/>
+                          </a:rPr>
+                        </m:ctrlPr>
+                      </m:sSupPr>
+                      <m:e>
+                        <m:r>
+                          <a:rPr lang="en-US" sz="3200">
+                            <a:latin typeface="Cambria Math" panose="02040503050406030204" pitchFamily="18" charset="0"/>
+                          </a:rPr>
+                          <m:t>𝑘</m:t>
+                        </m:r>
+                      </m:e>
+                      <m:sup>
+                        <m:r>
+                          <a:rPr lang="en-US" sz="3200">
+                            <a:latin typeface="Cambria Math" panose="02040503050406030204" pitchFamily="18" charset="0"/>
+                          </a:rPr>
+                          <m:t>𝑡</m:t>
+                        </m:r>
+                        <m:r>
+                          <a:rPr lang="en-US" sz="3200">
+                            <a:latin typeface="Cambria Math" panose="02040503050406030204" pitchFamily="18" charset="0"/>
+                          </a:rPr>
+                          <m:t>h</m:t>
+                        </m:r>
+                      </m:sup>
+                    </m:sSup>
+                  </m:oMath>
+                </a14:m>
+                <a:r>
+                  <a:rPr lang="en-US" sz="3200" dirty="0"/>
+                  <a:t> row and column, with an all-zeros diagonal. </a:t>
+                </a:r>
+                <a:endParaRPr lang="en-US" sz="3200" dirty="0" smtClean="0"/>
+              </a:p>
+              <a:p>
+                <a:pPr algn="just" rtl="0"/>
+                <a:endParaRPr lang="en-US" sz="3200" dirty="0"/>
+              </a:p>
+              <a:p>
+                <a:pPr algn="just" rtl="0"/>
+                <a14:m>
+                  <m:oMath xmlns:m="http://schemas.openxmlformats.org/officeDocument/2006/math">
+                    <m:r>
+                      <a:rPr lang="en-US" sz="3200">
+                        <a:latin typeface="Cambria Math" panose="02040503050406030204" pitchFamily="18" charset="0"/>
+                      </a:rPr>
+                      <m:t>𝑊</m:t>
+                    </m:r>
+                  </m:oMath>
+                </a14:m>
+                <a:r>
+                  <a:rPr lang="en-US" sz="3200" dirty="0"/>
+                  <a:t> is the sum </a:t>
+                </a:r>
+                <a14:m>
+                  <m:oMath xmlns:m="http://schemas.openxmlformats.org/officeDocument/2006/math">
+                    <m:r>
+                      <a:rPr lang="en-US" sz="3200">
+                        <a:latin typeface="Cambria Math" panose="02040503050406030204" pitchFamily="18" charset="0"/>
+                      </a:rPr>
+                      <m:t>𝑊</m:t>
+                    </m:r>
+                    <m:r>
+                      <a:rPr lang="en-US" sz="3200">
+                        <a:latin typeface="Cambria Math" panose="02040503050406030204" pitchFamily="18" charset="0"/>
+                      </a:rPr>
+                      <m:t>=</m:t>
+                    </m:r>
+                    <m:nary>
+                      <m:naryPr>
+                        <m:chr m:val="∑"/>
+                        <m:ctrlPr>
+                          <a:rPr lang="en-US" sz="3200" i="1">
+                            <a:latin typeface="Cambria Math" panose="02040503050406030204" pitchFamily="18" charset="0"/>
+                          </a:rPr>
+                        </m:ctrlPr>
+                      </m:naryPr>
+                      <m:sub>
+                        <m:r>
+                          <a:rPr lang="en-US" sz="3200">
+                            <a:latin typeface="Cambria Math" panose="02040503050406030204" pitchFamily="18" charset="0"/>
+                          </a:rPr>
+                          <m:t>𝑘</m:t>
+                        </m:r>
+                        <m:r>
+                          <a:rPr lang="en-US" sz="3200">
+                            <a:latin typeface="Cambria Math" panose="02040503050406030204" pitchFamily="18" charset="0"/>
+                          </a:rPr>
+                          <m:t>=</m:t>
+                        </m:r>
+                        <m:r>
+                          <a:rPr lang="en-US" sz="3200">
+                            <a:latin typeface="Cambria Math" panose="02040503050406030204" pitchFamily="18" charset="0"/>
+                          </a:rPr>
+                          <m:t>0</m:t>
+                        </m:r>
+                      </m:sub>
+                      <m:sup>
+                        <m:r>
+                          <a:rPr lang="en-US" sz="3200">
+                            <a:latin typeface="Cambria Math" panose="02040503050406030204" pitchFamily="18" charset="0"/>
+                          </a:rPr>
+                          <m:t>𝑑</m:t>
+                        </m:r>
+                      </m:sup>
+                      <m:e>
+                        <m:sSub>
+                          <m:sSubPr>
+                            <m:ctrlPr>
+                              <a:rPr lang="en-US" sz="3200" i="1">
+                                <a:latin typeface="Cambria Math" panose="02040503050406030204" pitchFamily="18" charset="0"/>
+                              </a:rPr>
+                            </m:ctrlPr>
+                          </m:sSubPr>
+                          <m:e>
+                            <m:r>
+                              <a:rPr lang="en-US" sz="3200">
+                                <a:latin typeface="Cambria Math" panose="02040503050406030204" pitchFamily="18" charset="0"/>
+                              </a:rPr>
+                              <m:t>𝑉</m:t>
+                            </m:r>
+                          </m:e>
+                          <m:sub>
+                            <m:r>
+                              <a:rPr lang="en-US" sz="3200">
+                                <a:latin typeface="Cambria Math" panose="02040503050406030204" pitchFamily="18" charset="0"/>
+                              </a:rPr>
+                              <m:t>𝑘</m:t>
+                            </m:r>
+                          </m:sub>
+                        </m:sSub>
+                      </m:e>
+                    </m:nary>
+                  </m:oMath>
+                </a14:m>
+                <a:endParaRPr lang="en-US" sz="3200" dirty="0"/>
+              </a:p>
+            </p:txBody>
+          </p:sp>
+        </mc:Choice>
+        <mc:Fallback>
+          <p:sp>
+            <p:nvSpPr>
+              <p:cNvPr id="74" name="Rectangle 73"/>
+              <p:cNvSpPr>
+                <a:spLocks noRot="1" noChangeAspect="1" noMove="1" noResize="1" noEditPoints="1" noAdjustHandles="1" noChangeArrowheads="1" noChangeShapeType="1" noTextEdit="1"/>
+              </p:cNvSpPr>
+              <p:nvPr/>
+            </p:nvSpPr>
+            <p:spPr>
+              <a:xfrm>
+                <a:off x="22034748" y="6119548"/>
+                <a:ext cx="5193111" cy="6093001"/>
+              </a:xfrm>
+              <a:prstGeom prst="rect">
+                <a:avLst/>
+              </a:prstGeom>
+              <a:blipFill rotWithShape="0">
+                <a:blip r:embed="rId22"/>
+                <a:stretch>
+                  <a:fillRect l="-2700" t="-1201" r="-2582" b="-2302"/>
+                </a:stretch>
+              </a:blipFill>
+            </p:spPr>
+            <p:txBody>
+              <a:bodyPr/>
+              <a:lstStyle/>
+              <a:p>
+                <a:r>
+                  <a:rPr lang="en-US">
+                    <a:noFill/>
+                  </a:rPr>
+                  <a:t> </a:t>
+                </a:r>
+              </a:p>
+            </p:txBody>
+          </p:sp>
+        </mc:Fallback>
+      </mc:AlternateContent>
+      <mc:AlternateContent xmlns:mc="http://schemas.openxmlformats.org/markup-compatibility/2006">
+        <mc:Choice xmlns:a14="http://schemas.microsoft.com/office/drawing/2010/main" Requires="a14">
+          <p:sp>
+            <p:nvSpPr>
+              <p:cNvPr id="75" name="Rectangle 74"/>
+              <p:cNvSpPr/>
+              <p:nvPr/>
+            </p:nvSpPr>
+            <p:spPr>
+              <a:xfrm>
+                <a:off x="22034748" y="12269646"/>
+                <a:ext cx="8334741" cy="12182937"/>
+              </a:xfrm>
+              <a:prstGeom prst="rect">
+                <a:avLst/>
+              </a:prstGeom>
+            </p:spPr>
+            <p:txBody>
+              <a:bodyPr wrap="square" lIns="108000" tIns="54000" rIns="108000" bIns="54000">
+                <a:spAutoFit/>
+              </a:bodyPr>
+              <a:lstStyle/>
+              <a:p>
+                <a:pPr algn="l" rtl="0"/>
+                <a:r>
+                  <a:rPr lang="en-US" sz="3200" dirty="0" smtClean="0"/>
+                  <a:t>We add a group-sparse norm penalty to the loss to encourage solutions with fewer features and obtain the following objective and optimization :</a:t>
+                </a:r>
+              </a:p>
+              <a:p>
+                <a:pPr algn="l" rtl="0"/>
+                <a:endParaRPr lang="en-US" sz="3200" dirty="0"/>
+              </a:p>
+              <a:p>
+                <a:pPr rtl="0"/>
+                <a14:m>
+                  <m:oMathPara xmlns:m="http://schemas.openxmlformats.org/officeDocument/2006/math">
+                    <m:oMathParaPr>
+                      <m:jc m:val="centerGroup"/>
+                    </m:oMathParaPr>
+                    <m:oMath xmlns:m="http://schemas.openxmlformats.org/officeDocument/2006/math">
+                      <m:sSubSup>
+                        <m:sSubSupPr>
+                          <m:ctrlPr>
+                            <a:rPr lang="en-US" sz="3200" i="1"/>
+                          </m:ctrlPr>
+                        </m:sSubSupPr>
+                        <m:e>
+                          <m:func>
+                            <m:funcPr>
+                              <m:ctrlPr>
+                                <a:rPr lang="en-US" sz="3200" i="1"/>
+                              </m:ctrlPr>
+                            </m:funcPr>
+                            <m:fName>
+                              <m:limLow>
+                                <m:limLowPr>
+                                  <m:ctrlPr>
+                                    <a:rPr lang="en-US" sz="3200" i="1"/>
+                                  </m:ctrlPr>
+                                </m:limLowPr>
+                                <m:e>
+                                  <m:r>
+                                    <m:rPr>
+                                      <m:sty m:val="p"/>
+                                    </m:rPr>
+                                    <a:rPr lang="en-US" sz="3200"/>
+                                    <m:t>min</m:t>
+                                  </m:r>
+                                </m:e>
+                                <m:lim>
+                                  <m:sSubSup>
+                                    <m:sSubSupPr>
+                                      <m:ctrlPr>
+                                        <a:rPr lang="en-US" sz="3200" i="1"/>
+                                      </m:ctrlPr>
+                                    </m:sSubSupPr>
+                                    <m:e>
+                                      <m:d>
+                                        <m:dPr>
+                                          <m:begChr m:val="{"/>
+                                          <m:endChr m:val="}"/>
+                                          <m:ctrlPr>
+                                            <a:rPr lang="en-US" sz="3200" i="1"/>
+                                          </m:ctrlPr>
+                                        </m:dPr>
+                                        <m:e>
+                                          <m:sSub>
+                                            <m:sSubPr>
+                                              <m:ctrlPr>
+                                                <a:rPr lang="en-US" sz="3200" i="1"/>
+                                              </m:ctrlPr>
+                                            </m:sSubPr>
+                                            <m:e>
+                                              <m:r>
+                                                <a:rPr lang="en-US" sz="3200" i="1"/>
+                                                <m:t>𝑉</m:t>
+                                              </m:r>
+                                            </m:e>
+                                            <m:sub>
+                                              <m:r>
+                                                <a:rPr lang="en-US" sz="3200" i="1"/>
+                                                <m:t>𝑘</m:t>
+                                              </m:r>
+                                            </m:sub>
+                                          </m:sSub>
+                                        </m:e>
+                                      </m:d>
+                                    </m:e>
+                                    <m:sub>
+                                      <m:r>
+                                        <a:rPr lang="en-US" sz="3200" i="1"/>
+                                        <m:t>𝑘</m:t>
+                                      </m:r>
+                                      <m:r>
+                                        <a:rPr lang="en-US" sz="3200" i="1"/>
+                                        <m:t>=</m:t>
+                                      </m:r>
+                                      <m:r>
+                                        <a:rPr lang="en-US" sz="3200" i="1"/>
+                                        <m:t>0</m:t>
+                                      </m:r>
+                                    </m:sub>
+                                    <m:sup>
+                                      <m:r>
+                                        <a:rPr lang="en-US" sz="3200" i="1"/>
+                                        <m:t>𝑑</m:t>
+                                      </m:r>
+                                    </m:sup>
+                                  </m:sSubSup>
+                                </m:lim>
+                              </m:limLow>
+                            </m:fName>
+                            <m:e>
+                              <m:r>
+                                <a:rPr lang="en-US" sz="3200" i="1"/>
+                                <m:t>𝐿</m:t>
+                              </m:r>
+                              <m:r>
+                                <a:rPr lang="en-US" sz="3200" i="1"/>
+                                <m:t>(</m:t>
+                              </m:r>
+                              <m:d>
+                                <m:dPr>
+                                  <m:begChr m:val="{"/>
+                                  <m:endChr m:val="}"/>
+                                  <m:ctrlPr>
+                                    <a:rPr lang="en-US" sz="3200" i="1"/>
+                                  </m:ctrlPr>
+                                </m:dPr>
+                                <m:e>
+                                  <m:sSub>
+                                    <m:sSubPr>
+                                      <m:ctrlPr>
+                                        <a:rPr lang="en-US" sz="3200" i="1"/>
+                                      </m:ctrlPr>
+                                    </m:sSubPr>
+                                    <m:e>
+                                      <m:r>
+                                        <a:rPr lang="en-US" sz="3200" i="1"/>
+                                        <m:t>𝑉</m:t>
+                                      </m:r>
+                                    </m:e>
+                                    <m:sub>
+                                      <m:r>
+                                        <a:rPr lang="en-US" sz="3200" i="1"/>
+                                        <m:t>𝑘</m:t>
+                                      </m:r>
+                                    </m:sub>
+                                  </m:sSub>
+                                </m:e>
+                              </m:d>
+                            </m:e>
+                          </m:func>
+                        </m:e>
+                        <m:sub>
+                          <m:r>
+                            <a:rPr lang="en-US" sz="3200" i="1"/>
+                            <m:t>𝑘</m:t>
+                          </m:r>
+                          <m:r>
+                            <a:rPr lang="en-US" sz="3200" i="1"/>
+                            <m:t>=</m:t>
+                          </m:r>
+                          <m:r>
+                            <a:rPr lang="en-US" sz="3200" i="1"/>
+                            <m:t>0</m:t>
+                          </m:r>
+                        </m:sub>
+                        <m:sup>
+                          <m:r>
+                            <a:rPr lang="en-US" sz="3200" i="1"/>
+                            <m:t>𝑑</m:t>
+                          </m:r>
+                        </m:sup>
+                      </m:sSubSup>
+                      <m:r>
+                        <a:rPr lang="en-US" sz="3200" i="1"/>
+                        <m:t>)=</m:t>
+                      </m:r>
+                      <m:func>
+                        <m:funcPr>
+                          <m:ctrlPr>
+                            <a:rPr lang="en-US" sz="3200" i="1"/>
+                          </m:ctrlPr>
+                        </m:funcPr>
+                        <m:fName>
+                          <m:limLow>
+                            <m:limLowPr>
+                              <m:ctrlPr>
+                                <a:rPr lang="en-US" sz="3200" i="1"/>
+                              </m:ctrlPr>
+                            </m:limLowPr>
+                            <m:e>
+                              <m:r>
+                                <m:rPr>
+                                  <m:sty m:val="p"/>
+                                </m:rPr>
+                                <a:rPr lang="en-US" sz="3200"/>
+                                <m:t>min</m:t>
+                              </m:r>
+                            </m:e>
+                            <m:lim>
+                              <m:sSubSup>
+                                <m:sSubSupPr>
+                                  <m:ctrlPr>
+                                    <a:rPr lang="en-US" sz="3200" i="1"/>
+                                  </m:ctrlPr>
+                                </m:sSubSupPr>
+                                <m:e>
+                                  <m:d>
+                                    <m:dPr>
+                                      <m:begChr m:val="{"/>
+                                      <m:endChr m:val="}"/>
+                                      <m:ctrlPr>
+                                        <a:rPr lang="en-US" sz="3200" i="1"/>
+                                      </m:ctrlPr>
+                                    </m:dPr>
+                                    <m:e>
+                                      <m:sSub>
+                                        <m:sSubPr>
+                                          <m:ctrlPr>
+                                            <a:rPr lang="en-US" sz="3200" i="1"/>
+                                          </m:ctrlPr>
+                                        </m:sSubPr>
+                                        <m:e>
+                                          <m:r>
+                                            <a:rPr lang="en-US" sz="3200" i="1"/>
+                                            <m:t>𝑉</m:t>
+                                          </m:r>
+                                        </m:e>
+                                        <m:sub>
+                                          <m:r>
+                                            <a:rPr lang="en-US" sz="3200" i="1"/>
+                                            <m:t>𝑘</m:t>
+                                          </m:r>
+                                        </m:sub>
+                                      </m:sSub>
+                                    </m:e>
+                                  </m:d>
+                                </m:e>
+                                <m:sub>
+                                  <m:r>
+                                    <a:rPr lang="en-US" sz="3200" i="1"/>
+                                    <m:t>𝑘</m:t>
+                                  </m:r>
+                                  <m:r>
+                                    <a:rPr lang="en-US" sz="3200" i="1"/>
+                                    <m:t>=</m:t>
+                                  </m:r>
+                                  <m:r>
+                                    <a:rPr lang="en-US" sz="3200" i="1"/>
+                                    <m:t>0</m:t>
+                                  </m:r>
+                                </m:sub>
+                                <m:sup>
+                                  <m:r>
+                                    <a:rPr lang="en-US" sz="3200" i="1"/>
+                                    <m:t>𝑑</m:t>
+                                  </m:r>
+                                </m:sup>
+                              </m:sSubSup>
+                            </m:lim>
+                          </m:limLow>
+                        </m:fName>
+                        <m:e>
+                          <m:nary>
+                            <m:naryPr>
+                              <m:chr m:val="∑"/>
+                              <m:supHide m:val="on"/>
+                              <m:ctrlPr>
+                                <a:rPr lang="en-US" sz="3200" i="1"/>
+                              </m:ctrlPr>
+                            </m:naryPr>
+                            <m:sub>
+                              <m:r>
+                                <a:rPr lang="en-US" sz="3200" i="1"/>
+                                <m:t>𝑡</m:t>
+                              </m:r>
+                              <m:r>
+                                <a:rPr lang="en-US" sz="3200" i="1"/>
+                                <m:t>∈</m:t>
+                              </m:r>
+                              <m:r>
+                                <a:rPr lang="en-US" sz="3200" i="1"/>
+                                <m:t>𝒯</m:t>
+                              </m:r>
+                            </m:sub>
+                            <m:sup/>
+                            <m:e>
+                              <m:r>
+                                <a:rPr lang="en-US" sz="3200" i="1"/>
+                                <m:t>[</m:t>
+                              </m:r>
+                              <m:r>
+                                <a:rPr lang="en-US" sz="3200" i="1"/>
+                                <m:t>1</m:t>
+                              </m:r>
+                              <m:r>
+                                <a:rPr lang="en-US" sz="3200" i="1"/>
+                                <m:t>−</m:t>
+                              </m:r>
+                              <m:sSub>
+                                <m:sSubPr>
+                                  <m:ctrlPr>
+                                    <a:rPr lang="en-US" sz="3200" i="1"/>
+                                  </m:ctrlPr>
+                                </m:sSubPr>
+                                <m:e>
+                                  <m:r>
+                                    <a:rPr lang="en-US" sz="3200" i="1"/>
+                                    <m:t>𝑞</m:t>
+                                  </m:r>
+                                </m:e>
+                                <m:sub>
+                                  <m:r>
+                                    <a:rPr lang="en-US" sz="3200" i="1"/>
+                                    <m:t>𝑡</m:t>
+                                  </m:r>
+                                </m:sub>
+                              </m:sSub>
+                              <m:r>
+                                <a:rPr lang="en-US" sz="3200" i="1"/>
+                                <m:t>𝑊</m:t>
+                              </m:r>
+                              <m:sSubSup>
+                                <m:sSubSupPr>
+                                  <m:ctrlPr>
+                                    <a:rPr lang="en-US" sz="3200" i="1"/>
+                                  </m:ctrlPr>
+                                </m:sSubSupPr>
+                                <m:e>
+                                  <m:r>
+                                    <a:rPr lang="en-US" sz="3200" i="1"/>
+                                    <m:t>𝑝</m:t>
+                                  </m:r>
+                                </m:e>
+                                <m:sub>
+                                  <m:r>
+                                    <a:rPr lang="en-US" sz="3200" i="1"/>
+                                    <m:t>𝑡</m:t>
+                                  </m:r>
+                                </m:sub>
+                                <m:sup>
+                                  <m:r>
+                                    <a:rPr lang="en-US" sz="3200" i="1"/>
+                                    <m:t>+</m:t>
+                                  </m:r>
+                                </m:sup>
+                              </m:sSubSup>
+                              <m:r>
+                                <a:rPr lang="en-US" sz="3200" i="1"/>
+                                <m:t>+</m:t>
+                              </m:r>
+                              <m:sSub>
+                                <m:sSubPr>
+                                  <m:ctrlPr>
+                                    <a:rPr lang="en-US" sz="3200" i="1"/>
+                                  </m:ctrlPr>
+                                </m:sSubPr>
+                                <m:e>
+                                  <m:r>
+                                    <a:rPr lang="en-US" sz="3200" i="1"/>
+                                    <m:t>𝑞</m:t>
+                                  </m:r>
+                                </m:e>
+                                <m:sub>
+                                  <m:r>
+                                    <a:rPr lang="en-US" sz="3200" i="1"/>
+                                    <m:t>𝑡</m:t>
+                                  </m:r>
+                                </m:sub>
+                              </m:sSub>
+                              <m:r>
+                                <a:rPr lang="en-US" sz="3200" i="1"/>
+                                <m:t>𝑊</m:t>
+                              </m:r>
+                              <m:sSubSup>
+                                <m:sSubSupPr>
+                                  <m:ctrlPr>
+                                    <a:rPr lang="en-US" sz="3200" i="1"/>
+                                  </m:ctrlPr>
+                                </m:sSubSupPr>
+                                <m:e>
+                                  <m:r>
+                                    <a:rPr lang="en-US" sz="3200" i="1"/>
+                                    <m:t>𝑝</m:t>
+                                  </m:r>
+                                </m:e>
+                                <m:sub>
+                                  <m:r>
+                                    <a:rPr lang="en-US" sz="3200" i="1"/>
+                                    <m:t>𝑡</m:t>
+                                  </m:r>
+                                </m:sub>
+                                <m:sup>
+                                  <m:r>
+                                    <a:rPr lang="en-US" sz="3200" i="1"/>
+                                    <m:t>−</m:t>
+                                  </m:r>
+                                </m:sup>
+                              </m:sSubSup>
+                              <m:r>
+                                <a:rPr lang="en-US" sz="3200" i="1"/>
+                                <m:t>]</m:t>
+                              </m:r>
+                            </m:e>
+                          </m:nary>
+                          <m:r>
+                            <a:rPr lang="en-US" sz="3200" i="1"/>
+                            <m:t> </m:t>
+                          </m:r>
+                        </m:e>
+                      </m:func>
+                    </m:oMath>
+                  </m:oMathPara>
+                </a14:m>
+                <a:endParaRPr lang="en-US" sz="3200" dirty="0"/>
+              </a:p>
+              <a:p>
+                <a:pPr algn="r" rtl="0"/>
+                <a14:m>
+                  <m:oMathPara xmlns:m="http://schemas.openxmlformats.org/officeDocument/2006/math">
+                    <m:oMathParaPr>
+                      <m:jc m:val="centerGroup"/>
+                    </m:oMathParaPr>
+                    <m:oMath xmlns:m="http://schemas.openxmlformats.org/officeDocument/2006/math">
+                      <m:r>
+                        <a:rPr lang="en-US" sz="3200" i="1"/>
+                        <m:t>−</m:t>
+                      </m:r>
+                      <m:r>
+                        <a:rPr lang="en-US" sz="3200" i="1"/>
+                        <m:t>𝛼</m:t>
+                      </m:r>
+                      <m:func>
+                        <m:funcPr>
+                          <m:ctrlPr>
+                            <a:rPr lang="en-US" sz="3200" i="1"/>
+                          </m:ctrlPr>
+                        </m:funcPr>
+                        <m:fName>
+                          <m:r>
+                            <m:rPr>
+                              <m:sty m:val="p"/>
+                            </m:rPr>
+                            <a:rPr lang="en-US" sz="3200"/>
+                            <m:t>log</m:t>
+                          </m:r>
+                        </m:fName>
+                        <m:e>
+                          <m:func>
+                            <m:funcPr>
+                              <m:ctrlPr>
+                                <a:rPr lang="en-US" sz="3200" i="1"/>
+                              </m:ctrlPr>
+                            </m:funcPr>
+                            <m:fName>
+                              <m:r>
+                                <m:rPr>
+                                  <m:sty m:val="p"/>
+                                </m:rPr>
+                                <a:rPr lang="en-US" sz="3200"/>
+                                <m:t>det</m:t>
+                              </m:r>
+                            </m:fName>
+                            <m:e>
+                              <m:r>
+                                <a:rPr lang="en-US" sz="3200" i="1"/>
+                                <m:t>𝑊</m:t>
+                              </m:r>
+                            </m:e>
+                          </m:func>
+                        </m:e>
+                      </m:func>
+                      <m:r>
+                        <a:rPr lang="en-US" sz="3200" i="1"/>
+                        <m:t>+</m:t>
+                      </m:r>
+                      <m:r>
+                        <a:rPr lang="en-US" sz="3200" i="1"/>
+                        <m:t>𝜆</m:t>
+                      </m:r>
+                      <m:nary>
+                        <m:naryPr>
+                          <m:chr m:val="∑"/>
+                          <m:ctrlPr>
+                            <a:rPr lang="en-US" sz="3200" i="1"/>
+                          </m:ctrlPr>
+                        </m:naryPr>
+                        <m:sub>
+                          <m:r>
+                            <a:rPr lang="en-US" sz="3200" i="1"/>
+                            <m:t>𝑘</m:t>
+                          </m:r>
+                          <m:r>
+                            <a:rPr lang="en-US" sz="3200" i="1"/>
+                            <m:t>=</m:t>
+                          </m:r>
+                          <m:r>
+                            <a:rPr lang="en-US" sz="3200" i="1"/>
+                            <m:t>0</m:t>
+                          </m:r>
+                        </m:sub>
+                        <m:sup>
+                          <m:r>
+                            <a:rPr lang="en-US" sz="3200" i="1"/>
+                            <m:t>𝑑</m:t>
+                          </m:r>
+                        </m:sup>
+                        <m:e>
+                          <m:sSub>
+                            <m:sSubPr>
+                              <m:ctrlPr>
+                                <a:rPr lang="en-US" sz="3200" i="1"/>
+                              </m:ctrlPr>
+                            </m:sSubPr>
+                            <m:e>
+                              <m:d>
+                                <m:dPr>
+                                  <m:begChr m:val="‖"/>
+                                  <m:endChr m:val="‖"/>
+                                  <m:ctrlPr>
+                                    <a:rPr lang="en-US" sz="3200" i="1"/>
+                                  </m:ctrlPr>
+                                </m:dPr>
+                                <m:e>
+                                  <m:sSub>
+                                    <m:sSubPr>
+                                      <m:ctrlPr>
+                                        <a:rPr lang="en-US" sz="3200" i="1"/>
+                                      </m:ctrlPr>
+                                    </m:sSubPr>
+                                    <m:e>
+                                      <m:r>
+                                        <a:rPr lang="en-US" sz="3200" i="1"/>
+                                        <m:t>𝑉</m:t>
+                                      </m:r>
+                                    </m:e>
+                                    <m:sub>
+                                      <m:r>
+                                        <a:rPr lang="en-US" sz="3200" i="1"/>
+                                        <m:t>𝑘</m:t>
+                                      </m:r>
+                                    </m:sub>
+                                  </m:sSub>
+                                </m:e>
+                              </m:d>
+                            </m:e>
+                            <m:sub>
+                              <m:r>
+                                <a:rPr lang="en-US" sz="3200" i="1"/>
+                                <m:t>𝐹</m:t>
+                              </m:r>
+                            </m:sub>
+                          </m:sSub>
+                        </m:e>
+                      </m:nary>
+                    </m:oMath>
+                  </m:oMathPara>
+                </a14:m>
+                <a:endParaRPr lang="en-US" sz="3200" dirty="0"/>
+              </a:p>
+              <a:p>
+                <a:pPr algn="l" rtl="0"/>
+                <a:endParaRPr lang="en-US" sz="3200" dirty="0" smtClean="0"/>
+              </a:p>
+              <a:p>
+                <a:pPr algn="l" rtl="0"/>
+                <a:r>
+                  <a:rPr lang="en-US" sz="3200" dirty="0"/>
+                  <a:t>For encouraging exact all-zeros updates, we solve </a:t>
+                </a:r>
+                <a:r>
+                  <a:rPr lang="en-US" sz="3200" dirty="0" smtClean="0"/>
+                  <a:t>on each </a:t>
+                </a:r>
+                <a:r>
+                  <a:rPr lang="en-US" sz="3200" dirty="0"/>
+                  <a:t>coordinate step the following proximal problem, which admits a closed form solution.</a:t>
+                </a:r>
+              </a:p>
+              <a:p>
+                <a:pPr algn="l" rtl="0"/>
+                <a14:m>
+                  <m:oMathPara xmlns:m="http://schemas.openxmlformats.org/officeDocument/2006/math">
+                    <m:oMathParaPr>
+                      <m:jc m:val="centerGroup"/>
+                    </m:oMathParaPr>
+                    <m:oMath xmlns:m="http://schemas.openxmlformats.org/officeDocument/2006/math">
+                      <m:sSubSup>
+                        <m:sSubSupPr>
+                          <m:ctrlPr>
+                            <a:rPr lang="en-US" sz="3200" i="1"/>
+                          </m:ctrlPr>
+                        </m:sSubSupPr>
+                        <m:e>
+                          <m:r>
+                            <a:rPr lang="en-US" sz="3200" i="1"/>
+                            <m:t>𝑉</m:t>
+                          </m:r>
+                        </m:e>
+                        <m:sub>
+                          <m:r>
+                            <a:rPr lang="en-US" sz="3200" i="1"/>
+                            <m:t>𝑘</m:t>
+                          </m:r>
+                        </m:sub>
+                        <m:sup>
+                          <m:r>
+                            <a:rPr lang="en-US" sz="3200" i="1"/>
+                            <m:t>𝑛𝑒𝑤</m:t>
+                          </m:r>
+                        </m:sup>
+                      </m:sSubSup>
+                      <m:r>
+                        <a:rPr lang="en-US" sz="3200" i="1"/>
+                        <m:t>=</m:t>
+                      </m:r>
+                      <m:func>
+                        <m:funcPr>
+                          <m:ctrlPr>
+                            <a:rPr lang="en-US" sz="3200" i="1"/>
+                          </m:ctrlPr>
+                        </m:funcPr>
+                        <m:fName>
+                          <m:limLow>
+                            <m:limLowPr>
+                              <m:ctrlPr>
+                                <a:rPr lang="en-US" sz="3200" i="1"/>
+                              </m:ctrlPr>
+                            </m:limLowPr>
+                            <m:e>
+                              <m:r>
+                                <m:rPr>
+                                  <m:sty m:val="p"/>
+                                </m:rPr>
+                                <a:rPr lang="en-US" sz="3200"/>
+                                <m:t>argmin</m:t>
+                              </m:r>
+                            </m:e>
+                            <m:lim>
+                              <m:r>
+                                <a:rPr lang="en-US" sz="3200" i="1"/>
+                                <m:t>𝑉</m:t>
+                              </m:r>
+                              <m:r>
+                                <a:rPr lang="en-US" sz="3200" i="1"/>
+                                <m:t>∈</m:t>
+                              </m:r>
+                              <m:sSub>
+                                <m:sSubPr>
+                                  <m:ctrlPr>
+                                    <a:rPr lang="en-US" sz="3200" i="1"/>
+                                  </m:ctrlPr>
+                                </m:sSubPr>
+                                <m:e>
+                                  <m:r>
+                                    <a:rPr lang="en-US" sz="3200" i="1"/>
+                                    <m:t>𝒱</m:t>
+                                  </m:r>
+                                </m:e>
+                                <m:sub>
+                                  <m:r>
+                                    <a:rPr lang="en-US" sz="3200" i="1"/>
+                                    <m:t>𝑘</m:t>
+                                  </m:r>
+                                </m:sub>
+                              </m:sSub>
+                            </m:lim>
+                          </m:limLow>
+                        </m:fName>
+                        <m:e>
+                          <m:d>
+                            <m:dPr>
+                              <m:begChr m:val="⟨"/>
+                              <m:endChr m:val="⟩"/>
+                              <m:ctrlPr>
+                                <a:rPr lang="en-US" sz="3200" i="1"/>
+                              </m:ctrlPr>
+                            </m:dPr>
+                            <m:e>
+                              <m:f>
+                                <m:fPr>
+                                  <m:ctrlPr>
+                                    <a:rPr lang="en-US" sz="3200" i="1"/>
+                                  </m:ctrlPr>
+                                </m:fPr>
+                                <m:num>
+                                  <m:r>
+                                    <a:rPr lang="en-US" sz="3200" i="1"/>
+                                    <m:t>𝜕</m:t>
+                                  </m:r>
+                                  <m:r>
+                                    <a:rPr lang="en-US" sz="3200" i="1"/>
+                                    <m:t>𝐿</m:t>
+                                  </m:r>
+                                </m:num>
+                                <m:den>
+                                  <m:r>
+                                    <a:rPr lang="en-US" sz="3200" i="1"/>
+                                    <m:t>𝜕</m:t>
+                                  </m:r>
+                                  <m:sSub>
+                                    <m:sSubPr>
+                                      <m:ctrlPr>
+                                        <a:rPr lang="en-US" sz="3200" i="1"/>
+                                      </m:ctrlPr>
+                                    </m:sSubPr>
+                                    <m:e>
+                                      <m:r>
+                                        <a:rPr lang="en-US" sz="3200" i="1"/>
+                                        <m:t>𝑉</m:t>
+                                      </m:r>
+                                    </m:e>
+                                    <m:sub>
+                                      <m:r>
+                                        <a:rPr lang="en-US" sz="3200" i="1"/>
+                                        <m:t>𝑘</m:t>
+                                      </m:r>
+                                    </m:sub>
+                                  </m:sSub>
+                                </m:den>
+                              </m:f>
+                              <m:r>
+                                <a:rPr lang="en-US" sz="3200" i="1"/>
+                                <m:t>,</m:t>
+                              </m:r>
+                              <m:r>
+                                <a:rPr lang="en-US" sz="3200" i="1"/>
+                                <m:t>𝑉</m:t>
+                              </m:r>
+                            </m:e>
+                          </m:d>
+                        </m:e>
+                      </m:func>
+                      <m:r>
+                        <a:rPr lang="en-US" sz="3200" i="1"/>
+                        <m:t>+</m:t>
+                      </m:r>
+                      <m:f>
+                        <m:fPr>
+                          <m:ctrlPr>
+                            <a:rPr lang="en-US" sz="3200" i="1"/>
+                          </m:ctrlPr>
+                        </m:fPr>
+                        <m:num>
+                          <m:r>
+                            <a:rPr lang="en-US" sz="3200" i="1"/>
+                            <m:t>1</m:t>
+                          </m:r>
+                        </m:num>
+                        <m:den>
+                          <m:r>
+                            <a:rPr lang="en-US" sz="3200" i="1"/>
+                            <m:t>2</m:t>
+                          </m:r>
+                          <m:r>
+                            <a:rPr lang="en-US" sz="3200" i="1"/>
+                            <m:t>𝜃</m:t>
+                          </m:r>
+                        </m:den>
+                      </m:f>
+                      <m:sSubSup>
+                        <m:sSubSupPr>
+                          <m:ctrlPr>
+                            <a:rPr lang="en-US" sz="3200" i="1"/>
+                          </m:ctrlPr>
+                        </m:sSubSupPr>
+                        <m:e>
+                          <m:d>
+                            <m:dPr>
+                              <m:begChr m:val="‖"/>
+                              <m:endChr m:val="‖"/>
+                              <m:ctrlPr>
+                                <a:rPr lang="en-US" sz="3200" i="1"/>
+                              </m:ctrlPr>
+                            </m:dPr>
+                            <m:e>
+                              <m:sSub>
+                                <m:sSubPr>
+                                  <m:ctrlPr>
+                                    <a:rPr lang="en-US" sz="3200" i="1"/>
+                                  </m:ctrlPr>
+                                </m:sSubPr>
+                                <m:e>
+                                  <m:r>
+                                    <a:rPr lang="en-US" sz="3200" i="1"/>
+                                    <m:t>𝑉</m:t>
+                                  </m:r>
+                                  <m:r>
+                                    <a:rPr lang="en-US" sz="3200" i="1"/>
+                                    <m:t>−</m:t>
+                                  </m:r>
+                                  <m:r>
+                                    <a:rPr lang="en-US" sz="3200" i="1"/>
+                                    <m:t>𝑉</m:t>
+                                  </m:r>
+                                </m:e>
+                                <m:sub>
+                                  <m:r>
+                                    <a:rPr lang="en-US" sz="3200" i="1"/>
+                                    <m:t>𝑘</m:t>
+                                  </m:r>
+                                </m:sub>
+                              </m:sSub>
+                            </m:e>
+                          </m:d>
+                        </m:e>
+                        <m:sub>
+                          <m:r>
+                            <a:rPr lang="en-US" sz="3200" i="1"/>
+                            <m:t>𝐹</m:t>
+                          </m:r>
+                        </m:sub>
+                        <m:sup>
+                          <m:r>
+                            <a:rPr lang="en-US" sz="3200" i="1"/>
+                            <m:t>2</m:t>
+                          </m:r>
+                        </m:sup>
+                      </m:sSubSup>
+                      <m:r>
+                        <a:rPr lang="en-US" sz="3200" i="1"/>
+                        <m:t> +</m:t>
+                      </m:r>
+                      <m:r>
+                        <a:rPr lang="en-US" sz="3200" i="1"/>
+                        <m:t>𝜆</m:t>
+                      </m:r>
+                      <m:d>
+                        <m:dPr>
+                          <m:begChr m:val="‖"/>
+                          <m:endChr m:val="‖"/>
+                          <m:ctrlPr>
+                            <a:rPr lang="en-US" sz="3200" i="1"/>
+                          </m:ctrlPr>
+                        </m:dPr>
+                        <m:e>
+                          <m:r>
+                            <a:rPr lang="en-US" sz="3200" i="1"/>
+                            <m:t>𝑉</m:t>
+                          </m:r>
+                        </m:e>
+                      </m:d>
+                    </m:oMath>
+                  </m:oMathPara>
+                </a14:m>
+                <a:endParaRPr lang="en-US" sz="3200" dirty="0"/>
+              </a:p>
+              <a:p>
+                <a:pPr algn="l" rtl="0"/>
+                <a:r>
+                  <a:rPr lang="en-US" sz="3200" dirty="0" smtClean="0"/>
+                  <a:t/>
+                </a:r>
+                <a:br>
+                  <a:rPr lang="en-US" sz="3200" dirty="0" smtClean="0"/>
+                </a:br>
+                <a:r>
+                  <a:rPr lang="en-US" sz="3200" dirty="0" smtClean="0"/>
+                  <a:t>and </a:t>
+                </a:r>
+                <a:r>
+                  <a:rPr lang="en-US" sz="3200" dirty="0"/>
+                  <a:t>set </a:t>
+                </a:r>
+                <a14:m>
+                  <m:oMath xmlns:m="http://schemas.openxmlformats.org/officeDocument/2006/math">
+                    <m:sSup>
+                      <m:sSupPr>
+                        <m:ctrlPr>
+                          <a:rPr lang="en-US" sz="3200" i="1"/>
+                        </m:ctrlPr>
+                      </m:sSupPr>
+                      <m:e>
+                        <m:r>
+                          <a:rPr lang="en-US" sz="3200" i="1"/>
+                          <m:t>𝑊</m:t>
+                        </m:r>
+                      </m:e>
+                      <m:sup>
+                        <m:r>
+                          <a:rPr lang="en-US" sz="3200" i="1"/>
+                          <m:t>𝑛𝑒𝑤</m:t>
+                        </m:r>
+                      </m:sup>
+                    </m:sSup>
+                    <m:r>
+                      <a:rPr lang="en-US" sz="3200" i="1"/>
+                      <m:t>=</m:t>
+                    </m:r>
+                    <m:r>
+                      <a:rPr lang="en-US" sz="3200" i="1"/>
+                      <m:t>𝑊</m:t>
+                    </m:r>
+                    <m:r>
+                      <a:rPr lang="en-US" sz="3200" i="1"/>
+                      <m:t>+</m:t>
+                    </m:r>
+                    <m:sSubSup>
+                      <m:sSubSupPr>
+                        <m:ctrlPr>
+                          <a:rPr lang="en-US" sz="3200" i="1"/>
+                        </m:ctrlPr>
+                      </m:sSubSupPr>
+                      <m:e>
+                        <m:r>
+                          <a:rPr lang="en-US" sz="3200" i="1"/>
+                          <m:t>𝑉</m:t>
+                        </m:r>
+                      </m:e>
+                      <m:sub>
+                        <m:r>
+                          <a:rPr lang="en-US" sz="3200" i="1"/>
+                          <m:t>𝑘</m:t>
+                        </m:r>
+                      </m:sub>
+                      <m:sup>
+                        <m:r>
+                          <a:rPr lang="en-US" sz="3200" i="1"/>
+                          <m:t>𝑛𝑒𝑤</m:t>
+                        </m:r>
+                      </m:sup>
+                    </m:sSubSup>
+                    <m:r>
+                      <a:rPr lang="en-US" sz="3200" i="1"/>
+                      <m:t>−</m:t>
+                    </m:r>
+                    <m:sSub>
+                      <m:sSubPr>
+                        <m:ctrlPr>
+                          <a:rPr lang="en-US" sz="3200" i="1"/>
+                        </m:ctrlPr>
+                      </m:sSubPr>
+                      <m:e>
+                        <m:r>
+                          <a:rPr lang="en-US" sz="3200" i="1"/>
+                          <m:t>𝑉</m:t>
+                        </m:r>
+                      </m:e>
+                      <m:sub>
+                        <m:r>
+                          <a:rPr lang="en-US" sz="3200" i="1"/>
+                          <m:t>𝑘</m:t>
+                        </m:r>
+                      </m:sub>
+                    </m:sSub>
+                  </m:oMath>
+                </a14:m>
+                <a:r>
+                  <a:rPr lang="en-US" sz="3200" dirty="0"/>
+                  <a:t>, where </a:t>
+                </a:r>
+                <a14:m>
+                  <m:oMath xmlns:m="http://schemas.openxmlformats.org/officeDocument/2006/math">
+                    <m:r>
+                      <a:rPr lang="en-US" sz="3200" i="1"/>
+                      <m:t>𝜃</m:t>
+                    </m:r>
+                  </m:oMath>
+                </a14:m>
+                <a:r>
+                  <a:rPr lang="en-US" sz="3200" dirty="0"/>
+                  <a:t> corresponds to the step size of the proximal update.</a:t>
+                </a:r>
+              </a:p>
+              <a:p>
+                <a:pPr algn="l" rtl="0"/>
+                <a:endParaRPr lang="en-US" sz="3200" dirty="0" smtClean="0"/>
+              </a:p>
+            </p:txBody>
+          </p:sp>
+        </mc:Choice>
+        <mc:Fallback>
+          <p:sp>
+            <p:nvSpPr>
+              <p:cNvPr id="75" name="Rectangle 74"/>
+              <p:cNvSpPr>
+                <a:spLocks noRot="1" noChangeAspect="1" noMove="1" noResize="1" noEditPoints="1" noAdjustHandles="1" noChangeArrowheads="1" noChangeShapeType="1" noTextEdit="1"/>
+              </p:cNvSpPr>
+              <p:nvPr/>
+            </p:nvSpPr>
+            <p:spPr>
+              <a:xfrm>
+                <a:off x="22034748" y="12269646"/>
+                <a:ext cx="8334741" cy="12182937"/>
+              </a:xfrm>
+              <a:prstGeom prst="rect">
+                <a:avLst/>
+              </a:prstGeom>
+              <a:blipFill rotWithShape="0">
+                <a:blip r:embed="rId23"/>
+                <a:stretch>
+                  <a:fillRect l="-1683" t="-601" r="-366"/>
+                </a:stretch>
+              </a:blipFill>
+            </p:spPr>
+            <p:txBody>
+              <a:bodyPr/>
+              <a:lstStyle/>
+              <a:p>
+                <a:r>
+                  <a:rPr lang="en-US">
+                    <a:noFill/>
+                  </a:rPr>
+                  <a:t> </a:t>
+                </a:r>
+              </a:p>
+            </p:txBody>
+          </p:sp>
+        </mc:Fallback>
+      </mc:AlternateContent>
+      <p:pic>
+        <p:nvPicPr>
+          <p:cNvPr id="9" name="Picture 8"/>
+          <p:cNvPicPr>
+            <a:picLocks noChangeAspect="1"/>
+          </p:cNvPicPr>
+          <p:nvPr/>
+        </p:nvPicPr>
+        <p:blipFill>
+          <a:blip r:embed="rId24"/>
+          <a:stretch>
+            <a:fillRect/>
+          </a:stretch>
+        </p:blipFill>
+        <p:spPr>
+          <a:xfrm>
+            <a:off x="22122838" y="27435273"/>
+            <a:ext cx="8696885" cy="1326930"/>
+          </a:xfrm>
+          <a:prstGeom prst="rect">
+            <a:avLst/>
+          </a:prstGeom>
+        </p:spPr>
+      </p:pic>
+      <p:pic>
+        <p:nvPicPr>
+          <p:cNvPr id="13" name="Picture 12"/>
+          <p:cNvPicPr>
+            <a:picLocks noChangeAspect="1"/>
+          </p:cNvPicPr>
+          <p:nvPr/>
+        </p:nvPicPr>
+        <p:blipFill rotWithShape="1">
+          <a:blip r:embed="rId25"/>
+          <a:srcRect r="4094"/>
+          <a:stretch/>
+        </p:blipFill>
+        <p:spPr>
+          <a:xfrm>
+            <a:off x="22034749" y="28815981"/>
+            <a:ext cx="8784974" cy="1913091"/>
+          </a:xfrm>
+          <a:prstGeom prst="rect">
+            <a:avLst/>
+          </a:prstGeom>
         </p:spPr>
       </p:pic>
     </p:spTree>

</xml_diff>

<commit_message>
0 version of completed poster
</commit_message>
<xml_diff>
--- a/COMET_poster.pptx
+++ b/COMET_poster.pptx
@@ -4746,56 +4746,6 @@
       </p:sp>
       <p:sp>
         <p:nvSpPr>
-          <p:cNvPr id="6" name="Rectangle 5"/>
-          <p:cNvSpPr>
-            <a:spLocks noChangeArrowheads="1"/>
-          </p:cNvSpPr>
-          <p:nvPr/>
-        </p:nvSpPr>
-        <p:spPr bwMode="auto">
-          <a:xfrm>
-            <a:off x="4252242" y="-37567"/>
-            <a:ext cx="34700925" cy="3078545"/>
-          </a:xfrm>
-          <a:prstGeom prst="rect">
-            <a:avLst/>
-          </a:prstGeom>
-          <a:noFill/>
-          <a:ln w="9525">
-            <a:noFill/>
-            <a:miter lim="800000"/>
-            <a:headEnd/>
-            <a:tailEnd/>
-          </a:ln>
-          <a:effectLst/>
-        </p:spPr>
-        <p:txBody>
-          <a:bodyPr wrap="square" lIns="76973" tIns="38486" rIns="76973" bIns="38486" anchor="ctr">
-            <a:spAutoFit/>
-          </a:bodyPr>
-          <a:lstStyle/>
-          <a:p>
-            <a:pPr algn="ctr" rtl="0"/>
-            <a:r>
-              <a:rPr lang="en-US" b="1" dirty="0" smtClean="0"/>
-              <a:t>Learning</a:t>
-            </a:r>
-            <a:r>
-              <a:rPr lang="en-US" sz="11000" b="1" dirty="0" smtClean="0"/>
-              <a:t> Sparse Metrics</a:t>
-            </a:r>
-          </a:p>
-          <a:p>
-            <a:pPr algn="ctr" rtl="0"/>
-            <a:r>
-              <a:rPr lang="en-US" b="1" dirty="0" smtClean="0"/>
-              <a:t>One Feature at a Time - COMET</a:t>
-            </a:r>
-          </a:p>
-        </p:txBody>
-      </p:sp>
-      <p:sp>
-        <p:nvSpPr>
           <p:cNvPr id="7" name="Text Box 5"/>
           <p:cNvSpPr txBox="1">
             <a:spLocks noChangeArrowheads="1"/>
@@ -6561,7 +6511,7 @@
         <p:spPr>
           <a:xfrm>
             <a:off x="30963739" y="28299369"/>
-            <a:ext cx="11449272" cy="3770263"/>
+            <a:ext cx="11449272" cy="1554272"/>
           </a:xfrm>
           <a:prstGeom prst="rect">
             <a:avLst/>
@@ -6578,139 +6528,6 @@
             <a:endParaRPr lang="en-US" sz="900" dirty="0" smtClean="0"/>
           </a:p>
           <a:p>
-            <a:pPr marL="997140" indent="-457200" algn="l" rtl="0">
-              <a:buAutoNum type="arabicPeriod"/>
-            </a:pPr>
-            <a:r>
-              <a:rPr lang="en-US" sz="2400" dirty="0" err="1" smtClean="0"/>
-              <a:t>Hawrylycz</a:t>
-            </a:r>
-            <a:r>
-              <a:rPr lang="en-US" sz="2400" dirty="0" smtClean="0"/>
-              <a:t> et al., An </a:t>
-            </a:r>
-            <a:r>
-              <a:rPr lang="en-US" sz="2400" dirty="0"/>
-              <a:t>anatomically comprehensive atlas of the adult human </a:t>
-            </a:r>
-            <a:r>
-              <a:rPr lang="en-US" sz="2400" dirty="0" smtClean="0"/>
-              <a:t>brain transcriptome, </a:t>
-            </a:r>
-            <a:r>
-              <a:rPr lang="en-US" sz="2400" i="1" dirty="0" smtClean="0"/>
-              <a:t>Nature </a:t>
-            </a:r>
-            <a:r>
-              <a:rPr lang="en-US" sz="2400" dirty="0" smtClean="0"/>
-              <a:t>2012</a:t>
-            </a:r>
-          </a:p>
-          <a:p>
-            <a:pPr marL="997140" indent="-457200" algn="l" rtl="0">
-              <a:buAutoNum type="arabicPeriod"/>
-            </a:pPr>
-            <a:r>
-              <a:rPr lang="en-US" sz="2400" dirty="0" smtClean="0"/>
-              <a:t>Kang et al., </a:t>
-            </a:r>
-            <a:r>
-              <a:rPr lang="en-US" sz="2400" dirty="0" err="1" smtClean="0"/>
-              <a:t>Spatio</a:t>
-            </a:r>
-            <a:r>
-              <a:rPr lang="en-US" sz="2400" dirty="0" smtClean="0"/>
-              <a:t>-temporal </a:t>
-            </a:r>
-            <a:r>
-              <a:rPr lang="en-US" sz="2400" dirty="0"/>
-              <a:t>transcriptome of the human </a:t>
-            </a:r>
-            <a:r>
-              <a:rPr lang="en-US" sz="2400" dirty="0" smtClean="0"/>
-              <a:t>brain, </a:t>
-            </a:r>
-            <a:r>
-              <a:rPr lang="en-US" sz="2400" i="1" dirty="0" smtClean="0"/>
-              <a:t>Nature</a:t>
-            </a:r>
-            <a:r>
-              <a:rPr lang="en-US" sz="2400" dirty="0" smtClean="0"/>
-              <a:t> 2011</a:t>
-            </a:r>
-          </a:p>
-          <a:p>
-            <a:pPr marL="997140" indent="-457200" algn="l" rtl="0">
-              <a:buAutoNum type="arabicPeriod"/>
-            </a:pPr>
-            <a:r>
-              <a:rPr lang="en-US" sz="2400" dirty="0" err="1" smtClean="0"/>
-              <a:t>Cahoy</a:t>
-            </a:r>
-            <a:r>
-              <a:rPr lang="en-US" sz="2400" dirty="0" smtClean="0"/>
-              <a:t> et al., A </a:t>
-            </a:r>
-            <a:r>
-              <a:rPr lang="en-US" sz="2400" dirty="0"/>
-              <a:t>transcriptome database for astrocytes, neurons, and </a:t>
-            </a:r>
-            <a:r>
-              <a:rPr lang="en-US" sz="2400" dirty="0" err="1" smtClean="0"/>
-              <a:t>oligodendrocytes</a:t>
-            </a:r>
-            <a:r>
-              <a:rPr lang="en-US" sz="2400" dirty="0" smtClean="0"/>
-              <a:t>, </a:t>
-            </a:r>
-            <a:r>
-              <a:rPr lang="en-US" sz="2400" i="1" dirty="0" smtClean="0"/>
-              <a:t>J. neuroscience </a:t>
-            </a:r>
-            <a:r>
-              <a:rPr lang="en-US" sz="2400" dirty="0" smtClean="0"/>
-              <a:t> 2008.</a:t>
-            </a:r>
-          </a:p>
-          <a:p>
-            <a:pPr marL="997140" indent="-457200" algn="l" rtl="0">
-              <a:buAutoNum type="arabicPeriod"/>
-            </a:pPr>
-            <a:r>
-              <a:rPr lang="en-US" sz="2400" dirty="0" smtClean="0"/>
-              <a:t>Eisenberg et al., Human </a:t>
-            </a:r>
-            <a:r>
-              <a:rPr lang="en-US" sz="2400" dirty="0"/>
-              <a:t>housekeeping genes are </a:t>
-            </a:r>
-            <a:r>
-              <a:rPr lang="en-US" sz="2400" dirty="0" smtClean="0"/>
-              <a:t>compact, </a:t>
-            </a:r>
-            <a:r>
-              <a:rPr lang="en-US" sz="2400" i="1" dirty="0" smtClean="0"/>
-              <a:t>Trends </a:t>
-            </a:r>
-            <a:r>
-              <a:rPr lang="en-US" sz="2400" i="1" dirty="0"/>
-              <a:t>in </a:t>
-            </a:r>
-            <a:r>
-              <a:rPr lang="en-US" sz="2400" i="1" dirty="0" smtClean="0"/>
-              <a:t>genetics</a:t>
-            </a:r>
-            <a:r>
-              <a:rPr lang="en-US" sz="2400" dirty="0" smtClean="0"/>
-              <a:t>. </a:t>
-            </a:r>
-            <a:r>
-              <a:rPr lang="en-US" sz="2400" dirty="0"/>
-              <a:t>2003</a:t>
-            </a:r>
-            <a:endParaRPr lang="en-US" sz="2400" dirty="0" smtClean="0"/>
-          </a:p>
-          <a:p>
             <a:pPr marL="539940" indent="-539940" algn="l" rtl="0">
               <a:buFont typeface="+mj-lt"/>
               <a:buAutoNum type="arabicPeriod"/>
@@ -6721,10 +6538,14 @@
             <a:pPr marL="539940" indent="-539940" algn="l" rtl="0"/>
             <a:r>
               <a:rPr lang="en-US" sz="3600" b="1" dirty="0" smtClean="0"/>
-              <a:t>	Contact</a:t>
-            </a:r>
-            <a:r>
-              <a:rPr lang="en-US" sz="3600" dirty="0" smtClean="0"/>
+              <a:t>	</a:t>
+            </a:r>
+            <a:r>
+              <a:rPr lang="en-US" sz="3600" b="1" smtClean="0"/>
+              <a:t>Contact and code</a:t>
+            </a:r>
+            <a:r>
+              <a:rPr lang="en-US" sz="3600" smtClean="0"/>
               <a:t>: </a:t>
             </a:r>
             <a:r>
@@ -10872,6 +10693,615 @@
           </a:p>
         </p:txBody>
       </p:sp>
+      <p:pic>
+        <p:nvPicPr>
+          <p:cNvPr id="1026" name="Picture 2" descr="http://chechiklab.biu.ac.il/~yuvval/figs/comet/V_features_vs_infogain.png"/>
+          <p:cNvPicPr>
+            <a:picLocks noChangeAspect="1" noChangeArrowheads="1"/>
+          </p:cNvPicPr>
+          <p:nvPr/>
+        </p:nvPicPr>
+        <p:blipFill rotWithShape="1">
+          <a:blip r:embed="rId24">
+            <a:extLst>
+              <a:ext uri="{28A0092B-C50C-407E-A947-70E740481C1C}">
+                <a14:useLocalDpi xmlns:a14="http://schemas.microsoft.com/office/drawing/2010/main" val="0"/>
+              </a:ext>
+            </a:extLst>
+          </a:blip>
+          <a:srcRect l="10612" t="10203" r="15050" b="1598"/>
+          <a:stretch/>
+        </p:blipFill>
+        <p:spPr bwMode="auto">
+          <a:xfrm>
+            <a:off x="32278072" y="23788480"/>
+            <a:ext cx="4752528" cy="4228945"/>
+          </a:xfrm>
+          <a:prstGeom prst="rect">
+            <a:avLst/>
+          </a:prstGeom>
+          <a:noFill/>
+          <a:extLst>
+            <a:ext uri="{909E8E84-426E-40DD-AFC4-6F175D3DCCD1}">
+              <a14:hiddenFill xmlns:a14="http://schemas.microsoft.com/office/drawing/2010/main">
+                <a:solidFill>
+                  <a:srgbClr val="FFFFFF"/>
+                </a:solidFill>
+              </a14:hiddenFill>
+            </a:ext>
+          </a:extLst>
+        </p:spPr>
+      </p:pic>
+      <p:sp>
+        <p:nvSpPr>
+          <p:cNvPr id="38" name="Rectangle 37"/>
+          <p:cNvSpPr>
+            <a:spLocks noChangeArrowheads="1"/>
+          </p:cNvSpPr>
+          <p:nvPr/>
+        </p:nvSpPr>
+        <p:spPr bwMode="auto">
+          <a:xfrm>
+            <a:off x="4252237" y="-245193"/>
+            <a:ext cx="34700925" cy="3078545"/>
+          </a:xfrm>
+          <a:prstGeom prst="rect">
+            <a:avLst/>
+          </a:prstGeom>
+          <a:noFill/>
+          <a:ln w="9525">
+            <a:noFill/>
+            <a:miter lim="800000"/>
+            <a:headEnd/>
+            <a:tailEnd/>
+          </a:ln>
+          <a:effectLst/>
+        </p:spPr>
+        <p:txBody>
+          <a:bodyPr wrap="square" lIns="76973" tIns="38486" rIns="76973" bIns="38486" anchor="ctr">
+            <a:spAutoFit/>
+          </a:bodyPr>
+          <a:lstStyle/>
+          <a:p>
+            <a:pPr algn="ctr" rtl="0"/>
+            <a:r>
+              <a:rPr lang="en-US" b="1" dirty="0" smtClean="0"/>
+              <a:t>Learning</a:t>
+            </a:r>
+            <a:r>
+              <a:rPr lang="en-US" sz="11000" b="1" dirty="0" smtClean="0"/>
+              <a:t> Sparse Metrics</a:t>
+            </a:r>
+          </a:p>
+          <a:p>
+            <a:pPr algn="ctr" rtl="0"/>
+            <a:r>
+              <a:rPr lang="en-US" b="1" dirty="0" smtClean="0"/>
+              <a:t>One Feature at a Time - COMET</a:t>
+            </a:r>
+          </a:p>
+        </p:txBody>
+      </p:sp>
+      <mc:AlternateContent xmlns:mc="http://schemas.openxmlformats.org/markup-compatibility/2006">
+        <mc:Choice xmlns:a14="http://schemas.microsoft.com/office/drawing/2010/main" Requires="a14">
+          <p:sp>
+            <p:nvSpPr>
+              <p:cNvPr id="39" name="Text Box 115"/>
+              <p:cNvSpPr txBox="1">
+                <a:spLocks noChangeArrowheads="1"/>
+              </p:cNvSpPr>
+              <p:nvPr/>
+            </p:nvSpPr>
+            <p:spPr bwMode="auto">
+              <a:xfrm>
+                <a:off x="37498100" y="23912883"/>
+                <a:ext cx="4369549" cy="1079399"/>
+              </a:xfrm>
+              <a:prstGeom prst="rect">
+                <a:avLst/>
+              </a:prstGeom>
+              <a:solidFill>
+                <a:srgbClr val="FFFFFF"/>
+              </a:solidFill>
+              <a:ln>
+                <a:noFill/>
+              </a:ln>
+              <a:effectLst/>
+              <a:extLst>
+                <a:ext uri="{91240B29-F687-4F45-9708-019B960494DF}">
+                  <a14:hiddenLine w="9525">
+                    <a:solidFill>
+                      <a:srgbClr val="000000"/>
+                    </a:solidFill>
+                    <a:round/>
+                    <a:headEnd/>
+                    <a:tailEnd/>
+                  </a14:hiddenLine>
+                </a:ext>
+                <a:ext uri="{AF507438-7753-43E0-B8FC-AC1667EBCBE1}">
+                  <a14:hiddenEffects>
+                    <a:effectLst>
+                      <a:outerShdw dist="35921" dir="2700000" algn="ctr" rotWithShape="0">
+                        <a:srgbClr val="808080"/>
+                      </a:outerShdw>
+                    </a:effectLst>
+                  </a14:hiddenEffects>
+                </a:ext>
+              </a:extLst>
+            </p:spPr>
+            <p:txBody>
+              <a:bodyPr wrap="square" lIns="90000" tIns="46800" rIns="90000" bIns="46800">
+                <a:spAutoFit/>
+              </a:bodyPr>
+              <a:lstStyle>
+                <a:lvl1pPr>
+                  <a:tabLst>
+                    <a:tab pos="0" algn="l"/>
+                    <a:tab pos="457200" algn="l"/>
+                    <a:tab pos="914400" algn="l"/>
+                    <a:tab pos="1371600" algn="l"/>
+                    <a:tab pos="1828800" algn="l"/>
+                    <a:tab pos="2286000" algn="l"/>
+                    <a:tab pos="2743200" algn="l"/>
+                    <a:tab pos="3200400" algn="l"/>
+                    <a:tab pos="3657600" algn="l"/>
+                    <a:tab pos="4114800" algn="l"/>
+                    <a:tab pos="4572000" algn="l"/>
+                    <a:tab pos="5029200" algn="l"/>
+                    <a:tab pos="5486400" algn="l"/>
+                    <a:tab pos="5943600" algn="l"/>
+                    <a:tab pos="6400800" algn="l"/>
+                    <a:tab pos="6858000" algn="l"/>
+                    <a:tab pos="7315200" algn="l"/>
+                    <a:tab pos="7772400" algn="l"/>
+                    <a:tab pos="8229600" algn="l"/>
+                    <a:tab pos="8686800" algn="l"/>
+                    <a:tab pos="9144000" algn="l"/>
+                    <a:tab pos="9410700" algn="l"/>
+                  </a:tabLst>
+                  <a:defRPr>
+                    <a:solidFill>
+                      <a:srgbClr val="000000"/>
+                    </a:solidFill>
+                    <a:latin typeface="Arial" panose="020B0604020202020204" pitchFamily="34" charset="0"/>
+                    <a:cs typeface="Arial" panose="020B0604020202020204" pitchFamily="34" charset="0"/>
+                  </a:defRPr>
+                </a:lvl1pPr>
+                <a:lvl2pPr>
+                  <a:tabLst>
+                    <a:tab pos="0" algn="l"/>
+                    <a:tab pos="457200" algn="l"/>
+                    <a:tab pos="914400" algn="l"/>
+                    <a:tab pos="1371600" algn="l"/>
+                    <a:tab pos="1828800" algn="l"/>
+                    <a:tab pos="2286000" algn="l"/>
+                    <a:tab pos="2743200" algn="l"/>
+                    <a:tab pos="3200400" algn="l"/>
+                    <a:tab pos="3657600" algn="l"/>
+                    <a:tab pos="4114800" algn="l"/>
+                    <a:tab pos="4572000" algn="l"/>
+                    <a:tab pos="5029200" algn="l"/>
+                    <a:tab pos="5486400" algn="l"/>
+                    <a:tab pos="5943600" algn="l"/>
+                    <a:tab pos="6400800" algn="l"/>
+                    <a:tab pos="6858000" algn="l"/>
+                    <a:tab pos="7315200" algn="l"/>
+                    <a:tab pos="7772400" algn="l"/>
+                    <a:tab pos="8229600" algn="l"/>
+                    <a:tab pos="8686800" algn="l"/>
+                    <a:tab pos="9144000" algn="l"/>
+                    <a:tab pos="9410700" algn="l"/>
+                  </a:tabLst>
+                  <a:defRPr>
+                    <a:solidFill>
+                      <a:srgbClr val="000000"/>
+                    </a:solidFill>
+                    <a:latin typeface="Arial" panose="020B0604020202020204" pitchFamily="34" charset="0"/>
+                    <a:cs typeface="Arial" panose="020B0604020202020204" pitchFamily="34" charset="0"/>
+                  </a:defRPr>
+                </a:lvl2pPr>
+                <a:lvl3pPr>
+                  <a:tabLst>
+                    <a:tab pos="0" algn="l"/>
+                    <a:tab pos="457200" algn="l"/>
+                    <a:tab pos="914400" algn="l"/>
+                    <a:tab pos="1371600" algn="l"/>
+                    <a:tab pos="1828800" algn="l"/>
+                    <a:tab pos="2286000" algn="l"/>
+                    <a:tab pos="2743200" algn="l"/>
+                    <a:tab pos="3200400" algn="l"/>
+                    <a:tab pos="3657600" algn="l"/>
+                    <a:tab pos="4114800" algn="l"/>
+                    <a:tab pos="4572000" algn="l"/>
+                    <a:tab pos="5029200" algn="l"/>
+                    <a:tab pos="5486400" algn="l"/>
+                    <a:tab pos="5943600" algn="l"/>
+                    <a:tab pos="6400800" algn="l"/>
+                    <a:tab pos="6858000" algn="l"/>
+                    <a:tab pos="7315200" algn="l"/>
+                    <a:tab pos="7772400" algn="l"/>
+                    <a:tab pos="8229600" algn="l"/>
+                    <a:tab pos="8686800" algn="l"/>
+                    <a:tab pos="9144000" algn="l"/>
+                    <a:tab pos="9410700" algn="l"/>
+                  </a:tabLst>
+                  <a:defRPr>
+                    <a:solidFill>
+                      <a:srgbClr val="000000"/>
+                    </a:solidFill>
+                    <a:latin typeface="Arial" panose="020B0604020202020204" pitchFamily="34" charset="0"/>
+                    <a:cs typeface="Arial" panose="020B0604020202020204" pitchFamily="34" charset="0"/>
+                  </a:defRPr>
+                </a:lvl3pPr>
+                <a:lvl4pPr>
+                  <a:tabLst>
+                    <a:tab pos="0" algn="l"/>
+                    <a:tab pos="457200" algn="l"/>
+                    <a:tab pos="914400" algn="l"/>
+                    <a:tab pos="1371600" algn="l"/>
+                    <a:tab pos="1828800" algn="l"/>
+                    <a:tab pos="2286000" algn="l"/>
+                    <a:tab pos="2743200" algn="l"/>
+                    <a:tab pos="3200400" algn="l"/>
+                    <a:tab pos="3657600" algn="l"/>
+                    <a:tab pos="4114800" algn="l"/>
+                    <a:tab pos="4572000" algn="l"/>
+                    <a:tab pos="5029200" algn="l"/>
+                    <a:tab pos="5486400" algn="l"/>
+                    <a:tab pos="5943600" algn="l"/>
+                    <a:tab pos="6400800" algn="l"/>
+                    <a:tab pos="6858000" algn="l"/>
+                    <a:tab pos="7315200" algn="l"/>
+                    <a:tab pos="7772400" algn="l"/>
+                    <a:tab pos="8229600" algn="l"/>
+                    <a:tab pos="8686800" algn="l"/>
+                    <a:tab pos="9144000" algn="l"/>
+                    <a:tab pos="9410700" algn="l"/>
+                  </a:tabLst>
+                  <a:defRPr>
+                    <a:solidFill>
+                      <a:srgbClr val="000000"/>
+                    </a:solidFill>
+                    <a:latin typeface="Arial" panose="020B0604020202020204" pitchFamily="34" charset="0"/>
+                    <a:cs typeface="Arial" panose="020B0604020202020204" pitchFamily="34" charset="0"/>
+                  </a:defRPr>
+                </a:lvl4pPr>
+                <a:lvl5pPr>
+                  <a:tabLst>
+                    <a:tab pos="0" algn="l"/>
+                    <a:tab pos="457200" algn="l"/>
+                    <a:tab pos="914400" algn="l"/>
+                    <a:tab pos="1371600" algn="l"/>
+                    <a:tab pos="1828800" algn="l"/>
+                    <a:tab pos="2286000" algn="l"/>
+                    <a:tab pos="2743200" algn="l"/>
+                    <a:tab pos="3200400" algn="l"/>
+                    <a:tab pos="3657600" algn="l"/>
+                    <a:tab pos="4114800" algn="l"/>
+                    <a:tab pos="4572000" algn="l"/>
+                    <a:tab pos="5029200" algn="l"/>
+                    <a:tab pos="5486400" algn="l"/>
+                    <a:tab pos="5943600" algn="l"/>
+                    <a:tab pos="6400800" algn="l"/>
+                    <a:tab pos="6858000" algn="l"/>
+                    <a:tab pos="7315200" algn="l"/>
+                    <a:tab pos="7772400" algn="l"/>
+                    <a:tab pos="8229600" algn="l"/>
+                    <a:tab pos="8686800" algn="l"/>
+                    <a:tab pos="9144000" algn="l"/>
+                    <a:tab pos="9410700" algn="l"/>
+                  </a:tabLst>
+                  <a:defRPr>
+                    <a:solidFill>
+                      <a:srgbClr val="000000"/>
+                    </a:solidFill>
+                    <a:latin typeface="Arial" panose="020B0604020202020204" pitchFamily="34" charset="0"/>
+                    <a:cs typeface="Arial" panose="020B0604020202020204" pitchFamily="34" charset="0"/>
+                  </a:defRPr>
+                </a:lvl5pPr>
+                <a:lvl6pPr defTabSz="457200" fontAlgn="base">
+                  <a:spcBef>
+                    <a:spcPct val="0"/>
+                  </a:spcBef>
+                  <a:spcAft>
+                    <a:spcPct val="0"/>
+                  </a:spcAft>
+                  <a:buClr>
+                    <a:srgbClr val="000000"/>
+                  </a:buClr>
+                  <a:buSzPct val="100000"/>
+                  <a:buFont typeface="Arial" panose="020B0604020202020204" pitchFamily="34" charset="0"/>
+                  <a:tabLst>
+                    <a:tab pos="0" algn="l"/>
+                    <a:tab pos="457200" algn="l"/>
+                    <a:tab pos="914400" algn="l"/>
+                    <a:tab pos="1371600" algn="l"/>
+                    <a:tab pos="1828800" algn="l"/>
+                    <a:tab pos="2286000" algn="l"/>
+                    <a:tab pos="2743200" algn="l"/>
+                    <a:tab pos="3200400" algn="l"/>
+                    <a:tab pos="3657600" algn="l"/>
+                    <a:tab pos="4114800" algn="l"/>
+                    <a:tab pos="4572000" algn="l"/>
+                    <a:tab pos="5029200" algn="l"/>
+                    <a:tab pos="5486400" algn="l"/>
+                    <a:tab pos="5943600" algn="l"/>
+                    <a:tab pos="6400800" algn="l"/>
+                    <a:tab pos="6858000" algn="l"/>
+                    <a:tab pos="7315200" algn="l"/>
+                    <a:tab pos="7772400" algn="l"/>
+                    <a:tab pos="8229600" algn="l"/>
+                    <a:tab pos="8686800" algn="l"/>
+                    <a:tab pos="9144000" algn="l"/>
+                    <a:tab pos="9410700" algn="l"/>
+                  </a:tabLst>
+                  <a:defRPr>
+                    <a:solidFill>
+                      <a:srgbClr val="000000"/>
+                    </a:solidFill>
+                    <a:latin typeface="Arial" panose="020B0604020202020204" pitchFamily="34" charset="0"/>
+                    <a:cs typeface="Arial" panose="020B0604020202020204" pitchFamily="34" charset="0"/>
+                  </a:defRPr>
+                </a:lvl6pPr>
+                <a:lvl7pPr defTabSz="457200" fontAlgn="base">
+                  <a:spcBef>
+                    <a:spcPct val="0"/>
+                  </a:spcBef>
+                  <a:spcAft>
+                    <a:spcPct val="0"/>
+                  </a:spcAft>
+                  <a:buClr>
+                    <a:srgbClr val="000000"/>
+                  </a:buClr>
+                  <a:buSzPct val="100000"/>
+                  <a:buFont typeface="Arial" panose="020B0604020202020204" pitchFamily="34" charset="0"/>
+                  <a:tabLst>
+                    <a:tab pos="0" algn="l"/>
+                    <a:tab pos="457200" algn="l"/>
+                    <a:tab pos="914400" algn="l"/>
+                    <a:tab pos="1371600" algn="l"/>
+                    <a:tab pos="1828800" algn="l"/>
+                    <a:tab pos="2286000" algn="l"/>
+                    <a:tab pos="2743200" algn="l"/>
+                    <a:tab pos="3200400" algn="l"/>
+                    <a:tab pos="3657600" algn="l"/>
+                    <a:tab pos="4114800" algn="l"/>
+                    <a:tab pos="4572000" algn="l"/>
+                    <a:tab pos="5029200" algn="l"/>
+                    <a:tab pos="5486400" algn="l"/>
+                    <a:tab pos="5943600" algn="l"/>
+                    <a:tab pos="6400800" algn="l"/>
+                    <a:tab pos="6858000" algn="l"/>
+                    <a:tab pos="7315200" algn="l"/>
+                    <a:tab pos="7772400" algn="l"/>
+                    <a:tab pos="8229600" algn="l"/>
+                    <a:tab pos="8686800" algn="l"/>
+                    <a:tab pos="9144000" algn="l"/>
+                    <a:tab pos="9410700" algn="l"/>
+                  </a:tabLst>
+                  <a:defRPr>
+                    <a:solidFill>
+                      <a:srgbClr val="000000"/>
+                    </a:solidFill>
+                    <a:latin typeface="Arial" panose="020B0604020202020204" pitchFamily="34" charset="0"/>
+                    <a:cs typeface="Arial" panose="020B0604020202020204" pitchFamily="34" charset="0"/>
+                  </a:defRPr>
+                </a:lvl7pPr>
+                <a:lvl8pPr defTabSz="457200" fontAlgn="base">
+                  <a:spcBef>
+                    <a:spcPct val="0"/>
+                  </a:spcBef>
+                  <a:spcAft>
+                    <a:spcPct val="0"/>
+                  </a:spcAft>
+                  <a:buClr>
+                    <a:srgbClr val="000000"/>
+                  </a:buClr>
+                  <a:buSzPct val="100000"/>
+                  <a:buFont typeface="Arial" panose="020B0604020202020204" pitchFamily="34" charset="0"/>
+                  <a:tabLst>
+                    <a:tab pos="0" algn="l"/>
+                    <a:tab pos="457200" algn="l"/>
+                    <a:tab pos="914400" algn="l"/>
+                    <a:tab pos="1371600" algn="l"/>
+                    <a:tab pos="1828800" algn="l"/>
+                    <a:tab pos="2286000" algn="l"/>
+                    <a:tab pos="2743200" algn="l"/>
+                    <a:tab pos="3200400" algn="l"/>
+                    <a:tab pos="3657600" algn="l"/>
+                    <a:tab pos="4114800" algn="l"/>
+                    <a:tab pos="4572000" algn="l"/>
+                    <a:tab pos="5029200" algn="l"/>
+                    <a:tab pos="5486400" algn="l"/>
+                    <a:tab pos="5943600" algn="l"/>
+                    <a:tab pos="6400800" algn="l"/>
+                    <a:tab pos="6858000" algn="l"/>
+                    <a:tab pos="7315200" algn="l"/>
+                    <a:tab pos="7772400" algn="l"/>
+                    <a:tab pos="8229600" algn="l"/>
+                    <a:tab pos="8686800" algn="l"/>
+                    <a:tab pos="9144000" algn="l"/>
+                    <a:tab pos="9410700" algn="l"/>
+                  </a:tabLst>
+                  <a:defRPr>
+                    <a:solidFill>
+                      <a:srgbClr val="000000"/>
+                    </a:solidFill>
+                    <a:latin typeface="Arial" panose="020B0604020202020204" pitchFamily="34" charset="0"/>
+                    <a:cs typeface="Arial" panose="020B0604020202020204" pitchFamily="34" charset="0"/>
+                  </a:defRPr>
+                </a:lvl8pPr>
+                <a:lvl9pPr defTabSz="457200" fontAlgn="base">
+                  <a:spcBef>
+                    <a:spcPct val="0"/>
+                  </a:spcBef>
+                  <a:spcAft>
+                    <a:spcPct val="0"/>
+                  </a:spcAft>
+                  <a:buClr>
+                    <a:srgbClr val="000000"/>
+                  </a:buClr>
+                  <a:buSzPct val="100000"/>
+                  <a:buFont typeface="Arial" panose="020B0604020202020204" pitchFamily="34" charset="0"/>
+                  <a:tabLst>
+                    <a:tab pos="0" algn="l"/>
+                    <a:tab pos="457200" algn="l"/>
+                    <a:tab pos="914400" algn="l"/>
+                    <a:tab pos="1371600" algn="l"/>
+                    <a:tab pos="1828800" algn="l"/>
+                    <a:tab pos="2286000" algn="l"/>
+                    <a:tab pos="2743200" algn="l"/>
+                    <a:tab pos="3200400" algn="l"/>
+                    <a:tab pos="3657600" algn="l"/>
+                    <a:tab pos="4114800" algn="l"/>
+                    <a:tab pos="4572000" algn="l"/>
+                    <a:tab pos="5029200" algn="l"/>
+                    <a:tab pos="5486400" algn="l"/>
+                    <a:tab pos="5943600" algn="l"/>
+                    <a:tab pos="6400800" algn="l"/>
+                    <a:tab pos="6858000" algn="l"/>
+                    <a:tab pos="7315200" algn="l"/>
+                    <a:tab pos="7772400" algn="l"/>
+                    <a:tab pos="8229600" algn="l"/>
+                    <a:tab pos="8686800" algn="l"/>
+                    <a:tab pos="9144000" algn="l"/>
+                    <a:tab pos="9410700" algn="l"/>
+                  </a:tabLst>
+                  <a:defRPr>
+                    <a:solidFill>
+                      <a:srgbClr val="000000"/>
+                    </a:solidFill>
+                    <a:latin typeface="Arial" panose="020B0604020202020204" pitchFamily="34" charset="0"/>
+                    <a:cs typeface="Arial" panose="020B0604020202020204" pitchFamily="34" charset="0"/>
+                  </a:defRPr>
+                </a:lvl9pPr>
+              </a:lstStyle>
+              <a:p>
+                <a:pPr algn="l" rtl="0">
+                  <a:spcBef>
+                    <a:spcPts val="750"/>
+                  </a:spcBef>
+                </a:pPr>
+                <a:r>
+                  <a:rPr lang="en-US" sz="1600" dirty="0" err="1" smtClean="0"/>
+                  <a:t>Frob</a:t>
+                </a:r>
+                <a:r>
+                  <a:rPr lang="en-US" sz="1600" dirty="0" smtClean="0"/>
+                  <a:t>. </a:t>
+                </a:r>
+                <a:r>
+                  <a:rPr lang="en-US" sz="1600" dirty="0"/>
+                  <a:t>norm of the groups </a:t>
+                </a:r>
+                <a14:m>
+                  <m:oMath xmlns:m="http://schemas.openxmlformats.org/officeDocument/2006/math">
+                    <m:sSub>
+                      <m:sSubPr>
+                        <m:ctrlPr>
+                          <a:rPr lang="en-US" sz="1600" i="1"/>
+                        </m:ctrlPr>
+                      </m:sSubPr>
+                      <m:e>
+                        <m:r>
+                          <a:rPr lang="en-US" sz="1600" i="1"/>
+                          <m:t>𝑉</m:t>
+                        </m:r>
+                      </m:e>
+                      <m:sub>
+                        <m:r>
+                          <a:rPr lang="en-US" sz="1600" i="1"/>
+                          <m:t>𝑘</m:t>
+                        </m:r>
+                      </m:sub>
+                    </m:sSub>
+                  </m:oMath>
+                </a14:m>
+                <a:r>
+                  <a:rPr lang="en-US" sz="1600" dirty="0"/>
+                  <a:t> against the information gain of feature </a:t>
+                </a:r>
+                <a14:m>
+                  <m:oMath xmlns:m="http://schemas.openxmlformats.org/officeDocument/2006/math">
+                    <m:r>
+                      <a:rPr lang="en-US" sz="1600" i="1"/>
+                      <m:t>𝑘</m:t>
+                    </m:r>
+                  </m:oMath>
+                </a14:m>
+                <a:r>
+                  <a:rPr lang="en-US" sz="1600" dirty="0"/>
+                  <a:t>. Sparse COMET assigns zero weights to less-informative features.</a:t>
+                </a:r>
+                <a:endParaRPr lang="en-AU" altLang="en-US" sz="1600" dirty="0"/>
+              </a:p>
+            </p:txBody>
+          </p:sp>
+        </mc:Choice>
+        <mc:Fallback>
+          <p:sp>
+            <p:nvSpPr>
+              <p:cNvPr id="39" name="Text Box 115"/>
+              <p:cNvSpPr txBox="1">
+                <a:spLocks noRot="1" noChangeAspect="1" noMove="1" noResize="1" noEditPoints="1" noAdjustHandles="1" noChangeArrowheads="1" noChangeShapeType="1" noTextEdit="1"/>
+              </p:cNvSpPr>
+              <p:nvPr/>
+            </p:nvSpPr>
+            <p:spPr bwMode="auto">
+              <a:xfrm>
+                <a:off x="37498100" y="23912883"/>
+                <a:ext cx="4369549" cy="1079399"/>
+              </a:xfrm>
+              <a:prstGeom prst="rect">
+                <a:avLst/>
+              </a:prstGeom>
+              <a:blipFill rotWithShape="0">
+                <a:blip r:embed="rId25"/>
+                <a:stretch>
+                  <a:fillRect l="-697" t="-1695" b="-6215"/>
+                </a:stretch>
+              </a:blipFill>
+              <a:ln>
+                <a:noFill/>
+              </a:ln>
+              <a:effectLst/>
+              <a:extLst>
+                <a:ext uri="{91240B29-F687-4F45-9708-019B960494DF}">
+                  <a14:hiddenLine xmlns:a14="http://schemas.microsoft.com/office/drawing/2010/main" w="9525">
+                    <a:solidFill>
+                      <a:srgbClr val="000000"/>
+                    </a:solidFill>
+                    <a:round/>
+                    <a:headEnd/>
+                    <a:tailEnd/>
+                  </a14:hiddenLine>
+                </a:ext>
+                <a:ext uri="{AF507438-7753-43E0-B8FC-AC1667EBCBE1}">
+                  <a14:hiddenEffects xmlns:a14="http://schemas.microsoft.com/office/drawing/2010/main">
+                    <a:effectLst>
+                      <a:outerShdw dist="35921" dir="2700000" algn="ctr" rotWithShape="0">
+                        <a:srgbClr val="808080"/>
+                      </a:outerShdw>
+                    </a:effectLst>
+                  </a14:hiddenEffects>
+                </a:ext>
+              </a:extLst>
+            </p:spPr>
+            <p:txBody>
+              <a:bodyPr/>
+              <a:lstStyle/>
+              <a:p>
+                <a:r>
+                  <a:rPr lang="en-US">
+                    <a:noFill/>
+                  </a:rPr>
+                  <a:t> </a:t>
+                </a:r>
+              </a:p>
+            </p:txBody>
+          </p:sp>
+        </mc:Fallback>
+      </mc:AlternateContent>
     </p:spTree>
   </p:cSld>
   <p:clrMapOvr>

</xml_diff>

<commit_message>
midway increase experiments to fill free spaces
</commit_message>
<xml_diff>
--- a/COMET_poster.pptx
+++ b/COMET_poster.pptx
@@ -215,7 +215,7 @@
             <a:fld id="{198A3463-10AA-40C1-AF51-9D4D3C36B945}" type="datetimeFigureOut">
               <a:rPr lang="he-IL" smtClean="0"/>
               <a:pPr/>
-              <a:t>ט"ו/כסלו/תשע"ו</a:t>
+              <a:t>י"ח/כסלו/תשע"ו</a:t>
             </a:fld>
             <a:endParaRPr lang="he-IL"/>
           </a:p>
@@ -760,7 +760,7 @@
             <a:fld id="{A6DEEEEF-6AFF-4F2F-80C9-19C8578E8C6D}" type="datetimeFigureOut">
               <a:rPr lang="he-IL" smtClean="0"/>
               <a:pPr/>
-              <a:t>ט"ו/כסלו/תשע"ו</a:t>
+              <a:t>י"ח/כסלו/תשע"ו</a:t>
             </a:fld>
             <a:endParaRPr lang="he-IL"/>
           </a:p>
@@ -927,7 +927,7 @@
             <a:fld id="{A6DEEEEF-6AFF-4F2F-80C9-19C8578E8C6D}" type="datetimeFigureOut">
               <a:rPr lang="he-IL" smtClean="0"/>
               <a:pPr/>
-              <a:t>ט"ו/כסלו/תשע"ו</a:t>
+              <a:t>י"ח/כסלו/תשע"ו</a:t>
             </a:fld>
             <a:endParaRPr lang="he-IL"/>
           </a:p>
@@ -1104,7 +1104,7 @@
             <a:fld id="{A6DEEEEF-6AFF-4F2F-80C9-19C8578E8C6D}" type="datetimeFigureOut">
               <a:rPr lang="he-IL" smtClean="0"/>
               <a:pPr/>
-              <a:t>ט"ו/כסלו/תשע"ו</a:t>
+              <a:t>י"ח/כסלו/תשע"ו</a:t>
             </a:fld>
             <a:endParaRPr lang="he-IL"/>
           </a:p>
@@ -1271,7 +1271,7 @@
             <a:fld id="{A6DEEEEF-6AFF-4F2F-80C9-19C8578E8C6D}" type="datetimeFigureOut">
               <a:rPr lang="he-IL" smtClean="0"/>
               <a:pPr/>
-              <a:t>ט"ו/כסלו/תשע"ו</a:t>
+              <a:t>י"ח/כסלו/תשע"ו</a:t>
             </a:fld>
             <a:endParaRPr lang="he-IL"/>
           </a:p>
@@ -1514,7 +1514,7 @@
             <a:fld id="{A6DEEEEF-6AFF-4F2F-80C9-19C8578E8C6D}" type="datetimeFigureOut">
               <a:rPr lang="he-IL" smtClean="0"/>
               <a:pPr/>
-              <a:t>ט"ו/כסלו/תשע"ו</a:t>
+              <a:t>י"ח/כסלו/תשע"ו</a:t>
             </a:fld>
             <a:endParaRPr lang="he-IL"/>
           </a:p>
@@ -1799,7 +1799,7 @@
             <a:fld id="{A6DEEEEF-6AFF-4F2F-80C9-19C8578E8C6D}" type="datetimeFigureOut">
               <a:rPr lang="he-IL" smtClean="0"/>
               <a:pPr/>
-              <a:t>ט"ו/כסלו/תשע"ו</a:t>
+              <a:t>י"ח/כסלו/תשע"ו</a:t>
             </a:fld>
             <a:endParaRPr lang="he-IL"/>
           </a:p>
@@ -2223,7 +2223,7 @@
             <a:fld id="{A6DEEEEF-6AFF-4F2F-80C9-19C8578E8C6D}" type="datetimeFigureOut">
               <a:rPr lang="he-IL" smtClean="0"/>
               <a:pPr/>
-              <a:t>ט"ו/כסלו/תשע"ו</a:t>
+              <a:t>י"ח/כסלו/תשע"ו</a:t>
             </a:fld>
             <a:endParaRPr lang="he-IL"/>
           </a:p>
@@ -2338,7 +2338,7 @@
             <a:fld id="{A6DEEEEF-6AFF-4F2F-80C9-19C8578E8C6D}" type="datetimeFigureOut">
               <a:rPr lang="he-IL" smtClean="0"/>
               <a:pPr/>
-              <a:t>ט"ו/כסלו/תשע"ו</a:t>
+              <a:t>י"ח/כסלו/תשע"ו</a:t>
             </a:fld>
             <a:endParaRPr lang="he-IL"/>
           </a:p>
@@ -2430,7 +2430,7 @@
             <a:fld id="{A6DEEEEF-6AFF-4F2F-80C9-19C8578E8C6D}" type="datetimeFigureOut">
               <a:rPr lang="he-IL" smtClean="0"/>
               <a:pPr/>
-              <a:t>ט"ו/כסלו/תשע"ו</a:t>
+              <a:t>י"ח/כסלו/תשע"ו</a:t>
             </a:fld>
             <a:endParaRPr lang="he-IL"/>
           </a:p>
@@ -2704,7 +2704,7 @@
             <a:fld id="{A6DEEEEF-6AFF-4F2F-80C9-19C8578E8C6D}" type="datetimeFigureOut">
               <a:rPr lang="he-IL" smtClean="0"/>
               <a:pPr/>
-              <a:t>ט"ו/כסלו/תשע"ו</a:t>
+              <a:t>י"ח/כסלו/תשע"ו</a:t>
             </a:fld>
             <a:endParaRPr lang="he-IL"/>
           </a:p>
@@ -2954,7 +2954,7 @@
             <a:fld id="{A6DEEEEF-6AFF-4F2F-80C9-19C8578E8C6D}" type="datetimeFigureOut">
               <a:rPr lang="he-IL" smtClean="0"/>
               <a:pPr/>
-              <a:t>ט"ו/כסלו/תשע"ו</a:t>
+              <a:t>י"ח/כסלו/תשע"ו</a:t>
             </a:fld>
             <a:endParaRPr lang="he-IL"/>
           </a:p>
@@ -3167,7 +3167,7 @@
             <a:fld id="{A6DEEEEF-6AFF-4F2F-80C9-19C8578E8C6D}" type="datetimeFigureOut">
               <a:rPr lang="he-IL" smtClean="0"/>
               <a:pPr/>
-              <a:t>ט"ו/כסלו/תשע"ו</a:t>
+              <a:t>י"ח/כסלו/תשע"ו</a:t>
             </a:fld>
             <a:endParaRPr lang="he-IL"/>
           </a:p>
@@ -3540,158 +3540,66 @@
       </p:grpSpPr>
       <p:sp>
         <p:nvSpPr>
-          <p:cNvPr id="7" name="Text Box 5"/>
-          <p:cNvSpPr txBox="1">
-            <a:spLocks noChangeArrowheads="1"/>
-          </p:cNvSpPr>
+          <p:cNvPr id="60" name="Rounded Rectangle 59"/>
+          <p:cNvSpPr/>
           <p:nvPr/>
         </p:nvSpPr>
-        <p:spPr bwMode="auto">
+        <p:spPr>
           <a:xfrm>
-            <a:off x="8554618" y="2880545"/>
-            <a:ext cx="26096173" cy="1447329"/>
+            <a:off x="32281619" y="4968774"/>
+            <a:ext cx="9714936" cy="18488564"/>
           </a:xfrm>
-          <a:prstGeom prst="rect">
+          <a:prstGeom prst="roundRect">
             <a:avLst/>
           </a:prstGeom>
-          <a:noFill/>
-          <a:ln w="9525">
-            <a:noFill/>
-            <a:miter lim="800000"/>
-            <a:headEnd/>
-            <a:tailEnd/>
+          <a:solidFill>
+            <a:schemeClr val="bg1"/>
+          </a:solidFill>
+          <a:ln w="76200">
+            <a:solidFill>
+              <a:schemeClr val="tx1"/>
+            </a:solidFill>
           </a:ln>
-          <a:effectLst/>
         </p:spPr>
+        <p:style>
+          <a:lnRef idx="2">
+            <a:schemeClr val="accent1">
+              <a:shade val="50000"/>
+            </a:schemeClr>
+          </a:lnRef>
+          <a:fillRef idx="1">
+            <a:schemeClr val="accent1"/>
+          </a:fillRef>
+          <a:effectRef idx="0">
+            <a:schemeClr val="accent1"/>
+          </a:effectRef>
+          <a:fontRef idx="minor">
+            <a:schemeClr val="lt1"/>
+          </a:fontRef>
+        </p:style>
         <p:txBody>
-          <a:bodyPr wrap="square" lIns="76973" tIns="38486" rIns="76973" bIns="38486">
-            <a:spAutoFit/>
-          </a:bodyPr>
+          <a:bodyPr lIns="83976" tIns="41987" rIns="83976" bIns="41987" rtlCol="1" anchor="t"/>
           <a:lstStyle/>
           <a:p>
-            <a:pPr algn="ctr"/>
-            <a:r>
-              <a:rPr lang="en-US" sz="5100" dirty="0" smtClean="0">
-                <a:latin typeface="Arial" pitchFamily="34" charset="0"/>
-                <a:cs typeface="+mj-cs"/>
-              </a:rPr>
-              <a:t>Yuval </a:t>
-            </a:r>
-            <a:r>
-              <a:rPr lang="en-US" sz="5100" dirty="0" err="1" smtClean="0">
-                <a:latin typeface="Arial" pitchFamily="34" charset="0"/>
-                <a:cs typeface="+mj-cs"/>
-              </a:rPr>
-              <a:t>Atzmon</a:t>
-            </a:r>
-            <a:r>
-              <a:rPr lang="en-US" sz="5400" baseline="30000" dirty="0"/>
-              <a:t> 1</a:t>
-            </a:r>
-            <a:r>
-              <a:rPr lang="en-US" sz="5100" dirty="0" smtClean="0">
-                <a:latin typeface="Arial" pitchFamily="34" charset="0"/>
-                <a:cs typeface="+mj-cs"/>
-              </a:rPr>
-              <a:t>, Uri </a:t>
-            </a:r>
-            <a:r>
-              <a:rPr lang="en-US" sz="5100" dirty="0" err="1" smtClean="0">
-                <a:latin typeface="Arial" pitchFamily="34" charset="0"/>
-                <a:cs typeface="+mj-cs"/>
-              </a:rPr>
-              <a:t>Shalit</a:t>
-            </a:r>
-            <a:r>
-              <a:rPr lang="en-US" sz="5400" baseline="30000" dirty="0"/>
-              <a:t> </a:t>
-            </a:r>
-            <a:r>
-              <a:rPr lang="en-US" sz="5400" baseline="30000" dirty="0" smtClean="0"/>
-              <a:t>2</a:t>
-            </a:r>
-            <a:r>
-              <a:rPr lang="en-US" sz="5100" dirty="0" smtClean="0">
-                <a:latin typeface="Arial" pitchFamily="34" charset="0"/>
-                <a:cs typeface="Arial" pitchFamily="34" charset="0"/>
-              </a:rPr>
-              <a:t>, Gal </a:t>
-            </a:r>
-            <a:r>
-              <a:rPr lang="en-US" sz="5100" dirty="0" err="1" smtClean="0">
-                <a:latin typeface="Arial" pitchFamily="34" charset="0"/>
-                <a:cs typeface="Arial" pitchFamily="34" charset="0"/>
-              </a:rPr>
-              <a:t>Chechik</a:t>
-            </a:r>
-            <a:r>
-              <a:rPr lang="en-US" sz="5400" baseline="30000" dirty="0"/>
-              <a:t> </a:t>
-            </a:r>
-            <a:r>
-              <a:rPr lang="en-US" sz="5400" baseline="30000" dirty="0" smtClean="0"/>
-              <a:t>1,3</a:t>
-            </a:r>
-            <a:endParaRPr lang="en-US" sz="5100" baseline="30000" dirty="0">
-              <a:latin typeface="Arial" pitchFamily="34" charset="0"/>
-              <a:cs typeface="Arial" pitchFamily="34" charset="0"/>
+            <a:pPr lvl="0" algn="ctr" rtl="0"/>
+            <a:endParaRPr lang="en-US" sz="4300" dirty="0">
+              <a:solidFill>
+                <a:prstClr val="black"/>
+              </a:solidFill>
             </a:endParaRPr>
-          </a:p>
-          <a:p>
-            <a:pPr algn="ctr" rtl="0"/>
-            <a:r>
-              <a:rPr lang="en-US" sz="4000" baseline="30000" dirty="0"/>
-              <a:t>1 </a:t>
-            </a:r>
-            <a:r>
-              <a:rPr lang="en-US" sz="3800" b="1" dirty="0" err="1" smtClean="0"/>
-              <a:t>Gonda</a:t>
-            </a:r>
-            <a:r>
-              <a:rPr lang="en-US" sz="3800" b="1" dirty="0" smtClean="0"/>
-              <a:t> </a:t>
-            </a:r>
-            <a:r>
-              <a:rPr lang="en-US" sz="3800" b="1" dirty="0"/>
-              <a:t>Multidisciplinary Brain Research Center, Bar-</a:t>
-            </a:r>
-            <a:r>
-              <a:rPr lang="en-US" sz="3800" b="1" dirty="0" err="1"/>
-              <a:t>Ilan</a:t>
-            </a:r>
-            <a:r>
-              <a:rPr lang="en-US" sz="3800" b="1" dirty="0"/>
-              <a:t> University, </a:t>
-            </a:r>
-            <a:r>
-              <a:rPr lang="en-US" sz="4000" baseline="30000" dirty="0" smtClean="0"/>
-              <a:t>2 </a:t>
-            </a:r>
-            <a:r>
-              <a:rPr lang="en-US" sz="3800" b="1" dirty="0" smtClean="0"/>
-              <a:t>NYU, </a:t>
-            </a:r>
-            <a:r>
-              <a:rPr lang="en-US" sz="4000" baseline="30000" dirty="0" smtClean="0"/>
-              <a:t>3 </a:t>
-            </a:r>
-            <a:r>
-              <a:rPr lang="en-US" sz="3800" b="1" dirty="0" smtClean="0"/>
-              <a:t>Google CA</a:t>
-            </a:r>
           </a:p>
         </p:txBody>
       </p:sp>
       <p:sp>
         <p:nvSpPr>
-          <p:cNvPr id="191" name="Rounded Rectangle 190"/>
+          <p:cNvPr id="48" name="Rounded Rectangle 47"/>
           <p:cNvSpPr/>
           <p:nvPr/>
         </p:nvSpPr>
         <p:spPr>
           <a:xfrm>
-            <a:off x="32403900" y="4968776"/>
-            <a:ext cx="9787674" cy="9371630"/>
+            <a:off x="22034747" y="13756312"/>
+            <a:ext cx="9721080" cy="18058273"/>
           </a:xfrm>
           <a:prstGeom prst="roundRect">
             <a:avLst/>
@@ -3725,14 +3633,155 @@
           <a:bodyPr lIns="83976" tIns="41987" rIns="83976" bIns="41987" rtlCol="1" anchor="t" anchorCtr="0"/>
           <a:lstStyle/>
           <a:p>
-            <a:pPr marL="539940" indent="-539940" algn="ctr" rtl="0"/>
-            <a:r>
-              <a:rPr lang="en-US" sz="4400" b="1" dirty="0" smtClean="0">
-                <a:solidFill>
-                  <a:schemeClr val="tx1"/>
-                </a:solidFill>
+            <a:pPr algn="ctr" rtl="0"/>
+            <a:endParaRPr lang="en-US" sz="3200" dirty="0" smtClean="0">
+              <a:solidFill>
+                <a:schemeClr val="tx1"/>
+              </a:solidFill>
+            </a:endParaRPr>
+          </a:p>
+        </p:txBody>
+      </p:sp>
+      <p:sp>
+        <p:nvSpPr>
+          <p:cNvPr id="7" name="Text Box 5"/>
+          <p:cNvSpPr txBox="1">
+            <a:spLocks noChangeArrowheads="1"/>
+          </p:cNvSpPr>
+          <p:nvPr/>
+        </p:nvSpPr>
+        <p:spPr bwMode="auto">
+          <a:xfrm>
+            <a:off x="8554618" y="2880545"/>
+            <a:ext cx="26096173" cy="1447329"/>
+          </a:xfrm>
+          <a:prstGeom prst="rect">
+            <a:avLst/>
+          </a:prstGeom>
+          <a:noFill/>
+          <a:ln w="9525">
+            <a:noFill/>
+            <a:miter lim="800000"/>
+            <a:headEnd/>
+            <a:tailEnd/>
+          </a:ln>
+          <a:effectLst/>
+        </p:spPr>
+        <p:txBody>
+          <a:bodyPr wrap="square" lIns="76973" tIns="38486" rIns="76973" bIns="38486">
+            <a:spAutoFit/>
+          </a:bodyPr>
+          <a:lstStyle/>
+          <a:p>
+            <a:pPr algn="ctr"/>
+            <a:r>
+              <a:rPr lang="en-US" sz="5100" dirty="0" smtClean="0">
+                <a:latin typeface="Arial" pitchFamily="34" charset="0"/>
+                <a:cs typeface="+mj-cs"/>
               </a:rPr>
-              <a:t>	</a:t>
+              <a:t>Yuval </a:t>
+            </a:r>
+            <a:r>
+              <a:rPr lang="en-US" sz="5100" dirty="0" err="1" smtClean="0">
+                <a:latin typeface="Arial" pitchFamily="34" charset="0"/>
+                <a:cs typeface="+mj-cs"/>
+              </a:rPr>
+              <a:t>Atzmon</a:t>
+            </a:r>
+            <a:r>
+              <a:rPr lang="en-US" sz="5400" baseline="30000" dirty="0"/>
+              <a:t> 1</a:t>
+            </a:r>
+            <a:r>
+              <a:rPr lang="en-US" sz="5100" dirty="0" smtClean="0">
+                <a:latin typeface="Arial" pitchFamily="34" charset="0"/>
+                <a:cs typeface="+mj-cs"/>
+              </a:rPr>
+              <a:t>, Uri </a:t>
+            </a:r>
+            <a:r>
+              <a:rPr lang="en-US" sz="5100" dirty="0" err="1" smtClean="0">
+                <a:latin typeface="Arial" pitchFamily="34" charset="0"/>
+                <a:cs typeface="+mj-cs"/>
+              </a:rPr>
+              <a:t>Shalit</a:t>
+            </a:r>
+            <a:r>
+              <a:rPr lang="en-US" sz="5400" baseline="30000" dirty="0"/>
+              <a:t> </a:t>
+            </a:r>
+            <a:r>
+              <a:rPr lang="en-US" sz="5400" baseline="30000" dirty="0" smtClean="0"/>
+              <a:t>2</a:t>
+            </a:r>
+            <a:r>
+              <a:rPr lang="en-US" sz="5100" dirty="0" smtClean="0">
+                <a:latin typeface="Arial" pitchFamily="34" charset="0"/>
+                <a:cs typeface="Arial" pitchFamily="34" charset="0"/>
+              </a:rPr>
+              <a:t>, Gal </a:t>
+            </a:r>
+            <a:r>
+              <a:rPr lang="en-US" sz="5100" dirty="0" err="1" smtClean="0">
+                <a:latin typeface="Arial" pitchFamily="34" charset="0"/>
+                <a:cs typeface="Arial" pitchFamily="34" charset="0"/>
+              </a:rPr>
+              <a:t>Chechik</a:t>
+            </a:r>
+            <a:r>
+              <a:rPr lang="en-US" sz="5400" baseline="30000" dirty="0"/>
+              <a:t> </a:t>
+            </a:r>
+            <a:r>
+              <a:rPr lang="en-US" sz="5400" baseline="30000" dirty="0" smtClean="0"/>
+              <a:t>1,3</a:t>
+            </a:r>
+            <a:endParaRPr lang="en-US" sz="5100" baseline="30000" dirty="0">
+              <a:latin typeface="Arial" pitchFamily="34" charset="0"/>
+              <a:cs typeface="Arial" pitchFamily="34" charset="0"/>
+            </a:endParaRPr>
+          </a:p>
+          <a:p>
+            <a:pPr algn="ctr" rtl="0"/>
+            <a:r>
+              <a:rPr lang="en-US" sz="4000" baseline="30000" dirty="0"/>
+              <a:t>1 </a:t>
+            </a:r>
+            <a:r>
+              <a:rPr lang="en-US" sz="3800" b="1" dirty="0" err="1" smtClean="0"/>
+              <a:t>Gonda</a:t>
+            </a:r>
+            <a:r>
+              <a:rPr lang="en-US" sz="3800" b="1" dirty="0" smtClean="0"/>
+              <a:t> </a:t>
+            </a:r>
+            <a:r>
+              <a:rPr lang="en-US" sz="3800" b="1" dirty="0"/>
+              <a:t>Multidisciplinary Brain Research Center, Bar-</a:t>
+            </a:r>
+            <a:r>
+              <a:rPr lang="en-US" sz="3800" b="1" dirty="0" err="1"/>
+              <a:t>Ilan</a:t>
+            </a:r>
+            <a:r>
+              <a:rPr lang="en-US" sz="3800" b="1" dirty="0"/>
+              <a:t> University, </a:t>
+            </a:r>
+            <a:r>
+              <a:rPr lang="en-US" sz="4000" baseline="30000" dirty="0" smtClean="0"/>
+              <a:t>2 </a:t>
+            </a:r>
+            <a:r>
+              <a:rPr lang="en-US" sz="3800" b="1" dirty="0" smtClean="0"/>
+              <a:t>NYU, </a:t>
+            </a:r>
+            <a:r>
+              <a:rPr lang="en-US" sz="4000" baseline="30000" dirty="0" smtClean="0"/>
+              <a:t>3 </a:t>
+            </a:r>
+            <a:r>
+              <a:rPr lang="en-US" sz="3800" b="1" dirty="0" smtClean="0"/>
+              <a:t>Google CA</a:t>
             </a:r>
           </a:p>
         </p:txBody>
@@ -3841,8 +3890,8 @@
         </p:nvSpPr>
         <p:spPr>
           <a:xfrm>
-            <a:off x="32475908" y="24776901"/>
-            <a:ext cx="9715665" cy="5826723"/>
+            <a:off x="32281620" y="24098239"/>
+            <a:ext cx="9714935" cy="6505386"/>
           </a:xfrm>
           <a:prstGeom prst="roundRect">
             <a:avLst/>
@@ -3951,58 +4000,6 @@
           </a:p>
         </p:txBody>
       </p:sp>
-      <p:sp>
-        <p:nvSpPr>
-          <p:cNvPr id="66" name="Rounded Rectangle 65"/>
-          <p:cNvSpPr/>
-          <p:nvPr/>
-        </p:nvSpPr>
-        <p:spPr>
-          <a:xfrm>
-            <a:off x="32475907" y="14781717"/>
-            <a:ext cx="9715666" cy="9553873"/>
-          </a:xfrm>
-          <a:prstGeom prst="roundRect">
-            <a:avLst/>
-          </a:prstGeom>
-          <a:solidFill>
-            <a:schemeClr val="bg1"/>
-          </a:solidFill>
-          <a:ln w="76200">
-            <a:solidFill>
-              <a:schemeClr val="tx1"/>
-            </a:solidFill>
-          </a:ln>
-        </p:spPr>
-        <p:style>
-          <a:lnRef idx="2">
-            <a:schemeClr val="accent1">
-              <a:shade val="50000"/>
-            </a:schemeClr>
-          </a:lnRef>
-          <a:fillRef idx="1">
-            <a:schemeClr val="accent1"/>
-          </a:fillRef>
-          <a:effectRef idx="0">
-            <a:schemeClr val="accent1"/>
-          </a:effectRef>
-          <a:fontRef idx="minor">
-            <a:schemeClr val="lt1"/>
-          </a:fontRef>
-        </p:style>
-        <p:txBody>
-          <a:bodyPr lIns="83976" tIns="41987" rIns="83976" bIns="41987" rtlCol="1" anchor="t" anchorCtr="0"/>
-          <a:lstStyle/>
-          <a:p>
-            <a:pPr algn="l" rtl="0"/>
-            <a:endParaRPr lang="en-US" sz="3200" dirty="0" smtClean="0">
-              <a:solidFill>
-                <a:schemeClr val="tx1"/>
-              </a:solidFill>
-            </a:endParaRPr>
-          </a:p>
-        </p:txBody>
-      </p:sp>
       <p:pic>
         <p:nvPicPr>
           <p:cNvPr id="64" name="Picture 120"/>
@@ -4071,45 +4068,6 @@
           </a:extLst>
         </p:spPr>
       </p:pic>
-      <p:pic>
-        <p:nvPicPr>
-          <p:cNvPr id="1034" name="Picture 10" descr="http://chechiklab.biu.ac.il/~yuvval/figs/comet/Precision_at_K_all_datasets.png"/>
-          <p:cNvPicPr>
-            <a:picLocks noChangeAspect="1" noChangeArrowheads="1"/>
-          </p:cNvPicPr>
-          <p:nvPr/>
-        </p:nvPicPr>
-        <p:blipFill rotWithShape="1">
-          <a:blip r:embed="rId8" cstate="print">
-            <a:extLst>
-              <a:ext uri="{28A0092B-C50C-407E-A947-70E740481C1C}">
-                <a14:useLocalDpi xmlns:a14="http://schemas.microsoft.com/office/drawing/2010/main" val="0"/>
-              </a:ext>
-            </a:extLst>
-          </a:blip>
-          <a:srcRect l="6017" t="18639" r="10321" b="14404"/>
-          <a:stretch/>
-        </p:blipFill>
-        <p:spPr bwMode="auto">
-          <a:xfrm>
-            <a:off x="32678705" y="6696969"/>
-            <a:ext cx="9158242" cy="4479815"/>
-          </a:xfrm>
-          <a:prstGeom prst="rect">
-            <a:avLst/>
-          </a:prstGeom>
-          <a:noFill/>
-          <a:extLst>
-            <a:ext uri="{909E8E84-426E-40DD-AFC4-6F175D3DCCD1}">
-              <a14:hiddenFill xmlns:a14="http://schemas.microsoft.com/office/drawing/2010/main">
-                <a:solidFill>
-                  <a:srgbClr val="FFFFFF"/>
-                </a:solidFill>
-              </a14:hiddenFill>
-            </a:ext>
-          </a:extLst>
-        </p:spPr>
-      </p:pic>
       <p:sp>
         <p:nvSpPr>
           <p:cNvPr id="32" name="Text Box 115"/>
@@ -4120,7 +4078,7 @@
         </p:nvSpPr>
         <p:spPr bwMode="auto">
           <a:xfrm>
-            <a:off x="32806662" y="11443248"/>
+            <a:off x="22782220" y="29307481"/>
             <a:ext cx="8973607" cy="2310505"/>
           </a:xfrm>
           <a:prstGeom prst="rect">
@@ -4507,20 +4465,28 @@
               <a:t>metric (baseline)</a:t>
             </a:r>
             <a:r>
-              <a:rPr lang="ar-SA" altLang="en-US" sz="2400" dirty="0"/>
+              <a:rPr lang="ar-SA" altLang="en-US" sz="2400" dirty="0" smtClean="0"/>
               <a:t>‏</a:t>
             </a:r>
             <a:r>
               <a:rPr lang="en-US" altLang="en-US" sz="2400" dirty="0"/>
-              <a:t>.</a:t>
-            </a:r>
-            <a:r>
-              <a:rPr lang="en-AU" altLang="en-US" sz="2400" dirty="0"/>
+              <a:t>,</a:t>
+            </a:r>
+            <a:r>
+              <a:rPr lang="en-AU" altLang="en-US" sz="2400" dirty="0" smtClean="0"/>
               <a:t> </a:t>
             </a:r>
             <a:r>
               <a:rPr lang="en-AU" altLang="en-US" sz="2400" dirty="0" smtClean="0"/>
-              <a:t>HDSL: Similarity Learning for High Dimensional Sparse Data  [Liu et al, 2015], LEGO </a:t>
+              <a:t>HDSL: Similarity Learning for High </a:t>
+            </a:r>
+            <a:r>
+              <a:rPr lang="en-AU" altLang="en-US" sz="2400" dirty="0" smtClean="0"/>
+              <a:t>Dimensional </a:t>
+            </a:r>
+            <a:r>
+              <a:rPr lang="en-AU" altLang="en-US" sz="2400" dirty="0" smtClean="0"/>
+              <a:t>Sparse Data  [Liu et al, 2015], LEGO </a:t>
             </a:r>
             <a:r>
               <a:rPr lang="en-AU" altLang="en-US" sz="2400" dirty="0"/>
@@ -4558,16 +4524,15 @@
           </p:cNvPicPr>
           <p:nvPr/>
         </p:nvPicPr>
-        <p:blipFill>
-          <a:blip r:embed="rId9"/>
-          <a:stretch>
-            <a:fillRect/>
-          </a:stretch>
+        <p:blipFill rotWithShape="1">
+          <a:blip r:embed="rId8"/>
+          <a:srcRect l="50064" r="-1"/>
+          <a:stretch/>
         </p:blipFill>
         <p:spPr>
           <a:xfrm>
-            <a:off x="32806663" y="16701826"/>
-            <a:ext cx="9076078" cy="3609298"/>
+            <a:off x="32950474" y="13758305"/>
+            <a:ext cx="8222714" cy="6548176"/>
           </a:xfrm>
           <a:prstGeom prst="rect">
             <a:avLst/>
@@ -5035,7 +5000,7 @@
           <p:nvPr/>
         </p:nvPicPr>
         <p:blipFill rotWithShape="1">
-          <a:blip r:embed="rId10">
+          <a:blip r:embed="rId9">
             <a:extLst>
               <a:ext uri="{28A0092B-C50C-407E-A947-70E740481C1C}">
                 <a14:useLocalDpi xmlns:a14="http://schemas.microsoft.com/office/drawing/2010/main" val="0"/>
@@ -5047,8 +5012,8 @@
         </p:blipFill>
         <p:spPr bwMode="auto">
           <a:xfrm>
-            <a:off x="33070159" y="25942632"/>
-            <a:ext cx="4752528" cy="4228945"/>
+            <a:off x="32855072" y="25382976"/>
+            <a:ext cx="5381475" cy="4788601"/>
           </a:xfrm>
           <a:prstGeom prst="rect">
             <a:avLst/>
@@ -5125,40 +5090,18 @@
             </p:nvSpPr>
             <p:spPr bwMode="auto">
               <a:xfrm>
-                <a:off x="38290188" y="25821621"/>
+                <a:off x="38596588" y="25228908"/>
                 <a:ext cx="3546760" cy="2782429"/>
               </a:xfrm>
               <a:prstGeom prst="rect">
                 <a:avLst/>
               </a:prstGeom>
-              <a:solidFill>
-                <a:srgbClr val="FFFFFF"/>
-              </a:solidFill>
+              <a:noFill/>
               <a:ln>
                 <a:noFill/>
               </a:ln>
               <a:effectLst/>
-              <a:extLst>
-                <a:ext uri="{91240B29-F687-4F45-9708-019B960494DF}">
-                  <a14:hiddenLine w="9525">
-                    <a:solidFill>
-                      <a:srgbClr val="000000"/>
-                    </a:solidFill>
-                    <a:round/>
-                    <a:headEnd/>
-                    <a:tailEnd/>
-                  </a14:hiddenLine>
-                </a:ext>
-                <a:ext uri="{AF507438-7753-43E0-B8FC-AC1667EBCBE1}">
-                  <a14:hiddenEffects>
-                    <a:effectLst>
-                      <a:outerShdw dist="35921" dir="2700000" algn="ctr" rotWithShape="0">
-                        <a:srgbClr val="808080"/>
-                      </a:outerShdw>
-                    </a:effectLst>
-                  </a14:hiddenEffects>
-                </a:ext>
-              </a:extLst>
+              <a:extLst/>
             </p:spPr>
             <p:txBody>
               <a:bodyPr wrap="square" lIns="90000" tIns="46800" rIns="90000" bIns="46800">
@@ -5592,43 +5535,23 @@
             </p:nvSpPr>
             <p:spPr bwMode="auto">
               <a:xfrm>
-                <a:off x="38290188" y="25821621"/>
+                <a:off x="38596588" y="25228908"/>
                 <a:ext cx="3546760" cy="2782429"/>
               </a:xfrm>
               <a:prstGeom prst="rect">
                 <a:avLst/>
               </a:prstGeom>
               <a:blipFill rotWithShape="0">
-                <a:blip r:embed="rId11"/>
+                <a:blip r:embed="rId10"/>
                 <a:stretch>
-                  <a:fillRect l="-2749" t="-1535" b="-658"/>
+                  <a:fillRect l="-2577" t="-1535" b="-658"/>
                 </a:stretch>
               </a:blipFill>
               <a:ln>
                 <a:noFill/>
               </a:ln>
               <a:effectLst/>
-              <a:extLst>
-                <a:ext uri="{91240B29-F687-4F45-9708-019B960494DF}">
-                  <a14:hiddenLine xmlns:a14="http://schemas.microsoft.com/office/drawing/2010/main" w="9525">
-                    <a:solidFill>
-                      <a:srgbClr val="000000"/>
-                    </a:solidFill>
-                    <a:round/>
-                    <a:headEnd/>
-                    <a:tailEnd/>
-                  </a14:hiddenLine>
-                </a:ext>
-                <a:ext uri="{AF507438-7753-43E0-B8FC-AC1667EBCBE1}">
-                  <a14:hiddenEffects xmlns:a14="http://schemas.microsoft.com/office/drawing/2010/main">
-                    <a:effectLst>
-                      <a:outerShdw dist="35921" dir="2700000" algn="ctr" rotWithShape="0">
-                        <a:srgbClr val="808080"/>
-                      </a:outerShdw>
-                    </a:effectLst>
-                  </a14:hiddenEffects>
-                </a:ext>
-              </a:extLst>
+              <a:extLst/>
             </p:spPr>
             <p:txBody>
               <a:bodyPr/>
@@ -5645,8 +5568,8 @@
           </p:sp>
         </mc:Fallback>
       </mc:AlternateContent>
-      <mc:AlternateContent xmlns:mc="http://schemas.openxmlformats.org/markup-compatibility/2006">
-        <mc:Choice xmlns:a14="http://schemas.microsoft.com/office/drawing/2010/main" Requires="a14">
+      <mc:AlternateContent xmlns:mc="http://schemas.openxmlformats.org/markup-compatibility/2006" xmlns:a14="http://schemas.microsoft.com/office/drawing/2010/main">
+        <mc:Choice Requires="a14">
           <p:sp>
             <p:nvSpPr>
               <p:cNvPr id="129" name="Rounded Rectangle 128"/>
@@ -5699,11 +5622,6 @@
                   </a:rPr>
                   <a:t>The Learning Setup</a:t>
                 </a:r>
-                <a:endParaRPr lang="en-US" sz="4400" b="1" dirty="0" smtClean="0">
-                  <a:solidFill>
-                    <a:schemeClr val="tx1"/>
-                  </a:solidFill>
-                </a:endParaRPr>
               </a:p>
               <a:p>
                 <a:pPr algn="l"/>
@@ -5745,6 +5663,7 @@
                           <a:solidFill>
                             <a:schemeClr val="tx1"/>
                           </a:solidFill>
+                          <a:latin typeface="Cambria Math" panose="02040503050406030204" pitchFamily="18" charset="0"/>
                         </a:rPr>
                         <m:t>𝑠𝑖</m:t>
                       </m:r>
@@ -5755,6 +5674,7 @@
                               <a:solidFill>
                                 <a:schemeClr val="tx1"/>
                               </a:solidFill>
+                              <a:latin typeface="Cambria Math" panose="02040503050406030204" pitchFamily="18" charset="0"/>
                             </a:rPr>
                           </m:ctrlPr>
                         </m:sSubPr>
@@ -5764,6 +5684,7 @@
                               <a:solidFill>
                                 <a:schemeClr val="tx1"/>
                               </a:solidFill>
+                              <a:latin typeface="Cambria Math" panose="02040503050406030204" pitchFamily="18" charset="0"/>
                             </a:rPr>
                             <m:t>𝑚</m:t>
                           </m:r>
@@ -5774,6 +5695,7 @@
                               <a:solidFill>
                                 <a:schemeClr val="tx1"/>
                               </a:solidFill>
+                              <a:latin typeface="Cambria Math" panose="02040503050406030204" pitchFamily="18" charset="0"/>
                             </a:rPr>
                             <m:t>𝑊</m:t>
                           </m:r>
@@ -5786,6 +5708,7 @@
                               <a:solidFill>
                                 <a:schemeClr val="tx1"/>
                               </a:solidFill>
+                              <a:latin typeface="Cambria Math" panose="02040503050406030204" pitchFamily="18" charset="0"/>
                             </a:rPr>
                           </m:ctrlPr>
                         </m:dPr>
@@ -5795,6 +5718,7 @@
                               <a:solidFill>
                                 <a:schemeClr val="tx1"/>
                               </a:solidFill>
+                              <a:latin typeface="Cambria Math" panose="02040503050406030204" pitchFamily="18" charset="0"/>
                             </a:rPr>
                             <m:t>𝑥</m:t>
                           </m:r>
@@ -5803,6 +5727,7 @@
                               <a:solidFill>
                                 <a:schemeClr val="tx1"/>
                               </a:solidFill>
+                              <a:latin typeface="Cambria Math" panose="02040503050406030204" pitchFamily="18" charset="0"/>
                             </a:rPr>
                             <m:t>,</m:t>
                           </m:r>
@@ -5811,6 +5736,7 @@
                               <a:solidFill>
                                 <a:schemeClr val="tx1"/>
                               </a:solidFill>
+                              <a:latin typeface="Cambria Math" panose="02040503050406030204" pitchFamily="18" charset="0"/>
                             </a:rPr>
                             <m:t>𝑦</m:t>
                           </m:r>
@@ -5821,6 +5747,7 @@
                           <a:solidFill>
                             <a:schemeClr val="tx1"/>
                           </a:solidFill>
+                          <a:latin typeface="Cambria Math" panose="02040503050406030204" pitchFamily="18" charset="0"/>
                         </a:rPr>
                         <m:t>=</m:t>
                       </m:r>
@@ -5831,6 +5758,7 @@
                               <a:solidFill>
                                 <a:schemeClr val="tx1"/>
                               </a:solidFill>
+                              <a:latin typeface="Cambria Math" panose="02040503050406030204" pitchFamily="18" charset="0"/>
                             </a:rPr>
                           </m:ctrlPr>
                         </m:sSupPr>
@@ -5840,6 +5768,7 @@
                               <a:solidFill>
                                 <a:schemeClr val="tx1"/>
                               </a:solidFill>
+                              <a:latin typeface="Cambria Math" panose="02040503050406030204" pitchFamily="18" charset="0"/>
                             </a:rPr>
                             <m:t>𝑥</m:t>
                           </m:r>
@@ -5850,6 +5779,7 @@
                               <a:solidFill>
                                 <a:schemeClr val="tx1"/>
                               </a:solidFill>
+                              <a:latin typeface="Cambria Math" panose="02040503050406030204" pitchFamily="18" charset="0"/>
                             </a:rPr>
                             <m:t>𝑇</m:t>
                           </m:r>
@@ -5860,6 +5790,7 @@
                           <a:solidFill>
                             <a:schemeClr val="tx1"/>
                           </a:solidFill>
+                          <a:latin typeface="Cambria Math" panose="02040503050406030204" pitchFamily="18" charset="0"/>
                         </a:rPr>
                         <m:t>𝑊𝑦</m:t>
                       </m:r>
@@ -5868,6 +5799,7 @@
                           <a:solidFill>
                             <a:schemeClr val="tx1"/>
                           </a:solidFill>
+                          <a:latin typeface="Cambria Math" panose="02040503050406030204" pitchFamily="18" charset="0"/>
                         </a:rPr>
                         <m:t>  | </m:t>
                       </m:r>
@@ -5876,6 +5808,7 @@
                           <a:solidFill>
                             <a:schemeClr val="tx1"/>
                           </a:solidFill>
+                          <a:latin typeface="Cambria Math" panose="02040503050406030204" pitchFamily="18" charset="0"/>
                         </a:rPr>
                         <m:t>𝑊</m:t>
                       </m:r>
@@ -5884,6 +5817,7 @@
                           <a:solidFill>
                             <a:schemeClr val="tx1"/>
                           </a:solidFill>
+                          <a:latin typeface="Cambria Math" panose="02040503050406030204" pitchFamily="18" charset="0"/>
                         </a:rPr>
                         <m:t>≻</m:t>
                       </m:r>
@@ -5892,6 +5826,7 @@
                           <a:solidFill>
                             <a:schemeClr val="tx1"/>
                           </a:solidFill>
+                          <a:latin typeface="Cambria Math" panose="02040503050406030204" pitchFamily="18" charset="0"/>
                         </a:rPr>
                         <m:t>0</m:t>
                       </m:r>
@@ -5900,6 +5835,7 @@
                           <a:solidFill>
                             <a:schemeClr val="tx1"/>
                           </a:solidFill>
+                          <a:latin typeface="Cambria Math" panose="02040503050406030204" pitchFamily="18" charset="0"/>
                         </a:rPr>
                         <m:t> (</m:t>
                       </m:r>
@@ -5908,6 +5844,7 @@
                           <a:solidFill>
                             <a:schemeClr val="tx1"/>
                           </a:solidFill>
+                          <a:latin typeface="Cambria Math" panose="02040503050406030204" pitchFamily="18" charset="0"/>
                         </a:rPr>
                         <m:t>𝑊</m:t>
                       </m:r>
@@ -5916,6 +5853,7 @@
                           <a:solidFill>
                             <a:schemeClr val="tx1"/>
                           </a:solidFill>
+                          <a:latin typeface="Cambria Math" panose="02040503050406030204" pitchFamily="18" charset="0"/>
                         </a:rPr>
                         <m:t> </m:t>
                       </m:r>
@@ -5924,6 +5862,7 @@
                           <a:solidFill>
                             <a:schemeClr val="tx1"/>
                           </a:solidFill>
+                          <a:latin typeface="Cambria Math" panose="02040503050406030204" pitchFamily="18" charset="0"/>
                         </a:rPr>
                         <m:t>𝑖𝑠</m:t>
                       </m:r>
@@ -5932,6 +5871,7 @@
                           <a:solidFill>
                             <a:schemeClr val="tx1"/>
                           </a:solidFill>
+                          <a:latin typeface="Cambria Math" panose="02040503050406030204" pitchFamily="18" charset="0"/>
                         </a:rPr>
                         <m:t> </m:t>
                       </m:r>
@@ -5940,6 +5880,7 @@
                           <a:solidFill>
                             <a:schemeClr val="tx1"/>
                           </a:solidFill>
+                          <a:latin typeface="Cambria Math" panose="02040503050406030204" pitchFamily="18" charset="0"/>
                         </a:rPr>
                         <m:t>𝑃𝐷</m:t>
                       </m:r>
@@ -5948,6 +5889,7 @@
                           <a:solidFill>
                             <a:schemeClr val="tx1"/>
                           </a:solidFill>
+                          <a:latin typeface="Cambria Math" panose="02040503050406030204" pitchFamily="18" charset="0"/>
                         </a:rPr>
                         <m:t>)</m:t>
                       </m:r>
@@ -5976,29 +5918,8 @@
                       <a:schemeClr val="tx1"/>
                     </a:solidFill>
                   </a:rPr>
-                  <a:t>Assuming </a:t>
+                  <a:t>Assuming a ranking based weak supervision signal,</a:t>
                 </a:r>
-                <a:r>
-                  <a:rPr lang="en-US" sz="3200" dirty="0" smtClean="0">
-                    <a:solidFill>
-                      <a:schemeClr val="tx1"/>
-                    </a:solidFill>
-                  </a:rPr>
-                  <a:t>a ranking based weak supervision </a:t>
-                </a:r>
-                <a:r>
-                  <a:rPr lang="en-US" sz="3200" dirty="0" smtClean="0">
-                    <a:solidFill>
-                      <a:schemeClr val="tx1"/>
-                    </a:solidFill>
-                  </a:rPr>
-                  <a:t>signal,</a:t>
-                </a:r>
-                <a:endParaRPr lang="en-US" sz="3200" dirty="0" smtClean="0">
-                  <a:solidFill>
-                    <a:schemeClr val="tx1"/>
-                  </a:solidFill>
-                </a:endParaRPr>
               </a:p>
               <a:p>
                 <a:pPr algn="l" rtl="0"/>
@@ -6080,15 +6001,7 @@
                       <a:schemeClr val="tx1"/>
                     </a:solidFill>
                   </a:rPr>
-                  <a:t>such </a:t>
-                </a:r>
-                <a:r>
-                  <a:rPr lang="en-US" sz="3200" dirty="0" smtClean="0">
-                    <a:solidFill>
-                      <a:schemeClr val="tx1"/>
-                    </a:solidFill>
-                  </a:rPr>
-                  <a:t>that per a given triplet </a:t>
+                  <a:t>such that per a given triplet </a:t>
                 </a:r>
                 <a14:m>
                   <m:oMath xmlns:m="http://schemas.openxmlformats.org/officeDocument/2006/math">
@@ -7111,7 +7024,7 @@
             </p:txBody>
           </p:sp>
         </mc:Choice>
-        <mc:Fallback>
+        <mc:Fallback xmlns="">
           <p:sp>
             <p:nvSpPr>
               <p:cNvPr id="129" name="Rounded Rectangle 128"/>
@@ -7155,8 +7068,8 @@
           </p:sp>
         </mc:Fallback>
       </mc:AlternateContent>
-      <mc:AlternateContent xmlns:mc="http://schemas.openxmlformats.org/markup-compatibility/2006">
-        <mc:Choice xmlns:a14="http://schemas.microsoft.com/office/drawing/2010/main" Requires="a14">
+      <mc:AlternateContent xmlns:mc="http://schemas.openxmlformats.org/markup-compatibility/2006" xmlns:a14="http://schemas.microsoft.com/office/drawing/2010/main">
+        <mc:Choice Requires="a14">
           <p:sp>
             <p:nvSpPr>
               <p:cNvPr id="52" name="Text Box 101"/>
@@ -7622,7 +7535,7 @@
             </p:txBody>
           </p:sp>
         </mc:Choice>
-        <mc:Fallback>
+        <mc:Fallback xmlns="">
           <p:sp>
             <p:nvSpPr>
               <p:cNvPr id="52" name="Text Box 101"/>
@@ -7693,8 +7606,8 @@
           </p:sp>
         </mc:Fallback>
       </mc:AlternateContent>
-      <mc:AlternateContent xmlns:mc="http://schemas.openxmlformats.org/markup-compatibility/2006">
-        <mc:Choice xmlns:a14="http://schemas.microsoft.com/office/drawing/2010/main" Requires="a14">
+      <mc:AlternateContent xmlns:mc="http://schemas.openxmlformats.org/markup-compatibility/2006" xmlns:a14="http://schemas.microsoft.com/office/drawing/2010/main">
+        <mc:Choice Requires="a14">
           <p:sp>
             <p:nvSpPr>
               <p:cNvPr id="53" name="Text Box 102"/>
@@ -8181,7 +8094,7 @@
             </p:txBody>
           </p:sp>
         </mc:Choice>
-        <mc:Fallback>
+        <mc:Fallback xmlns="">
           <p:sp>
             <p:nvSpPr>
               <p:cNvPr id="53" name="Text Box 102"/>
@@ -8252,8 +8165,8 @@
           </p:sp>
         </mc:Fallback>
       </mc:AlternateContent>
-      <mc:AlternateContent xmlns:mc="http://schemas.openxmlformats.org/markup-compatibility/2006">
-        <mc:Choice xmlns:a14="http://schemas.microsoft.com/office/drawing/2010/main" Requires="a14">
+      <mc:AlternateContent xmlns:mc="http://schemas.openxmlformats.org/markup-compatibility/2006" xmlns:a14="http://schemas.microsoft.com/office/drawing/2010/main">
+        <mc:Choice Requires="a14">
           <p:sp>
             <p:nvSpPr>
               <p:cNvPr id="54" name="Text Box 103"/>
@@ -8740,7 +8653,7 @@
             </p:txBody>
           </p:sp>
         </mc:Choice>
-        <mc:Fallback>
+        <mc:Fallback xmlns="">
           <p:sp>
             <p:nvSpPr>
               <p:cNvPr id="54" name="Text Box 103"/>
@@ -8978,15 +8891,7 @@
                   <a:schemeClr val="tx1"/>
                 </a:solidFill>
               </a:rPr>
-              <a:t>COMET </a:t>
-            </a:r>
-            <a:r>
-              <a:rPr lang="en-US" sz="4400" b="1" dirty="0" smtClean="0">
-                <a:solidFill>
-                  <a:schemeClr val="tx1"/>
-                </a:solidFill>
-              </a:rPr>
-              <a:t>row-column coordinate step</a:t>
+              <a:t>COMET row-column coordinate step</a:t>
             </a:r>
             <a:endParaRPr lang="en-US" sz="4300" dirty="0">
               <a:solidFill>
@@ -9028,11 +8933,7 @@
             </a:r>
             <a:r>
               <a:rPr lang="en-US" sz="3200" dirty="0" smtClean="0"/>
-              <a:t>time. </a:t>
-            </a:r>
-            <a:r>
-              <a:rPr lang="en-US" sz="3200" dirty="0" smtClean="0"/>
-              <a:t>The </a:t>
+              <a:t>time. The </a:t>
             </a:r>
             <a:r>
               <a:rPr lang="en-US" sz="3200" dirty="0"/>
@@ -9062,8 +8963,8 @@
           </a:p>
         </p:txBody>
       </p:sp>
-      <mc:AlternateContent xmlns:mc="http://schemas.openxmlformats.org/markup-compatibility/2006">
-        <mc:Choice xmlns:a14="http://schemas.microsoft.com/office/drawing/2010/main" Requires="a14">
+      <mc:AlternateContent xmlns:mc="http://schemas.openxmlformats.org/markup-compatibility/2006" xmlns:a14="http://schemas.microsoft.com/office/drawing/2010/main">
+        <mc:Choice Requires="a14">
           <p:sp>
             <p:nvSpPr>
               <p:cNvPr id="76" name="Rectangle 75"/>
@@ -9680,11 +9581,7 @@
                 </a:r>
                 <a:r>
                   <a:rPr lang="en-US" sz="3200" dirty="0" smtClean="0"/>
-                  <a:t>size</a:t>
-                </a:r>
-                <a:r>
-                  <a:rPr lang="en-US" sz="3200" dirty="0" smtClean="0"/>
-                  <a:t>.</a:t>
+                  <a:t>size.</a:t>
                 </a:r>
               </a:p>
               <a:p>
@@ -9824,19 +9721,7 @@
                 </a14:m>
                 <a:r>
                   <a:rPr lang="en-US" sz="3200" dirty="0" smtClean="0"/>
-                  <a:t>to solve the condition, </a:t>
-                </a:r>
-                <a:r>
-                  <a:rPr lang="en-US" sz="3200" dirty="0" smtClean="0"/>
-                  <a:t>a</a:t>
-                </a:r>
-                <a:r>
-                  <a:rPr lang="en-US" sz="3200" dirty="0" smtClean="0"/>
-                  <a:t>lso result with a </a:t>
-                </a:r>
-                <a:r>
-                  <a:rPr lang="en-US" sz="3200" dirty="0" smtClean="0"/>
-                  <a:t>continues embedding </a:t>
+                  <a:t>to solve the condition, also result with a continues embedding </a:t>
                 </a:r>
                 <a14:m>
                   <m:oMath xmlns:m="http://schemas.openxmlformats.org/officeDocument/2006/math">
@@ -9856,18 +9741,14 @@
                 </a14:m>
                 <a:r>
                   <a:rPr lang="en-US" sz="3200" dirty="0" smtClean="0"/>
-                  <a:t>of the features into the metric </a:t>
-                </a:r>
-                <a:r>
-                  <a:rPr lang="en-US" sz="3200" dirty="0" smtClean="0"/>
-                  <a:t>space.</a:t>
+                  <a:t>of the features into the metric space.</a:t>
                 </a:r>
                 <a:endParaRPr lang="en-US" sz="3200" dirty="0"/>
               </a:p>
             </p:txBody>
           </p:sp>
         </mc:Choice>
-        <mc:Fallback>
+        <mc:Fallback xmlns="">
           <p:sp>
             <p:nvSpPr>
               <p:cNvPr id="76" name="Rectangle 75"/>
@@ -10116,8 +9997,8 @@
           </a:prstGeom>
         </p:spPr>
       </p:pic>
-      <mc:AlternateContent xmlns:mc="http://schemas.openxmlformats.org/markup-compatibility/2006">
-        <mc:Choice xmlns:a14="http://schemas.microsoft.com/office/drawing/2010/main" Requires="a14">
+      <mc:AlternateContent xmlns:mc="http://schemas.openxmlformats.org/markup-compatibility/2006" xmlns:a14="http://schemas.microsoft.com/office/drawing/2010/main">
+        <mc:Choice Requires="a14">
           <p:sp>
             <p:nvSpPr>
               <p:cNvPr id="40" name="Text Box 115"/>
@@ -10559,7 +10440,7 @@
             </p:txBody>
           </p:sp>
         </mc:Choice>
-        <mc:Fallback>
+        <mc:Fallback xmlns="">
           <p:sp>
             <p:nvSpPr>
               <p:cNvPr id="40" name="Text Box 115"/>
@@ -10662,8 +10543,8 @@
           </a:extLst>
         </p:spPr>
       </p:pic>
-      <mc:AlternateContent xmlns:mc="http://schemas.openxmlformats.org/markup-compatibility/2006">
-        <mc:Choice xmlns:a14="http://schemas.microsoft.com/office/drawing/2010/main" Requires="a14">
+      <mc:AlternateContent xmlns:mc="http://schemas.openxmlformats.org/markup-compatibility/2006" xmlns:a14="http://schemas.microsoft.com/office/drawing/2010/main">
+        <mc:Choice Requires="a14">
           <p:sp>
             <p:nvSpPr>
               <p:cNvPr id="74" name="Rectangle 73"/>
@@ -11033,7 +10914,7 @@
             </p:txBody>
           </p:sp>
         </mc:Choice>
-        <mc:Fallback>
+        <mc:Fallback xmlns="">
           <p:sp>
             <p:nvSpPr>
               <p:cNvPr id="74" name="Rectangle 73"/>
@@ -11081,7 +10962,7 @@
         <p:spPr>
           <a:xfrm>
             <a:off x="21963105" y="4968774"/>
-            <a:ext cx="9715300" cy="26987267"/>
+            <a:ext cx="9714936" cy="8496947"/>
           </a:xfrm>
           <a:prstGeom prst="roundRect">
             <a:avLst/>
@@ -11205,8 +11086,8 @@
         </p:nvSpPr>
         <p:spPr>
           <a:xfrm>
-            <a:off x="32961713" y="5159075"/>
-            <a:ext cx="8849661" cy="1463272"/>
+            <a:off x="22414188" y="14173068"/>
+            <a:ext cx="8849661" cy="786163"/>
           </a:xfrm>
           <a:prstGeom prst="rect">
             <a:avLst/>
@@ -11225,11 +11106,11 @@
             </a:r>
             <a:r>
               <a:rPr lang="en-US" sz="4400" b="1" dirty="0"/>
-              <a:t>achieves better precision in every dataset tested</a:t>
+              <a:t>achieves better </a:t>
             </a:r>
             <a:r>
               <a:rPr lang="en-US" sz="4400" b="1" dirty="0" smtClean="0"/>
-              <a:t>.</a:t>
+              <a:t>precision.</a:t>
             </a:r>
             <a:endParaRPr lang="en-US" sz="4400" b="1" dirty="0"/>
           </a:p>
@@ -11243,7 +11124,7 @@
         </p:nvSpPr>
         <p:spPr>
           <a:xfrm>
-            <a:off x="32896973" y="15042462"/>
+            <a:off x="32908909" y="5348618"/>
             <a:ext cx="8849661" cy="1740270"/>
           </a:xfrm>
           <a:prstGeom prst="rect">
@@ -11280,7 +11161,7 @@
         </p:nvSpPr>
         <p:spPr>
           <a:xfrm>
-            <a:off x="33152316" y="24920918"/>
+            <a:off x="32763940" y="24266921"/>
             <a:ext cx="8849661" cy="786163"/>
           </a:xfrm>
           <a:prstGeom prst="rect">
@@ -11367,8 +11248,8 @@
           </a:prstGeom>
         </p:spPr>
       </p:pic>
-      <mc:AlternateContent xmlns:mc="http://schemas.openxmlformats.org/markup-compatibility/2006">
-        <mc:Choice xmlns:a14="http://schemas.microsoft.com/office/drawing/2010/main" Requires="a14">
+      <mc:AlternateContent xmlns:mc="http://schemas.openxmlformats.org/markup-compatibility/2006" xmlns:a14="http://schemas.microsoft.com/office/drawing/2010/main">
+        <mc:Choice Requires="a14">
           <p:sp>
             <p:nvSpPr>
               <p:cNvPr id="75" name="Rectangle 74"/>
@@ -11393,31 +11274,7 @@
                 <a:pPr algn="l" rtl="0"/>
                 <a:r>
                   <a:rPr lang="en-US" sz="3200" dirty="0" smtClean="0"/>
-                  <a:t>A </a:t>
-                </a:r>
-                <a:r>
-                  <a:rPr lang="en-US" sz="3200" dirty="0" smtClean="0"/>
-                  <a:t>group-sparse norm </a:t>
-                </a:r>
-                <a:r>
-                  <a:rPr lang="en-US" sz="3200" dirty="0" smtClean="0"/>
-                  <a:t>penalty encourages </a:t>
-                </a:r>
-                <a:r>
-                  <a:rPr lang="en-US" sz="3200" dirty="0" smtClean="0"/>
-                  <a:t>solutions </a:t>
-                </a:r>
-                <a:r>
-                  <a:rPr lang="en-US" sz="3200" dirty="0" smtClean="0"/>
-                  <a:t>with </a:t>
-                </a:r>
-                <a:r>
-                  <a:rPr lang="en-US" sz="3200" dirty="0" smtClean="0"/>
-                  <a:t>fewer </a:t>
-                </a:r>
-                <a:r>
-                  <a:rPr lang="en-US" sz="3200" dirty="0" smtClean="0"/>
-                  <a:t>features:</a:t>
+                  <a:t>A group-sparse norm penalty encourages solutions with fewer features:</a:t>
                 </a:r>
               </a:p>
               <a:p>
@@ -12205,43 +12062,57 @@
                       <m:sSubSup>
                         <m:sSubSupPr>
                           <m:ctrlPr>
-                            <a:rPr lang="en-US" sz="3200" i="1"/>
+                            <a:rPr lang="en-US" sz="3200" i="1">
+                              <a:latin typeface="Cambria Math" panose="02040503050406030204" pitchFamily="18" charset="0"/>
+                            </a:rPr>
                           </m:ctrlPr>
                         </m:sSubSupPr>
                         <m:e>
                           <m:r>
-                            <a:rPr lang="en-US" sz="3200" i="1"/>
+                            <a:rPr lang="en-US" sz="3200" i="1">
+                              <a:latin typeface="Cambria Math" panose="02040503050406030204" pitchFamily="18" charset="0"/>
+                            </a:rPr>
                             <m:t>𝑉</m:t>
                           </m:r>
                         </m:e>
                         <m:sub>
                           <m:r>
-                            <a:rPr lang="en-US" sz="3200" i="1"/>
+                            <a:rPr lang="en-US" sz="3200" i="1">
+                              <a:latin typeface="Cambria Math" panose="02040503050406030204" pitchFamily="18" charset="0"/>
+                            </a:rPr>
                             <m:t>𝑘</m:t>
                           </m:r>
                         </m:sub>
                         <m:sup>
                           <m:r>
-                            <a:rPr lang="en-US" sz="3200" i="1"/>
+                            <a:rPr lang="en-US" sz="3200" i="1">
+                              <a:latin typeface="Cambria Math" panose="02040503050406030204" pitchFamily="18" charset="0"/>
+                            </a:rPr>
                             <m:t>𝑛𝑒𝑤</m:t>
                           </m:r>
                         </m:sup>
                       </m:sSubSup>
                       <m:r>
-                        <a:rPr lang="en-US" sz="3200" i="1"/>
+                        <a:rPr lang="en-US" sz="3200" i="1">
+                          <a:latin typeface="Cambria Math" panose="02040503050406030204" pitchFamily="18" charset="0"/>
+                        </a:rPr>
                         <m:t>=</m:t>
                       </m:r>
                       <m:func>
                         <m:funcPr>
                           <m:ctrlPr>
-                            <a:rPr lang="en-US" sz="3200" i="1"/>
+                            <a:rPr lang="en-US" sz="3200" i="1">
+                              <a:latin typeface="Cambria Math" panose="02040503050406030204" pitchFamily="18" charset="0"/>
+                            </a:rPr>
                           </m:ctrlPr>
                         </m:funcPr>
                         <m:fName>
                           <m:limLow>
                             <m:limLowPr>
                               <m:ctrlPr>
-                                <a:rPr lang="en-US" sz="3200" i="1"/>
+                                <a:rPr lang="en-US" sz="3200" i="1">
+                                  <a:latin typeface="Cambria Math" panose="02040503050406030204" pitchFamily="18" charset="0"/>
+                                </a:rPr>
                               </m:ctrlPr>
                             </m:limLowPr>
                             <m:e>
@@ -12249,34 +12120,46 @@
                                 <m:rPr>
                                   <m:sty m:val="p"/>
                                 </m:rPr>
-                                <a:rPr lang="en-US" sz="3200"/>
+                                <a:rPr lang="en-US" sz="3200">
+                                  <a:latin typeface="Cambria Math" panose="02040503050406030204" pitchFamily="18" charset="0"/>
+                                </a:rPr>
                                 <m:t>argmin</m:t>
                               </m:r>
                             </m:e>
                             <m:lim>
                               <m:r>
-                                <a:rPr lang="en-US" sz="3200" i="1"/>
+                                <a:rPr lang="en-US" sz="3200" i="1">
+                                  <a:latin typeface="Cambria Math" panose="02040503050406030204" pitchFamily="18" charset="0"/>
+                                </a:rPr>
                                 <m:t>𝑉</m:t>
                               </m:r>
                               <m:r>
-                                <a:rPr lang="en-US" sz="3200" i="1"/>
+                                <a:rPr lang="en-US" sz="3200" i="1">
+                                  <a:latin typeface="Cambria Math" panose="02040503050406030204" pitchFamily="18" charset="0"/>
+                                </a:rPr>
                                 <m:t>∈</m:t>
                               </m:r>
                               <m:sSub>
                                 <m:sSubPr>
                                   <m:ctrlPr>
-                                    <a:rPr lang="en-US" sz="3200" i="1"/>
+                                    <a:rPr lang="en-US" sz="3200" i="1">
+                                      <a:latin typeface="Cambria Math" panose="02040503050406030204" pitchFamily="18" charset="0"/>
+                                    </a:rPr>
                                   </m:ctrlPr>
                                 </m:sSubPr>
                                 <m:e>
                                   <m:r>
-                                    <a:rPr lang="en-US" sz="3200" i="1"/>
+                                    <a:rPr lang="en-US" sz="3200" i="1">
+                                      <a:latin typeface="Cambria Math" panose="02040503050406030204" pitchFamily="18" charset="0"/>
+                                    </a:rPr>
                                     <m:t>𝒱</m:t>
                                   </m:r>
                                 </m:e>
                                 <m:sub>
                                   <m:r>
-                                    <a:rPr lang="en-US" sz="3200" i="1"/>
+                                    <a:rPr lang="en-US" sz="3200" i="1">
+                                      <a:latin typeface="Cambria Math" panose="02040503050406030204" pitchFamily="18" charset="0"/>
+                                    </a:rPr>
                                     <m:t>𝑘</m:t>
                                   </m:r>
                                 </m:sub>
@@ -12290,46 +12173,62 @@
                               <m:begChr m:val="⟨"/>
                               <m:endChr m:val="⟩"/>
                               <m:ctrlPr>
-                                <a:rPr lang="en-US" sz="3200" i="1"/>
+                                <a:rPr lang="en-US" sz="3200" i="1">
+                                  <a:latin typeface="Cambria Math" panose="02040503050406030204" pitchFamily="18" charset="0"/>
+                                </a:rPr>
                               </m:ctrlPr>
                             </m:dPr>
                             <m:e>
                               <m:f>
                                 <m:fPr>
                                   <m:ctrlPr>
-                                    <a:rPr lang="en-US" sz="3200" i="1"/>
+                                    <a:rPr lang="en-US" sz="3200" i="1">
+                                      <a:latin typeface="Cambria Math" panose="02040503050406030204" pitchFamily="18" charset="0"/>
+                                    </a:rPr>
                                   </m:ctrlPr>
                                 </m:fPr>
                                 <m:num>
                                   <m:r>
-                                    <a:rPr lang="en-US" sz="3200" i="1"/>
+                                    <a:rPr lang="en-US" sz="3200" i="1">
+                                      <a:latin typeface="Cambria Math" panose="02040503050406030204" pitchFamily="18" charset="0"/>
+                                    </a:rPr>
                                     <m:t>𝜕</m:t>
                                   </m:r>
                                   <m:r>
-                                    <a:rPr lang="en-US" sz="3200" i="1"/>
+                                    <a:rPr lang="en-US" sz="3200" i="1">
+                                      <a:latin typeface="Cambria Math" panose="02040503050406030204" pitchFamily="18" charset="0"/>
+                                    </a:rPr>
                                     <m:t>𝐿</m:t>
                                   </m:r>
                                 </m:num>
                                 <m:den>
                                   <m:r>
-                                    <a:rPr lang="en-US" sz="3200" i="1"/>
+                                    <a:rPr lang="en-US" sz="3200" i="1">
+                                      <a:latin typeface="Cambria Math" panose="02040503050406030204" pitchFamily="18" charset="0"/>
+                                    </a:rPr>
                                     <m:t>𝜕</m:t>
                                   </m:r>
                                   <m:sSub>
                                     <m:sSubPr>
                                       <m:ctrlPr>
-                                        <a:rPr lang="en-US" sz="3200" i="1"/>
+                                        <a:rPr lang="en-US" sz="3200" i="1">
+                                          <a:latin typeface="Cambria Math" panose="02040503050406030204" pitchFamily="18" charset="0"/>
+                                        </a:rPr>
                                       </m:ctrlPr>
                                     </m:sSubPr>
                                     <m:e>
                                       <m:r>
-                                        <a:rPr lang="en-US" sz="3200" i="1"/>
+                                        <a:rPr lang="en-US" sz="3200" i="1">
+                                          <a:latin typeface="Cambria Math" panose="02040503050406030204" pitchFamily="18" charset="0"/>
+                                        </a:rPr>
                                         <m:t>𝑉</m:t>
                                       </m:r>
                                     </m:e>
                                     <m:sub>
                                       <m:r>
-                                        <a:rPr lang="en-US" sz="3200" i="1"/>
+                                        <a:rPr lang="en-US" sz="3200" i="1">
+                                          <a:latin typeface="Cambria Math" panose="02040503050406030204" pitchFamily="18" charset="0"/>
+                                        </a:rPr>
                                         <m:t>𝑘</m:t>
                                       </m:r>
                                     </m:sub>
@@ -12337,11 +12236,15 @@
                                 </m:den>
                               </m:f>
                               <m:r>
-                                <a:rPr lang="en-US" sz="3200" i="1"/>
+                                <a:rPr lang="en-US" sz="3200" i="1">
+                                  <a:latin typeface="Cambria Math" panose="02040503050406030204" pitchFamily="18" charset="0"/>
+                                </a:rPr>
                                 <m:t>,</m:t>
                               </m:r>
                               <m:r>
-                                <a:rPr lang="en-US" sz="3200" i="1"/>
+                                <a:rPr lang="en-US" sz="3200" i="1">
+                                  <a:latin typeface="Cambria Math" panose="02040503050406030204" pitchFamily="18" charset="0"/>
+                                </a:rPr>
                                 <m:t>𝑉</m:t>
                               </m:r>
                             </m:e>
@@ -12349,28 +12252,38 @@
                         </m:e>
                       </m:func>
                       <m:r>
-                        <a:rPr lang="en-US" sz="3200" i="1"/>
+                        <a:rPr lang="en-US" sz="3200" i="1">
+                          <a:latin typeface="Cambria Math" panose="02040503050406030204" pitchFamily="18" charset="0"/>
+                        </a:rPr>
                         <m:t>+</m:t>
                       </m:r>
                       <m:f>
                         <m:fPr>
                           <m:ctrlPr>
-                            <a:rPr lang="en-US" sz="3200" i="1"/>
+                            <a:rPr lang="en-US" sz="3200" i="1">
+                              <a:latin typeface="Cambria Math" panose="02040503050406030204" pitchFamily="18" charset="0"/>
+                            </a:rPr>
                           </m:ctrlPr>
                         </m:fPr>
                         <m:num>
                           <m:r>
-                            <a:rPr lang="en-US" sz="3200" i="1"/>
+                            <a:rPr lang="en-US" sz="3200" i="1">
+                              <a:latin typeface="Cambria Math" panose="02040503050406030204" pitchFamily="18" charset="0"/>
+                            </a:rPr>
                             <m:t>1</m:t>
                           </m:r>
                         </m:num>
                         <m:den>
                           <m:r>
-                            <a:rPr lang="en-US" sz="3200" i="1"/>
+                            <a:rPr lang="en-US" sz="3200" i="1">
+                              <a:latin typeface="Cambria Math" panose="02040503050406030204" pitchFamily="18" charset="0"/>
+                            </a:rPr>
                             <m:t>2</m:t>
                           </m:r>
                           <m:r>
-                            <a:rPr lang="en-US" sz="3200" i="1"/>
+                            <a:rPr lang="en-US" sz="3200" i="1">
+                              <a:latin typeface="Cambria Math" panose="02040503050406030204" pitchFamily="18" charset="0"/>
+                            </a:rPr>
                             <m:t>𝜃</m:t>
                           </m:r>
                         </m:den>
@@ -12378,7 +12291,9 @@
                       <m:sSubSup>
                         <m:sSubSupPr>
                           <m:ctrlPr>
-                            <a:rPr lang="en-US" sz="3200" i="1"/>
+                            <a:rPr lang="en-US" sz="3200" i="1">
+                              <a:latin typeface="Cambria Math" panose="02040503050406030204" pitchFamily="18" charset="0"/>
+                            </a:rPr>
                           </m:ctrlPr>
                         </m:sSubSupPr>
                         <m:e>
@@ -12387,33 +12302,45 @@
                               <m:begChr m:val="‖"/>
                               <m:endChr m:val="‖"/>
                               <m:ctrlPr>
-                                <a:rPr lang="en-US" sz="3200" i="1"/>
+                                <a:rPr lang="en-US" sz="3200" i="1">
+                                  <a:latin typeface="Cambria Math" panose="02040503050406030204" pitchFamily="18" charset="0"/>
+                                </a:rPr>
                               </m:ctrlPr>
                             </m:dPr>
                             <m:e>
                               <m:sSub>
                                 <m:sSubPr>
                                   <m:ctrlPr>
-                                    <a:rPr lang="en-US" sz="3200" i="1"/>
+                                    <a:rPr lang="en-US" sz="3200" i="1">
+                                      <a:latin typeface="Cambria Math" panose="02040503050406030204" pitchFamily="18" charset="0"/>
+                                    </a:rPr>
                                   </m:ctrlPr>
                                 </m:sSubPr>
                                 <m:e>
                                   <m:r>
-                                    <a:rPr lang="en-US" sz="3200" i="1"/>
+                                    <a:rPr lang="en-US" sz="3200" i="1">
+                                      <a:latin typeface="Cambria Math" panose="02040503050406030204" pitchFamily="18" charset="0"/>
+                                    </a:rPr>
                                     <m:t>𝑉</m:t>
                                   </m:r>
                                   <m:r>
-                                    <a:rPr lang="en-US" sz="3200" i="1"/>
+                                    <a:rPr lang="en-US" sz="3200" i="1">
+                                      <a:latin typeface="Cambria Math" panose="02040503050406030204" pitchFamily="18" charset="0"/>
+                                    </a:rPr>
                                     <m:t>−</m:t>
                                   </m:r>
                                   <m:r>
-                                    <a:rPr lang="en-US" sz="3200" i="1"/>
+                                    <a:rPr lang="en-US" sz="3200" i="1">
+                                      <a:latin typeface="Cambria Math" panose="02040503050406030204" pitchFamily="18" charset="0"/>
+                                    </a:rPr>
                                     <m:t>𝑉</m:t>
                                   </m:r>
                                 </m:e>
                                 <m:sub>
                                   <m:r>
-                                    <a:rPr lang="en-US" sz="3200" i="1"/>
+                                    <a:rPr lang="en-US" sz="3200" i="1">
+                                      <a:latin typeface="Cambria Math" panose="02040503050406030204" pitchFamily="18" charset="0"/>
+                                    </a:rPr>
                                     <m:t>𝑘</m:t>
                                   </m:r>
                                 </m:sub>
@@ -12423,23 +12350,31 @@
                         </m:e>
                         <m:sub>
                           <m:r>
-                            <a:rPr lang="en-US" sz="3200" i="1"/>
+                            <a:rPr lang="en-US" sz="3200" i="1">
+                              <a:latin typeface="Cambria Math" panose="02040503050406030204" pitchFamily="18" charset="0"/>
+                            </a:rPr>
                             <m:t>𝐹</m:t>
                           </m:r>
                         </m:sub>
                         <m:sup>
                           <m:r>
-                            <a:rPr lang="en-US" sz="3200" i="1"/>
+                            <a:rPr lang="en-US" sz="3200" i="1">
+                              <a:latin typeface="Cambria Math" panose="02040503050406030204" pitchFamily="18" charset="0"/>
+                            </a:rPr>
                             <m:t>2</m:t>
                           </m:r>
                         </m:sup>
                       </m:sSubSup>
                       <m:r>
-                        <a:rPr lang="en-US" sz="3200" i="1"/>
+                        <a:rPr lang="en-US" sz="3200" i="1">
+                          <a:latin typeface="Cambria Math" panose="02040503050406030204" pitchFamily="18" charset="0"/>
+                        </a:rPr>
                         <m:t> +</m:t>
                       </m:r>
                       <m:r>
-                        <a:rPr lang="en-US" sz="3200" i="1"/>
+                        <a:rPr lang="en-US" sz="3200" i="1">
+                          <a:latin typeface="Cambria Math" panose="02040503050406030204" pitchFamily="18" charset="0"/>
+                        </a:rPr>
                         <m:t>𝜆</m:t>
                       </m:r>
                       <m:d>
@@ -12447,18 +12382,24 @@
                           <m:begChr m:val="‖"/>
                           <m:endChr m:val="‖"/>
                           <m:ctrlPr>
-                            <a:rPr lang="en-US" sz="3200" i="1"/>
+                            <a:rPr lang="en-US" sz="3200" i="1">
+                              <a:latin typeface="Cambria Math" panose="02040503050406030204" pitchFamily="18" charset="0"/>
+                            </a:rPr>
                           </m:ctrlPr>
                         </m:dPr>
                         <m:e>
                           <m:r>
-                            <a:rPr lang="en-US" sz="3200" i="1"/>
+                            <a:rPr lang="en-US" sz="3200" i="1">
+                              <a:latin typeface="Cambria Math" panose="02040503050406030204" pitchFamily="18" charset="0"/>
+                            </a:rPr>
                             <m:t>𝑉</m:t>
                           </m:r>
                         </m:e>
                       </m:d>
                       <m:r>
-                        <a:rPr lang="en-US" sz="3200" i="1"/>
+                        <a:rPr lang="en-US" sz="3200" i="1">
+                          <a:latin typeface="Cambria Math" panose="02040503050406030204" pitchFamily="18" charset="0"/>
+                        </a:rPr>
                         <m:t>,</m:t>
                       </m:r>
                     </m:oMath>
@@ -12484,78 +12425,106 @@
                     <m:sSup>
                       <m:sSupPr>
                         <m:ctrlPr>
-                          <a:rPr lang="en-US" sz="3200" i="1"/>
+                          <a:rPr lang="en-US" sz="3200" i="1">
+                            <a:latin typeface="Cambria Math" panose="02040503050406030204" pitchFamily="18" charset="0"/>
+                          </a:rPr>
                         </m:ctrlPr>
                       </m:sSupPr>
                       <m:e>
                         <m:r>
-                          <a:rPr lang="en-US" sz="3200" i="1"/>
+                          <a:rPr lang="en-US" sz="3200" i="1">
+                            <a:latin typeface="Cambria Math" panose="02040503050406030204" pitchFamily="18" charset="0"/>
+                          </a:rPr>
                           <m:t>𝑊</m:t>
                         </m:r>
                       </m:e>
                       <m:sup>
                         <m:r>
-                          <a:rPr lang="en-US" sz="3200" i="1"/>
+                          <a:rPr lang="en-US" sz="3200" i="1">
+                            <a:latin typeface="Cambria Math" panose="02040503050406030204" pitchFamily="18" charset="0"/>
+                          </a:rPr>
                           <m:t>𝑛𝑒𝑤</m:t>
                         </m:r>
                       </m:sup>
                     </m:sSup>
                     <m:r>
-                      <a:rPr lang="en-US" sz="3200" i="1"/>
+                      <a:rPr lang="en-US" sz="3200" i="1">
+                        <a:latin typeface="Cambria Math" panose="02040503050406030204" pitchFamily="18" charset="0"/>
+                      </a:rPr>
                       <m:t>=</m:t>
                     </m:r>
                     <m:r>
-                      <a:rPr lang="en-US" sz="3200" i="1"/>
+                      <a:rPr lang="en-US" sz="3200" i="1">
+                        <a:latin typeface="Cambria Math" panose="02040503050406030204" pitchFamily="18" charset="0"/>
+                      </a:rPr>
                       <m:t>𝑊</m:t>
                     </m:r>
                     <m:r>
-                      <a:rPr lang="en-US" sz="3200" i="1"/>
+                      <a:rPr lang="en-US" sz="3200" i="1">
+                        <a:latin typeface="Cambria Math" panose="02040503050406030204" pitchFamily="18" charset="0"/>
+                      </a:rPr>
                       <m:t>+</m:t>
                     </m:r>
                     <m:sSubSup>
                       <m:sSubSupPr>
                         <m:ctrlPr>
-                          <a:rPr lang="en-US" sz="3200" i="1"/>
+                          <a:rPr lang="en-US" sz="3200" i="1">
+                            <a:latin typeface="Cambria Math" panose="02040503050406030204" pitchFamily="18" charset="0"/>
+                          </a:rPr>
                         </m:ctrlPr>
                       </m:sSubSupPr>
                       <m:e>
                         <m:r>
-                          <a:rPr lang="en-US" sz="3200" i="1"/>
+                          <a:rPr lang="en-US" sz="3200" i="1">
+                            <a:latin typeface="Cambria Math" panose="02040503050406030204" pitchFamily="18" charset="0"/>
+                          </a:rPr>
                           <m:t>𝑉</m:t>
                         </m:r>
                       </m:e>
                       <m:sub>
                         <m:r>
-                          <a:rPr lang="en-US" sz="3200" i="1"/>
+                          <a:rPr lang="en-US" sz="3200" i="1">
+                            <a:latin typeface="Cambria Math" panose="02040503050406030204" pitchFamily="18" charset="0"/>
+                          </a:rPr>
                           <m:t>𝑘</m:t>
                         </m:r>
                       </m:sub>
                       <m:sup>
                         <m:r>
-                          <a:rPr lang="en-US" sz="3200" i="1"/>
+                          <a:rPr lang="en-US" sz="3200" i="1">
+                            <a:latin typeface="Cambria Math" panose="02040503050406030204" pitchFamily="18" charset="0"/>
+                          </a:rPr>
                           <m:t>𝑛𝑒𝑤</m:t>
                         </m:r>
                       </m:sup>
                     </m:sSubSup>
                     <m:r>
-                      <a:rPr lang="en-US" sz="3200" i="1"/>
+                      <a:rPr lang="en-US" sz="3200" i="1">
+                        <a:latin typeface="Cambria Math" panose="02040503050406030204" pitchFamily="18" charset="0"/>
+                      </a:rPr>
                       <m:t>−</m:t>
                     </m:r>
                     <m:sSub>
                       <m:sSubPr>
                         <m:ctrlPr>
-                          <a:rPr lang="en-US" sz="3200" i="1"/>
+                          <a:rPr lang="en-US" sz="3200" i="1">
+                            <a:latin typeface="Cambria Math" panose="02040503050406030204" pitchFamily="18" charset="0"/>
+                          </a:rPr>
                         </m:ctrlPr>
                       </m:sSubPr>
                       <m:e>
                         <m:r>
-                          <a:rPr lang="en-US" sz="3200" i="1"/>
+                          <a:rPr lang="en-US" sz="3200" i="1">
+                            <a:latin typeface="Cambria Math" panose="02040503050406030204" pitchFamily="18" charset="0"/>
+                          </a:rPr>
                           <m:t>𝑉</m:t>
                         </m:r>
                       </m:e>
                       <m:sub>
                         <m:r>
-                          <a:rPr lang="en-US" sz="3200" i="1"/>
+                          <a:rPr lang="en-US" sz="3200" i="1">
+                            <a:latin typeface="Cambria Math" panose="02040503050406030204" pitchFamily="18" charset="0"/>
+                          </a:rPr>
                           <m:t>𝑘</m:t>
                         </m:r>
                       </m:sub>
@@ -12569,7 +12538,9 @@
                 <a14:m>
                   <m:oMath xmlns:m="http://schemas.openxmlformats.org/officeDocument/2006/math">
                     <m:r>
-                      <a:rPr lang="en-US" sz="3200" i="1"/>
+                      <a:rPr lang="en-US" sz="3200" i="1">
+                        <a:latin typeface="Cambria Math" panose="02040503050406030204" pitchFamily="18" charset="0"/>
+                      </a:rPr>
                       <m:t>𝜃</m:t>
                     </m:r>
                   </m:oMath>
@@ -12586,7 +12557,7 @@
             </p:txBody>
           </p:sp>
         </mc:Choice>
-        <mc:Fallback>
+        <mc:Fallback xmlns="">
           <p:sp>
             <p:nvSpPr>
               <p:cNvPr id="75" name="Rectangle 74"/>
@@ -13040,17 +13011,6 @@
               </a:rPr>
               <a:t>Projected Gradient</a:t>
             </a:r>
-            <a:endParaRPr kumimoji="0" lang="en-US" altLang="en-US" sz="2400" b="1" i="0" u="none" strike="noStrike" kern="0" cap="none" spc="0" normalizeH="0" baseline="0" noProof="0" dirty="0" smtClean="0">
-              <a:ln>
-                <a:noFill/>
-              </a:ln>
-              <a:solidFill>
-                <a:srgbClr val="333399"/>
-              </a:solidFill>
-              <a:effectLst/>
-              <a:uLnTx/>
-              <a:uFillTx/>
-            </a:endParaRPr>
           </a:p>
         </p:txBody>
       </p:sp>
@@ -13469,17 +13429,6 @@
               </a:rPr>
               <a:t>COMET</a:t>
             </a:r>
-            <a:endParaRPr kumimoji="0" lang="en-US" altLang="en-US" sz="2400" b="1" i="0" u="none" strike="noStrike" kern="0" cap="none" spc="0" normalizeH="0" baseline="0" noProof="0" dirty="0" smtClean="0">
-              <a:ln>
-                <a:noFill/>
-              </a:ln>
-              <a:solidFill>
-                <a:srgbClr val="333399"/>
-              </a:solidFill>
-              <a:effectLst/>
-              <a:uLnTx/>
-              <a:uFillTx/>
-            </a:endParaRPr>
           </a:p>
         </p:txBody>
       </p:sp>
@@ -13912,8 +13861,8 @@
           </a:prstGeom>
         </p:spPr>
       </p:pic>
-      <mc:AlternateContent xmlns:mc="http://schemas.openxmlformats.org/markup-compatibility/2006">
-        <mc:Choice xmlns:a14="http://schemas.microsoft.com/office/drawing/2010/main" Requires="a14">
+      <mc:AlternateContent xmlns:mc="http://schemas.openxmlformats.org/markup-compatibility/2006" xmlns:a14="http://schemas.microsoft.com/office/drawing/2010/main">
+        <mc:Choice Requires="a14">
           <p:sp>
             <p:nvSpPr>
               <p:cNvPr id="63" name="Text Box 115"/>
@@ -14335,12 +14284,24 @@
                   <a:rPr lang="en-US" altLang="en-US" sz="2400" dirty="0"/>
                   <a:t>values to illustrate the performance gain. </a:t>
                 </a:r>
-                <a:endParaRPr lang="en-AU" altLang="en-US" sz="2400" i="1" dirty="0"/>
+                <a:r>
+                  <a:rPr lang="en-US" altLang="en-US" sz="2400" b="1" dirty="0" smtClean="0">
+                    <a:solidFill>
+                      <a:srgbClr val="FF0000"/>
+                    </a:solidFill>
+                  </a:rPr>
+                  <a:t> TODO set best results in bold</a:t>
+                </a:r>
+                <a:endParaRPr lang="en-AU" altLang="en-US" sz="2400" b="1" i="1" dirty="0">
+                  <a:solidFill>
+                    <a:srgbClr val="FF0000"/>
+                  </a:solidFill>
+                </a:endParaRPr>
               </a:p>
             </p:txBody>
           </p:sp>
         </mc:Choice>
-        <mc:Fallback>
+        <mc:Fallback xmlns="">
           <p:sp>
             <p:nvSpPr>
               <p:cNvPr id="63" name="Text Box 115"/>
@@ -14384,6 +14345,107 @@
           </p:sp>
         </mc:Fallback>
       </mc:AlternateContent>
+      <p:pic>
+        <p:nvPicPr>
+          <p:cNvPr id="49" name="Picture 10" descr="http://chechiklab.biu.ac.il/~yuvval/figs/comet/Precision_at_K_all_datasets.png"/>
+          <p:cNvPicPr>
+            <a:picLocks noChangeAspect="1" noChangeArrowheads="1"/>
+          </p:cNvPicPr>
+          <p:nvPr/>
+        </p:nvPicPr>
+        <p:blipFill rotWithShape="1">
+          <a:blip r:embed="rId30" cstate="print">
+            <a:extLst>
+              <a:ext uri="{28A0092B-C50C-407E-A947-70E740481C1C}">
+                <a14:useLocalDpi xmlns:a14="http://schemas.microsoft.com/office/drawing/2010/main" val="0"/>
+              </a:ext>
+            </a:extLst>
+          </a:blip>
+          <a:srcRect l="6018" t="18639" r="54515" b="14404"/>
+          <a:stretch/>
+        </p:blipFill>
+        <p:spPr bwMode="auto">
+          <a:xfrm>
+            <a:off x="23396926" y="21962665"/>
+            <a:ext cx="7050277" cy="7310284"/>
+          </a:xfrm>
+          <a:prstGeom prst="rect">
+            <a:avLst/>
+          </a:prstGeom>
+          <a:noFill/>
+          <a:extLst>
+            <a:ext uri="{909E8E84-426E-40DD-AFC4-6F175D3DCCD1}">
+              <a14:hiddenFill xmlns:a14="http://schemas.microsoft.com/office/drawing/2010/main">
+                <a:solidFill>
+                  <a:srgbClr val="FFFFFF"/>
+                </a:solidFill>
+              </a14:hiddenFill>
+            </a:ext>
+          </a:extLst>
+        </p:spPr>
+      </p:pic>
+      <p:pic>
+        <p:nvPicPr>
+          <p:cNvPr id="1034" name="Picture 10" descr="http://chechiklab.biu.ac.il/~yuvval/figs/comet/Precision_at_K_all_datasets.png"/>
+          <p:cNvPicPr>
+            <a:picLocks noChangeAspect="1" noChangeArrowheads="1"/>
+          </p:cNvPicPr>
+          <p:nvPr/>
+        </p:nvPicPr>
+        <p:blipFill rotWithShape="1">
+          <a:blip r:embed="rId30" cstate="print">
+            <a:extLst>
+              <a:ext uri="{28A0092B-C50C-407E-A947-70E740481C1C}">
+                <a14:useLocalDpi xmlns:a14="http://schemas.microsoft.com/office/drawing/2010/main" val="0"/>
+              </a:ext>
+            </a:extLst>
+          </a:blip>
+          <a:srcRect l="47894" t="18639" r="10321" b="14404"/>
+          <a:stretch/>
+        </p:blipFill>
+        <p:spPr bwMode="auto">
+          <a:xfrm>
+            <a:off x="23421236" y="15265921"/>
+            <a:ext cx="7027803" cy="6882859"/>
+          </a:xfrm>
+          <a:prstGeom prst="rect">
+            <a:avLst/>
+          </a:prstGeom>
+          <a:noFill/>
+          <a:extLst>
+            <a:ext uri="{909E8E84-426E-40DD-AFC4-6F175D3DCCD1}">
+              <a14:hiddenFill xmlns:a14="http://schemas.microsoft.com/office/drawing/2010/main">
+                <a:solidFill>
+                  <a:srgbClr val="FFFFFF"/>
+                </a:solidFill>
+              </a14:hiddenFill>
+            </a:ext>
+          </a:extLst>
+        </p:spPr>
+      </p:pic>
+      <p:pic>
+        <p:nvPicPr>
+          <p:cNvPr id="62" name="Picture 61"/>
+          <p:cNvPicPr>
+            <a:picLocks noChangeAspect="1"/>
+          </p:cNvPicPr>
+          <p:nvPr/>
+        </p:nvPicPr>
+        <p:blipFill rotWithShape="1">
+          <a:blip r:embed="rId8"/>
+          <a:srcRect r="50227"/>
+          <a:stretch/>
+        </p:blipFill>
+        <p:spPr>
+          <a:xfrm>
+            <a:off x="32855073" y="6699701"/>
+            <a:ext cx="8468315" cy="6766020"/>
+          </a:xfrm>
+          <a:prstGeom prst="rect">
+            <a:avLst/>
+          </a:prstGeom>
+        </p:spPr>
+      </p:pic>
     </p:spTree>
   </p:cSld>
   <p:clrMapOvr>

</xml_diff>

<commit_message>
aligned margins (version with alignment bars)
</commit_message>
<xml_diff>
--- a/COMET_poster.pptx
+++ b/COMET_poster.pptx
@@ -4078,8 +4078,8 @@
         </p:nvSpPr>
         <p:spPr bwMode="auto">
           <a:xfrm>
-            <a:off x="22782220" y="29307481"/>
-            <a:ext cx="8973607" cy="2310505"/>
+            <a:off x="22605960" y="29307481"/>
+            <a:ext cx="8657890" cy="2310505"/>
           </a:xfrm>
           <a:prstGeom prst="rect">
             <a:avLst/>
@@ -4531,8 +4531,8 @@
         </p:blipFill>
         <p:spPr>
           <a:xfrm>
-            <a:off x="32950474" y="13758305"/>
-            <a:ext cx="8222714" cy="6548176"/>
+            <a:off x="32925073" y="13758304"/>
+            <a:ext cx="8514069" cy="6780197"/>
           </a:xfrm>
           <a:prstGeom prst="rect">
             <a:avLst/>
@@ -4549,8 +4549,8 @@
         </p:nvSpPr>
         <p:spPr bwMode="auto">
           <a:xfrm>
-            <a:off x="32806663" y="20713696"/>
-            <a:ext cx="8973606" cy="1941173"/>
+            <a:off x="32839031" y="20713696"/>
+            <a:ext cx="8600112" cy="1941173"/>
           </a:xfrm>
           <a:prstGeom prst="rect">
             <a:avLst/>
@@ -5012,7 +5012,7 @@
         </p:blipFill>
         <p:spPr bwMode="auto">
           <a:xfrm>
-            <a:off x="32855072" y="25382976"/>
+            <a:off x="32855072" y="25671008"/>
             <a:ext cx="5381475" cy="4788601"/>
           </a:xfrm>
           <a:prstGeom prst="rect">
@@ -5090,8 +5090,8 @@
             </p:nvSpPr>
             <p:spPr bwMode="auto">
               <a:xfrm>
-                <a:off x="38596588" y="25228908"/>
-                <a:ext cx="3546760" cy="2782429"/>
+                <a:off x="38236547" y="25547524"/>
+                <a:ext cx="3202595" cy="2679837"/>
               </a:xfrm>
               <a:prstGeom prst="rect">
                 <a:avLst/>
@@ -5535,8 +5535,8 @@
             </p:nvSpPr>
             <p:spPr bwMode="auto">
               <a:xfrm>
-                <a:off x="38596588" y="25228908"/>
-                <a:ext cx="3546760" cy="2782429"/>
+                <a:off x="38236547" y="25547524"/>
+                <a:ext cx="3202595" cy="2679837"/>
               </a:xfrm>
               <a:prstGeom prst="rect">
                 <a:avLst/>
@@ -5544,7 +5544,7 @@
               <a:blipFill rotWithShape="0">
                 <a:blip r:embed="rId10"/>
                 <a:stretch>
-                  <a:fillRect l="-2577" t="-1535" b="-658"/>
+                  <a:fillRect l="-2852" t="-1595" r="-4373" b="-4556"/>
                 </a:stretch>
               </a:blipFill>
               <a:ln>
@@ -8909,7 +8909,7 @@
         </p:nvSpPr>
         <p:spPr>
           <a:xfrm>
-            <a:off x="1463443" y="19579532"/>
+            <a:off x="1608386" y="19591159"/>
             <a:ext cx="4851213" cy="3063710"/>
           </a:xfrm>
           <a:prstGeom prst="rect">
@@ -8963,8 +8963,8 @@
           </a:p>
         </p:txBody>
       </p:sp>
-      <mc:AlternateContent xmlns:mc="http://schemas.openxmlformats.org/markup-compatibility/2006" xmlns:a14="http://schemas.microsoft.com/office/drawing/2010/main">
-        <mc:Choice Requires="a14">
+      <mc:AlternateContent xmlns:mc="http://schemas.openxmlformats.org/markup-compatibility/2006">
+        <mc:Choice xmlns:a14="http://schemas.microsoft.com/office/drawing/2010/main" Requires="a14">
           <p:sp>
             <p:nvSpPr>
               <p:cNvPr id="76" name="Rectangle 75"/>
@@ -8973,8 +8973,8 @@
             </p:nvSpPr>
             <p:spPr>
               <a:xfrm>
-                <a:off x="1463443" y="23402825"/>
-                <a:ext cx="8958814" cy="7651632"/>
+                <a:off x="1642704" y="23416344"/>
+                <a:ext cx="8570252" cy="8144075"/>
               </a:xfrm>
               <a:prstGeom prst="rect">
                 <a:avLst/>
@@ -9748,7 +9748,7 @@
             </p:txBody>
           </p:sp>
         </mc:Choice>
-        <mc:Fallback xmlns="">
+        <mc:Fallback>
           <p:sp>
             <p:nvSpPr>
               <p:cNvPr id="76" name="Rectangle 75"/>
@@ -9759,8 +9759,8 @@
             </p:nvSpPr>
             <p:spPr>
               <a:xfrm>
-                <a:off x="1463443" y="23402825"/>
-                <a:ext cx="8958814" cy="7651632"/>
+                <a:off x="1642704" y="23416344"/>
+                <a:ext cx="8570252" cy="8144075"/>
               </a:xfrm>
               <a:prstGeom prst="rect">
                 <a:avLst/>
@@ -9768,7 +9768,7 @@
               <a:blipFill rotWithShape="0">
                 <a:blip r:embed="rId19"/>
                 <a:stretch>
-                  <a:fillRect l="-1565" b="-1594"/>
+                  <a:fillRect l="-1565" b="-1497"/>
                 </a:stretch>
               </a:blipFill>
             </p:spPr>
@@ -9847,8 +9847,8 @@
         </p:nvSpPr>
         <p:spPr>
           <a:xfrm>
-            <a:off x="12072515" y="5348618"/>
-            <a:ext cx="8849661" cy="3263764"/>
+            <a:off x="12120340" y="5348618"/>
+            <a:ext cx="8599025" cy="3263764"/>
           </a:xfrm>
           <a:prstGeom prst="rect">
             <a:avLst/>
@@ -9997,8 +9997,8 @@
           </a:prstGeom>
         </p:spPr>
       </p:pic>
-      <mc:AlternateContent xmlns:mc="http://schemas.openxmlformats.org/markup-compatibility/2006" xmlns:a14="http://schemas.microsoft.com/office/drawing/2010/main">
-        <mc:Choice Requires="a14">
+      <mc:AlternateContent xmlns:mc="http://schemas.openxmlformats.org/markup-compatibility/2006">
+        <mc:Choice xmlns:a14="http://schemas.microsoft.com/office/drawing/2010/main" Requires="a14">
           <p:sp>
             <p:nvSpPr>
               <p:cNvPr id="40" name="Text Box 115"/>
@@ -10009,8 +10009,8 @@
             </p:nvSpPr>
             <p:spPr bwMode="auto">
               <a:xfrm>
-                <a:off x="12083856" y="16583691"/>
-                <a:ext cx="8438724" cy="1202510"/>
+                <a:off x="12120340" y="16583691"/>
+                <a:ext cx="8559128" cy="1202510"/>
               </a:xfrm>
               <a:prstGeom prst="rect">
                 <a:avLst/>
@@ -10440,7 +10440,7 @@
             </p:txBody>
           </p:sp>
         </mc:Choice>
-        <mc:Fallback xmlns="">
+        <mc:Fallback>
           <p:sp>
             <p:nvSpPr>
               <p:cNvPr id="40" name="Text Box 115"/>
@@ -10451,8 +10451,8 @@
             </p:nvSpPr>
             <p:spPr bwMode="auto">
               <a:xfrm>
-                <a:off x="12083856" y="16583691"/>
-                <a:ext cx="8438724" cy="1202510"/>
+                <a:off x="12120340" y="16583691"/>
+                <a:ext cx="8559128" cy="1202510"/>
               </a:xfrm>
               <a:prstGeom prst="rect">
                 <a:avLst/>
@@ -10460,7 +10460,7 @@
               <a:blipFill rotWithShape="0">
                 <a:blip r:embed="rId21"/>
                 <a:stretch>
-                  <a:fillRect l="-1083" t="-3030" b="-11111"/>
+                  <a:fillRect l="-1068" t="-3030" b="-11111"/>
                 </a:stretch>
               </a:blipFill>
               <a:ln>
@@ -10543,18 +10543,313 @@
           </a:extLst>
         </p:spPr>
       </p:pic>
-      <mc:AlternateContent xmlns:mc="http://schemas.openxmlformats.org/markup-compatibility/2006" xmlns:a14="http://schemas.microsoft.com/office/drawing/2010/main">
-        <mc:Choice Requires="a14">
+      <p:sp>
+        <p:nvSpPr>
+          <p:cNvPr id="50" name="Rounded Rectangle 49"/>
+          <p:cNvSpPr/>
+          <p:nvPr/>
+        </p:nvSpPr>
+        <p:spPr>
+          <a:xfrm>
+            <a:off x="21963105" y="4968774"/>
+            <a:ext cx="9714936" cy="8496947"/>
+          </a:xfrm>
+          <a:prstGeom prst="roundRect">
+            <a:avLst/>
+          </a:prstGeom>
+          <a:solidFill>
+            <a:schemeClr val="bg1"/>
+          </a:solidFill>
+          <a:ln w="76200">
+            <a:solidFill>
+              <a:schemeClr val="tx1"/>
+            </a:solidFill>
+          </a:ln>
+        </p:spPr>
+        <p:style>
+          <a:lnRef idx="2">
+            <a:schemeClr val="accent1">
+              <a:shade val="50000"/>
+            </a:schemeClr>
+          </a:lnRef>
+          <a:fillRef idx="1">
+            <a:schemeClr val="accent1"/>
+          </a:fillRef>
+          <a:effectRef idx="0">
+            <a:schemeClr val="accent1"/>
+          </a:effectRef>
+          <a:fontRef idx="minor">
+            <a:schemeClr val="lt1"/>
+          </a:fontRef>
+        </p:style>
+        <p:txBody>
+          <a:bodyPr lIns="83976" tIns="41987" rIns="83976" bIns="41987" rtlCol="1" anchor="t"/>
+          <a:lstStyle/>
+          <a:p>
+            <a:pPr lvl="0" algn="ctr" rtl="0"/>
+            <a:endParaRPr lang="en-US" sz="4300" dirty="0">
+              <a:solidFill>
+                <a:prstClr val="black"/>
+              </a:solidFill>
+            </a:endParaRPr>
+          </a:p>
+        </p:txBody>
+      </p:sp>
+      <p:sp>
+        <p:nvSpPr>
+          <p:cNvPr id="51" name="Rectangle 50"/>
+          <p:cNvSpPr/>
+          <p:nvPr/>
+        </p:nvSpPr>
+        <p:spPr>
+          <a:xfrm>
+            <a:off x="22522614" y="5375614"/>
+            <a:ext cx="8612485" cy="2263491"/>
+          </a:xfrm>
+          <a:prstGeom prst="rect">
+            <a:avLst/>
+          </a:prstGeom>
+        </p:spPr>
+        <p:txBody>
+          <a:bodyPr wrap="square" lIns="108000" tIns="54000" rIns="108000" bIns="54000">
+            <a:spAutoFit/>
+          </a:bodyPr>
+          <a:lstStyle/>
+          <a:p>
+            <a:pPr lvl="0" algn="ctr" rtl="0"/>
+            <a:r>
+              <a:rPr lang="en-US" sz="4400" b="1" dirty="0" smtClean="0">
+                <a:solidFill>
+                  <a:prstClr val="black"/>
+                </a:solidFill>
+              </a:rPr>
+              <a:t>Complexity and Runtimes</a:t>
+            </a:r>
+            <a:endParaRPr lang="en-US" sz="3600" dirty="0" smtClean="0">
+              <a:solidFill>
+                <a:prstClr val="black"/>
+              </a:solidFill>
+            </a:endParaRPr>
+          </a:p>
+          <a:p>
+            <a:pPr algn="l" rtl="0"/>
+            <a:r>
+              <a:rPr lang="en-US" sz="3200" dirty="0" smtClean="0"/>
+              <a:t>We </a:t>
+            </a:r>
+            <a:r>
+              <a:rPr lang="en-US" sz="3200" dirty="0"/>
+              <a:t>compared COMET with approaches that avoid repeated projections to the PD cone and  to the Euclidean metric baseline.</a:t>
+            </a:r>
+          </a:p>
+        </p:txBody>
+      </p:sp>
+      <p:pic>
+        <p:nvPicPr>
+          <p:cNvPr id="9" name="Picture 8"/>
+          <p:cNvPicPr>
+            <a:picLocks noChangeAspect="1"/>
+          </p:cNvPicPr>
+          <p:nvPr/>
+        </p:nvPicPr>
+        <p:blipFill>
+          <a:blip r:embed="rId23"/>
+          <a:stretch>
+            <a:fillRect/>
+          </a:stretch>
+        </p:blipFill>
+        <p:spPr>
+          <a:xfrm>
+            <a:off x="22522615" y="7777089"/>
+            <a:ext cx="8612484" cy="1326930"/>
+          </a:xfrm>
+          <a:prstGeom prst="rect">
+            <a:avLst/>
+          </a:prstGeom>
+        </p:spPr>
+      </p:pic>
+      <p:sp>
+        <p:nvSpPr>
+          <p:cNvPr id="70" name="Rectangle 69"/>
+          <p:cNvSpPr/>
+          <p:nvPr/>
+        </p:nvSpPr>
+        <p:spPr>
+          <a:xfrm>
+            <a:off x="22414188" y="14173068"/>
+            <a:ext cx="8849661" cy="786163"/>
+          </a:xfrm>
+          <a:prstGeom prst="rect">
+            <a:avLst/>
+          </a:prstGeom>
+        </p:spPr>
+        <p:txBody>
+          <a:bodyPr wrap="square" lIns="108000" tIns="54000" rIns="108000" bIns="54000">
+            <a:spAutoFit/>
+          </a:bodyPr>
+          <a:lstStyle/>
+          <a:p>
+            <a:pPr algn="ctr" rtl="0"/>
+            <a:r>
+              <a:rPr lang="en-US" sz="4400" b="1" dirty="0" smtClean="0"/>
+              <a:t>COMET </a:t>
+            </a:r>
+            <a:r>
+              <a:rPr lang="en-US" sz="4400" b="1" dirty="0"/>
+              <a:t>achieves better </a:t>
+            </a:r>
+            <a:r>
+              <a:rPr lang="en-US" sz="4400" b="1" dirty="0" smtClean="0"/>
+              <a:t>precision.</a:t>
+            </a:r>
+            <a:endParaRPr lang="en-US" sz="4400" b="1" dirty="0"/>
+          </a:p>
+        </p:txBody>
+      </p:sp>
+      <p:sp>
+        <p:nvSpPr>
+          <p:cNvPr id="72" name="Rectangle 71"/>
+          <p:cNvSpPr/>
+          <p:nvPr/>
+        </p:nvSpPr>
+        <p:spPr>
+          <a:xfrm>
+            <a:off x="32702110" y="5397206"/>
+            <a:ext cx="8849661" cy="1740270"/>
+          </a:xfrm>
+          <a:prstGeom prst="rect">
+            <a:avLst/>
+          </a:prstGeom>
+        </p:spPr>
+        <p:txBody>
+          <a:bodyPr wrap="square" lIns="108000" tIns="54000" rIns="108000" bIns="54000">
+            <a:spAutoFit/>
+          </a:bodyPr>
+          <a:lstStyle/>
+          <a:p>
+            <a:pPr algn="ctr" rtl="0"/>
+            <a:r>
+              <a:rPr lang="en-US" sz="4400" b="1" dirty="0"/>
+              <a:t>The effect of sparsity on precision and </a:t>
+            </a:r>
+            <a:r>
+              <a:rPr lang="en-US" sz="4400" b="1" dirty="0" smtClean="0"/>
+              <a:t>runtime</a:t>
+            </a:r>
+          </a:p>
+          <a:p>
+            <a:pPr algn="l" rtl="0"/>
+            <a:endParaRPr lang="en-US" sz="1800" b="1" dirty="0"/>
+          </a:p>
+        </p:txBody>
+      </p:sp>
+      <p:sp>
+        <p:nvSpPr>
+          <p:cNvPr id="73" name="Rectangle 72"/>
+          <p:cNvSpPr/>
+          <p:nvPr/>
+        </p:nvSpPr>
+        <p:spPr>
+          <a:xfrm>
+            <a:off x="32757276" y="24548002"/>
+            <a:ext cx="8849661" cy="786163"/>
+          </a:xfrm>
+          <a:prstGeom prst="rect">
+            <a:avLst/>
+          </a:prstGeom>
+        </p:spPr>
+        <p:txBody>
+          <a:bodyPr wrap="square" lIns="108000" tIns="54000" rIns="108000" bIns="54000">
+            <a:spAutoFit/>
+          </a:bodyPr>
+          <a:lstStyle/>
+          <a:p>
+            <a:pPr algn="ctr" rtl="0"/>
+            <a:r>
+              <a:rPr lang="en-US" sz="4400" b="1" dirty="0" smtClean="0"/>
+              <a:t>Informative features are non-zeros</a:t>
+            </a:r>
+            <a:endParaRPr lang="en-US" sz="1800" b="1" dirty="0"/>
+          </a:p>
+        </p:txBody>
+      </p:sp>
+      <p:pic>
+        <p:nvPicPr>
+          <p:cNvPr id="2" name="Picture 2" descr="http://www.natcom.org/uploadedImages/More_Scholarly_Resources/Doctoral_Program_Resource_Guide/NYU%20Logo.jpg"/>
+          <p:cNvPicPr>
+            <a:picLocks noChangeAspect="1" noChangeArrowheads="1"/>
+          </p:cNvPicPr>
+          <p:nvPr/>
+        </p:nvPicPr>
+        <p:blipFill>
+          <a:blip r:embed="rId24">
+            <a:extLst>
+              <a:ext uri="{28A0092B-C50C-407E-A947-70E740481C1C}">
+                <a14:useLocalDpi xmlns:a14="http://schemas.microsoft.com/office/drawing/2010/main" val="0"/>
+              </a:ext>
+            </a:extLst>
+          </a:blip>
+          <a:srcRect/>
+          <a:stretch>
+            <a:fillRect/>
+          </a:stretch>
+        </p:blipFill>
+        <p:spPr bwMode="auto">
+          <a:xfrm>
+            <a:off x="39388676" y="910858"/>
+            <a:ext cx="3018839" cy="3018840"/>
+          </a:xfrm>
+          <a:prstGeom prst="rect">
+            <a:avLst/>
+          </a:prstGeom>
+          <a:noFill/>
+          <a:extLst>
+            <a:ext uri="{909E8E84-426E-40DD-AFC4-6F175D3DCCD1}">
+              <a14:hiddenFill xmlns:a14="http://schemas.microsoft.com/office/drawing/2010/main">
+                <a:solidFill>
+                  <a:srgbClr val="FFFFFF"/>
+                </a:solidFill>
+              </a14:hiddenFill>
+            </a:ext>
+          </a:extLst>
+        </p:spPr>
+      </p:pic>
+      <p:pic>
+        <p:nvPicPr>
+          <p:cNvPr id="16" name="Picture 15"/>
+          <p:cNvPicPr>
+            <a:picLocks noChangeAspect="1"/>
+          </p:cNvPicPr>
+          <p:nvPr/>
+        </p:nvPicPr>
+        <p:blipFill>
+          <a:blip r:embed="rId25"/>
+          <a:stretch>
+            <a:fillRect/>
+          </a:stretch>
+        </p:blipFill>
+        <p:spPr>
+          <a:xfrm>
+            <a:off x="1586235" y="26139129"/>
+            <a:ext cx="6610690" cy="2609984"/>
+          </a:xfrm>
+          <a:prstGeom prst="rect">
+            <a:avLst/>
+          </a:prstGeom>
+        </p:spPr>
+      </p:pic>
+      <mc:AlternateContent xmlns:mc="http://schemas.openxmlformats.org/markup-compatibility/2006">
+        <mc:Choice xmlns:a14="http://schemas.microsoft.com/office/drawing/2010/main" Requires="a14">
           <p:sp>
             <p:nvSpPr>
-              <p:cNvPr id="74" name="Rectangle 73"/>
+              <p:cNvPr id="75" name="Rectangle 74"/>
               <p:cNvSpPr/>
               <p:nvPr/>
             </p:nvSpPr>
             <p:spPr>
               <a:xfrm>
-                <a:off x="12085081" y="18059695"/>
-                <a:ext cx="8837095" cy="2645903"/>
+                <a:off x="12069455" y="18248930"/>
+                <a:ext cx="8610014" cy="13734901"/>
               </a:xfrm>
               <a:prstGeom prst="rect">
                 <a:avLst/>
@@ -10568,7 +10863,7 @@
               <a:p>
                 <a:pPr algn="l" rtl="0"/>
                 <a:r>
-                  <a:rPr lang="en-US" sz="3200" dirty="0" smtClean="0"/>
+                  <a:rPr lang="en-US" sz="3200" dirty="0"/>
                   <a:t>Using an overlapping </a:t>
                 </a:r>
                 <a:r>
@@ -10708,7 +11003,7 @@
                   <a:t> is a diagonal matrix, </a:t>
                 </a:r>
                 <a:r>
-                  <a:rPr lang="en-US" sz="3200" dirty="0" smtClean="0"/>
+                  <a:rPr lang="en-US" sz="3200" dirty="0"/>
                   <a:t>each </a:t>
                 </a:r>
                 <a14:m>
@@ -10819,7 +11114,7 @@
                   <a:t> row and column, with an all-zeros diagonal</a:t>
                 </a:r>
                 <a:r>
-                  <a:rPr lang="en-US" sz="3200" dirty="0" smtClean="0"/>
+                  <a:rPr lang="en-US" sz="3200" dirty="0"/>
                   <a:t>, </a:t>
                 </a:r>
                 <a14:m>
@@ -10902,7 +11197,7 @@
                       </m:e>
                     </m:nary>
                     <m:r>
-                      <a:rPr lang="en-US" sz="3200" b="0" i="1" smtClean="0">
+                      <a:rPr lang="en-US" sz="3200" i="1">
                         <a:latin typeface="Cambria Math" panose="02040503050406030204" pitchFamily="18" charset="0"/>
                       </a:rPr>
                       <m:t>.</m:t>
@@ -10911,370 +11206,19 @@
                 </a14:m>
                 <a:endParaRPr lang="en-US" sz="3200" dirty="0"/>
               </a:p>
-            </p:txBody>
-          </p:sp>
-        </mc:Choice>
-        <mc:Fallback xmlns="">
-          <p:sp>
-            <p:nvSpPr>
-              <p:cNvPr id="74" name="Rectangle 73"/>
-              <p:cNvSpPr>
-                <a:spLocks noRot="1" noChangeAspect="1" noMove="1" noResize="1" noEditPoints="1" noAdjustHandles="1" noChangeArrowheads="1" noChangeShapeType="1" noTextEdit="1"/>
-              </p:cNvSpPr>
-              <p:nvPr/>
-            </p:nvSpPr>
-            <p:spPr>
-              <a:xfrm>
-                <a:off x="12085081" y="18059695"/>
-                <a:ext cx="8837095" cy="2645903"/>
-              </a:xfrm>
-              <a:prstGeom prst="rect">
-                <a:avLst/>
-              </a:prstGeom>
-              <a:blipFill rotWithShape="0">
-                <a:blip r:embed="rId23"/>
-                <a:stretch>
-                  <a:fillRect l="-1517" t="-2535" r="-1379" b="-6452"/>
-                </a:stretch>
-              </a:blipFill>
-            </p:spPr>
-            <p:txBody>
-              <a:bodyPr/>
-              <a:lstStyle/>
               <a:p>
-                <a:r>
-                  <a:rPr lang="en-US">
-                    <a:noFill/>
-                  </a:rPr>
-                  <a:t> </a:t>
-                </a:r>
+                <a:pPr algn="l" rtl="0"/>
+                <a:endParaRPr lang="en-US" sz="3200" dirty="0" smtClean="0"/>
               </a:p>
-            </p:txBody>
-          </p:sp>
-        </mc:Fallback>
-      </mc:AlternateContent>
-      <p:sp>
-        <p:nvSpPr>
-          <p:cNvPr id="50" name="Rounded Rectangle 49"/>
-          <p:cNvSpPr/>
-          <p:nvPr/>
-        </p:nvSpPr>
-        <p:spPr>
-          <a:xfrm>
-            <a:off x="21963105" y="4968774"/>
-            <a:ext cx="9714936" cy="8496947"/>
-          </a:xfrm>
-          <a:prstGeom prst="roundRect">
-            <a:avLst/>
-          </a:prstGeom>
-          <a:solidFill>
-            <a:schemeClr val="bg1"/>
-          </a:solidFill>
-          <a:ln w="76200">
-            <a:solidFill>
-              <a:schemeClr val="tx1"/>
-            </a:solidFill>
-          </a:ln>
-        </p:spPr>
-        <p:style>
-          <a:lnRef idx="2">
-            <a:schemeClr val="accent1">
-              <a:shade val="50000"/>
-            </a:schemeClr>
-          </a:lnRef>
-          <a:fillRef idx="1">
-            <a:schemeClr val="accent1"/>
-          </a:fillRef>
-          <a:effectRef idx="0">
-            <a:schemeClr val="accent1"/>
-          </a:effectRef>
-          <a:fontRef idx="minor">
-            <a:schemeClr val="lt1"/>
-          </a:fontRef>
-        </p:style>
-        <p:txBody>
-          <a:bodyPr lIns="83976" tIns="41987" rIns="83976" bIns="41987" rtlCol="1" anchor="t"/>
-          <a:lstStyle/>
-          <a:p>
-            <a:pPr lvl="0" algn="ctr" rtl="0"/>
-            <a:endParaRPr lang="en-US" sz="4300" dirty="0">
-              <a:solidFill>
-                <a:prstClr val="black"/>
-              </a:solidFill>
-            </a:endParaRPr>
-          </a:p>
-        </p:txBody>
-      </p:sp>
-      <p:sp>
-        <p:nvSpPr>
-          <p:cNvPr id="51" name="Rectangle 50"/>
-          <p:cNvSpPr/>
-          <p:nvPr/>
-        </p:nvSpPr>
-        <p:spPr>
-          <a:xfrm>
-            <a:off x="22510308" y="5348618"/>
-            <a:ext cx="8849661" cy="2263491"/>
-          </a:xfrm>
-          <a:prstGeom prst="rect">
-            <a:avLst/>
-          </a:prstGeom>
-        </p:spPr>
-        <p:txBody>
-          <a:bodyPr wrap="square" lIns="108000" tIns="54000" rIns="108000" bIns="54000">
-            <a:spAutoFit/>
-          </a:bodyPr>
-          <a:lstStyle/>
-          <a:p>
-            <a:pPr lvl="0" algn="ctr" rtl="0"/>
-            <a:r>
-              <a:rPr lang="en-US" sz="4400" b="1" dirty="0" smtClean="0">
-                <a:solidFill>
-                  <a:prstClr val="black"/>
-                </a:solidFill>
-              </a:rPr>
-              <a:t>Complexity and Runtimes</a:t>
-            </a:r>
-            <a:endParaRPr lang="en-US" sz="3600" dirty="0" smtClean="0">
-              <a:solidFill>
-                <a:prstClr val="black"/>
-              </a:solidFill>
-            </a:endParaRPr>
-          </a:p>
-          <a:p>
-            <a:pPr algn="l" rtl="0"/>
-            <a:r>
-              <a:rPr lang="en-US" sz="3200" dirty="0" smtClean="0"/>
-              <a:t>We </a:t>
-            </a:r>
-            <a:r>
-              <a:rPr lang="en-US" sz="3200" dirty="0"/>
-              <a:t>compared COMET with approaches that avoid repeated projections to the PD cone and  to the Euclidean metric baseline.</a:t>
-            </a:r>
-          </a:p>
-        </p:txBody>
-      </p:sp>
-      <p:pic>
-        <p:nvPicPr>
-          <p:cNvPr id="9" name="Picture 8"/>
-          <p:cNvPicPr>
-            <a:picLocks noChangeAspect="1"/>
-          </p:cNvPicPr>
-          <p:nvPr/>
-        </p:nvPicPr>
-        <p:blipFill>
-          <a:blip r:embed="rId24"/>
-          <a:stretch>
-            <a:fillRect/>
-          </a:stretch>
-        </p:blipFill>
-        <p:spPr>
-          <a:xfrm>
-            <a:off x="22524711" y="7777089"/>
-            <a:ext cx="8696885" cy="1326930"/>
-          </a:xfrm>
-          <a:prstGeom prst="rect">
-            <a:avLst/>
-          </a:prstGeom>
-        </p:spPr>
-      </p:pic>
-      <p:sp>
-        <p:nvSpPr>
-          <p:cNvPr id="70" name="Rectangle 69"/>
-          <p:cNvSpPr/>
-          <p:nvPr/>
-        </p:nvSpPr>
-        <p:spPr>
-          <a:xfrm>
-            <a:off x="22414188" y="14173068"/>
-            <a:ext cx="8849661" cy="786163"/>
-          </a:xfrm>
-          <a:prstGeom prst="rect">
-            <a:avLst/>
-          </a:prstGeom>
-        </p:spPr>
-        <p:txBody>
-          <a:bodyPr wrap="square" lIns="108000" tIns="54000" rIns="108000" bIns="54000">
-            <a:spAutoFit/>
-          </a:bodyPr>
-          <a:lstStyle/>
-          <a:p>
-            <a:pPr algn="ctr" rtl="0"/>
-            <a:r>
-              <a:rPr lang="en-US" sz="4400" b="1" dirty="0" smtClean="0"/>
-              <a:t>COMET </a:t>
-            </a:r>
-            <a:r>
-              <a:rPr lang="en-US" sz="4400" b="1" dirty="0"/>
-              <a:t>achieves better </a:t>
-            </a:r>
-            <a:r>
-              <a:rPr lang="en-US" sz="4400" b="1" dirty="0" smtClean="0"/>
-              <a:t>precision.</a:t>
-            </a:r>
-            <a:endParaRPr lang="en-US" sz="4400" b="1" dirty="0"/>
-          </a:p>
-        </p:txBody>
-      </p:sp>
-      <p:sp>
-        <p:nvSpPr>
-          <p:cNvPr id="72" name="Rectangle 71"/>
-          <p:cNvSpPr/>
-          <p:nvPr/>
-        </p:nvSpPr>
-        <p:spPr>
-          <a:xfrm>
-            <a:off x="32908909" y="5348618"/>
-            <a:ext cx="8849661" cy="1740270"/>
-          </a:xfrm>
-          <a:prstGeom prst="rect">
-            <a:avLst/>
-          </a:prstGeom>
-        </p:spPr>
-        <p:txBody>
-          <a:bodyPr wrap="square" lIns="108000" tIns="54000" rIns="108000" bIns="54000">
-            <a:spAutoFit/>
-          </a:bodyPr>
-          <a:lstStyle/>
-          <a:p>
-            <a:pPr algn="ctr" rtl="0"/>
-            <a:r>
-              <a:rPr lang="en-US" sz="4400" b="1" dirty="0"/>
-              <a:t>The effect of sparsity on precision and </a:t>
-            </a:r>
-            <a:r>
-              <a:rPr lang="en-US" sz="4400" b="1" dirty="0" smtClean="0"/>
-              <a:t>runtime</a:t>
-            </a:r>
-          </a:p>
-          <a:p>
-            <a:pPr algn="l" rtl="0"/>
-            <a:endParaRPr lang="en-US" sz="1800" b="1" dirty="0"/>
-          </a:p>
-        </p:txBody>
-      </p:sp>
-      <p:sp>
-        <p:nvSpPr>
-          <p:cNvPr id="73" name="Rectangle 72"/>
-          <p:cNvSpPr/>
-          <p:nvPr/>
-        </p:nvSpPr>
-        <p:spPr>
-          <a:xfrm>
-            <a:off x="32763940" y="24266921"/>
-            <a:ext cx="8849661" cy="786163"/>
-          </a:xfrm>
-          <a:prstGeom prst="rect">
-            <a:avLst/>
-          </a:prstGeom>
-        </p:spPr>
-        <p:txBody>
-          <a:bodyPr wrap="square" lIns="108000" tIns="54000" rIns="108000" bIns="54000">
-            <a:spAutoFit/>
-          </a:bodyPr>
-          <a:lstStyle/>
-          <a:p>
-            <a:pPr algn="ctr" rtl="0"/>
-            <a:r>
-              <a:rPr lang="en-US" sz="4400" b="1" dirty="0" smtClean="0"/>
-              <a:t>Informative features are non-zeros</a:t>
-            </a:r>
-            <a:endParaRPr lang="en-US" sz="1800" b="1" dirty="0"/>
-          </a:p>
-        </p:txBody>
-      </p:sp>
-      <p:pic>
-        <p:nvPicPr>
-          <p:cNvPr id="2" name="Picture 2" descr="http://www.natcom.org/uploadedImages/More_Scholarly_Resources/Doctoral_Program_Resource_Guide/NYU%20Logo.jpg"/>
-          <p:cNvPicPr>
-            <a:picLocks noChangeAspect="1" noChangeArrowheads="1"/>
-          </p:cNvPicPr>
-          <p:nvPr/>
-        </p:nvPicPr>
-        <p:blipFill>
-          <a:blip r:embed="rId25">
-            <a:extLst>
-              <a:ext uri="{28A0092B-C50C-407E-A947-70E740481C1C}">
-                <a14:useLocalDpi xmlns:a14="http://schemas.microsoft.com/office/drawing/2010/main" val="0"/>
-              </a:ext>
-            </a:extLst>
-          </a:blip>
-          <a:srcRect/>
-          <a:stretch>
-            <a:fillRect/>
-          </a:stretch>
-        </p:blipFill>
-        <p:spPr bwMode="auto">
-          <a:xfrm>
-            <a:off x="39388676" y="910858"/>
-            <a:ext cx="3018839" cy="3018840"/>
-          </a:xfrm>
-          <a:prstGeom prst="rect">
-            <a:avLst/>
-          </a:prstGeom>
-          <a:noFill/>
-          <a:extLst>
-            <a:ext uri="{909E8E84-426E-40DD-AFC4-6F175D3DCCD1}">
-              <a14:hiddenFill xmlns:a14="http://schemas.microsoft.com/office/drawing/2010/main">
-                <a:solidFill>
-                  <a:srgbClr val="FFFFFF"/>
-                </a:solidFill>
-              </a14:hiddenFill>
-            </a:ext>
-          </a:extLst>
-        </p:spPr>
-      </p:pic>
-      <p:pic>
-        <p:nvPicPr>
-          <p:cNvPr id="16" name="Picture 15"/>
-          <p:cNvPicPr>
-            <a:picLocks noChangeAspect="1"/>
-          </p:cNvPicPr>
-          <p:nvPr/>
-        </p:nvPicPr>
-        <p:blipFill>
-          <a:blip r:embed="rId26"/>
-          <a:stretch>
-            <a:fillRect/>
-          </a:stretch>
-        </p:blipFill>
-        <p:spPr>
-          <a:xfrm>
-            <a:off x="1586235" y="26139129"/>
-            <a:ext cx="6610690" cy="2609984"/>
-          </a:xfrm>
-          <a:prstGeom prst="rect">
-            <a:avLst/>
-          </a:prstGeom>
-        </p:spPr>
-      </p:pic>
-      <mc:AlternateContent xmlns:mc="http://schemas.openxmlformats.org/markup-compatibility/2006" xmlns:a14="http://schemas.microsoft.com/office/drawing/2010/main">
-        <mc:Choice Requires="a14">
-          <p:sp>
-            <p:nvSpPr>
-              <p:cNvPr id="75" name="Rectangle 74"/>
-              <p:cNvSpPr/>
-              <p:nvPr/>
-            </p:nvSpPr>
-            <p:spPr>
-              <a:xfrm>
-                <a:off x="12083856" y="20736961"/>
-                <a:ext cx="8838320" cy="10215091"/>
-              </a:xfrm>
-              <a:prstGeom prst="rect">
-                <a:avLst/>
-              </a:prstGeom>
-            </p:spPr>
-            <p:txBody>
-              <a:bodyPr wrap="square" lIns="108000" tIns="54000" rIns="108000" bIns="54000">
-                <a:spAutoFit/>
-              </a:bodyPr>
-              <a:lstStyle/>
               <a:p>
                 <a:pPr algn="l" rtl="0"/>
                 <a:r>
                   <a:rPr lang="en-US" sz="3200" dirty="0" smtClean="0"/>
-                  <a:t>A group-sparse norm penalty encourages solutions with fewer features:</a:t>
+                  <a:t>A </a:t>
+                </a:r>
+                <a:r>
+                  <a:rPr lang="en-US" sz="3200" dirty="0" smtClean="0"/>
+                  <a:t>group-sparse norm penalty encourages solutions with fewer features:</a:t>
                 </a:r>
               </a:p>
               <a:p>
@@ -12557,7 +12501,7 @@
             </p:txBody>
           </p:sp>
         </mc:Choice>
-        <mc:Fallback xmlns="">
+        <mc:Fallback>
           <p:sp>
             <p:nvSpPr>
               <p:cNvPr id="75" name="Rectangle 74"/>
@@ -12568,16 +12512,16 @@
             </p:nvSpPr>
             <p:spPr>
               <a:xfrm>
-                <a:off x="12083856" y="20736961"/>
-                <a:ext cx="8838320" cy="10215091"/>
+                <a:off x="12069455" y="18248930"/>
+                <a:ext cx="8610014" cy="13734901"/>
               </a:xfrm>
               <a:prstGeom prst="rect">
                 <a:avLst/>
               </a:prstGeom>
               <a:blipFill rotWithShape="0">
-                <a:blip r:embed="rId27"/>
+                <a:blip r:embed="rId26"/>
                 <a:stretch>
-                  <a:fillRect l="-1586" t="-716"/>
+                  <a:fillRect l="-1629" t="-488" r="-2479"/>
                 </a:stretch>
               </a:blipFill>
             </p:spPr>
@@ -13442,8 +13386,8 @@
         </p:nvSpPr>
         <p:spPr bwMode="auto">
           <a:xfrm>
-            <a:off x="8593547" y="26276896"/>
-            <a:ext cx="1991929" cy="2310505"/>
+            <a:off x="8323849" y="26276896"/>
+            <a:ext cx="1920240" cy="2310505"/>
           </a:xfrm>
           <a:prstGeom prst="rect">
             <a:avLst/>
@@ -13847,22 +13791,22 @@
           <p:nvPr/>
         </p:nvPicPr>
         <p:blipFill rotWithShape="1">
-          <a:blip r:embed="rId28"/>
+          <a:blip r:embed="rId27"/>
           <a:srcRect r="4094"/>
           <a:stretch/>
         </p:blipFill>
         <p:spPr>
           <a:xfrm>
-            <a:off x="22305640" y="9621067"/>
-            <a:ext cx="9101506" cy="1982022"/>
+            <a:off x="22522614" y="9621067"/>
+            <a:ext cx="8612485" cy="1875529"/>
           </a:xfrm>
           <a:prstGeom prst="rect">
             <a:avLst/>
           </a:prstGeom>
         </p:spPr>
       </p:pic>
-      <mc:AlternateContent xmlns:mc="http://schemas.openxmlformats.org/markup-compatibility/2006" xmlns:a14="http://schemas.microsoft.com/office/drawing/2010/main">
-        <mc:Choice Requires="a14">
+      <mc:AlternateContent xmlns:mc="http://schemas.openxmlformats.org/markup-compatibility/2006">
+        <mc:Choice xmlns:a14="http://schemas.microsoft.com/office/drawing/2010/main" Requires="a14">
           <p:sp>
             <p:nvSpPr>
               <p:cNvPr id="63" name="Text Box 115"/>
@@ -13873,8 +13817,8 @@
             </p:nvSpPr>
             <p:spPr bwMode="auto">
               <a:xfrm>
-                <a:off x="22391015" y="11813666"/>
-                <a:ext cx="8964410" cy="1202510"/>
+                <a:off x="22520517" y="11813666"/>
+                <a:ext cx="8614582" cy="1202510"/>
               </a:xfrm>
               <a:prstGeom prst="rect">
                 <a:avLst/>
@@ -14301,7 +14245,7 @@
             </p:txBody>
           </p:sp>
         </mc:Choice>
-        <mc:Fallback xmlns="">
+        <mc:Fallback>
           <p:sp>
             <p:nvSpPr>
               <p:cNvPr id="63" name="Text Box 115"/>
@@ -14312,16 +14256,16 @@
             </p:nvSpPr>
             <p:spPr bwMode="auto">
               <a:xfrm>
-                <a:off x="22391015" y="11813666"/>
-                <a:ext cx="8964410" cy="1202510"/>
+                <a:off x="22520517" y="11813666"/>
+                <a:ext cx="8614582" cy="1202510"/>
               </a:xfrm>
               <a:prstGeom prst="rect">
                 <a:avLst/>
               </a:prstGeom>
               <a:blipFill rotWithShape="0">
-                <a:blip r:embed="rId29"/>
+                <a:blip r:embed="rId28"/>
                 <a:stretch>
-                  <a:fillRect l="-1088" t="-3553" b="-11168"/>
+                  <a:fillRect l="-1062" t="-3553" b="-11168"/>
                 </a:stretch>
               </a:blipFill>
               <a:ln>
@@ -14347,45 +14291,6 @@
       </mc:AlternateContent>
       <p:pic>
         <p:nvPicPr>
-          <p:cNvPr id="49" name="Picture 10" descr="http://chechiklab.biu.ac.il/~yuvval/figs/comet/Precision_at_K_all_datasets.png"/>
-          <p:cNvPicPr>
-            <a:picLocks noChangeAspect="1" noChangeArrowheads="1"/>
-          </p:cNvPicPr>
-          <p:nvPr/>
-        </p:nvPicPr>
-        <p:blipFill rotWithShape="1">
-          <a:blip r:embed="rId30" cstate="print">
-            <a:extLst>
-              <a:ext uri="{28A0092B-C50C-407E-A947-70E740481C1C}">
-                <a14:useLocalDpi xmlns:a14="http://schemas.microsoft.com/office/drawing/2010/main" val="0"/>
-              </a:ext>
-            </a:extLst>
-          </a:blip>
-          <a:srcRect l="6018" t="18639" r="54515" b="14404"/>
-          <a:stretch/>
-        </p:blipFill>
-        <p:spPr bwMode="auto">
-          <a:xfrm>
-            <a:off x="23396926" y="21962665"/>
-            <a:ext cx="7050277" cy="7310284"/>
-          </a:xfrm>
-          <a:prstGeom prst="rect">
-            <a:avLst/>
-          </a:prstGeom>
-          <a:noFill/>
-          <a:extLst>
-            <a:ext uri="{909E8E84-426E-40DD-AFC4-6F175D3DCCD1}">
-              <a14:hiddenFill xmlns:a14="http://schemas.microsoft.com/office/drawing/2010/main">
-                <a:solidFill>
-                  <a:srgbClr val="FFFFFF"/>
-                </a:solidFill>
-              </a14:hiddenFill>
-            </a:ext>
-          </a:extLst>
-        </p:spPr>
-      </p:pic>
-      <p:pic>
-        <p:nvPicPr>
           <p:cNvPr id="1034" name="Picture 10" descr="http://chechiklab.biu.ac.il/~yuvval/figs/comet/Precision_at_K_all_datasets.png"/>
           <p:cNvPicPr>
             <a:picLocks noChangeAspect="1" noChangeArrowheads="1"/>
@@ -14393,7 +14298,7 @@
           <p:nvPr/>
         </p:nvPicPr>
         <p:blipFill rotWithShape="1">
-          <a:blip r:embed="rId30" cstate="print">
+          <a:blip r:embed="rId29" cstate="print">
             <a:extLst>
               <a:ext uri="{28A0092B-C50C-407E-A947-70E740481C1C}">
                 <a14:useLocalDpi xmlns:a14="http://schemas.microsoft.com/office/drawing/2010/main" val="0"/>
@@ -14438,14 +14343,173 @@
         </p:blipFill>
         <p:spPr>
           <a:xfrm>
-            <a:off x="32855073" y="6699701"/>
-            <a:ext cx="8468315" cy="6766020"/>
+            <a:off x="32814740" y="6699700"/>
+            <a:ext cx="8624403" cy="6890731"/>
           </a:xfrm>
           <a:prstGeom prst="rect">
             <a:avLst/>
           </a:prstGeom>
         </p:spPr>
       </p:pic>
+      <p:pic>
+        <p:nvPicPr>
+          <p:cNvPr id="49" name="Picture 10" descr="http://chechiklab.biu.ac.il/~yuvval/figs/comet/Precision_at_K_all_datasets.png"/>
+          <p:cNvPicPr>
+            <a:picLocks noChangeAspect="1" noChangeArrowheads="1"/>
+          </p:cNvPicPr>
+          <p:nvPr/>
+        </p:nvPicPr>
+        <p:blipFill rotWithShape="1">
+          <a:blip r:embed="rId29" cstate="print">
+            <a:extLst>
+              <a:ext uri="{28A0092B-C50C-407E-A947-70E740481C1C}">
+                <a14:useLocalDpi xmlns:a14="http://schemas.microsoft.com/office/drawing/2010/main" val="0"/>
+              </a:ext>
+            </a:extLst>
+          </a:blip>
+          <a:srcRect l="6018" t="18639" r="54515" b="14404"/>
+          <a:stretch/>
+        </p:blipFill>
+        <p:spPr bwMode="auto">
+          <a:xfrm>
+            <a:off x="23396926" y="21962665"/>
+            <a:ext cx="7050277" cy="7310284"/>
+          </a:xfrm>
+          <a:prstGeom prst="rect">
+            <a:avLst/>
+          </a:prstGeom>
+          <a:noFill/>
+          <a:extLst>
+            <a:ext uri="{909E8E84-426E-40DD-AFC4-6F175D3DCCD1}">
+              <a14:hiddenFill xmlns:a14="http://schemas.microsoft.com/office/drawing/2010/main">
+                <a:solidFill>
+                  <a:srgbClr val="FFFFFF"/>
+                </a:solidFill>
+              </a14:hiddenFill>
+            </a:ext>
+          </a:extLst>
+        </p:spPr>
+      </p:pic>
+      <p:sp>
+        <p:nvSpPr>
+          <p:cNvPr id="4" name="Rectangle 3"/>
+          <p:cNvSpPr/>
+          <p:nvPr/>
+        </p:nvSpPr>
+        <p:spPr>
+          <a:xfrm>
+            <a:off x="1085293" y="19779561"/>
+            <a:ext cx="557412" cy="2748716"/>
+          </a:xfrm>
+          <a:prstGeom prst="rect">
+            <a:avLst/>
+          </a:prstGeom>
+        </p:spPr>
+        <p:style>
+          <a:lnRef idx="2">
+            <a:schemeClr val="accent1">
+              <a:shade val="50000"/>
+            </a:schemeClr>
+          </a:lnRef>
+          <a:fillRef idx="1">
+            <a:schemeClr val="accent1"/>
+          </a:fillRef>
+          <a:effectRef idx="0">
+            <a:schemeClr val="accent1"/>
+          </a:effectRef>
+          <a:fontRef idx="minor">
+            <a:schemeClr val="lt1"/>
+          </a:fontRef>
+        </p:style>
+        <p:txBody>
+          <a:bodyPr rtlCol="0" anchor="ctr"/>
+          <a:lstStyle/>
+          <a:p>
+            <a:pPr algn="ctr"/>
+            <a:endParaRPr lang="en-US"/>
+          </a:p>
+        </p:txBody>
+      </p:sp>
+      <p:sp>
+        <p:nvSpPr>
+          <p:cNvPr id="67" name="Rectangle 66"/>
+          <p:cNvSpPr/>
+          <p:nvPr/>
+        </p:nvSpPr>
+        <p:spPr>
+          <a:xfrm>
+            <a:off x="10244088" y="23246397"/>
+            <a:ext cx="557412" cy="2748716"/>
+          </a:xfrm>
+          <a:prstGeom prst="rect">
+            <a:avLst/>
+          </a:prstGeom>
+        </p:spPr>
+        <p:style>
+          <a:lnRef idx="2">
+            <a:schemeClr val="accent1">
+              <a:shade val="50000"/>
+            </a:schemeClr>
+          </a:lnRef>
+          <a:fillRef idx="1">
+            <a:schemeClr val="accent1"/>
+          </a:fillRef>
+          <a:effectRef idx="0">
+            <a:schemeClr val="accent1"/>
+          </a:effectRef>
+          <a:fontRef idx="minor">
+            <a:schemeClr val="lt1"/>
+          </a:fontRef>
+        </p:style>
+        <p:txBody>
+          <a:bodyPr rtlCol="0" anchor="ctr"/>
+          <a:lstStyle/>
+          <a:p>
+            <a:pPr algn="ctr"/>
+            <a:endParaRPr lang="en-US"/>
+          </a:p>
+        </p:txBody>
+      </p:sp>
+      <p:sp>
+        <p:nvSpPr>
+          <p:cNvPr id="71" name="Rectangle 70"/>
+          <p:cNvSpPr/>
+          <p:nvPr/>
+        </p:nvSpPr>
+        <p:spPr>
+          <a:xfrm rot="16200000">
+            <a:off x="5563726" y="17080240"/>
+            <a:ext cx="406840" cy="2748716"/>
+          </a:xfrm>
+          <a:prstGeom prst="rect">
+            <a:avLst/>
+          </a:prstGeom>
+        </p:spPr>
+        <p:style>
+          <a:lnRef idx="2">
+            <a:schemeClr val="accent1">
+              <a:shade val="50000"/>
+            </a:schemeClr>
+          </a:lnRef>
+          <a:fillRef idx="1">
+            <a:schemeClr val="accent1"/>
+          </a:fillRef>
+          <a:effectRef idx="0">
+            <a:schemeClr val="accent1"/>
+          </a:effectRef>
+          <a:fontRef idx="minor">
+            <a:schemeClr val="lt1"/>
+          </a:fontRef>
+        </p:style>
+        <p:txBody>
+          <a:bodyPr rtlCol="0" anchor="ctr"/>
+          <a:lstStyle/>
+          <a:p>
+            <a:pPr algn="ctr"/>
+            <a:endParaRPr lang="en-US"/>
+          </a:p>
+        </p:txBody>
+      </p:sp>
     </p:spTree>
   </p:cSld>
   <p:clrMapOvr>

</xml_diff>

<commit_message>
-- add the content we discussed before. -- Add text explaining the figures if necessary -- Font size of runtime table is too small. Make the first column narrower by breaking the names of methods to pan two lines each.    Then paste the table as larger. -- You have room to add the convergence theorem. -- Add text that satte that you evaluted using two datasets: Object recognition (Caltech256, xxx images) and text (RCV1, xxx documents).
Also,
Please use the same font for all text boxes.  currently you have various fonts, font sizes and spacing. Lets make it consistent
</commit_message>
<xml_diff>
--- a/COMET_poster.pptx
+++ b/COMET_poster.pptx
@@ -3598,8 +3598,8 @@
         </p:nvSpPr>
         <p:spPr>
           <a:xfrm>
-            <a:off x="22034747" y="13756312"/>
-            <a:ext cx="9721080" cy="18227519"/>
+            <a:off x="22034747" y="16153357"/>
+            <a:ext cx="9721080" cy="15830474"/>
           </a:xfrm>
           <a:prstGeom prst="roundRect">
             <a:avLst/>
@@ -4010,8 +4010,8 @@
         </p:nvSpPr>
         <p:spPr bwMode="auto">
           <a:xfrm>
-            <a:off x="28072393" y="15375987"/>
-            <a:ext cx="3191456" cy="7152857"/>
+            <a:off x="28072393" y="19462060"/>
+            <a:ext cx="3191456" cy="11933653"/>
           </a:xfrm>
           <a:prstGeom prst="rect">
             <a:avLst/>
@@ -4377,20 +4377,16 @@
               </a:spcBef>
             </a:pPr>
             <a:r>
-              <a:rPr lang="en-US" altLang="en-US" sz="2400" dirty="0" smtClean="0"/>
-              <a:t>80%/20% </a:t>
-            </a:r>
-            <a:r>
-              <a:rPr lang="en-US" altLang="en-US" sz="2400" dirty="0"/>
-              <a:t>train/test split, 5-fold </a:t>
-            </a:r>
-            <a:r>
-              <a:rPr lang="en-US" altLang="en-US" sz="2400" dirty="0" smtClean="0"/>
-              <a:t>cross-validation, </a:t>
-            </a:r>
-            <a:r>
-              <a:rPr lang="en-US" altLang="en-US" sz="2400" dirty="0" smtClean="0"/>
-              <a:t>comparing with: </a:t>
+              <a:rPr lang="en-US" altLang="en-US" sz="3200" b="1" dirty="0" err="1" smtClean="0">
+                <a:latin typeface="+mj-lt"/>
+              </a:rPr>
+              <a:t>Precision@top-k</a:t>
+            </a:r>
+            <a:r>
+              <a:rPr lang="en-US" altLang="en-US" sz="3200" dirty="0" smtClean="0">
+                <a:latin typeface="+mj-lt"/>
+              </a:rPr>
+              <a:t>, comparing with: </a:t>
             </a:r>
           </a:p>
           <a:p>
@@ -4400,19 +4396,27 @@
               </a:spcBef>
             </a:pPr>
             <a:r>
-              <a:rPr lang="en-AU" altLang="en-US" sz="2400" dirty="0" smtClean="0"/>
+              <a:rPr lang="en-AU" altLang="en-US" sz="3200" dirty="0" smtClean="0">
+                <a:latin typeface="+mj-lt"/>
+              </a:rPr>
               <a:t>Euclidean </a:t>
             </a:r>
             <a:r>
-              <a:rPr lang="en-AU" altLang="en-US" sz="2400" dirty="0"/>
+              <a:rPr lang="en-AU" altLang="en-US" sz="3200" dirty="0">
+                <a:latin typeface="+mj-lt"/>
+              </a:rPr>
               <a:t>metric (baseline)</a:t>
             </a:r>
             <a:r>
-              <a:rPr lang="ar-SA" altLang="en-US" sz="2400" dirty="0" smtClean="0"/>
+              <a:rPr lang="ar-SA" altLang="en-US" sz="3200" dirty="0" smtClean="0">
+                <a:latin typeface="+mj-lt"/>
+              </a:rPr>
               <a:t>‏</a:t>
             </a:r>
             <a:r>
-              <a:rPr lang="en-US" altLang="en-US" sz="2400" dirty="0" smtClean="0"/>
+              <a:rPr lang="en-US" altLang="en-US" sz="3200" dirty="0" smtClean="0">
+                <a:latin typeface="+mj-lt"/>
+              </a:rPr>
               <a:t>,</a:t>
             </a:r>
           </a:p>
@@ -4423,14 +4427,11 @@
               </a:spcBef>
             </a:pPr>
             <a:r>
-              <a:rPr lang="en-AU" altLang="en-US" sz="2400" dirty="0" smtClean="0"/>
-              <a:t>HDSL</a:t>
-            </a:r>
-            <a:r>
-              <a:rPr lang="en-AU" altLang="en-US" sz="2400" dirty="0" smtClean="0"/>
-              <a:t>: Similarity Learning for High Dimensional Sparse Data  [Liu et al, 2015], </a:t>
-            </a:r>
-            <a:endParaRPr lang="en-AU" altLang="en-US" sz="2400" dirty="0" smtClean="0"/>
+              <a:rPr lang="en-AU" altLang="en-US" sz="3200" dirty="0" smtClean="0">
+                <a:latin typeface="+mj-lt"/>
+              </a:rPr>
+              <a:t>HDSL: Similarity Learning for High Dimensional Sparse Data  [Liu et al, 2015], </a:t>
+            </a:r>
           </a:p>
           <a:p>
             <a:pPr algn="l" rtl="0">
@@ -4439,26 +4440,35 @@
               </a:spcBef>
             </a:pPr>
             <a:r>
-              <a:rPr lang="en-AU" altLang="en-US" sz="2400" dirty="0" smtClean="0"/>
+              <a:rPr lang="en-AU" altLang="en-US" sz="3200" dirty="0" smtClean="0">
+                <a:latin typeface="+mj-lt"/>
+              </a:rPr>
               <a:t>LEGO </a:t>
             </a:r>
             <a:r>
-              <a:rPr lang="en-AU" altLang="en-US" sz="2400" dirty="0"/>
+              <a:rPr lang="en-AU" altLang="en-US" sz="3200" dirty="0">
+                <a:latin typeface="+mj-lt"/>
+              </a:rPr>
               <a:t>(ITML): Log-</a:t>
             </a:r>
             <a:r>
-              <a:rPr lang="en-AU" altLang="en-US" sz="2400" dirty="0" err="1"/>
+              <a:rPr lang="en-AU" altLang="en-US" sz="3200" dirty="0" err="1">
+                <a:latin typeface="+mj-lt"/>
+              </a:rPr>
               <a:t>Det</a:t>
             </a:r>
             <a:r>
-              <a:rPr lang="en-AU" altLang="en-US" sz="2400" dirty="0"/>
+              <a:rPr lang="en-AU" altLang="en-US" sz="3200" dirty="0">
+                <a:latin typeface="+mj-lt"/>
+              </a:rPr>
               <a:t> Exact Gradient Online [</a:t>
             </a:r>
             <a:r>
-              <a:rPr lang="en-AU" altLang="en-US" sz="2400" dirty="0" smtClean="0"/>
+              <a:rPr lang="en-AU" altLang="en-US" sz="3200" dirty="0" smtClean="0">
+                <a:latin typeface="+mj-lt"/>
+              </a:rPr>
               <a:t>Jain et al. 2008], </a:t>
             </a:r>
-            <a:endParaRPr lang="en-AU" altLang="en-US" sz="2400" dirty="0" smtClean="0"/>
           </a:p>
           <a:p>
             <a:pPr algn="l" rtl="0">
@@ -4467,18 +4477,47 @@
               </a:spcBef>
             </a:pPr>
             <a:r>
-              <a:rPr lang="en-AU" altLang="en-US" sz="2400" dirty="0" err="1" smtClean="0"/>
+              <a:rPr lang="en-AU" altLang="en-US" sz="3200" dirty="0" err="1" smtClean="0">
+                <a:latin typeface="+mj-lt"/>
+              </a:rPr>
               <a:t>BoostMetric</a:t>
             </a:r>
             <a:r>
-              <a:rPr lang="en-AU" altLang="en-US" sz="2400" dirty="0" smtClean="0"/>
-              <a:t> </a:t>
-            </a:r>
-            <a:r>
-              <a:rPr lang="en-AU" altLang="en-US" sz="2400" dirty="0" smtClean="0"/>
-              <a:t>positive-semidefinite metric learning with boosting [Shen et al. 2009]</a:t>
-            </a:r>
-            <a:endParaRPr lang="en-AU" altLang="en-US" sz="2400" dirty="0"/>
+              <a:rPr lang="en-AU" altLang="en-US" sz="3200" dirty="0" smtClean="0">
+                <a:latin typeface="+mj-lt"/>
+              </a:rPr>
+              <a:t> positive-semidefinite metric learning with boosting [Shen et al. 2009],</a:t>
+            </a:r>
+          </a:p>
+          <a:p>
+            <a:pPr algn="l" rtl="0">
+              <a:spcBef>
+                <a:spcPts val="750"/>
+              </a:spcBef>
+            </a:pPr>
+            <a:r>
+              <a:rPr lang="en-US" altLang="en-US" sz="3200" dirty="0">
+                <a:solidFill>
+                  <a:prstClr val="black"/>
+                </a:solidFill>
+                <a:latin typeface="Calibri"/>
+                <a:cs typeface="+mn-cs"/>
+              </a:rPr>
+              <a:t>80%/20% train/test split, 5-fold </a:t>
+            </a:r>
+            <a:r>
+              <a:rPr lang="en-US" altLang="en-US" sz="3200" dirty="0" smtClean="0">
+                <a:solidFill>
+                  <a:prstClr val="black"/>
+                </a:solidFill>
+                <a:latin typeface="Calibri"/>
+                <a:cs typeface="+mn-cs"/>
+              </a:rPr>
+              <a:t>cross-validation</a:t>
+            </a:r>
+            <a:endParaRPr lang="en-AU" altLang="en-US" sz="3200" dirty="0">
+              <a:latin typeface="+mj-lt"/>
+            </a:endParaRPr>
           </a:p>
         </p:txBody>
       </p:sp>
@@ -4497,7 +4536,7 @@
         </p:blipFill>
         <p:spPr>
           <a:xfrm>
-            <a:off x="32725010" y="12229046"/>
+            <a:off x="32725010" y="14317278"/>
             <a:ext cx="5421807" cy="4044987"/>
           </a:xfrm>
           <a:prstGeom prst="rect">
@@ -4605,7 +4644,7 @@
             <p:spPr bwMode="auto">
               <a:xfrm>
                 <a:off x="38236547" y="25547524"/>
-                <a:ext cx="3202595" cy="2679837"/>
+                <a:ext cx="3202595" cy="4629089"/>
               </a:xfrm>
               <a:prstGeom prst="rect">
                 <a:avLst/>
@@ -4971,15 +5010,21 @@
                   </a:spcBef>
                 </a:pPr>
                 <a:r>
-                  <a:rPr lang="en-US" sz="2400" dirty="0" err="1" smtClean="0"/>
+                  <a:rPr lang="en-US" sz="3200" b="1" dirty="0" err="1" smtClean="0">
+                    <a:latin typeface="+mj-lt"/>
+                  </a:rPr>
                   <a:t>Frobenius</a:t>
                 </a:r>
                 <a:r>
-                  <a:rPr lang="en-US" sz="2400" dirty="0" smtClean="0"/>
+                  <a:rPr lang="en-US" sz="3200" b="1" dirty="0" smtClean="0">
+                    <a:latin typeface="+mj-lt"/>
+                  </a:rPr>
                   <a:t> </a:t>
                 </a:r>
                 <a:r>
-                  <a:rPr lang="en-US" sz="2400" dirty="0"/>
+                  <a:rPr lang="en-US" sz="3200" b="1" dirty="0">
+                    <a:latin typeface="+mj-lt"/>
+                  </a:rPr>
                   <a:t>norm of the groups </a:t>
                 </a:r>
                 <a14:m>
@@ -4987,38 +5032,58 @@
                     <m:sSub>
                       <m:sSubPr>
                         <m:ctrlPr>
-                          <a:rPr lang="en-US" sz="2400" i="1">
+                          <a:rPr lang="en-US" sz="3200" b="1" i="1">
                             <a:latin typeface="Cambria Math" panose="02040503050406030204" pitchFamily="18" charset="0"/>
                           </a:rPr>
                         </m:ctrlPr>
                       </m:sSubPr>
                       <m:e>
                         <m:r>
-                          <a:rPr lang="en-US" sz="2400" i="1">
+                          <a:rPr lang="en-US" sz="3200" b="1" i="1">
                             <a:latin typeface="Cambria Math" panose="02040503050406030204" pitchFamily="18" charset="0"/>
                           </a:rPr>
-                          <m:t>𝑉</m:t>
+                          <m:t>𝑽</m:t>
                         </m:r>
                       </m:e>
                       <m:sub>
                         <m:r>
-                          <a:rPr lang="en-US" sz="2400" i="1">
+                          <a:rPr lang="en-US" sz="3200" b="1" i="1">
                             <a:latin typeface="Cambria Math" panose="02040503050406030204" pitchFamily="18" charset="0"/>
                           </a:rPr>
-                          <m:t>𝑘</m:t>
+                          <m:t>𝒌</m:t>
                         </m:r>
                       </m:sub>
                     </m:sSub>
                   </m:oMath>
                 </a14:m>
                 <a:r>
-                  <a:rPr lang="en-US" sz="2400" dirty="0"/>
-                  <a:t> against the information gain of feature </a:t>
+                  <a:rPr lang="en-US" sz="3200" b="1" dirty="0">
+                    <a:latin typeface="+mj-lt"/>
+                  </a:rPr>
+                  <a:t> </a:t>
+                </a:r>
+                <a:r>
+                  <a:rPr lang="en-US" sz="3200" b="1" dirty="0" smtClean="0">
+                    <a:latin typeface="+mj-lt"/>
+                  </a:rPr>
+                  <a:t>vs. the info. gain</a:t>
+                </a:r>
+                <a:r>
+                  <a:rPr lang="en-US" sz="3200" dirty="0" smtClean="0">
+                    <a:latin typeface="+mj-lt"/>
+                  </a:rPr>
+                  <a:t> </a:t>
+                </a:r>
+                <a:r>
+                  <a:rPr lang="en-US" sz="3200" dirty="0">
+                    <a:latin typeface="+mj-lt"/>
+                  </a:rPr>
+                  <a:t>of feature </a:t>
                 </a:r>
                 <a14:m>
                   <m:oMath xmlns:m="http://schemas.openxmlformats.org/officeDocument/2006/math">
                     <m:r>
-                      <a:rPr lang="en-US" sz="2400" i="1">
+                      <a:rPr lang="en-US" sz="3200" i="1">
                         <a:latin typeface="Cambria Math" panose="02040503050406030204" pitchFamily="18" charset="0"/>
                       </a:rPr>
                       <m:t>𝑘</m:t>
@@ -5026,14 +5091,33 @@
                   </m:oMath>
                 </a14:m>
                 <a:r>
-                  <a:rPr lang="en-US" sz="2400" dirty="0" smtClean="0"/>
-                  <a:t>. Sparse </a:t>
+                  <a:rPr lang="en-US" sz="3200" dirty="0" smtClean="0">
+                    <a:latin typeface="+mj-lt"/>
+                  </a:rPr>
+                  <a:t>. </a:t>
+                </a:r>
+              </a:p>
+              <a:p>
+                <a:pPr algn="l" rtl="0">
+                  <a:spcBef>
+                    <a:spcPts val="750"/>
+                  </a:spcBef>
+                </a:pPr>
+                <a:r>
+                  <a:rPr lang="en-US" sz="3200" dirty="0" smtClean="0">
+                    <a:latin typeface="+mj-lt"/>
+                  </a:rPr>
+                  <a:t>Sparse </a:t>
                 </a:r>
                 <a:r>
-                  <a:rPr lang="en-US" sz="2400" dirty="0"/>
+                  <a:rPr lang="en-US" sz="3200" dirty="0">
+                    <a:latin typeface="+mj-lt"/>
+                  </a:rPr>
                   <a:t>COMET assigns zero weights to less-informative features.</a:t>
                 </a:r>
-                <a:endParaRPr lang="en-AU" altLang="en-US" sz="2400" dirty="0"/>
+                <a:endParaRPr lang="en-AU" altLang="en-US" sz="3200" dirty="0">
+                  <a:latin typeface="+mj-lt"/>
+                </a:endParaRPr>
               </a:p>
             </p:txBody>
           </p:sp>
@@ -5050,15 +5134,15 @@
             <p:spPr bwMode="auto">
               <a:xfrm>
                 <a:off x="38236547" y="25547524"/>
-                <a:ext cx="3202595" cy="2679837"/>
+                <a:ext cx="3202595" cy="4629089"/>
               </a:xfrm>
               <a:prstGeom prst="rect">
                 <a:avLst/>
               </a:prstGeom>
               <a:blipFill rotWithShape="0">
-                <a:blip r:embed="rId10"/>
+                <a:blip r:embed="rId9"/>
                 <a:stretch>
-                  <a:fillRect l="-2852" t="-1595" r="-4373" b="-4556"/>
+                  <a:fillRect l="-4753" t="-1713" b="-3426"/>
                 </a:stretch>
               </a:blipFill>
               <a:ln>
@@ -5082,8 +5166,8 @@
           </p:sp>
         </mc:Fallback>
       </mc:AlternateContent>
-      <mc:AlternateContent xmlns:mc="http://schemas.openxmlformats.org/markup-compatibility/2006">
-        <mc:Choice xmlns:a14="http://schemas.microsoft.com/office/drawing/2010/main" Requires="a14">
+      <mc:AlternateContent xmlns:mc="http://schemas.openxmlformats.org/markup-compatibility/2006" xmlns:a14="http://schemas.microsoft.com/office/drawing/2010/main">
+        <mc:Choice Requires="a14">
           <p:sp>
             <p:nvSpPr>
               <p:cNvPr id="129" name="Rounded Rectangle 128"/>
@@ -5171,11 +5255,6 @@
                   </a:rPr>
                   <a:t>matrix:</a:t>
                 </a:r>
-                <a:endParaRPr lang="en-US" sz="3200" dirty="0" smtClean="0">
-                  <a:solidFill>
-                    <a:schemeClr val="tx1"/>
-                  </a:solidFill>
-                </a:endParaRPr>
               </a:p>
               <a:p>
                 <a:pPr algn="l"/>
@@ -6425,7 +6504,7 @@
             </p:txBody>
           </p:sp>
         </mc:Choice>
-        <mc:Fallback>
+        <mc:Fallback xmlns="">
           <p:sp>
             <p:nvSpPr>
               <p:cNvPr id="129" name="Rounded Rectangle 128"/>
@@ -8336,7 +8415,6 @@
               <a:rPr lang="en-US" sz="3200" dirty="0" smtClean="0"/>
               <a:t>time. </a:t>
             </a:r>
-            <a:endParaRPr lang="en-US" sz="3200" dirty="0" smtClean="0"/>
           </a:p>
           <a:p>
             <a:pPr algn="l" rtl="0"/>
@@ -8346,11 +8424,7 @@
             <a:pPr algn="l" rtl="0"/>
             <a:r>
               <a:rPr lang="en-US" sz="3200" dirty="0" smtClean="0"/>
-              <a:t>Using t</a:t>
-            </a:r>
-            <a:r>
-              <a:rPr lang="en-US" sz="3200" dirty="0" smtClean="0"/>
-              <a:t>he </a:t>
+              <a:t>Using the </a:t>
             </a:r>
             <a:r>
               <a:rPr lang="en-US" sz="3200" dirty="0"/>
@@ -8366,18 +8440,14 @@
             </a:r>
             <a:r>
               <a:rPr lang="en-US" sz="3200" dirty="0" smtClean="0"/>
-              <a:t>complement </a:t>
-            </a:r>
-            <a:r>
-              <a:rPr lang="en-US" sz="3200" dirty="0" smtClean="0"/>
-              <a:t>to limit the step to the PD cone:</a:t>
+              <a:t>complement to limit the step to the PD cone:</a:t>
             </a:r>
             <a:endParaRPr lang="en-US" sz="3200" b="1" dirty="0"/>
           </a:p>
         </p:txBody>
       </p:sp>
-      <mc:AlternateContent xmlns:mc="http://schemas.openxmlformats.org/markup-compatibility/2006">
-        <mc:Choice xmlns:a14="http://schemas.microsoft.com/office/drawing/2010/main" Requires="a14">
+      <mc:AlternateContent xmlns:mc="http://schemas.openxmlformats.org/markup-compatibility/2006" xmlns:a14="http://schemas.microsoft.com/office/drawing/2010/main">
+        <mc:Choice Requires="a14">
           <p:sp>
             <p:nvSpPr>
               <p:cNvPr id="76" name="Rectangle 75"/>
@@ -9008,7 +9078,6 @@
                   <a:rPr lang="en-US" sz="3200" dirty="0" smtClean="0"/>
                   <a:t>.</a:t>
                 </a:r>
-                <a:endParaRPr lang="en-US" sz="3200" dirty="0" smtClean="0"/>
               </a:p>
               <a:p>
                 <a:pPr algn="l" rtl="0"/>
@@ -9170,7 +9239,7 @@
             </p:txBody>
           </p:sp>
         </mc:Choice>
-        <mc:Fallback>
+        <mc:Fallback xmlns="">
           <p:sp>
             <p:nvSpPr>
               <p:cNvPr id="76" name="Rectangle 75"/>
@@ -9305,18 +9374,10 @@
                   <a:prstClr val="black"/>
                 </a:solidFill>
               </a:rPr>
-              <a:t>COMET’s structured sparsity allows </a:t>
-            </a:r>
-            <a:r>
-              <a:rPr lang="en-US" sz="3200" dirty="0">
-                <a:solidFill>
-                  <a:prstClr val="black"/>
-                </a:solidFill>
-              </a:rPr>
-              <a:t>only a small set of features to interact with </a:t>
-            </a:r>
-            <a:r>
-              <a:rPr lang="en-US" sz="3200" i="1" dirty="0">
+              <a:t>Structured sparsity allows only a small set of features to interact with </a:t>
+            </a:r>
+            <a:r>
+              <a:rPr lang="en-US" sz="3200" i="1" dirty="0" smtClean="0">
                 <a:solidFill>
                   <a:prstClr val="black"/>
                 </a:solidFill>
@@ -9324,62 +9385,14 @@
               <a:t>any</a:t>
             </a:r>
             <a:r>
-              <a:rPr lang="en-US" sz="3200" dirty="0">
-                <a:solidFill>
-                  <a:prstClr val="black"/>
-                </a:solidFill>
-              </a:rPr>
-              <a:t> of the other features. </a:t>
-            </a:r>
-            <a:r>
               <a:rPr lang="en-US" sz="3200" dirty="0" smtClean="0">
                 <a:solidFill>
                   <a:prstClr val="black"/>
                 </a:solidFill>
               </a:rPr>
-              <a:t>Other individual features correspond to </a:t>
-            </a:r>
-            <a:r>
-              <a:rPr lang="en-US" sz="3200" dirty="0">
-                <a:solidFill>
-                  <a:prstClr val="black"/>
-                </a:solidFill>
-              </a:rPr>
-              <a:t>the diagonal of </a:t>
-            </a:r>
-            <a:r>
-              <a:rPr lang="en-US" sz="3200" dirty="0" smtClean="0">
-                <a:solidFill>
-                  <a:prstClr val="black"/>
-                </a:solidFill>
-              </a:rPr>
-              <a:t>the learned </a:t>
-            </a:r>
-            <a:r>
-              <a:rPr lang="en-US" sz="3200" dirty="0">
-                <a:solidFill>
-                  <a:prstClr val="black"/>
-                </a:solidFill>
-              </a:rPr>
-              <a:t>similarity </a:t>
-            </a:r>
-            <a:r>
-              <a:rPr lang="en-US" sz="3200" dirty="0" smtClean="0">
-                <a:solidFill>
-                  <a:prstClr val="black"/>
-                </a:solidFill>
-              </a:rPr>
-              <a:t>matrix</a:t>
-            </a:r>
-            <a:r>
-              <a:rPr lang="en-US" sz="3200" dirty="0">
-                <a:solidFill>
-                  <a:prstClr val="black"/>
-                </a:solidFill>
-              </a:rPr>
-              <a:t>.</a:t>
-            </a:r>
-            <a:endParaRPr lang="he-IL" sz="3200" i="1" dirty="0">
+              <a:t> of the other features. Other individual features correspond to the diagonal of the learned similarity matrix.</a:t>
+            </a:r>
+            <a:endParaRPr lang="he-IL" sz="3200" i="1" dirty="0" smtClean="0">
               <a:solidFill>
                 <a:prstClr val="black"/>
               </a:solidFill>
@@ -9419,8 +9432,8 @@
           </a:prstGeom>
         </p:spPr>
       </p:pic>
-      <mc:AlternateContent xmlns:mc="http://schemas.openxmlformats.org/markup-compatibility/2006">
-        <mc:Choice xmlns:a14="http://schemas.microsoft.com/office/drawing/2010/main" Requires="a14">
+      <mc:AlternateContent xmlns:mc="http://schemas.openxmlformats.org/markup-compatibility/2006" xmlns:a14="http://schemas.microsoft.com/office/drawing/2010/main">
+        <mc:Choice Requires="a14">
           <p:sp>
             <p:nvSpPr>
               <p:cNvPr id="40" name="Text Box 115"/>
@@ -9432,7 +9445,7 @@
             <p:spPr bwMode="auto">
               <a:xfrm>
                 <a:off x="17590892" y="8569177"/>
-                <a:ext cx="3202596" cy="2310505"/>
+                <a:ext cx="3202596" cy="4034054"/>
               </a:xfrm>
               <a:prstGeom prst="rect">
                 <a:avLst/>
@@ -9820,25 +9833,33 @@
                   </a:spcBef>
                 </a:pPr>
                 <a:r>
-                  <a:rPr lang="en-US" sz="2400" b="1" dirty="0"/>
+                  <a:rPr lang="en-US" sz="3200" b="1" dirty="0">
+                    <a:latin typeface="+mj-lt"/>
+                  </a:rPr>
                   <a:t>Structured sparsity:</a:t>
                 </a:r>
                 <a:r>
-                  <a:rPr lang="en-US" sz="2400" dirty="0"/>
+                  <a:rPr lang="en-US" sz="3200" dirty="0">
+                    <a:latin typeface="+mj-lt"/>
+                  </a:rPr>
                   <a:t> </a:t>
                 </a:r>
                 <a:r>
-                  <a:rPr lang="en-US" sz="2400" dirty="0" smtClean="0"/>
+                  <a:rPr lang="en-US" sz="3200" dirty="0" smtClean="0">
+                    <a:latin typeface="+mj-lt"/>
+                  </a:rPr>
                   <a:t>Absolute </a:t>
                 </a:r>
                 <a:r>
-                  <a:rPr lang="en-US" sz="2400" dirty="0"/>
+                  <a:rPr lang="en-US" sz="3200" dirty="0">
+                    <a:latin typeface="+mj-lt"/>
+                  </a:rPr>
                   <a:t>values of the elements of </a:t>
                 </a:r>
                 <a14:m>
                   <m:oMath xmlns:m="http://schemas.openxmlformats.org/officeDocument/2006/math">
                     <m:r>
-                      <a:rPr lang="en-US" sz="2400" i="1">
+                      <a:rPr lang="en-US" sz="3200" i="1">
                         <a:latin typeface="Cambria Math" panose="02040503050406030204" pitchFamily="18" charset="0"/>
                       </a:rPr>
                       <m:t>𝑊</m:t>
@@ -9846,23 +9867,31 @@
                   </m:oMath>
                 </a14:m>
                 <a:r>
-                  <a:rPr lang="en-US" sz="2400" dirty="0"/>
+                  <a:rPr lang="en-US" sz="3200" dirty="0">
+                    <a:latin typeface="+mj-lt"/>
+                  </a:rPr>
                   <a:t> trained on </a:t>
                 </a:r>
                 <a:r>
-                  <a:rPr lang="en-US" sz="2400" dirty="0" smtClean="0"/>
+                  <a:rPr lang="en-US" sz="3200" dirty="0" smtClean="0">
+                    <a:latin typeface="+mj-lt"/>
+                  </a:rPr>
                   <a:t>RCV1, features </a:t>
                 </a:r>
                 <a:r>
-                  <a:rPr lang="en-US" sz="2400" dirty="0"/>
+                  <a:rPr lang="en-US" sz="3200" dirty="0">
+                    <a:latin typeface="+mj-lt"/>
+                  </a:rPr>
                   <a:t>are ordered by their information gain.</a:t>
                 </a:r>
-                <a:endParaRPr lang="en-AU" altLang="en-US" sz="2400" dirty="0"/>
+                <a:endParaRPr lang="en-AU" altLang="en-US" sz="3200" dirty="0">
+                  <a:latin typeface="+mj-lt"/>
+                </a:endParaRPr>
               </a:p>
             </p:txBody>
           </p:sp>
         </mc:Choice>
-        <mc:Fallback>
+        <mc:Fallback xmlns="">
           <p:sp>
             <p:nvSpPr>
               <p:cNvPr id="40" name="Text Box 115"/>
@@ -9874,7 +9903,7 @@
             <p:spPr bwMode="auto">
               <a:xfrm>
                 <a:off x="17590892" y="8569177"/>
-                <a:ext cx="3202596" cy="2310505"/>
+                <a:ext cx="3202596" cy="4034054"/>
               </a:xfrm>
               <a:prstGeom prst="rect">
                 <a:avLst/>
@@ -9882,7 +9911,7 @@
               <a:blipFill rotWithShape="0">
                 <a:blip r:embed="rId20"/>
                 <a:stretch>
-                  <a:fillRect l="-3048" t="-1847" r="-4952" b="-5277"/>
+                  <a:fillRect l="-4952" t="-1967" r="-6476" b="-4085"/>
                 </a:stretch>
               </a:blipFill>
               <a:ln>
@@ -9973,8 +10002,8 @@
         </p:nvSpPr>
         <p:spPr>
           <a:xfrm>
-            <a:off x="21963105" y="4968774"/>
-            <a:ext cx="9714936" cy="8496947"/>
+            <a:off x="21963105" y="4968775"/>
+            <a:ext cx="9714936" cy="10945218"/>
           </a:xfrm>
           <a:prstGeom prst="roundRect">
             <a:avLst/>
@@ -10025,7 +10054,7 @@
         </p:nvSpPr>
         <p:spPr>
           <a:xfrm>
-            <a:off x="22522614" y="5375614"/>
+            <a:off x="22400351" y="5341966"/>
             <a:ext cx="8612485" cy="2263491"/>
           </a:xfrm>
           <a:prstGeom prst="rect">
@@ -10082,7 +10111,7 @@
         </p:blipFill>
         <p:spPr>
           <a:xfrm>
-            <a:off x="22522615" y="7777089"/>
+            <a:off x="22414188" y="7746273"/>
             <a:ext cx="8612484" cy="1326930"/>
           </a:xfrm>
           <a:prstGeom prst="rect">
@@ -10098,8 +10127,8 @@
         </p:nvSpPr>
         <p:spPr>
           <a:xfrm>
-            <a:off x="22414188" y="14173068"/>
-            <a:ext cx="8849661" cy="786163"/>
+            <a:off x="22414188" y="16441389"/>
+            <a:ext cx="8849661" cy="2755933"/>
           </a:xfrm>
           <a:prstGeom prst="rect">
             <a:avLst/>
@@ -10116,7 +10145,37 @@
               <a:rPr lang="en-US" sz="4400" b="1" dirty="0" smtClean="0"/>
               <a:t>Experimental Evaluation</a:t>
             </a:r>
-            <a:endParaRPr lang="en-US" sz="4400" b="1" dirty="0"/>
+          </a:p>
+          <a:p>
+            <a:pPr algn="l" rtl="0"/>
+            <a:r>
+              <a:rPr lang="en-US" sz="3200" dirty="0"/>
+              <a:t>Evaluated COMET with three datasets: Object recognition (Caltech256</a:t>
+            </a:r>
+            <a:r>
+              <a:rPr lang="en-US" sz="3200" dirty="0" smtClean="0"/>
+              <a:t>, 135k </a:t>
+            </a:r>
+            <a:r>
+              <a:rPr lang="en-US" sz="3200" dirty="0"/>
+              <a:t>triplets), text classification (RCV1, 4 </a:t>
+            </a:r>
+            <a:r>
+              <a:rPr lang="en-US" sz="3200" dirty="0" smtClean="0"/>
+              <a:t>classes, 100k </a:t>
+            </a:r>
+            <a:r>
+              <a:rPr lang="en-US" sz="3200" dirty="0"/>
+              <a:t>triplets), bio-informatics (Protein-LIBSVM, </a:t>
+            </a:r>
+            <a:r>
+              <a:rPr lang="en-US" sz="3200" dirty="0" smtClean="0"/>
+              <a:t>20k </a:t>
+            </a:r>
+            <a:r>
+              <a:rPr lang="en-US" sz="3200" dirty="0"/>
+              <a:t>triplets).</a:t>
+            </a:r>
           </a:p>
         </p:txBody>
       </p:sp>
@@ -10263,7 +10322,7 @@
             <p:spPr>
               <a:xfrm>
                 <a:off x="11945425" y="14360058"/>
-                <a:ext cx="8610014" cy="15212228"/>
+                <a:ext cx="8610014" cy="16197113"/>
               </a:xfrm>
               <a:prstGeom prst="rect">
                 <a:avLst/>
@@ -10277,8 +10336,24 @@
               <a:p>
                 <a:pPr algn="l" rtl="0"/>
                 <a:r>
+                  <a:rPr lang="en-US" sz="3200" dirty="0" smtClean="0"/>
+                  <a:t>Using an overlapping decomposition </a:t>
+                </a:r>
+                <a:r>
                   <a:rPr lang="en-US" sz="3200" dirty="0"/>
-                  <a:t>Using an overlapping decomposition of </a:t>
+                  <a:t>[Jacob 2009, </a:t>
+                </a:r>
+                <a:r>
+                  <a:rPr lang="en-US" sz="3200" dirty="0" err="1"/>
+                  <a:t>Obozinski</a:t>
+                </a:r>
+                <a:r>
+                  <a:rPr lang="en-US" sz="3200" dirty="0"/>
+                  <a:t> 2011</a:t>
+                </a:r>
+                <a:r>
+                  <a:rPr lang="en-US" sz="3200" dirty="0" smtClean="0"/>
+                  <a:t>] of </a:t>
                 </a:r>
                 <a14:m>
                   <m:oMath xmlns:m="http://schemas.openxmlformats.org/officeDocument/2006/math">
@@ -10412,6 +10487,17 @@
                   <a:rPr lang="en-US" sz="3200" dirty="0"/>
                   <a:t> is a diagonal matrix, each </a:t>
                 </a:r>
+                <a:r>
+                  <a:rPr lang="en-US" sz="3200" i="1" dirty="0" smtClean="0">
+                    <a:latin typeface="Cambria Math" panose="02040503050406030204" pitchFamily="18" charset="0"/>
+                  </a:rPr>
+                  <a:t/>
+                </a:r>
+                <a:br>
+                  <a:rPr lang="en-US" sz="3200" i="1" dirty="0" smtClean="0">
+                    <a:latin typeface="Cambria Math" panose="02040503050406030204" pitchFamily="18" charset="0"/>
+                  </a:rPr>
+                </a:br>
                 <a14:m>
                   <m:oMath xmlns:m="http://schemas.openxmlformats.org/officeDocument/2006/math">
                     <m:sSub>
@@ -11176,7 +11262,10 @@
                       <m:func>
                         <m:funcPr>
                           <m:ctrlPr>
-                            <a:rPr lang="en-US" sz="3200" i="1">
+                            <a:rPr lang="en-US" sz="3200" i="1" smtClean="0">
+                              <a:solidFill>
+                                <a:schemeClr val="tx1"/>
+                              </a:solidFill>
                               <a:latin typeface="Cambria Math" panose="02040503050406030204" pitchFamily="18" charset="0"/>
                             </a:rPr>
                           </m:ctrlPr>
@@ -11187,6 +11276,9 @@
                               <m:sty m:val="p"/>
                             </m:rPr>
                             <a:rPr lang="en-US" sz="3200">
+                              <a:solidFill>
+                                <a:schemeClr val="tx1"/>
+                              </a:solidFill>
                               <a:latin typeface="Cambria Math" panose="02040503050406030204" pitchFamily="18" charset="0"/>
                             </a:rPr>
                             <m:t>log</m:t>
@@ -11197,6 +11289,9 @@
                             <m:funcPr>
                               <m:ctrlPr>
                                 <a:rPr lang="en-US" sz="3200" i="1">
+                                  <a:solidFill>
+                                    <a:schemeClr val="tx1"/>
+                                  </a:solidFill>
                                   <a:latin typeface="Cambria Math" panose="02040503050406030204" pitchFamily="18" charset="0"/>
                                 </a:rPr>
                               </m:ctrlPr>
@@ -11207,6 +11302,9 @@
                                   <m:sty m:val="p"/>
                                 </m:rPr>
                                 <a:rPr lang="en-US" sz="3200">
+                                  <a:solidFill>
+                                    <a:schemeClr val="tx1"/>
+                                  </a:solidFill>
                                   <a:latin typeface="Cambria Math" panose="02040503050406030204" pitchFamily="18" charset="0"/>
                                 </a:rPr>
                                 <m:t>det</m:t>
@@ -11215,6 +11313,9 @@
                             <m:e>
                               <m:r>
                                 <a:rPr lang="en-US" sz="3200" i="1">
+                                  <a:solidFill>
+                                    <a:schemeClr val="tx1"/>
+                                  </a:solidFill>
                                   <a:latin typeface="Cambria Math" panose="02040503050406030204" pitchFamily="18" charset="0"/>
                                 </a:rPr>
                                 <m:t>𝑊</m:t>
@@ -11225,6 +11326,9 @@
                       </m:func>
                       <m:r>
                         <a:rPr lang="en-US" sz="3200" i="1">
+                          <a:solidFill>
+                            <a:schemeClr val="tx1"/>
+                          </a:solidFill>
                           <a:latin typeface="Cambria Math" panose="02040503050406030204" pitchFamily="18" charset="0"/>
                         </a:rPr>
                         <m:t>+</m:t>
@@ -11232,7 +11336,7 @@
                       <m:r>
                         <a:rPr lang="en-US" sz="3200" i="1" smtClean="0">
                           <a:solidFill>
-                            <a:schemeClr val="tx2"/>
+                            <a:schemeClr val="tx1"/>
                           </a:solidFill>
                           <a:latin typeface="Cambria Math" panose="02040503050406030204" pitchFamily="18" charset="0"/>
                         </a:rPr>
@@ -11244,7 +11348,7 @@
                           <m:ctrlPr>
                             <a:rPr lang="en-US" sz="3200" i="1">
                               <a:solidFill>
-                                <a:schemeClr val="tx2"/>
+                                <a:schemeClr val="tx1"/>
                               </a:solidFill>
                               <a:latin typeface="Cambria Math" panose="02040503050406030204" pitchFamily="18" charset="0"/>
                             </a:rPr>
@@ -11254,7 +11358,7 @@
                           <m:r>
                             <a:rPr lang="en-US" sz="3200" i="1">
                               <a:solidFill>
-                                <a:schemeClr val="tx2"/>
+                                <a:schemeClr val="tx1"/>
                               </a:solidFill>
                               <a:latin typeface="Cambria Math" panose="02040503050406030204" pitchFamily="18" charset="0"/>
                             </a:rPr>
@@ -11263,7 +11367,7 @@
                           <m:r>
                             <a:rPr lang="en-US" sz="3200" i="1">
                               <a:solidFill>
-                                <a:schemeClr val="tx2"/>
+                                <a:schemeClr val="tx1"/>
                               </a:solidFill>
                               <a:latin typeface="Cambria Math" panose="02040503050406030204" pitchFamily="18" charset="0"/>
                             </a:rPr>
@@ -11272,7 +11376,7 @@
                           <m:r>
                             <a:rPr lang="en-US" sz="3200" i="1">
                               <a:solidFill>
-                                <a:schemeClr val="tx2"/>
+                                <a:schemeClr val="tx1"/>
                               </a:solidFill>
                               <a:latin typeface="Cambria Math" panose="02040503050406030204" pitchFamily="18" charset="0"/>
                             </a:rPr>
@@ -11283,7 +11387,7 @@
                           <m:r>
                             <a:rPr lang="en-US" sz="3200" i="1">
                               <a:solidFill>
-                                <a:schemeClr val="tx2"/>
+                                <a:schemeClr val="tx1"/>
                               </a:solidFill>
                               <a:latin typeface="Cambria Math" panose="02040503050406030204" pitchFamily="18" charset="0"/>
                             </a:rPr>
@@ -11296,7 +11400,7 @@
                               <m:ctrlPr>
                                 <a:rPr lang="en-US" sz="3200" i="1">
                                   <a:solidFill>
-                                    <a:schemeClr val="tx2"/>
+                                    <a:schemeClr val="tx1"/>
                                   </a:solidFill>
                                   <a:latin typeface="Cambria Math" panose="02040503050406030204" pitchFamily="18" charset="0"/>
                                 </a:rPr>
@@ -11310,7 +11414,7 @@
                                   <m:ctrlPr>
                                     <a:rPr lang="en-US" sz="3200" i="1">
                                       <a:solidFill>
-                                        <a:schemeClr val="tx2"/>
+                                        <a:schemeClr val="tx1"/>
                                       </a:solidFill>
                                       <a:latin typeface="Cambria Math" panose="02040503050406030204" pitchFamily="18" charset="0"/>
                                     </a:rPr>
@@ -11322,7 +11426,7 @@
                                       <m:ctrlPr>
                                         <a:rPr lang="en-US" sz="3200" i="1">
                                           <a:solidFill>
-                                            <a:schemeClr val="tx2"/>
+                                            <a:schemeClr val="tx1"/>
                                           </a:solidFill>
                                           <a:latin typeface="Cambria Math" panose="02040503050406030204" pitchFamily="18" charset="0"/>
                                         </a:rPr>
@@ -11332,7 +11436,7 @@
                                       <m:r>
                                         <a:rPr lang="en-US" sz="3200" i="1">
                                           <a:solidFill>
-                                            <a:schemeClr val="tx2"/>
+                                            <a:schemeClr val="tx1"/>
                                           </a:solidFill>
                                           <a:latin typeface="Cambria Math" panose="02040503050406030204" pitchFamily="18" charset="0"/>
                                         </a:rPr>
@@ -11343,7 +11447,7 @@
                                       <m:r>
                                         <a:rPr lang="en-US" sz="3200" i="1">
                                           <a:solidFill>
-                                            <a:schemeClr val="tx2"/>
+                                            <a:schemeClr val="tx1"/>
                                           </a:solidFill>
                                           <a:latin typeface="Cambria Math" panose="02040503050406030204" pitchFamily="18" charset="0"/>
                                         </a:rPr>
@@ -11358,7 +11462,7 @@
                               <m:r>
                                 <a:rPr lang="en-US" sz="3200" i="1">
                                   <a:solidFill>
-                                    <a:schemeClr val="tx2"/>
+                                    <a:schemeClr val="tx1"/>
                                   </a:solidFill>
                                   <a:latin typeface="Cambria Math" panose="02040503050406030204" pitchFamily="18" charset="0"/>
                                 </a:rPr>
@@ -11373,7 +11477,7 @@
                 </a14:m>
                 <a:endParaRPr lang="en-US" sz="3200" dirty="0">
                   <a:solidFill>
-                    <a:schemeClr val="tx2"/>
+                    <a:schemeClr val="tx1"/>
                   </a:solidFill>
                 </a:endParaRPr>
               </a:p>
@@ -11385,7 +11489,15 @@
                 <a:pPr algn="l"/>
                 <a:r>
                   <a:rPr lang="en-US" sz="3200" dirty="0"/>
-                  <a:t>Solving a proximal problem on each step to encourage exact all-zeros updates, which admits a closed form </a:t>
+                  <a:t>Solving a proximal problem on each step to encourage exact all-zeros </a:t>
+                </a:r>
+                <a:r>
+                  <a:rPr lang="en-US" sz="3200" dirty="0" smtClean="0"/>
+                  <a:t>updates [Bach 2012], </a:t>
+                </a:r>
+                <a:r>
+                  <a:rPr lang="en-US" sz="3200" dirty="0"/>
+                  <a:t>which admits a closed form </a:t>
                 </a:r>
                 <a:r>
                   <a:rPr lang="en-US" sz="3200" dirty="0" smtClean="0"/>
@@ -11915,7 +12027,31 @@
                       <a:srgbClr val="FF0000"/>
                     </a:solidFill>
                   </a:rPr>
-                  <a:t>TODO: ADD CLOSED FORM SOLUTION?</a:t>
+                  <a:t>TODO: ADD CLOSED FORM SOLUTION</a:t>
+                </a:r>
+                <a:r>
+                  <a:rPr lang="en-US" sz="3200" b="1" dirty="0">
+                    <a:solidFill>
+                      <a:srgbClr val="FF0000"/>
+                    </a:solidFill>
+                  </a:rPr>
+                  <a:t>? (it shows how groups are </a:t>
+                </a:r>
+                <a:r>
+                  <a:rPr lang="en-US" sz="3200" b="1" dirty="0" smtClean="0">
+                    <a:solidFill>
+                      <a:srgbClr val="FF0000"/>
+                    </a:solidFill>
+                  </a:rPr>
+                  <a:t>forced </a:t>
+                </a:r>
+                <a:r>
+                  <a:rPr lang="en-US" sz="3200" b="1" dirty="0">
+                    <a:solidFill>
+                      <a:srgbClr val="FF0000"/>
+                    </a:solidFill>
+                  </a:rPr>
+                  <a:t>to zero)</a:t>
                 </a:r>
                 <a:endParaRPr lang="en-US" sz="3200" b="1" dirty="0">
                   <a:solidFill>
@@ -11942,7 +12078,7 @@
             <p:spPr>
               <a:xfrm>
                 <a:off x="11945425" y="14360058"/>
-                <a:ext cx="8610014" cy="15212228"/>
+                <a:ext cx="8610014" cy="16197113"/>
               </a:xfrm>
               <a:prstGeom prst="rect">
                 <a:avLst/>
@@ -11950,7 +12086,7 @@
               <a:blipFill rotWithShape="0">
                 <a:blip r:embed="rId25"/>
                 <a:stretch>
-                  <a:fillRect l="-1629" t="-441" r="-2479"/>
+                  <a:fillRect l="-1629" t="-452" r="-2479"/>
                 </a:stretch>
               </a:blipFill>
             </p:spPr>
@@ -11979,7 +12115,7 @@
         </p:nvSpPr>
         <p:spPr bwMode="auto">
           <a:xfrm>
-            <a:off x="1512468" y="26481473"/>
+            <a:off x="1620770" y="26355153"/>
             <a:ext cx="2934114" cy="463846"/>
           </a:xfrm>
           <a:prstGeom prst="rect">
@@ -12397,7 +12533,7 @@
         </p:nvSpPr>
         <p:spPr bwMode="auto">
           <a:xfrm>
-            <a:off x="5616924" y="26481473"/>
+            <a:off x="5631030" y="26355153"/>
             <a:ext cx="1292639" cy="463846"/>
           </a:xfrm>
           <a:prstGeom prst="rect">
@@ -12815,8 +12951,8 @@
         </p:nvSpPr>
         <p:spPr bwMode="auto">
           <a:xfrm>
-            <a:off x="8323849" y="26763256"/>
-            <a:ext cx="1920240" cy="2310505"/>
+            <a:off x="8312951" y="26355153"/>
+            <a:ext cx="1920240" cy="3049169"/>
           </a:xfrm>
           <a:prstGeom prst="rect">
             <a:avLst/>
@@ -13204,36 +13340,17 @@
               </a:spcBef>
             </a:pPr>
             <a:r>
-              <a:rPr lang="en-US" sz="2400" dirty="0" smtClean="0"/>
-              <a:t>COMET gradient steps versus projected gradient steps</a:t>
-            </a:r>
-            <a:endParaRPr lang="en-AU" altLang="en-US" sz="2400" dirty="0"/>
+              <a:rPr lang="en-US" sz="3200" dirty="0" smtClean="0">
+                <a:latin typeface="+mj-lt"/>
+              </a:rPr>
+              <a:t>COMET gradient steps vs. projected gradient steps</a:t>
+            </a:r>
+            <a:endParaRPr lang="en-AU" altLang="en-US" sz="3200" dirty="0">
+              <a:latin typeface="+mj-lt"/>
+            </a:endParaRPr>
           </a:p>
         </p:txBody>
       </p:sp>
-      <p:pic>
-        <p:nvPicPr>
-          <p:cNvPr id="13" name="Picture 12"/>
-          <p:cNvPicPr>
-            <a:picLocks noChangeAspect="1"/>
-          </p:cNvPicPr>
-          <p:nvPr/>
-        </p:nvPicPr>
-        <p:blipFill rotWithShape="1">
-          <a:blip r:embed="rId26"/>
-          <a:srcRect r="4094"/>
-          <a:stretch/>
-        </p:blipFill>
-        <p:spPr>
-          <a:xfrm>
-            <a:off x="22522614" y="9621067"/>
-            <a:ext cx="8612485" cy="1875529"/>
-          </a:xfrm>
-          <a:prstGeom prst="rect">
-            <a:avLst/>
-          </a:prstGeom>
-        </p:spPr>
-      </p:pic>
       <mc:AlternateContent xmlns:mc="http://schemas.openxmlformats.org/markup-compatibility/2006" xmlns:a14="http://schemas.microsoft.com/office/drawing/2010/main">
         <mc:Choice Requires="a14">
           <p:sp>
@@ -13246,8 +13363,8 @@
             </p:nvSpPr>
             <p:spPr bwMode="auto">
               <a:xfrm>
-                <a:off x="22520517" y="11813666"/>
-                <a:ext cx="8614582" cy="1202510"/>
+                <a:off x="22398254" y="13969777"/>
+                <a:ext cx="8614582" cy="1571842"/>
               </a:xfrm>
               <a:prstGeom prst="rect">
                 <a:avLst/>
@@ -13613,62 +13730,79 @@
                   </a:spcBef>
                 </a:pPr>
                 <a:r>
-                  <a:rPr lang="en-US" altLang="en-US" sz="2400" dirty="0" smtClean="0"/>
-                  <a:t>Runtimes, minutes. </a:t>
+                  <a:rPr lang="en-US" altLang="en-US" sz="3200" b="1" dirty="0">
+                    <a:solidFill>
+                      <a:schemeClr val="tx1"/>
+                    </a:solidFill>
+                    <a:latin typeface="+mn-lt"/>
+                    <a:cs typeface="+mn-cs"/>
+                  </a:rPr>
+                  <a:t>Runtimes</a:t>
+                </a:r>
+                <a:r>
+                  <a:rPr lang="en-US" altLang="en-US" sz="3200" dirty="0">
+                    <a:solidFill>
+                      <a:schemeClr val="tx1"/>
+                    </a:solidFill>
+                    <a:latin typeface="+mn-lt"/>
+                    <a:cs typeface="+mn-cs"/>
+                  </a:rPr>
+                  <a:t>, minutes. </a:t>
                 </a:r>
                 <a14:m>
                   <m:oMath xmlns:m="http://schemas.openxmlformats.org/officeDocument/2006/math">
                     <m:r>
-                      <a:rPr lang="en-US" sz="2400" i="1" smtClean="0">
+                      <a:rPr lang="en-US" sz="3200">
+                        <a:solidFill>
+                          <a:schemeClr val="tx1"/>
+                        </a:solidFill>
                         <a:latin typeface="Cambria Math" panose="02040503050406030204" pitchFamily="18" charset="0"/>
-                        <a:ea typeface="Cambria Math" panose="02040503050406030204" pitchFamily="18" charset="0"/>
+                        <a:cs typeface="+mn-cs"/>
                       </a:rPr>
                       <m:t>±</m:t>
                     </m:r>
                   </m:oMath>
                 </a14:m>
                 <a:r>
-                  <a:rPr lang="en-US" altLang="en-US" sz="2400" dirty="0"/>
-                  <a:t> denotes the standard deviation. For </a:t>
-                </a:r>
-                <a:r>
-                  <a:rPr lang="en-US" altLang="en-US" sz="2400" dirty="0" smtClean="0"/>
-                  <a:t>sparse COMET</a:t>
-                </a:r>
-                <a:r>
-                  <a:rPr lang="en-US" altLang="en-US" sz="2400" dirty="0"/>
-                  <a:t>, we  selected </a:t>
+                  <a:rPr lang="en-US" altLang="en-US" sz="3200" dirty="0">
+                    <a:solidFill>
+                      <a:schemeClr val="tx1"/>
+                    </a:solidFill>
+                    <a:latin typeface="+mn-lt"/>
+                    <a:cs typeface="+mn-cs"/>
+                  </a:rPr>
+                  <a:t> denotes the standard deviation. For sparse COMET, we  selected </a:t>
                 </a:r>
                 <a14:m>
                   <m:oMath xmlns:m="http://schemas.openxmlformats.org/officeDocument/2006/math">
                     <m:r>
-                      <a:rPr lang="en-US" sz="2400" b="0" i="1" smtClean="0">
+                      <a:rPr lang="en-US" sz="3200">
+                        <a:solidFill>
+                          <a:schemeClr val="tx1"/>
+                        </a:solidFill>
                         <a:latin typeface="Cambria Math" panose="02040503050406030204" pitchFamily="18" charset="0"/>
+                        <a:cs typeface="+mn-cs"/>
                       </a:rPr>
                       <m:t>𝜌</m:t>
                     </m:r>
                   </m:oMath>
                 </a14:m>
                 <a:r>
-                  <a:rPr lang="en-US" altLang="en-US" sz="2400" dirty="0" smtClean="0"/>
-                  <a:t> </a:t>
+                  <a:rPr lang="en-US" altLang="en-US" sz="3200" dirty="0">
+                    <a:solidFill>
+                      <a:schemeClr val="tx1"/>
+                    </a:solidFill>
+                    <a:latin typeface="+mn-lt"/>
+                    <a:cs typeface="+mn-cs"/>
+                  </a:rPr>
+                  <a:t> values to illustrate the performance gain. </a:t>
                 </a:r>
-                <a:r>
-                  <a:rPr lang="en-US" altLang="en-US" sz="2400" dirty="0"/>
-                  <a:t>values to illustrate the performance gain. </a:t>
-                </a:r>
-                <a:r>
-                  <a:rPr lang="en-US" altLang="en-US" sz="2400" b="1" dirty="0" smtClean="0">
-                    <a:solidFill>
-                      <a:srgbClr val="FF0000"/>
-                    </a:solidFill>
-                  </a:rPr>
-                  <a:t> TODO set best results in bold</a:t>
-                </a:r>
-                <a:endParaRPr lang="en-AU" altLang="en-US" sz="2400" b="1" i="1" dirty="0">
+                <a:endParaRPr lang="en-AU" altLang="en-US" sz="3200" dirty="0">
                   <a:solidFill>
-                    <a:srgbClr val="FF0000"/>
+                    <a:schemeClr val="tx1"/>
                   </a:solidFill>
+                  <a:latin typeface="+mn-lt"/>
+                  <a:cs typeface="+mn-cs"/>
                 </a:endParaRPr>
               </a:p>
             </p:txBody>
@@ -13685,16 +13819,16 @@
             </p:nvSpPr>
             <p:spPr bwMode="auto">
               <a:xfrm>
-                <a:off x="22520517" y="11813666"/>
-                <a:ext cx="8614582" cy="1202510"/>
+                <a:off x="22398254" y="13969777"/>
+                <a:ext cx="8614582" cy="1571842"/>
               </a:xfrm>
               <a:prstGeom prst="rect">
                 <a:avLst/>
               </a:prstGeom>
               <a:blipFill rotWithShape="0">
-                <a:blip r:embed="rId28"/>
+                <a:blip r:embed="rId26"/>
                 <a:stretch>
-                  <a:fillRect l="-1062" t="-3553" b="-11168"/>
+                  <a:fillRect l="-1769" t="-4669" r="-2689" b="-12062"/>
                 </a:stretch>
               </a:blipFill>
               <a:ln>
@@ -13727,7 +13861,7 @@
           <p:nvPr/>
         </p:nvPicPr>
         <p:blipFill rotWithShape="1">
-          <a:blip r:embed="rId29" cstate="print">
+          <a:blip r:embed="rId27" cstate="print">
             <a:extLst>
               <a:ext uri="{28A0092B-C50C-407E-A947-70E740481C1C}">
                 <a14:useLocalDpi xmlns:a14="http://schemas.microsoft.com/office/drawing/2010/main" val="0"/>
@@ -13739,7 +13873,7 @@
         </p:blipFill>
         <p:spPr bwMode="auto">
           <a:xfrm>
-            <a:off x="22456719" y="15406108"/>
+            <a:off x="22520517" y="19464850"/>
             <a:ext cx="5421807" cy="4931836"/>
           </a:xfrm>
           <a:prstGeom prst="rect">
@@ -13789,7 +13923,7 @@
           <p:nvPr/>
         </p:nvPicPr>
         <p:blipFill rotWithShape="1">
-          <a:blip r:embed="rId29" cstate="print">
+          <a:blip r:embed="rId27" cstate="print">
             <a:extLst>
               <a:ext uri="{28A0092B-C50C-407E-A947-70E740481C1C}">
                 <a14:useLocalDpi xmlns:a14="http://schemas.microsoft.com/office/drawing/2010/main" val="0"/>
@@ -13801,7 +13935,7 @@
         </p:blipFill>
         <p:spPr bwMode="auto">
           <a:xfrm>
-            <a:off x="22420231" y="21018534"/>
+            <a:off x="22520517" y="26084673"/>
             <a:ext cx="5389266" cy="4968552"/>
           </a:xfrm>
           <a:prstGeom prst="rect">
@@ -13828,7 +13962,7 @@
           <p:nvPr/>
         </p:nvPicPr>
         <p:blipFill rotWithShape="1">
-          <a:blip r:embed="rId30">
+          <a:blip r:embed="rId28">
             <a:extLst>
               <a:ext uri="{28A0092B-C50C-407E-A947-70E740481C1C}">
                 <a14:useLocalDpi xmlns:a14="http://schemas.microsoft.com/office/drawing/2010/main" val="0"/>
@@ -13869,7 +14003,7 @@
         <p:spPr bwMode="auto">
           <a:xfrm>
             <a:off x="38361322" y="7137476"/>
-            <a:ext cx="3202595" cy="4157165"/>
+            <a:ext cx="3202595" cy="5613974"/>
           </a:xfrm>
           <a:prstGeom prst="rect">
             <a:avLst/>
@@ -14235,66 +14369,110 @@
               </a:spcBef>
             </a:pPr>
             <a:r>
-              <a:rPr lang="en-US" altLang="en-US" sz="2400" dirty="0"/>
+              <a:rPr lang="en-US" altLang="en-US" sz="3200" b="1" dirty="0" smtClean="0">
+                <a:latin typeface="+mj-lt"/>
+              </a:rPr>
+              <a:t>Precision </a:t>
+            </a:r>
+            <a:r>
+              <a:rPr lang="en-US" altLang="en-US" sz="3200" b="1" dirty="0">
+                <a:latin typeface="+mj-lt"/>
+              </a:rPr>
+              <a:t>at 1, 3 and 5 </a:t>
+            </a:r>
+            <a:r>
+              <a:rPr lang="en-US" altLang="en-US" sz="3200" b="1" i="1" dirty="0" smtClean="0">
+                <a:latin typeface="+mj-lt"/>
+              </a:rPr>
+              <a:t>vs.</a:t>
+            </a:r>
+            <a:r>
+              <a:rPr lang="en-US" altLang="en-US" sz="3200" b="1" dirty="0" smtClean="0">
+                <a:latin typeface="+mj-lt"/>
+              </a:rPr>
+              <a:t> the </a:t>
+            </a:r>
+            <a:r>
+              <a:rPr lang="en-US" altLang="en-US" sz="3200" b="1" dirty="0">
+                <a:latin typeface="+mj-lt"/>
+              </a:rPr>
+              <a:t>mean training run time</a:t>
+            </a:r>
+            <a:r>
+              <a:rPr lang="en-US" altLang="en-US" sz="3200" dirty="0">
+                <a:latin typeface="+mj-lt"/>
+              </a:rPr>
+              <a:t> of COMET. </a:t>
+            </a:r>
+            <a:endParaRPr lang="en-US" altLang="en-US" sz="3200" dirty="0" smtClean="0">
+              <a:latin typeface="+mj-lt"/>
+            </a:endParaRPr>
+          </a:p>
+          <a:p>
+            <a:pPr algn="l" rtl="0">
+              <a:spcBef>
+                <a:spcPts val="750"/>
+              </a:spcBef>
+            </a:pPr>
+            <a:r>
+              <a:rPr lang="en-US" altLang="en-US" sz="3200" dirty="0" smtClean="0">
+                <a:latin typeface="+mj-lt"/>
+              </a:rPr>
+              <a:t>Dashed </a:t>
+            </a:r>
+            <a:r>
+              <a:rPr lang="en-US" altLang="en-US" sz="3200" dirty="0">
+                <a:latin typeface="+mj-lt"/>
+              </a:rPr>
+              <a:t>line denotes the </a:t>
+            </a:r>
+            <a:r>
+              <a:rPr lang="en-US" altLang="en-US" sz="3200" i="1" dirty="0" smtClean="0">
+                <a:latin typeface="+mj-lt"/>
+              </a:rPr>
+              <a:t>precision-at-1</a:t>
+            </a:r>
+            <a:r>
+              <a:rPr lang="en-US" altLang="en-US" sz="3200" dirty="0" smtClean="0">
+                <a:latin typeface="+mj-lt"/>
+              </a:rPr>
+              <a:t> </a:t>
+            </a:r>
+            <a:r>
+              <a:rPr lang="en-US" altLang="en-US" sz="3200" dirty="0">
+                <a:latin typeface="+mj-lt"/>
+              </a:rPr>
+              <a:t>of the Euclidean </a:t>
+            </a:r>
+            <a:r>
+              <a:rPr lang="en-US" altLang="en-US" sz="3200" dirty="0" smtClean="0">
+                <a:latin typeface="+mj-lt"/>
+              </a:rPr>
+              <a:t>baseline, </a:t>
+            </a:r>
+            <a:r>
+              <a:rPr lang="en-US" altLang="en-US" sz="3200" dirty="0">
+                <a:solidFill>
+                  <a:prstClr val="black"/>
+                </a:solidFill>
+                <a:latin typeface="Calibri"/>
+                <a:cs typeface="+mn-cs"/>
+              </a:rPr>
               <a:t>RCV1 dataset with 5K </a:t>
             </a:r>
             <a:r>
-              <a:rPr lang="en-US" altLang="en-US" sz="2400" dirty="0" smtClean="0"/>
-              <a:t>features</a:t>
-            </a:r>
-            <a:r>
-              <a:rPr lang="en-US" altLang="en-US" sz="2400" dirty="0" smtClean="0"/>
-              <a:t>, </a:t>
-            </a:r>
-            <a:r>
-              <a:rPr lang="en-US" altLang="en-US" sz="2400" dirty="0"/>
-              <a:t>p</a:t>
-            </a:r>
-            <a:r>
-              <a:rPr lang="en-US" altLang="en-US" sz="2400" dirty="0" smtClean="0"/>
-              <a:t>recision </a:t>
-            </a:r>
-            <a:r>
-              <a:rPr lang="en-US" altLang="en-US" sz="2400" dirty="0"/>
-              <a:t>at 1, 3 and 5 nearest neighbor evaluated on the test set </a:t>
-            </a:r>
-            <a:r>
-              <a:rPr lang="en-US" altLang="en-US" sz="2400" i="1" dirty="0" smtClean="0"/>
-              <a:t>vs. </a:t>
-            </a:r>
-            <a:r>
-              <a:rPr lang="en-US" altLang="en-US" sz="2400" dirty="0" smtClean="0"/>
-              <a:t>the </a:t>
-            </a:r>
-            <a:r>
-              <a:rPr lang="en-US" altLang="en-US" sz="2400" dirty="0"/>
-              <a:t>mean training run time of COMET. </a:t>
-            </a:r>
-            <a:r>
-              <a:rPr lang="en-US" altLang="en-US" sz="2400" dirty="0" smtClean="0"/>
-              <a:t>Dashed </a:t>
-            </a:r>
-            <a:r>
-              <a:rPr lang="en-US" altLang="en-US" sz="2400" dirty="0"/>
-              <a:t>line denotes the </a:t>
-            </a:r>
-            <a:r>
-              <a:rPr lang="en-US" altLang="en-US" sz="2400" i="1" dirty="0" smtClean="0"/>
-              <a:t>precision-at-1</a:t>
-            </a:r>
-            <a:r>
-              <a:rPr lang="en-US" altLang="en-US" sz="2400" dirty="0" smtClean="0"/>
-              <a:t> </a:t>
-            </a:r>
-            <a:r>
-              <a:rPr lang="en-US" altLang="en-US" sz="2400" dirty="0"/>
-              <a:t>of the Euclidean baseline</a:t>
-            </a:r>
-            <a:r>
-              <a:rPr lang="en-US" altLang="en-US" sz="2400" dirty="0" smtClean="0"/>
-              <a:t>.</a:t>
-            </a:r>
-            <a:endParaRPr lang="en-AU" altLang="en-US" sz="2400" i="1" dirty="0"/>
+              <a:rPr lang="en-US" altLang="en-US" sz="3200" dirty="0" smtClean="0">
+                <a:solidFill>
+                  <a:prstClr val="black"/>
+                </a:solidFill>
+                <a:latin typeface="Calibri"/>
+                <a:cs typeface="+mn-cs"/>
+              </a:rPr>
+              <a:t>features.</a:t>
+            </a:r>
+            <a:endParaRPr lang="en-AU" altLang="en-US" sz="3200" i="1" dirty="0">
+              <a:latin typeface="+mj-lt"/>
+            </a:endParaRPr>
           </a:p>
         </p:txBody>
       </p:sp>
@@ -14308,8 +14486,8 @@
         </p:nvSpPr>
         <p:spPr bwMode="auto">
           <a:xfrm>
-            <a:off x="38374790" y="12229046"/>
-            <a:ext cx="3202595" cy="1941173"/>
+            <a:off x="38374790" y="14317278"/>
+            <a:ext cx="3202595" cy="3049169"/>
           </a:xfrm>
           <a:prstGeom prst="rect">
             <a:avLst/>
@@ -14675,26 +14853,121 @@
               </a:spcBef>
             </a:pPr>
             <a:r>
-              <a:rPr lang="en-US" altLang="en-US" sz="2400" dirty="0"/>
+              <a:rPr lang="en-US" altLang="en-US" sz="3200" b="1" dirty="0" smtClean="0">
+                <a:latin typeface="+mj-lt"/>
+              </a:rPr>
+              <a:t>Mean </a:t>
+            </a:r>
+            <a:r>
+              <a:rPr lang="en-US" altLang="en-US" sz="3200" b="1" dirty="0">
+                <a:latin typeface="+mj-lt"/>
+              </a:rPr>
+              <a:t>training time </a:t>
+            </a:r>
+            <a:r>
+              <a:rPr lang="en-US" altLang="en-US" sz="3200" b="1" i="1" dirty="0" smtClean="0">
+                <a:latin typeface="+mj-lt"/>
+              </a:rPr>
+              <a:t>vs.</a:t>
+            </a:r>
+            <a:r>
+              <a:rPr lang="en-US" altLang="en-US" sz="3200" b="1" dirty="0" smtClean="0">
+                <a:latin typeface="+mj-lt"/>
+              </a:rPr>
+              <a:t> the </a:t>
+            </a:r>
+            <a:r>
+              <a:rPr lang="en-US" altLang="en-US" sz="3200" b="1" dirty="0">
+                <a:latin typeface="+mj-lt"/>
+              </a:rPr>
+              <a:t>learned matrix </a:t>
+            </a:r>
+            <a:r>
+              <a:rPr lang="en-US" altLang="en-US" sz="3200" b="1" dirty="0" smtClean="0">
+                <a:latin typeface="+mj-lt"/>
+              </a:rPr>
+              <a:t>density</a:t>
+            </a:r>
+            <a:r>
+              <a:rPr lang="en-US" altLang="en-US" sz="3200" dirty="0" smtClean="0">
+                <a:latin typeface="+mj-lt"/>
+              </a:rPr>
+              <a:t>, </a:t>
+            </a:r>
+            <a:r>
+              <a:rPr lang="en-US" altLang="en-US" sz="3200" dirty="0"/>
               <a:t>RCV1 dataset with 5K </a:t>
             </a:r>
             <a:r>
-              <a:rPr lang="en-US" altLang="en-US" sz="2400" dirty="0" smtClean="0"/>
-              <a:t>features</a:t>
-            </a:r>
-            <a:r>
-              <a:rPr lang="en-US" altLang="en-US" sz="2400" dirty="0" smtClean="0"/>
-              <a:t>, </a:t>
-            </a:r>
-            <a:r>
-              <a:rPr lang="en-US" altLang="en-US" sz="2400" dirty="0" smtClean="0"/>
-              <a:t>mean </a:t>
-            </a:r>
-            <a:r>
-              <a:rPr lang="en-US" altLang="en-US" sz="2400" dirty="0"/>
-              <a:t>training time as a function of the learned matrix density. </a:t>
-            </a:r>
-            <a:endParaRPr lang="en-AU" altLang="en-US" sz="2400" i="1" dirty="0"/>
+              <a:rPr lang="en-US" altLang="en-US" sz="3200" dirty="0" smtClean="0"/>
+              <a:t>features.</a:t>
+            </a:r>
+            <a:endParaRPr lang="en-AU" altLang="en-US" sz="3200" b="1" i="1" dirty="0">
+              <a:latin typeface="+mj-lt"/>
+            </a:endParaRPr>
+          </a:p>
+        </p:txBody>
+      </p:sp>
+      <p:pic>
+        <p:nvPicPr>
+          <p:cNvPr id="6" name="Picture 5"/>
+          <p:cNvPicPr>
+            <a:picLocks noChangeAspect="1"/>
+          </p:cNvPicPr>
+          <p:nvPr/>
+        </p:nvPicPr>
+        <p:blipFill rotWithShape="1">
+          <a:blip r:embed="rId29"/>
+          <a:srcRect l="1039" r="1174"/>
+          <a:stretch/>
+        </p:blipFill>
+        <p:spPr>
+          <a:xfrm>
+            <a:off x="22407589" y="9454763"/>
+            <a:ext cx="8614582" cy="4387746"/>
+          </a:xfrm>
+          <a:prstGeom prst="rect">
+            <a:avLst/>
+          </a:prstGeom>
+        </p:spPr>
+      </p:pic>
+      <p:sp>
+        <p:nvSpPr>
+          <p:cNvPr id="8" name="Rectangle 7"/>
+          <p:cNvSpPr/>
+          <p:nvPr/>
+        </p:nvSpPr>
+        <p:spPr>
+          <a:xfrm>
+            <a:off x="21956960" y="12866317"/>
+            <a:ext cx="443391" cy="2039564"/>
+          </a:xfrm>
+          <a:prstGeom prst="rect">
+            <a:avLst/>
+          </a:prstGeom>
+        </p:spPr>
+        <p:style>
+          <a:lnRef idx="2">
+            <a:schemeClr val="accent1">
+              <a:shade val="50000"/>
+            </a:schemeClr>
+          </a:lnRef>
+          <a:fillRef idx="1">
+            <a:schemeClr val="accent1"/>
+          </a:fillRef>
+          <a:effectRef idx="0">
+            <a:schemeClr val="accent1"/>
+          </a:effectRef>
+          <a:fontRef idx="minor">
+            <a:schemeClr val="lt1"/>
+          </a:fontRef>
+        </p:style>
+        <p:txBody>
+          <a:bodyPr rtlCol="0" anchor="ctr"/>
+          <a:lstStyle/>
+          <a:p>
+            <a:pPr algn="ctr"/>
+            <a:endParaRPr lang="en-US"/>
           </a:p>
         </p:txBody>
       </p:sp>

</xml_diff>

<commit_message>
minor fixes, sent to gal
</commit_message>
<xml_diff>
--- a/COMET_poster.pptx
+++ b/COMET_poster.pptx
@@ -9374,7 +9374,23 @@
                   <a:prstClr val="black"/>
                 </a:solidFill>
               </a:rPr>
-              <a:t>Structured sparsity allows only a small set of features to interact with </a:t>
+              <a:t>COMET’s s</a:t>
+            </a:r>
+            <a:r>
+              <a:rPr lang="en-US" sz="3200" dirty="0" smtClean="0">
+                <a:solidFill>
+                  <a:prstClr val="black"/>
+                </a:solidFill>
+              </a:rPr>
+              <a:t>tructured </a:t>
+            </a:r>
+            <a:r>
+              <a:rPr lang="en-US" sz="3200" dirty="0" smtClean="0">
+                <a:solidFill>
+                  <a:prstClr val="black"/>
+                </a:solidFill>
+              </a:rPr>
+              <a:t>sparsity allows only a small set of features to interact with </a:t>
             </a:r>
             <a:r>
               <a:rPr lang="en-US" sz="3200" i="1" dirty="0" smtClean="0">
@@ -10086,11 +10102,19 @@
             <a:pPr algn="l" rtl="0"/>
             <a:r>
               <a:rPr lang="en-US" sz="3200" dirty="0" smtClean="0"/>
-              <a:t>We </a:t>
+              <a:t>Compared </a:t>
             </a:r>
             <a:r>
               <a:rPr lang="en-US" sz="3200" dirty="0"/>
-              <a:t>compared COMET with approaches that avoid repeated projections to the PD cone and  to the Euclidean metric baseline.</a:t>
+              <a:t>COMET with approaches that avoid repeated projections to the PD </a:t>
+            </a:r>
+            <a:r>
+              <a:rPr lang="en-US" sz="3200" dirty="0" smtClean="0"/>
+              <a:t>cone, and  </a:t>
+            </a:r>
+            <a:r>
+              <a:rPr lang="en-US" sz="3200" dirty="0"/>
+              <a:t>to the Euclidean metric baseline.</a:t>
             </a:r>
           </a:p>
         </p:txBody>
@@ -13935,7 +13959,7 @@
         </p:blipFill>
         <p:spPr bwMode="auto">
           <a:xfrm>
-            <a:off x="22520517" y="26084673"/>
+            <a:off x="22520517" y="25275033"/>
             <a:ext cx="5389266" cy="4968552"/>
           </a:xfrm>
           <a:prstGeom prst="rect">
@@ -14931,46 +14955,6 @@
           </a:prstGeom>
         </p:spPr>
       </p:pic>
-      <p:sp>
-        <p:nvSpPr>
-          <p:cNvPr id="8" name="Rectangle 7"/>
-          <p:cNvSpPr/>
-          <p:nvPr/>
-        </p:nvSpPr>
-        <p:spPr>
-          <a:xfrm>
-            <a:off x="21956960" y="12866317"/>
-            <a:ext cx="443391" cy="2039564"/>
-          </a:xfrm>
-          <a:prstGeom prst="rect">
-            <a:avLst/>
-          </a:prstGeom>
-        </p:spPr>
-        <p:style>
-          <a:lnRef idx="2">
-            <a:schemeClr val="accent1">
-              <a:shade val="50000"/>
-            </a:schemeClr>
-          </a:lnRef>
-          <a:fillRef idx="1">
-            <a:schemeClr val="accent1"/>
-          </a:fillRef>
-          <a:effectRef idx="0">
-            <a:schemeClr val="accent1"/>
-          </a:effectRef>
-          <a:fontRef idx="minor">
-            <a:schemeClr val="lt1"/>
-          </a:fontRef>
-        </p:style>
-        <p:txBody>
-          <a:bodyPr rtlCol="0" anchor="ctr"/>
-          <a:lstStyle/>
-          <a:p>
-            <a:pPr algn="ctr"/>
-            <a:endParaRPr lang="en-US"/>
-          </a:p>
-        </p:txBody>
-      </p:sp>
     </p:spTree>
   </p:cSld>
   <p:clrMapOvr>

</xml_diff>

<commit_message>
applying gal comments after thu. call
</commit_message>
<xml_diff>
--- a/COMET_poster.pptx
+++ b/COMET_poster.pptx
@@ -215,7 +215,7 @@
             <a:fld id="{198A3463-10AA-40C1-AF51-9D4D3C36B945}" type="datetimeFigureOut">
               <a:rPr lang="he-IL" smtClean="0"/>
               <a:pPr/>
-              <a:t>כ'/כסלו/תשע"ו</a:t>
+              <a:t>כ"א/כסלו/תשע"ו</a:t>
             </a:fld>
             <a:endParaRPr lang="he-IL"/>
           </a:p>
@@ -760,7 +760,7 @@
             <a:fld id="{A6DEEEEF-6AFF-4F2F-80C9-19C8578E8C6D}" type="datetimeFigureOut">
               <a:rPr lang="he-IL" smtClean="0"/>
               <a:pPr/>
-              <a:t>כ'/כסלו/תשע"ו</a:t>
+              <a:t>כ"א/כסלו/תשע"ו</a:t>
             </a:fld>
             <a:endParaRPr lang="he-IL"/>
           </a:p>
@@ -927,7 +927,7 @@
             <a:fld id="{A6DEEEEF-6AFF-4F2F-80C9-19C8578E8C6D}" type="datetimeFigureOut">
               <a:rPr lang="he-IL" smtClean="0"/>
               <a:pPr/>
-              <a:t>כ'/כסלו/תשע"ו</a:t>
+              <a:t>כ"א/כסלו/תשע"ו</a:t>
             </a:fld>
             <a:endParaRPr lang="he-IL"/>
           </a:p>
@@ -1104,7 +1104,7 @@
             <a:fld id="{A6DEEEEF-6AFF-4F2F-80C9-19C8578E8C6D}" type="datetimeFigureOut">
               <a:rPr lang="he-IL" smtClean="0"/>
               <a:pPr/>
-              <a:t>כ'/כסלו/תשע"ו</a:t>
+              <a:t>כ"א/כסלו/תשע"ו</a:t>
             </a:fld>
             <a:endParaRPr lang="he-IL"/>
           </a:p>
@@ -1271,7 +1271,7 @@
             <a:fld id="{A6DEEEEF-6AFF-4F2F-80C9-19C8578E8C6D}" type="datetimeFigureOut">
               <a:rPr lang="he-IL" smtClean="0"/>
               <a:pPr/>
-              <a:t>כ'/כסלו/תשע"ו</a:t>
+              <a:t>כ"א/כסלו/תשע"ו</a:t>
             </a:fld>
             <a:endParaRPr lang="he-IL"/>
           </a:p>
@@ -1514,7 +1514,7 @@
             <a:fld id="{A6DEEEEF-6AFF-4F2F-80C9-19C8578E8C6D}" type="datetimeFigureOut">
               <a:rPr lang="he-IL" smtClean="0"/>
               <a:pPr/>
-              <a:t>כ'/כסלו/תשע"ו</a:t>
+              <a:t>כ"א/כסלו/תשע"ו</a:t>
             </a:fld>
             <a:endParaRPr lang="he-IL"/>
           </a:p>
@@ -1799,7 +1799,7 @@
             <a:fld id="{A6DEEEEF-6AFF-4F2F-80C9-19C8578E8C6D}" type="datetimeFigureOut">
               <a:rPr lang="he-IL" smtClean="0"/>
               <a:pPr/>
-              <a:t>כ'/כסלו/תשע"ו</a:t>
+              <a:t>כ"א/כסלו/תשע"ו</a:t>
             </a:fld>
             <a:endParaRPr lang="he-IL"/>
           </a:p>
@@ -2223,7 +2223,7 @@
             <a:fld id="{A6DEEEEF-6AFF-4F2F-80C9-19C8578E8C6D}" type="datetimeFigureOut">
               <a:rPr lang="he-IL" smtClean="0"/>
               <a:pPr/>
-              <a:t>כ'/כסלו/תשע"ו</a:t>
+              <a:t>כ"א/כסלו/תשע"ו</a:t>
             </a:fld>
             <a:endParaRPr lang="he-IL"/>
           </a:p>
@@ -2338,7 +2338,7 @@
             <a:fld id="{A6DEEEEF-6AFF-4F2F-80C9-19C8578E8C6D}" type="datetimeFigureOut">
               <a:rPr lang="he-IL" smtClean="0"/>
               <a:pPr/>
-              <a:t>כ'/כסלו/תשע"ו</a:t>
+              <a:t>כ"א/כסלו/תשע"ו</a:t>
             </a:fld>
             <a:endParaRPr lang="he-IL"/>
           </a:p>
@@ -2430,7 +2430,7 @@
             <a:fld id="{A6DEEEEF-6AFF-4F2F-80C9-19C8578E8C6D}" type="datetimeFigureOut">
               <a:rPr lang="he-IL" smtClean="0"/>
               <a:pPr/>
-              <a:t>כ'/כסלו/תשע"ו</a:t>
+              <a:t>כ"א/כסלו/תשע"ו</a:t>
             </a:fld>
             <a:endParaRPr lang="he-IL"/>
           </a:p>
@@ -2704,7 +2704,7 @@
             <a:fld id="{A6DEEEEF-6AFF-4F2F-80C9-19C8578E8C6D}" type="datetimeFigureOut">
               <a:rPr lang="he-IL" smtClean="0"/>
               <a:pPr/>
-              <a:t>כ'/כסלו/תשע"ו</a:t>
+              <a:t>כ"א/כסלו/תשע"ו</a:t>
             </a:fld>
             <a:endParaRPr lang="he-IL"/>
           </a:p>
@@ -2954,7 +2954,7 @@
             <a:fld id="{A6DEEEEF-6AFF-4F2F-80C9-19C8578E8C6D}" type="datetimeFigureOut">
               <a:rPr lang="he-IL" smtClean="0"/>
               <a:pPr/>
-              <a:t>כ'/כסלו/תשע"ו</a:t>
+              <a:t>כ"א/כסלו/תשע"ו</a:t>
             </a:fld>
             <a:endParaRPr lang="he-IL"/>
           </a:p>
@@ -3167,7 +3167,7 @@
             <a:fld id="{A6DEEEEF-6AFF-4F2F-80C9-19C8578E8C6D}" type="datetimeFigureOut">
               <a:rPr lang="he-IL" smtClean="0"/>
               <a:pPr/>
-              <a:t>כ'/כסלו/תשע"ו</a:t>
+              <a:t>כ"א/כסלו/תשע"ו</a:t>
             </a:fld>
             <a:endParaRPr lang="he-IL"/>
           </a:p>
@@ -3554,7 +3554,7 @@
         </p:blipFill>
         <p:spPr>
           <a:xfrm>
-            <a:off x="32898616" y="21666662"/>
+            <a:off x="32898616" y="22277641"/>
             <a:ext cx="5251214" cy="4760499"/>
           </a:xfrm>
           <a:prstGeom prst="rect">
@@ -3578,7 +3578,7 @@
         </p:blipFill>
         <p:spPr>
           <a:xfrm>
-            <a:off x="32768554" y="15121905"/>
+            <a:off x="32768554" y="15383311"/>
             <a:ext cx="6077946" cy="4491122"/>
           </a:xfrm>
           <a:prstGeom prst="rect">
@@ -3595,7 +3595,7 @@
         <p:spPr>
           <a:xfrm>
             <a:off x="32325163" y="4968774"/>
-            <a:ext cx="9714936" cy="14761643"/>
+            <a:ext cx="9714936" cy="14953473"/>
           </a:xfrm>
           <a:prstGeom prst="roundRect">
             <a:avLst/>
@@ -3645,8 +3645,8 @@
         </p:nvSpPr>
         <p:spPr>
           <a:xfrm>
-            <a:off x="21933909" y="16157845"/>
-            <a:ext cx="9721080" cy="15830474"/>
+            <a:off x="21933909" y="16590428"/>
+            <a:ext cx="9721080" cy="15397891"/>
           </a:xfrm>
           <a:prstGeom prst="roundRect">
             <a:avLst/>
@@ -3829,8 +3829,13 @@
             </a:r>
             <a:r>
               <a:rPr lang="en-US" sz="3800" b="1" dirty="0" smtClean="0"/>
-              <a:t>Google CA</a:t>
-            </a:r>
+              <a:t>Google </a:t>
+            </a:r>
+            <a:r>
+              <a:rPr lang="en-US" sz="3800" b="1" dirty="0" smtClean="0"/>
+              <a:t>Research</a:t>
+            </a:r>
+            <a:endParaRPr lang="en-US" sz="3800" b="1" dirty="0" smtClean="0"/>
           </a:p>
         </p:txBody>
       </p:sp>
@@ -3938,8 +3943,8 @@
         </p:nvSpPr>
         <p:spPr>
           <a:xfrm>
-            <a:off x="32325164" y="19970853"/>
-            <a:ext cx="9714935" cy="6600324"/>
+            <a:off x="32325164" y="20162144"/>
+            <a:ext cx="9714935" cy="6960685"/>
           </a:xfrm>
           <a:prstGeom prst="roundRect">
             <a:avLst/>
@@ -4057,8 +4062,8 @@
         </p:nvSpPr>
         <p:spPr bwMode="auto">
           <a:xfrm>
-            <a:off x="28049341" y="19462060"/>
-            <a:ext cx="3191456" cy="6701451"/>
+            <a:off x="28049341" y="20038124"/>
+            <a:ext cx="3191456" cy="5613974"/>
           </a:xfrm>
           <a:prstGeom prst="rect">
             <a:avLst/>
@@ -4433,14 +4438,17 @@
               <a:rPr lang="en-US" altLang="en-US" sz="3200" dirty="0" smtClean="0">
                 <a:latin typeface="+mj-lt"/>
               </a:rPr>
-              <a:t>, for Caltech256 with 50  cat. and </a:t>
+              <a:t>, for Caltech256 with 50  </a:t>
             </a:r>
             <a:r>
               <a:rPr lang="en-US" altLang="en-US" sz="3200" dirty="0" smtClean="0">
                 <a:latin typeface="+mj-lt"/>
               </a:rPr>
-              <a:t>for Reuters CV1. </a:t>
-            </a:r>
+              <a:t>categories. </a:t>
+            </a:r>
+            <a:endParaRPr lang="en-US" altLang="en-US" sz="3200" dirty="0" smtClean="0">
+              <a:latin typeface="+mj-lt"/>
+            </a:endParaRPr>
           </a:p>
           <a:p>
             <a:pPr algn="l" rtl="0">
@@ -4452,13 +4460,7 @@
               <a:rPr lang="en-US" altLang="en-US" sz="3200" dirty="0" smtClean="0">
                 <a:latin typeface="+mj-lt"/>
               </a:rPr>
-              <a:t>Comparing </a:t>
-            </a:r>
-            <a:r>
-              <a:rPr lang="en-US" altLang="en-US" sz="3200" dirty="0" smtClean="0">
-                <a:latin typeface="+mj-lt"/>
-              </a:rPr>
-              <a:t>with: </a:t>
+              <a:t>Comparing with: </a:t>
             </a:r>
             <a:r>
               <a:rPr lang="en-AU" altLang="en-US" sz="3200" dirty="0" smtClean="0">
@@ -4500,13 +4502,7 @@
               <a:rPr lang="en-AU" altLang="en-US" sz="3200" dirty="0" smtClean="0">
                 <a:latin typeface="+mj-lt"/>
               </a:rPr>
-              <a:t>, </a:t>
-            </a:r>
-            <a:r>
-              <a:rPr lang="en-AU" altLang="en-US" sz="3200" dirty="0" smtClean="0">
-                <a:latin typeface="+mj-lt"/>
-              </a:rPr>
-              <a:t>LEGO</a:t>
+              <a:t>, LEGO</a:t>
             </a:r>
             <a:r>
               <a:rPr lang="en-AU" sz="3200" baseline="30000" dirty="0" smtClean="0">
@@ -4537,23 +4533,6 @@
                 <a:latin typeface="+mj-lt"/>
               </a:rPr>
               <a:t>,</a:t>
-            </a:r>
-          </a:p>
-          <a:p>
-            <a:pPr algn="l" rtl="0">
-              <a:spcBef>
-                <a:spcPts val="750"/>
-              </a:spcBef>
-            </a:pPr>
-            <a:r>
-              <a:rPr lang="en-US" altLang="en-US" sz="3200" dirty="0">
-                <a:solidFill>
-                  <a:prstClr val="black"/>
-                </a:solidFill>
-                <a:latin typeface="+mj-lt"/>
-                <a:cs typeface="+mn-cs"/>
-              </a:rPr>
-              <a:t>80%/20% train/test split, 5-fold </a:t>
             </a:r>
             <a:r>
               <a:rPr lang="en-US" altLang="en-US" sz="3200" dirty="0" smtClean="0">
@@ -4563,7 +4542,26 @@
                 <a:latin typeface="+mj-lt"/>
                 <a:cs typeface="+mn-cs"/>
               </a:rPr>
-              <a:t>cross-validation</a:t>
+              <a:t> </a:t>
+            </a:r>
+            <a:br>
+              <a:rPr lang="en-US" altLang="en-US" sz="3200" dirty="0" smtClean="0">
+                <a:solidFill>
+                  <a:prstClr val="black"/>
+                </a:solidFill>
+                <a:latin typeface="+mj-lt"/>
+                <a:cs typeface="+mn-cs"/>
+              </a:rPr>
+            </a:br>
+            <a:r>
+              <a:rPr lang="en-US" altLang="en-US" sz="3200" dirty="0" smtClean="0">
+                <a:solidFill>
+                  <a:prstClr val="black"/>
+                </a:solidFill>
+                <a:latin typeface="+mj-lt"/>
+                <a:cs typeface="+mn-cs"/>
+              </a:rPr>
+              <a:t>5-fold cross-validation.</a:t>
             </a:r>
             <a:endParaRPr lang="en-AU" altLang="en-US" sz="3200" dirty="0">
               <a:latin typeface="+mj-lt"/>
@@ -4631,8 +4629,8 @@
             </p:nvSpPr>
             <p:spPr bwMode="auto">
               <a:xfrm>
-                <a:off x="38280091" y="21495702"/>
-                <a:ext cx="3202595" cy="4629089"/>
+                <a:off x="38280091" y="22106681"/>
+                <a:ext cx="3202595" cy="2556727"/>
               </a:xfrm>
               <a:prstGeom prst="rect">
                 <a:avLst/>
@@ -4998,7 +4996,7 @@
                   </a:spcBef>
                 </a:pPr>
                 <a:r>
-                  <a:rPr lang="en-US" sz="3200" b="1" dirty="0" err="1" smtClean="0">
+                  <a:rPr lang="en-US" sz="3200" b="1" dirty="0" smtClean="0">
                     <a:latin typeface="+mj-lt"/>
                   </a:rPr>
                   <a:t>Frobenius</a:t>
@@ -5082,28 +5080,9 @@
                   <a:rPr lang="en-US" sz="3200" dirty="0" smtClean="0">
                     <a:latin typeface="+mj-lt"/>
                   </a:rPr>
-                  <a:t>. </a:t>
+                  <a:t> at sparse COMET.</a:t>
                 </a:r>
-              </a:p>
-              <a:p>
-                <a:pPr algn="l" rtl="0">
-                  <a:spcBef>
-                    <a:spcPts val="750"/>
-                  </a:spcBef>
-                </a:pPr>
-                <a:r>
-                  <a:rPr lang="en-US" sz="3200" dirty="0" smtClean="0">
-                    <a:latin typeface="+mj-lt"/>
-                  </a:rPr>
-                  <a:t>Sparse </a:t>
-                </a:r>
-                <a:r>
-                  <a:rPr lang="en-US" sz="3200" dirty="0">
-                    <a:latin typeface="+mj-lt"/>
-                  </a:rPr>
-                  <a:t>COMET assigns zero weights to less-informative features.</a:t>
-                </a:r>
-                <a:endParaRPr lang="en-AU" altLang="en-US" sz="3200" dirty="0">
+                <a:endParaRPr lang="en-US" sz="3200" dirty="0" smtClean="0">
                   <a:latin typeface="+mj-lt"/>
                 </a:endParaRPr>
               </a:p>
@@ -5121,8 +5100,8 @@
             </p:nvSpPr>
             <p:spPr bwMode="auto">
               <a:xfrm>
-                <a:off x="38280091" y="21495702"/>
-                <a:ext cx="3202595" cy="4629089"/>
+                <a:off x="38280091" y="22106681"/>
+                <a:ext cx="3202595" cy="2556727"/>
               </a:xfrm>
               <a:prstGeom prst="rect">
                 <a:avLst/>
@@ -5130,7 +5109,7 @@
               <a:blipFill rotWithShape="0">
                 <a:blip r:embed="rId9"/>
                 <a:stretch>
-                  <a:fillRect l="-4952" t="-1711" b="-3289"/>
+                  <a:fillRect l="-4952" t="-2857" b="-6905"/>
                 </a:stretch>
               </a:blipFill>
               <a:ln>
@@ -8423,7 +8402,7 @@
         <p:spPr>
           <a:xfrm>
             <a:off x="11964971" y="5343175"/>
-            <a:ext cx="8599025" cy="3263764"/>
+            <a:ext cx="8599025" cy="2755933"/>
           </a:xfrm>
           <a:prstGeom prst="rect">
             <a:avLst/>
@@ -8455,14 +8434,16 @@
           <a:p>
             <a:pPr lvl="0" algn="l" rtl="0"/>
             <a:r>
-              <a:rPr lang="en-US" sz="3200" b="1" dirty="0" smtClean="0">
-                <a:solidFill>
-                  <a:srgbClr val="0070C0"/>
-                </a:solidFill>
+              <a:rPr lang="en-US" sz="3200" dirty="0" smtClean="0">
                 <a:latin typeface="+mj-lt"/>
               </a:rPr>
-              <a:t>We propose a new form of structured sparsity.</a:t>
-            </a:r>
+              <a:t>We propose a new form of structured sparsity. </a:t>
+            </a:r>
+            <a:br>
+              <a:rPr lang="en-US" sz="3200" dirty="0" smtClean="0">
+                <a:latin typeface="+mj-lt"/>
+              </a:rPr>
+            </a:br>
             <a:r>
               <a:rPr lang="en-US" sz="3200" dirty="0" smtClean="0">
                 <a:solidFill>
@@ -8470,7 +8451,7 @@
                 </a:solidFill>
                 <a:latin typeface="+mj-lt"/>
               </a:rPr>
-              <a:t> A small set of features interacts with </a:t>
+              <a:t>A small set of features interacts with </a:t>
             </a:r>
             <a:r>
               <a:rPr lang="en-US" sz="3200" i="1" dirty="0" smtClean="0">
@@ -8488,17 +8469,8 @@
                 </a:solidFill>
                 <a:latin typeface="+mj-lt"/>
               </a:rPr>
-              <a:t> other features. Other individual features correspond to the diagonal of the learned similarity matrix.</a:t>
-            </a:r>
-            <a:endParaRPr lang="he-IL" sz="3200" i="1" dirty="0" smtClean="0">
-              <a:solidFill>
-                <a:prstClr val="black"/>
-              </a:solidFill>
-              <a:latin typeface="+mj-lt"/>
-            </a:endParaRPr>
-          </a:p>
-          <a:p>
-            <a:pPr lvl="0" algn="l" rtl="0"/>
+              <a:t> other feature. We also maintain the diagonal of W corresponding to weights of individual features. </a:t>
+            </a:r>
             <a:endParaRPr lang="en-US" sz="3300" dirty="0">
               <a:solidFill>
                 <a:prstClr val="black"/>
@@ -8521,7 +8493,7 @@
             <p:spPr bwMode="auto">
               <a:xfrm>
                 <a:off x="17590892" y="8569177"/>
-                <a:ext cx="3202596" cy="3541612"/>
+                <a:ext cx="3202596" cy="3049169"/>
               </a:xfrm>
               <a:prstGeom prst="rect">
                 <a:avLst/>
@@ -8918,7 +8890,13 @@
                   <a:rPr lang="en-US" sz="3200" dirty="0">
                     <a:latin typeface="+mj-lt"/>
                   </a:rPr>
-                  <a:t>values of the elements of </a:t>
+                  <a:t>values </a:t>
+                </a:r>
+                <a:r>
+                  <a:rPr lang="en-US" sz="3200" dirty="0" smtClean="0">
+                    <a:latin typeface="+mj-lt"/>
+                  </a:rPr>
+                  <a:t>of </a:t>
                 </a:r>
                 <a14:m>
                   <m:oMath xmlns:m="http://schemas.openxmlformats.org/officeDocument/2006/math">
@@ -8934,13 +8912,25 @@
                   <a:rPr lang="en-US" sz="3200" dirty="0">
                     <a:latin typeface="+mj-lt"/>
                   </a:rPr>
-                  <a:t> trained on </a:t>
+                  <a:t> </a:t>
                 </a:r>
                 <a:r>
                   <a:rPr lang="en-US" sz="3200" dirty="0" smtClean="0">
                     <a:latin typeface="+mj-lt"/>
                   </a:rPr>
-                  <a:t>RCV1. Features </a:t>
+                  <a:t>that was trained </a:t>
+                </a:r>
+                <a:r>
+                  <a:rPr lang="en-US" sz="3200" dirty="0">
+                    <a:latin typeface="+mj-lt"/>
+                  </a:rPr>
+                  <a:t>on </a:t>
+                </a:r>
+                <a:r>
+                  <a:rPr lang="en-US" sz="3200" dirty="0" smtClean="0">
+                    <a:latin typeface="+mj-lt"/>
+                  </a:rPr>
+                  <a:t>RCV1. The features </a:t>
                 </a:r>
                 <a:r>
                   <a:rPr lang="en-US" sz="3200" dirty="0">
@@ -8967,15 +8957,15 @@
             <p:spPr bwMode="auto">
               <a:xfrm>
                 <a:off x="17590892" y="8569177"/>
-                <a:ext cx="3202596" cy="3541612"/>
+                <a:ext cx="3202596" cy="3049169"/>
               </a:xfrm>
               <a:prstGeom prst="rect">
                 <a:avLst/>
               </a:prstGeom>
               <a:blipFill rotWithShape="0">
-                <a:blip r:embed="rId18"/>
+                <a:blip r:embed="rId17"/>
                 <a:stretch>
-                  <a:fillRect l="-4952" t="-2238" r="-1905" b="-4647"/>
+                  <a:fillRect l="-4952" t="-2600" b="-5600"/>
                 </a:stretch>
               </a:blipFill>
               <a:ln>
@@ -9028,7 +9018,7 @@
         <p:spPr>
           <a:xfrm>
             <a:off x="21940053" y="4968775"/>
-            <a:ext cx="9714936" cy="10945218"/>
+            <a:ext cx="9714936" cy="11354125"/>
           </a:xfrm>
           <a:prstGeom prst="roundRect">
             <a:avLst/>
@@ -9101,7 +9091,16 @@
                 </a:solidFill>
                 <a:latin typeface="+mj-lt"/>
               </a:rPr>
-              <a:t>Complexity and runtimes</a:t>
+              <a:t>Complexity and </a:t>
+            </a:r>
+            <a:r>
+              <a:rPr lang="en-US" sz="4400" b="1" dirty="0" smtClean="0">
+                <a:solidFill>
+                  <a:prstClr val="black"/>
+                </a:solidFill>
+                <a:latin typeface="+mj-lt"/>
+              </a:rPr>
+              <a:t>runtime</a:t>
             </a:r>
             <a:endParaRPr lang="en-US" sz="3600" dirty="0" smtClean="0">
               <a:solidFill>
@@ -9133,7 +9132,7 @@
           <p:nvPr/>
         </p:nvPicPr>
         <p:blipFill>
-          <a:blip r:embed="rId19"/>
+          <a:blip r:embed="rId18"/>
           <a:stretch>
             <a:fillRect/>
           </a:stretch>
@@ -9156,7 +9155,7 @@
         </p:nvSpPr>
         <p:spPr>
           <a:xfrm>
-            <a:off x="22391136" y="16441389"/>
+            <a:off x="22391136" y="17017453"/>
             <a:ext cx="8849661" cy="2755933"/>
           </a:xfrm>
           <a:prstGeom prst="rect">
@@ -9239,7 +9238,7 @@
         <p:spPr>
           <a:xfrm>
             <a:off x="32745654" y="5397206"/>
-            <a:ext cx="8849661" cy="1740270"/>
+            <a:ext cx="8849661" cy="2448157"/>
           </a:xfrm>
           <a:prstGeom prst="rect">
             <a:avLst/>
@@ -9267,6 +9266,18 @@
           </a:p>
           <a:p>
             <a:pPr algn="l" rtl="0"/>
+            <a:r>
+              <a:rPr lang="en-US" sz="3200" dirty="0">
+                <a:latin typeface="+mj-lt"/>
+              </a:rPr>
+              <a:t>Achieving almost identical precision as dense-COMET, ×4.5 faster, with 0.5% </a:t>
+            </a:r>
+            <a:r>
+              <a:rPr lang="en-US" sz="3200" dirty="0" smtClean="0">
+                <a:latin typeface="+mj-lt"/>
+              </a:rPr>
+              <a:t>density</a:t>
+            </a:r>
             <a:endParaRPr lang="en-US" sz="1800" b="1" dirty="0">
               <a:latin typeface="+mj-lt"/>
             </a:endParaRPr>
@@ -9281,8 +9292,8 @@
         </p:nvSpPr>
         <p:spPr>
           <a:xfrm>
-            <a:off x="32757800" y="20397878"/>
-            <a:ext cx="8849661" cy="786163"/>
+            <a:off x="32757800" y="20570592"/>
+            <a:ext cx="8849661" cy="1381198"/>
           </a:xfrm>
           <a:prstGeom prst="rect">
             <a:avLst/>
@@ -9296,10 +9307,22 @@
           <a:p>
             <a:pPr algn="ctr" rtl="0"/>
             <a:r>
+              <a:rPr lang="en-US" sz="4400" b="1" dirty="0" err="1" smtClean="0">
+                <a:latin typeface="+mj-lt"/>
+              </a:rPr>
+              <a:t>sCOMET</a:t>
+            </a:r>
+            <a:r>
               <a:rPr lang="en-US" sz="4400" b="1" dirty="0" smtClean="0">
                 <a:latin typeface="+mj-lt"/>
               </a:rPr>
-              <a:t>COMET selects </a:t>
+              <a:t> </a:t>
+            </a:r>
+            <a:r>
+              <a:rPr lang="en-US" sz="4400" b="1" dirty="0" smtClean="0">
+                <a:latin typeface="+mj-lt"/>
+              </a:rPr>
+              <a:t>selects </a:t>
             </a:r>
             <a:r>
               <a:rPr lang="en-US" sz="4400" b="1" dirty="0">
@@ -9311,10 +9334,49 @@
               <a:rPr lang="en-US" sz="4400" b="1" dirty="0" smtClean="0">
                 <a:latin typeface="+mj-lt"/>
               </a:rPr>
-              <a:t>nformative features</a:t>
-            </a:r>
-            <a:endParaRPr lang="en-US" sz="1800" b="1" dirty="0">
-              <a:latin typeface="+mj-lt"/>
+              <a:t>nformative </a:t>
+            </a:r>
+            <a:r>
+              <a:rPr lang="en-US" sz="4400" b="1" dirty="0" smtClean="0">
+                <a:latin typeface="+mj-lt"/>
+              </a:rPr>
+              <a:t>features</a:t>
+            </a:r>
+          </a:p>
+          <a:p>
+            <a:pPr lvl="0" algn="l" rtl="0">
+              <a:spcBef>
+                <a:spcPts val="750"/>
+              </a:spcBef>
+            </a:pPr>
+            <a:r>
+              <a:rPr lang="en-US" sz="3200" dirty="0" smtClean="0">
+                <a:solidFill>
+                  <a:prstClr val="black"/>
+                </a:solidFill>
+              </a:rPr>
+              <a:t>It assigns </a:t>
+            </a:r>
+            <a:r>
+              <a:rPr lang="en-US" sz="3200" dirty="0">
+                <a:solidFill>
+                  <a:prstClr val="black"/>
+                </a:solidFill>
+              </a:rPr>
+              <a:t>zero weights to </a:t>
+            </a:r>
+            <a:r>
+              <a:rPr lang="en-US" sz="3200" dirty="0" smtClean="0">
+                <a:solidFill>
+                  <a:prstClr val="black"/>
+                </a:solidFill>
+              </a:rPr>
+              <a:t>less-informative features.</a:t>
+            </a:r>
+            <a:endParaRPr lang="en-AU" altLang="en-US" sz="3200" dirty="0">
+              <a:solidFill>
+                <a:prstClr val="black"/>
+              </a:solidFill>
             </a:endParaRPr>
           </a:p>
         </p:txBody>
@@ -9328,7 +9390,7 @@
           <p:nvPr/>
         </p:nvPicPr>
         <p:blipFill>
-          <a:blip r:embed="rId20">
+          <a:blip r:embed="rId19">
             <a:extLst>
               <a:ext uri="{28A0092B-C50C-407E-A947-70E740481C1C}">
                 <a14:useLocalDpi xmlns:a14="http://schemas.microsoft.com/office/drawing/2010/main" val="0"/>
@@ -9371,7 +9433,7 @@
             <p:spPr>
               <a:xfrm>
                 <a:off x="11945425" y="14360058"/>
-                <a:ext cx="8610014" cy="16689556"/>
+                <a:ext cx="8610014" cy="17149104"/>
               </a:xfrm>
               <a:prstGeom prst="rect">
                 <a:avLst/>
@@ -9388,13 +9450,7 @@
                   <a:rPr lang="en-US" sz="3200" dirty="0" smtClean="0">
                     <a:latin typeface="+mj-lt"/>
                   </a:rPr>
-                  <a:t>We use </a:t>
-                </a:r>
-                <a:r>
-                  <a:rPr lang="en-US" sz="3200" dirty="0" smtClean="0">
-                    <a:latin typeface="+mj-lt"/>
-                  </a:rPr>
-                  <a:t>an overlapping </a:t>
+                  <a:t>We use an overlapping </a:t>
                 </a:r>
                 <a:r>
                   <a:rPr lang="en-US" sz="3200" dirty="0" smtClean="0"/>
@@ -9418,10 +9474,93 @@
                       </a:rPr>
                       <m:t>𝑊</m:t>
                     </m:r>
+                    <m:r>
+                      <a:rPr lang="en-US" sz="3200" b="0" i="0" smtClean="0">
+                        <a:latin typeface="Cambria Math" panose="02040503050406030204" pitchFamily="18" charset="0"/>
+                      </a:rPr>
+                      <m:t>,</m:t>
+                    </m:r>
+                    <m:r>
+                      <a:rPr lang="en-US" sz="3200">
+                        <a:latin typeface="Cambria Math" panose="02040503050406030204" pitchFamily="18" charset="0"/>
+                      </a:rPr>
+                      <m:t>𝑊</m:t>
+                    </m:r>
+                    <m:r>
+                      <a:rPr lang="en-US" sz="3200">
+                        <a:latin typeface="Cambria Math" panose="02040503050406030204" pitchFamily="18" charset="0"/>
+                      </a:rPr>
+                      <m:t>=</m:t>
+                    </m:r>
+                    <m:nary>
+                      <m:naryPr>
+                        <m:chr m:val="∑"/>
+                        <m:ctrlPr>
+                          <a:rPr lang="en-US" sz="3200" i="1">
+                            <a:latin typeface="Cambria Math" panose="02040503050406030204" pitchFamily="18" charset="0"/>
+                          </a:rPr>
+                        </m:ctrlPr>
+                      </m:naryPr>
+                      <m:sub>
+                        <m:r>
+                          <a:rPr lang="en-US" sz="3200">
+                            <a:latin typeface="Cambria Math" panose="02040503050406030204" pitchFamily="18" charset="0"/>
+                          </a:rPr>
+                          <m:t>𝑘</m:t>
+                        </m:r>
+                        <m:r>
+                          <a:rPr lang="en-US" sz="3200">
+                            <a:latin typeface="Cambria Math" panose="02040503050406030204" pitchFamily="18" charset="0"/>
+                          </a:rPr>
+                          <m:t>=</m:t>
+                        </m:r>
+                        <m:r>
+                          <a:rPr lang="en-US" sz="3200">
+                            <a:latin typeface="Cambria Math" panose="02040503050406030204" pitchFamily="18" charset="0"/>
+                          </a:rPr>
+                          <m:t>0</m:t>
+                        </m:r>
+                      </m:sub>
+                      <m:sup>
+                        <m:r>
+                          <a:rPr lang="en-US" sz="3200">
+                            <a:latin typeface="Cambria Math" panose="02040503050406030204" pitchFamily="18" charset="0"/>
+                          </a:rPr>
+                          <m:t>𝑑</m:t>
+                        </m:r>
+                      </m:sup>
+                      <m:e>
+                        <m:sSub>
+                          <m:sSubPr>
+                            <m:ctrlPr>
+                              <a:rPr lang="en-US" sz="3200" i="1">
+                                <a:latin typeface="Cambria Math" panose="02040503050406030204" pitchFamily="18" charset="0"/>
+                              </a:rPr>
+                            </m:ctrlPr>
+                          </m:sSubPr>
+                          <m:e>
+                            <m:r>
+                              <a:rPr lang="en-US" sz="3200">
+                                <a:latin typeface="Cambria Math" panose="02040503050406030204" pitchFamily="18" charset="0"/>
+                              </a:rPr>
+                              <m:t>𝑉</m:t>
+                            </m:r>
+                          </m:e>
+                          <m:sub>
+                            <m:r>
+                              <a:rPr lang="en-US" sz="3200">
+                                <a:latin typeface="Cambria Math" panose="02040503050406030204" pitchFamily="18" charset="0"/>
+                              </a:rPr>
+                              <m:t>𝑘</m:t>
+                            </m:r>
+                          </m:sub>
+                        </m:sSub>
+                      </m:e>
+                    </m:nary>
                   </m:oMath>
                 </a14:m>
                 <a:r>
-                  <a:rPr lang="en-US" sz="3200" dirty="0">
+                  <a:rPr lang="en-US" sz="3200" dirty="0" smtClean="0">
                     <a:latin typeface="+mj-lt"/>
                   </a:rPr>
                   <a:t> into </a:t>
@@ -9546,7 +9685,13 @@
                   <a:rPr lang="en-US" sz="3200" dirty="0">
                     <a:latin typeface="+mj-lt"/>
                   </a:rPr>
-                  <a:t> is a diagonal matrix, each </a:t>
+                  <a:t> is a diagonal </a:t>
+                </a:r>
+                <a:r>
+                  <a:rPr lang="en-US" sz="3200" dirty="0" smtClean="0">
+                    <a:latin typeface="+mj-lt"/>
+                  </a:rPr>
+                  <a:t>matrix. Each </a:t>
                 </a:r>
                 <a14:m>
                   <m:oMath xmlns:m="http://schemas.openxmlformats.org/officeDocument/2006/math">
@@ -9657,95 +9802,14 @@
                   <a:rPr lang="en-US" sz="3200" dirty="0">
                     <a:latin typeface="+mj-lt"/>
                   </a:rPr>
-                  <a:t> row and column, with an all-zeros diagonal, </a:t>
+                  <a:t> row and column, with an all-zeros </a:t>
                 </a:r>
-                <a14:m>
-                  <m:oMath xmlns:m="http://schemas.openxmlformats.org/officeDocument/2006/math">
-                    <m:r>
-                      <a:rPr lang="en-US" sz="3200">
-                        <a:latin typeface="Cambria Math" panose="02040503050406030204" pitchFamily="18" charset="0"/>
-                      </a:rPr>
-                      <m:t>𝑊</m:t>
-                    </m:r>
-                    <m:r>
-                      <a:rPr lang="en-US" sz="3200">
-                        <a:latin typeface="Cambria Math" panose="02040503050406030204" pitchFamily="18" charset="0"/>
-                      </a:rPr>
-                      <m:t>=</m:t>
-                    </m:r>
-                    <m:nary>
-                      <m:naryPr>
-                        <m:chr m:val="∑"/>
-                        <m:ctrlPr>
-                          <a:rPr lang="en-US" sz="3200" i="1">
-                            <a:latin typeface="Cambria Math" panose="02040503050406030204" pitchFamily="18" charset="0"/>
-                          </a:rPr>
-                        </m:ctrlPr>
-                      </m:naryPr>
-                      <m:sub>
-                        <m:r>
-                          <a:rPr lang="en-US" sz="3200">
-                            <a:latin typeface="Cambria Math" panose="02040503050406030204" pitchFamily="18" charset="0"/>
-                          </a:rPr>
-                          <m:t>𝑘</m:t>
-                        </m:r>
-                        <m:r>
-                          <a:rPr lang="en-US" sz="3200">
-                            <a:latin typeface="Cambria Math" panose="02040503050406030204" pitchFamily="18" charset="0"/>
-                          </a:rPr>
-                          <m:t>=</m:t>
-                        </m:r>
-                        <m:r>
-                          <a:rPr lang="en-US" sz="3200">
-                            <a:latin typeface="Cambria Math" panose="02040503050406030204" pitchFamily="18" charset="0"/>
-                          </a:rPr>
-                          <m:t>0</m:t>
-                        </m:r>
-                      </m:sub>
-                      <m:sup>
-                        <m:r>
-                          <a:rPr lang="en-US" sz="3200">
-                            <a:latin typeface="Cambria Math" panose="02040503050406030204" pitchFamily="18" charset="0"/>
-                          </a:rPr>
-                          <m:t>𝑑</m:t>
-                        </m:r>
-                      </m:sup>
-                      <m:e>
-                        <m:sSub>
-                          <m:sSubPr>
-                            <m:ctrlPr>
-                              <a:rPr lang="en-US" sz="3200" i="1">
-                                <a:latin typeface="Cambria Math" panose="02040503050406030204" pitchFamily="18" charset="0"/>
-                              </a:rPr>
-                            </m:ctrlPr>
-                          </m:sSubPr>
-                          <m:e>
-                            <m:r>
-                              <a:rPr lang="en-US" sz="3200">
-                                <a:latin typeface="Cambria Math" panose="02040503050406030204" pitchFamily="18" charset="0"/>
-                              </a:rPr>
-                              <m:t>𝑉</m:t>
-                            </m:r>
-                          </m:e>
-                          <m:sub>
-                            <m:r>
-                              <a:rPr lang="en-US" sz="3200">
-                                <a:latin typeface="Cambria Math" panose="02040503050406030204" pitchFamily="18" charset="0"/>
-                              </a:rPr>
-                              <m:t>𝑘</m:t>
-                            </m:r>
-                          </m:sub>
-                        </m:sSub>
-                      </m:e>
-                    </m:nary>
-                    <m:r>
-                      <a:rPr lang="en-US" sz="3200" i="1">
-                        <a:latin typeface="Cambria Math" panose="02040503050406030204" pitchFamily="18" charset="0"/>
-                      </a:rPr>
-                      <m:t>.</m:t>
-                    </m:r>
-                  </m:oMath>
-                </a14:m>
+                <a:r>
+                  <a:rPr lang="en-US" sz="3200" dirty="0" smtClean="0">
+                    <a:latin typeface="+mj-lt"/>
+                  </a:rPr>
+                  <a:t>diagonal.</a:t>
+                </a:r>
                 <a:endParaRPr lang="en-US" sz="3200" dirty="0">
                   <a:latin typeface="+mj-lt"/>
                 </a:endParaRPr>
@@ -10555,37 +10619,52 @@
               <a:p>
                 <a:pPr algn="l"/>
                 <a:r>
-                  <a:rPr lang="en-US" sz="3200" dirty="0">
+                  <a:rPr lang="en-US" sz="3200" dirty="0" smtClean="0">
                     <a:latin typeface="+mj-lt"/>
                   </a:rPr>
-                  <a:t>Solving a proximal problem on each step to encourage exact all-zeros </a:t>
-                </a:r>
-                <a:r>
-                  <a:rPr lang="en-US" sz="3200" dirty="0"/>
-                  <a:t>updates</a:t>
-                </a:r>
-                <a:r>
-                  <a:rPr lang="en-US" sz="3200" baseline="30000" dirty="0"/>
-                  <a:t>4</a:t>
+                  <a:t>At each coordinate step we </a:t>
                 </a:r>
                 <a:r>
                   <a:rPr lang="en-US" sz="3200" dirty="0" smtClean="0">
                     <a:latin typeface="+mj-lt"/>
                   </a:rPr>
-                  <a:t>, </a:t>
+                  <a:t>solve </a:t>
+                </a:r>
+                <a:r>
+                  <a:rPr lang="en-US" sz="3200" dirty="0" smtClean="0">
+                    <a:latin typeface="+mj-lt"/>
+                  </a:rPr>
+                  <a:t>a </a:t>
                 </a:r>
                 <a:r>
                   <a:rPr lang="en-US" sz="3200" dirty="0">
                     <a:latin typeface="+mj-lt"/>
                   </a:rPr>
-                  <a:t>which admits a closed form </a:t>
+                  <a:t>proximal problem </a:t>
                 </a:r>
                 <a:r>
                   <a:rPr lang="en-US" sz="3200" dirty="0" smtClean="0">
                     <a:latin typeface="+mj-lt"/>
                   </a:rPr>
-                  <a:t>solution.</a:t>
+                  <a:t>to </a:t>
                 </a:r>
+                <a:r>
+                  <a:rPr lang="en-US" sz="3200" dirty="0">
+                    <a:latin typeface="+mj-lt"/>
+                  </a:rPr>
+                  <a:t>encourage exact all-zeros </a:t>
+                </a:r>
+                <a:r>
+                  <a:rPr lang="en-US" sz="3200" dirty="0" smtClean="0"/>
+                  <a:t>updates</a:t>
+                </a:r>
+                <a:r>
+                  <a:rPr lang="en-US" sz="3200" baseline="30000" dirty="0" smtClean="0"/>
+                  <a:t>4</a:t>
+                </a:r>
+                <a:endParaRPr lang="en-US" sz="3200" dirty="0" smtClean="0">
+                  <a:latin typeface="+mj-lt"/>
+                </a:endParaRPr>
               </a:p>
               <a:p>
                 <a:pPr algn="l"/>
@@ -10939,10 +11018,10 @@
                         </m:e>
                       </m:d>
                       <m:r>
-                        <a:rPr lang="en-US" sz="3200" i="1">
+                        <a:rPr lang="en-US" sz="3200" b="0" i="1" smtClean="0">
                           <a:latin typeface="Cambria Math" panose="02040503050406030204" pitchFamily="18" charset="0"/>
                         </a:rPr>
-                        <m:t>,</m:t>
+                        <m:t>.</m:t>
                       </m:r>
                     </m:oMath>
                   </m:oMathPara>
@@ -10974,7 +11053,7 @@
                   <a:rPr lang="en-US" sz="3200" dirty="0" smtClean="0">
                     <a:latin typeface="+mj-lt"/>
                   </a:rPr>
-                  <a:t>setting </a:t>
+                  <a:t>This has a closed-form solution. We then set </a:t>
                 </a:r>
                 <a14:m>
                   <m:oMath xmlns:m="http://schemas.openxmlformats.org/officeDocument/2006/math">
@@ -11085,13 +11164,19 @@
                         </m:r>
                       </m:sub>
                     </m:sSub>
+                    <m:r>
+                      <a:rPr lang="en-US" sz="3200" b="0" i="0" smtClean="0">
+                        <a:latin typeface="Cambria Math" panose="02040503050406030204" pitchFamily="18" charset="0"/>
+                      </a:rPr>
+                      <m:t>.</m:t>
+                    </m:r>
                   </m:oMath>
                 </a14:m>
                 <a:r>
-                  <a:rPr lang="en-US" sz="3200" dirty="0">
+                  <a:rPr lang="en-US" sz="3200" dirty="0" smtClean="0">
                     <a:latin typeface="+mj-lt"/>
                   </a:rPr>
-                  <a:t> and </a:t>
+                  <a:t> </a:t>
                 </a:r>
                 <a14:m>
                   <m:oMath xmlns:m="http://schemas.openxmlformats.org/officeDocument/2006/math">
@@ -11101,13 +11186,25 @@
                       </a:rPr>
                       <m:t>𝜃</m:t>
                     </m:r>
+                    <m:r>
+                      <a:rPr lang="en-US" sz="3200" i="1">
+                        <a:latin typeface="Cambria Math" panose="02040503050406030204" pitchFamily="18" charset="0"/>
+                      </a:rPr>
+                      <m:t> </m:t>
+                    </m:r>
                   </m:oMath>
                 </a14:m>
+                <a:r>
+                  <a:rPr lang="en-US" sz="3200" dirty="0" smtClean="0">
+                    <a:latin typeface="+mj-lt"/>
+                  </a:rPr>
+                  <a:t>is </a:t>
+                </a:r>
                 <a:r>
                   <a:rPr lang="en-US" sz="3200" dirty="0">
                     <a:latin typeface="+mj-lt"/>
                   </a:rPr>
-                  <a:t> is the step size of the proximal update</a:t>
+                  <a:t>the step size of the proximal update</a:t>
                 </a:r>
                 <a:r>
                   <a:rPr lang="en-US" sz="3200" dirty="0" smtClean="0">
@@ -11134,13 +11231,19 @@
                   <a:rPr lang="en-AU" sz="3200" dirty="0" smtClean="0">
                     <a:latin typeface="+mj-lt"/>
                   </a:rPr>
-                  <a:t>update maintains </a:t>
+                  <a:t>update </a:t>
+                </a:r>
+                <a:r>
+                  <a:rPr lang="en-AU" sz="3200" dirty="0" smtClean="0">
+                    <a:latin typeface="+mj-lt"/>
+                  </a:rPr>
+                  <a:t>sets many </a:t>
                 </a:r>
                 <a:r>
                   <a:rPr lang="en-AU" sz="3200" dirty="0">
                     <a:latin typeface="+mj-lt"/>
                   </a:rPr>
-                  <a:t>many of the groups </a:t>
+                  <a:t>of the groups </a:t>
                 </a:r>
                 <a14:m>
                   <m:oMath xmlns:m="http://schemas.openxmlformats.org/officeDocument/2006/math">
@@ -11148,14 +11251,14 @@
                       <m:sSubPr>
                         <m:ctrlPr>
                           <a:rPr lang="en-US" sz="3200" i="1">
-                            <a:latin typeface="+mj-lt"/>
+                            <a:latin typeface="Cambria Math" panose="02040503050406030204" pitchFamily="18" charset="0"/>
                           </a:rPr>
                         </m:ctrlPr>
                       </m:sSubPr>
                       <m:e>
                         <m:r>
                           <a:rPr lang="en-US" sz="3200" i="1">
-                            <a:latin typeface="+mj-lt"/>
+                            <a:latin typeface="Cambria Math" panose="02040503050406030204" pitchFamily="18" charset="0"/>
                           </a:rPr>
                           <m:t>𝑉</m:t>
                         </m:r>
@@ -11163,7 +11266,7 @@
                       <m:sub>
                         <m:r>
                           <a:rPr lang="en-US" sz="3200" i="1">
-                            <a:latin typeface="+mj-lt"/>
+                            <a:latin typeface="Cambria Math" panose="02040503050406030204" pitchFamily="18" charset="0"/>
                           </a:rPr>
                           <m:t>𝑘</m:t>
                         </m:r>
@@ -11175,13 +11278,19 @@
                   <a:rPr lang="en-AU" sz="3200" dirty="0" smtClean="0">
                     <a:latin typeface="+mj-lt"/>
                   </a:rPr>
-                  <a:t> as </a:t>
+                  <a:t> </a:t>
+                </a:r>
+                <a:r>
+                  <a:rPr lang="en-AU" sz="3200" dirty="0" smtClean="0">
+                    <a:latin typeface="+mj-lt"/>
+                  </a:rPr>
+                  <a:t> to be identically </a:t>
                 </a:r>
                 <a:r>
                   <a:rPr lang="en-AU" sz="3200" dirty="0">
                     <a:latin typeface="+mj-lt"/>
                   </a:rPr>
-                  <a:t>identically zero</a:t>
+                  <a:t>zero</a:t>
                 </a:r>
                 <a:r>
                   <a:rPr lang="en-AU" sz="3200" dirty="0" smtClean="0">
@@ -11223,7 +11332,7 @@
                   <m:oMath xmlns:m="http://schemas.openxmlformats.org/officeDocument/2006/math">
                     <m:r>
                       <a:rPr lang="en-US" sz="3200" i="1">
-                        <a:latin typeface="+mj-lt"/>
+                        <a:latin typeface="Cambria Math" panose="02040503050406030204" pitchFamily="18" charset="0"/>
                       </a:rPr>
                       <m:t>𝑂</m:t>
                     </m:r>
@@ -11231,14 +11340,14 @@
                       <m:dPr>
                         <m:ctrlPr>
                           <a:rPr lang="en-US" sz="3200" i="1">
-                            <a:latin typeface="+mj-lt"/>
+                            <a:latin typeface="Cambria Math" panose="02040503050406030204" pitchFamily="18" charset="0"/>
                           </a:rPr>
                         </m:ctrlPr>
                       </m:dPr>
                       <m:e>
                         <m:r>
                           <a:rPr lang="en-US" sz="3200" i="1">
-                            <a:latin typeface="+mj-lt"/>
+                            <a:latin typeface="Cambria Math" panose="02040503050406030204" pitchFamily="18" charset="0"/>
                           </a:rPr>
                           <m:t>𝜌</m:t>
                         </m:r>
@@ -11246,14 +11355,14 @@
                           <m:sSupPr>
                             <m:ctrlPr>
                               <a:rPr lang="en-US" sz="3200" i="1">
-                                <a:latin typeface="+mj-lt"/>
+                                <a:latin typeface="Cambria Math" panose="02040503050406030204" pitchFamily="18" charset="0"/>
                               </a:rPr>
                             </m:ctrlPr>
                           </m:sSupPr>
                           <m:e>
                             <m:r>
                               <a:rPr lang="en-US" sz="3200" i="1">
-                                <a:latin typeface="+mj-lt"/>
+                                <a:latin typeface="Cambria Math" panose="02040503050406030204" pitchFamily="18" charset="0"/>
                               </a:rPr>
                               <m:t>𝑑</m:t>
                             </m:r>
@@ -11261,7 +11370,7 @@
                           <m:sup>
                             <m:r>
                               <a:rPr lang="en-US" sz="3200" i="1">
-                                <a:latin typeface="+mj-lt"/>
+                                <a:latin typeface="Cambria Math" panose="02040503050406030204" pitchFamily="18" charset="0"/>
                               </a:rPr>
                               <m:t>2</m:t>
                             </m:r>
@@ -11271,6 +11380,34 @@
                     </m:d>
                   </m:oMath>
                 </a14:m>
+                <a:r>
+                  <a:rPr lang="en-US" sz="3200" dirty="0" smtClean="0">
+                    <a:latin typeface="+mj-lt"/>
+                  </a:rPr>
+                  <a:t>, where </a:t>
+                </a:r>
+                <a14:m>
+                  <m:oMath xmlns:m="http://schemas.openxmlformats.org/officeDocument/2006/math">
+                    <m:r>
+                      <a:rPr lang="en-US" sz="3200" i="1">
+                        <a:latin typeface="Cambria Math" panose="02040503050406030204" pitchFamily="18" charset="0"/>
+                      </a:rPr>
+                      <m:t>𝜌</m:t>
+                    </m:r>
+                    <m:r>
+                      <a:rPr lang="en-US" sz="3200" i="1">
+                        <a:latin typeface="Cambria Math" panose="02040503050406030204" pitchFamily="18" charset="0"/>
+                      </a:rPr>
+                      <m:t> </m:t>
+                    </m:r>
+                  </m:oMath>
+                </a14:m>
+                <a:r>
+                  <a:rPr lang="en-US" sz="3200" dirty="0" smtClean="0">
+                    <a:latin typeface="+mj-lt"/>
+                  </a:rPr>
+                  <a:t>is the density level.</a:t>
+                </a:r>
                 <a:endParaRPr lang="en-US" sz="3200" dirty="0" smtClean="0">
                   <a:latin typeface="+mj-lt"/>
                 </a:endParaRPr>
@@ -11296,15 +11433,15 @@
             <p:spPr>
               <a:xfrm>
                 <a:off x="11945425" y="14360058"/>
-                <a:ext cx="8610014" cy="16689556"/>
+                <a:ext cx="8610014" cy="17149104"/>
               </a:xfrm>
               <a:prstGeom prst="rect">
                 <a:avLst/>
               </a:prstGeom>
               <a:blipFill rotWithShape="0">
-                <a:blip r:embed="rId21"/>
+                <a:blip r:embed="rId20"/>
                 <a:stretch>
-                  <a:fillRect l="-1629" t="-402" r="-2691"/>
+                  <a:fillRect l="-1629" t="-391" r="-2620"/>
                 </a:stretch>
               </a:blipFill>
             </p:spPr>
@@ -11335,7 +11472,7 @@
             </p:nvSpPr>
             <p:spPr bwMode="auto">
               <a:xfrm>
-                <a:off x="22375202" y="13969777"/>
+                <a:off x="22375202" y="14126127"/>
                 <a:ext cx="8614582" cy="1571842"/>
               </a:xfrm>
               <a:prstGeom prst="rect">
@@ -11702,14 +11839,24 @@
                   </a:spcBef>
                 </a:pPr>
                 <a:r>
-                  <a:rPr lang="en-US" altLang="en-US" sz="3200" b="1" dirty="0">
+                  <a:rPr lang="en-US" altLang="en-US" sz="3200" b="1" dirty="0" smtClean="0">
                     <a:solidFill>
                       <a:schemeClr val="tx1"/>
                     </a:solidFill>
                     <a:latin typeface="+mj-lt"/>
                     <a:cs typeface="+mn-cs"/>
                   </a:rPr>
-                  <a:t>Runtimes</a:t>
+                  <a:t>Runtime</a:t>
+                </a:r>
+                <a:r>
+                  <a:rPr lang="en-US" altLang="en-US" sz="3200" dirty="0" smtClean="0">
+                    <a:solidFill>
+                      <a:schemeClr val="tx1"/>
+                    </a:solidFill>
+                    <a:latin typeface="+mj-lt"/>
+                    <a:cs typeface="+mn-cs"/>
+                  </a:rPr>
+                  <a:t>, </a:t>
                 </a:r>
                 <a:r>
                   <a:rPr lang="en-US" altLang="en-US" sz="3200" dirty="0">
@@ -11719,7 +11866,7 @@
                     <a:latin typeface="+mj-lt"/>
                     <a:cs typeface="+mn-cs"/>
                   </a:rPr>
-                  <a:t>, minutes. </a:t>
+                  <a:t>minutes. </a:t>
                 </a:r>
                 <a14:m>
                   <m:oMath xmlns:m="http://schemas.openxmlformats.org/officeDocument/2006/math">
@@ -11831,16 +11978,16 @@
             </p:nvSpPr>
             <p:spPr bwMode="auto">
               <a:xfrm>
-                <a:off x="22375202" y="13969777"/>
+                <a:off x="22375202" y="14126127"/>
                 <a:ext cx="8614582" cy="1571842"/>
               </a:xfrm>
               <a:prstGeom prst="rect">
                 <a:avLst/>
               </a:prstGeom>
               <a:blipFill rotWithShape="0">
-                <a:blip r:embed="rId22"/>
+                <a:blip r:embed="rId21"/>
                 <a:stretch>
-                  <a:fillRect l="-1768" t="-4669" r="-1556" b="-12062"/>
+                  <a:fillRect l="-1768" t="-4651" r="-1556" b="-11628"/>
                 </a:stretch>
               </a:blipFill>
               <a:ln>
@@ -11873,7 +12020,7 @@
           <p:nvPr/>
         </p:nvPicPr>
         <p:blipFill rotWithShape="1">
-          <a:blip r:embed="rId23" cstate="print">
+          <a:blip r:embed="rId22" cstate="print">
             <a:extLst>
               <a:ext uri="{28A0092B-C50C-407E-A947-70E740481C1C}">
                 <a14:useLocalDpi xmlns:a14="http://schemas.microsoft.com/office/drawing/2010/main" val="0"/>
@@ -11885,7 +12032,7 @@
         </p:blipFill>
         <p:spPr bwMode="auto">
           <a:xfrm>
-            <a:off x="22497465" y="19464850"/>
+            <a:off x="22497465" y="20040914"/>
             <a:ext cx="5421807" cy="4931836"/>
           </a:xfrm>
           <a:prstGeom prst="rect">
@@ -11912,13 +12059,13 @@
           <p:nvPr/>
         </p:nvPicPr>
         <p:blipFill rotWithShape="1">
-          <a:blip r:embed="rId24"/>
+          <a:blip r:embed="rId23"/>
           <a:srcRect t="5723" r="50227"/>
           <a:stretch/>
         </p:blipFill>
         <p:spPr>
           <a:xfrm>
-            <a:off x="32768554" y="7201024"/>
+            <a:off x="32768554" y="7849097"/>
             <a:ext cx="8714132" cy="6563961"/>
           </a:xfrm>
           <a:prstGeom prst="rect">
@@ -11935,7 +12082,7 @@
           <p:nvPr/>
         </p:nvPicPr>
         <p:blipFill rotWithShape="1">
-          <a:blip r:embed="rId23" cstate="print">
+          <a:blip r:embed="rId22" cstate="print">
             <a:extLst>
               <a:ext uri="{28A0092B-C50C-407E-A947-70E740481C1C}">
                 <a14:useLocalDpi xmlns:a14="http://schemas.microsoft.com/office/drawing/2010/main" val="0"/>
@@ -11947,7 +12094,7 @@
         </p:blipFill>
         <p:spPr bwMode="auto">
           <a:xfrm>
-            <a:off x="22497465" y="25275033"/>
+            <a:off x="22497465" y="25851097"/>
             <a:ext cx="5389266" cy="4968552"/>
           </a:xfrm>
           <a:prstGeom prst="rect">
@@ -11974,7 +12121,7 @@
           <p:nvPr/>
         </p:nvPicPr>
         <p:blipFill rotWithShape="1">
-          <a:blip r:embed="rId25">
+          <a:blip r:embed="rId24">
             <a:extLst>
               <a:ext uri="{28A0092B-C50C-407E-A947-70E740481C1C}">
                 <a14:useLocalDpi xmlns:a14="http://schemas.microsoft.com/office/drawing/2010/main" val="0"/>
@@ -12014,7 +12161,7 @@
         </p:nvSpPr>
         <p:spPr bwMode="auto">
           <a:xfrm>
-            <a:off x="32898616" y="13551819"/>
+            <a:off x="32898616" y="14199892"/>
             <a:ext cx="8584070" cy="1079399"/>
           </a:xfrm>
           <a:prstGeom prst="rect">
@@ -12408,19 +12555,31 @@
               <a:rPr lang="en-US" altLang="en-US" sz="3200" b="1" dirty="0">
                 <a:latin typeface="+mj-lt"/>
               </a:rPr>
-              <a:t>mean training run time</a:t>
+              <a:t>mean training </a:t>
+            </a:r>
+            <a:r>
+              <a:rPr lang="en-US" altLang="en-US" sz="3200" b="1" dirty="0" smtClean="0">
+                <a:latin typeface="+mj-lt"/>
+              </a:rPr>
+              <a:t>time</a:t>
+            </a:r>
+            <a:r>
+              <a:rPr lang="en-US" altLang="en-US" sz="3200" dirty="0" smtClean="0">
+                <a:latin typeface="+mj-lt"/>
+              </a:rPr>
+              <a:t> </a:t>
             </a:r>
             <a:r>
               <a:rPr lang="en-US" altLang="en-US" sz="3200" dirty="0">
                 <a:latin typeface="+mj-lt"/>
               </a:rPr>
-              <a:t> of </a:t>
+              <a:t>of </a:t>
             </a:r>
             <a:r>
               <a:rPr lang="en-US" altLang="en-US" sz="3200" dirty="0" smtClean="0">
                 <a:latin typeface="+mj-lt"/>
               </a:rPr>
-              <a:t>COMET, </a:t>
+              <a:t>COMET; </a:t>
             </a:r>
             <a:r>
               <a:rPr lang="en-US" altLang="en-US" sz="3200" dirty="0" smtClean="0">
@@ -12450,17 +12609,7 @@
                 <a:latin typeface="+mj-lt"/>
                 <a:cs typeface="+mn-cs"/>
               </a:rPr>
-              <a:t>5k </a:t>
-            </a:r>
-            <a:r>
-              <a:rPr lang="en-US" altLang="en-US" sz="3200" dirty="0" smtClean="0">
-                <a:solidFill>
-                  <a:prstClr val="black"/>
-                </a:solidFill>
-                <a:latin typeface="+mj-lt"/>
-                <a:cs typeface="+mn-cs"/>
-              </a:rPr>
-              <a:t>features.</a:t>
+              <a:t>5k features.</a:t>
             </a:r>
             <a:endParaRPr lang="en-AU" altLang="en-US" sz="3200" i="1" dirty="0">
               <a:latin typeface="+mj-lt"/>
@@ -12478,7 +12627,7 @@
         </p:nvSpPr>
         <p:spPr bwMode="auto">
           <a:xfrm>
-            <a:off x="38856156" y="15121905"/>
+            <a:off x="38856156" y="15383311"/>
             <a:ext cx="2760363" cy="3049169"/>
           </a:xfrm>
           <a:prstGeom prst="rect">
@@ -12884,7 +13033,7 @@
               <a:rPr lang="en-US" altLang="en-US" sz="3200" dirty="0" smtClean="0">
                 <a:latin typeface="+mj-lt"/>
               </a:rPr>
-              <a:t>, </a:t>
+              <a:t>; </a:t>
             </a:r>
             <a:r>
               <a:rPr lang="en-US" altLang="en-US" sz="3200" dirty="0">
@@ -12896,13 +13045,7 @@
               <a:rPr lang="en-US" altLang="en-US" sz="3200" dirty="0" smtClean="0">
                 <a:latin typeface="+mj-lt"/>
               </a:rPr>
-              <a:t>5k </a:t>
-            </a:r>
-            <a:r>
-              <a:rPr lang="en-US" altLang="en-US" sz="3200" dirty="0" smtClean="0">
-                <a:latin typeface="+mj-lt"/>
-              </a:rPr>
-              <a:t>features.</a:t>
+              <a:t>5k features.</a:t>
             </a:r>
             <a:endParaRPr lang="en-AU" altLang="en-US" sz="3200" b="1" i="1" dirty="0">
               <a:latin typeface="+mj-lt"/>
@@ -12910,8 +13053,8 @@
           </a:p>
         </p:txBody>
       </p:sp>
-      <mc:AlternateContent xmlns:mc="http://schemas.openxmlformats.org/markup-compatibility/2006">
-        <mc:Choice xmlns:a14="http://schemas.microsoft.com/office/drawing/2010/main" Requires="a14">
+      <mc:AlternateContent xmlns:mc="http://schemas.openxmlformats.org/markup-compatibility/2006" xmlns:a14="http://schemas.microsoft.com/office/drawing/2010/main">
+        <mc:Choice Requires="a14">
           <p:sp>
             <p:nvSpPr>
               <p:cNvPr id="59" name="Rectangle 58"/>
@@ -13029,7 +13172,7 @@
             </p:txBody>
           </p:sp>
         </mc:Choice>
-        <mc:Fallback>
+        <mc:Fallback xmlns="">
           <p:sp>
             <p:nvSpPr>
               <p:cNvPr id="59" name="Rectangle 58"/>
@@ -13070,59 +13213,6 @@
       </mc:AlternateContent>
       <p:sp>
         <p:nvSpPr>
-          <p:cNvPr id="61" name="Rounded Rectangle 60"/>
-          <p:cNvSpPr/>
-          <p:nvPr/>
-        </p:nvSpPr>
-        <p:spPr>
-          <a:xfrm>
-            <a:off x="32303428" y="26811613"/>
-            <a:ext cx="9714935" cy="3911616"/>
-          </a:xfrm>
-          <a:prstGeom prst="roundRect">
-            <a:avLst/>
-          </a:prstGeom>
-          <a:solidFill>
-            <a:schemeClr val="bg1"/>
-          </a:solidFill>
-          <a:ln w="76200">
-            <a:solidFill>
-              <a:schemeClr val="tx1"/>
-            </a:solidFill>
-          </a:ln>
-        </p:spPr>
-        <p:style>
-          <a:lnRef idx="2">
-            <a:schemeClr val="accent1">
-              <a:shade val="50000"/>
-            </a:schemeClr>
-          </a:lnRef>
-          <a:fillRef idx="1">
-            <a:schemeClr val="accent1"/>
-          </a:fillRef>
-          <a:effectRef idx="0">
-            <a:schemeClr val="accent1"/>
-          </a:effectRef>
-          <a:fontRef idx="minor">
-            <a:schemeClr val="lt1"/>
-          </a:fontRef>
-        </p:style>
-        <p:txBody>
-          <a:bodyPr lIns="83976" tIns="41987" rIns="83976" bIns="41987" rtlCol="1" anchor="t" anchorCtr="0"/>
-          <a:lstStyle/>
-          <a:p>
-            <a:pPr algn="ctr" rtl="0"/>
-            <a:endParaRPr lang="en-US" sz="4400" b="1" dirty="0" smtClean="0">
-              <a:solidFill>
-                <a:schemeClr val="tx1"/>
-              </a:solidFill>
-              <a:latin typeface="+mj-lt"/>
-            </a:endParaRPr>
-          </a:p>
-        </p:txBody>
-      </p:sp>
-      <p:sp>
-        <p:nvSpPr>
           <p:cNvPr id="68" name="Text Box 115"/>
           <p:cNvSpPr txBox="1">
             <a:spLocks noChangeArrowheads="1"/>
@@ -13131,7 +13221,7 @@
         </p:nvSpPr>
         <p:spPr bwMode="auto">
           <a:xfrm>
-            <a:off x="32900129" y="27003225"/>
+            <a:off x="32900129" y="27278037"/>
             <a:ext cx="8584070" cy="3541612"/>
           </a:xfrm>
           <a:prstGeom prst="rect">
@@ -13516,20 +13606,17 @@
               <a:t>Convex optimization</a:t>
             </a:r>
             <a:r>
-              <a:rPr lang="en-US" sz="2300">
+              <a:rPr lang="en-US" sz="2300" dirty="0">
                 <a:latin typeface="+mj-lt"/>
               </a:rPr>
               <a:t>, </a:t>
             </a:r>
             <a:r>
-              <a:rPr lang="en-US" sz="2300" smtClean="0">
+              <a:rPr lang="en-US" sz="2300" dirty="0" smtClean="0">
                 <a:latin typeface="+mj-lt"/>
               </a:rPr>
               <a:t>2004</a:t>
             </a:r>
-            <a:endParaRPr lang="en-US" sz="2300" dirty="0" smtClean="0">
-              <a:latin typeface="+mj-lt"/>
-            </a:endParaRPr>
           </a:p>
           <a:p>
             <a:pPr algn="l" rtl="0">
@@ -13794,30 +13881,6 @@
           </a:p>
         </p:txBody>
       </p:sp>
-      <p:pic>
-        <p:nvPicPr>
-          <p:cNvPr id="12" name="Picture 11"/>
-          <p:cNvPicPr>
-            <a:picLocks noChangeAspect="1"/>
-          </p:cNvPicPr>
-          <p:nvPr/>
-        </p:nvPicPr>
-        <p:blipFill>
-          <a:blip r:embed="rId27"/>
-          <a:stretch>
-            <a:fillRect/>
-          </a:stretch>
-        </p:blipFill>
-        <p:spPr>
-          <a:xfrm>
-            <a:off x="22391136" y="9577289"/>
-            <a:ext cx="8608304" cy="4409819"/>
-          </a:xfrm>
-          <a:prstGeom prst="rect">
-            <a:avLst/>
-          </a:prstGeom>
-        </p:spPr>
-      </p:pic>
       <p:pic>
         <p:nvPicPr>
           <p:cNvPr id="13" name="Picture 12"/>
@@ -13827,7 +13890,7 @@
           <p:nvPr/>
         </p:nvPicPr>
         <p:blipFill>
-          <a:blip r:embed="rId28"/>
+          <a:blip r:embed="rId27"/>
           <a:stretch>
             <a:fillRect/>
           </a:stretch>
@@ -13964,8 +14027,8 @@
           </a:p>
         </p:txBody>
       </p:sp>
-      <mc:AlternateContent xmlns:mc="http://schemas.openxmlformats.org/markup-compatibility/2006">
-        <mc:Choice xmlns:a14="http://schemas.microsoft.com/office/drawing/2010/main" Requires="a14">
+      <mc:AlternateContent xmlns:mc="http://schemas.openxmlformats.org/markup-compatibility/2006" xmlns:a14="http://schemas.microsoft.com/office/drawing/2010/main">
+        <mc:Choice Requires="a14">
           <p:sp>
             <p:nvSpPr>
               <p:cNvPr id="78" name="Rectangle 77"/>
@@ -13990,7 +14053,57 @@
                 <a:pPr algn="l" rtl="0"/>
                 <a:r>
                   <a:rPr lang="en-AU" sz="3200" dirty="0" smtClean="0"/>
-                  <a:t>To avoid costly projections, we use the PD condition of the </a:t>
+                  <a:t>To avoid costly projections </a:t>
+                </a:r>
+                <a14:m>
+                  <m:oMath xmlns:m="http://schemas.openxmlformats.org/officeDocument/2006/math">
+                    <m:r>
+                      <a:rPr lang="en-US" sz="3200" i="1">
+                        <a:latin typeface="Cambria Math" panose="02040503050406030204" pitchFamily="18" charset="0"/>
+                      </a:rPr>
+                      <m:t>𝑂</m:t>
+                    </m:r>
+                    <m:d>
+                      <m:dPr>
+                        <m:ctrlPr>
+                          <a:rPr lang="en-US" sz="3200" i="1">
+                            <a:latin typeface="Cambria Math" panose="02040503050406030204" pitchFamily="18" charset="0"/>
+                          </a:rPr>
+                        </m:ctrlPr>
+                      </m:dPr>
+                      <m:e>
+                        <m:sSup>
+                          <m:sSupPr>
+                            <m:ctrlPr>
+                              <a:rPr lang="en-US" sz="3200" i="1">
+                                <a:latin typeface="Cambria Math" panose="02040503050406030204" pitchFamily="18" charset="0"/>
+                              </a:rPr>
+                            </m:ctrlPr>
+                          </m:sSupPr>
+                          <m:e>
+                            <m:r>
+                              <a:rPr lang="en-US" sz="3200" i="1">
+                                <a:latin typeface="Cambria Math" panose="02040503050406030204" pitchFamily="18" charset="0"/>
+                              </a:rPr>
+                              <m:t>𝑑</m:t>
+                            </m:r>
+                          </m:e>
+                          <m:sup>
+                            <m:r>
+                              <a:rPr lang="en-US" sz="3200" b="0" i="1" smtClean="0">
+                                <a:latin typeface="Cambria Math" panose="02040503050406030204" pitchFamily="18" charset="0"/>
+                              </a:rPr>
+                              <m:t>3</m:t>
+                            </m:r>
+                          </m:sup>
+                        </m:sSup>
+                      </m:e>
+                    </m:d>
+                  </m:oMath>
+                </a14:m>
+                <a:r>
+                  <a:rPr lang="en-AU" sz="3200" dirty="0" smtClean="0"/>
+                  <a:t>, we use the PD condition of the </a:t>
                 </a:r>
                 <a:r>
                   <a:rPr lang="en-AU" sz="3200" dirty="0" err="1"/>
@@ -14336,16 +14449,7 @@
                     </a:solidFill>
                     <a:latin typeface="+mj-lt"/>
                   </a:rPr>
-                  <a:t>continuously during </a:t>
-                </a:r>
-                <a:r>
-                  <a:rPr lang="en-US" sz="3200" dirty="0" smtClean="0">
-                    <a:solidFill>
-                      <a:prstClr val="black"/>
-                    </a:solidFill>
-                    <a:latin typeface="+mj-lt"/>
-                  </a:rPr>
-                  <a:t>learning.</a:t>
+                  <a:t>continuously during learning.</a:t>
                 </a:r>
               </a:p>
               <a:p>
@@ -14357,7 +14461,7 @@
             </p:txBody>
           </p:sp>
         </mc:Choice>
-        <mc:Fallback>
+        <mc:Fallback xmlns="">
           <p:sp>
             <p:nvSpPr>
               <p:cNvPr id="78" name="Rectangle 77"/>
@@ -14377,7 +14481,7 @@
               <a:blipFill rotWithShape="0">
                 <a:blip r:embed="rId29"/>
                 <a:stretch>
-                  <a:fillRect l="-1672" t="-1654" r="-1526"/>
+                  <a:fillRect l="-1672" t="-1504" r="-1526"/>
                 </a:stretch>
               </a:blipFill>
             </p:spPr>
@@ -14435,8 +14539,8 @@
           </a:extLst>
         </p:spPr>
       </p:pic>
-      <mc:AlternateContent xmlns:mc="http://schemas.openxmlformats.org/markup-compatibility/2006">
-        <mc:Choice xmlns:a14="http://schemas.microsoft.com/office/drawing/2010/main" Requires="a14">
+      <mc:AlternateContent xmlns:mc="http://schemas.openxmlformats.org/markup-compatibility/2006" xmlns:a14="http://schemas.microsoft.com/office/drawing/2010/main">
+        <mc:Choice Requires="a14">
           <p:sp>
             <p:nvSpPr>
               <p:cNvPr id="82" name="Rectangle 81"/>
@@ -14639,11 +14743,7 @@
                 </a:r>
                 <a:r>
                   <a:rPr lang="en-AU" sz="3200" dirty="0" smtClean="0"/>
-                  <a:t>(showing row indices</a:t>
-                </a:r>
-                <a:r>
-                  <a:rPr lang="en-AU" sz="3200" dirty="0" smtClean="0"/>
-                  <a:t>).</a:t>
+                  <a:t>(showing row indices).</a:t>
                 </a:r>
                 <a:endParaRPr lang="en-US" sz="3200" dirty="0"/>
               </a:p>
@@ -14656,7 +14756,7 @@
             </p:txBody>
           </p:sp>
         </mc:Choice>
-        <mc:Fallback>
+        <mc:Fallback xmlns="">
           <p:sp>
             <p:nvSpPr>
               <p:cNvPr id="82" name="Rectangle 81"/>
@@ -15552,6 +15652,476 @@
               </a:rPr>
               <a:t>COMET</a:t>
             </a:r>
+          </a:p>
+        </p:txBody>
+      </p:sp>
+      <p:sp>
+        <p:nvSpPr>
+          <p:cNvPr id="3" name="Oval 2"/>
+          <p:cNvSpPr/>
+          <p:nvPr/>
+        </p:nvSpPr>
+        <p:spPr>
+          <a:xfrm>
+            <a:off x="16543090" y="20810537"/>
+            <a:ext cx="2232248" cy="1656184"/>
+          </a:xfrm>
+          <a:prstGeom prst="ellipse">
+            <a:avLst/>
+          </a:prstGeom>
+          <a:noFill/>
+          <a:ln w="28575">
+            <a:solidFill>
+              <a:srgbClr val="C00000"/>
+            </a:solidFill>
+          </a:ln>
+        </p:spPr>
+        <p:style>
+          <a:lnRef idx="2">
+            <a:schemeClr val="accent1">
+              <a:shade val="50000"/>
+            </a:schemeClr>
+          </a:lnRef>
+          <a:fillRef idx="1">
+            <a:schemeClr val="accent1"/>
+          </a:fillRef>
+          <a:effectRef idx="0">
+            <a:schemeClr val="accent1"/>
+          </a:effectRef>
+          <a:fontRef idx="minor">
+            <a:schemeClr val="lt1"/>
+          </a:fontRef>
+        </p:style>
+        <p:txBody>
+          <a:bodyPr rtlCol="0" anchor="ctr"/>
+          <a:lstStyle/>
+          <a:p>
+            <a:pPr algn="ctr"/>
+            <a:endParaRPr lang="en-US"/>
+          </a:p>
+        </p:txBody>
+      </p:sp>
+      <p:pic>
+        <p:nvPicPr>
+          <p:cNvPr id="4" name="Picture 3"/>
+          <p:cNvPicPr>
+            <a:picLocks noChangeAspect="1"/>
+          </p:cNvPicPr>
+          <p:nvPr/>
+        </p:nvPicPr>
+        <p:blipFill>
+          <a:blip r:embed="rId33"/>
+          <a:stretch>
+            <a:fillRect/>
+          </a:stretch>
+        </p:blipFill>
+        <p:spPr>
+          <a:xfrm>
+            <a:off x="22391136" y="9449005"/>
+            <a:ext cx="8598648" cy="4520772"/>
+          </a:xfrm>
+          <a:prstGeom prst="rect">
+            <a:avLst/>
+          </a:prstGeom>
+        </p:spPr>
+      </p:pic>
+      <p:sp>
+        <p:nvSpPr>
+          <p:cNvPr id="56" name="Text Box 115"/>
+          <p:cNvSpPr txBox="1">
+            <a:spLocks noChangeArrowheads="1"/>
+          </p:cNvSpPr>
+          <p:nvPr/>
+        </p:nvSpPr>
+        <p:spPr bwMode="auto">
+          <a:xfrm>
+            <a:off x="28049341" y="25846308"/>
+            <a:ext cx="3191456" cy="1079399"/>
+          </a:xfrm>
+          <a:prstGeom prst="rect">
+            <a:avLst/>
+          </a:prstGeom>
+          <a:noFill/>
+          <a:ln>
+            <a:noFill/>
+          </a:ln>
+          <a:effectLst/>
+          <a:extLst/>
+        </p:spPr>
+        <p:txBody>
+          <a:bodyPr wrap="square" lIns="90000" tIns="46800" rIns="90000" bIns="46800">
+            <a:spAutoFit/>
+          </a:bodyPr>
+          <a:lstStyle>
+            <a:lvl1pPr>
+              <a:tabLst>
+                <a:tab pos="0" algn="l"/>
+                <a:tab pos="457200" algn="l"/>
+                <a:tab pos="914400" algn="l"/>
+                <a:tab pos="1371600" algn="l"/>
+                <a:tab pos="1828800" algn="l"/>
+                <a:tab pos="2286000" algn="l"/>
+                <a:tab pos="2743200" algn="l"/>
+                <a:tab pos="3200400" algn="l"/>
+                <a:tab pos="3657600" algn="l"/>
+                <a:tab pos="4114800" algn="l"/>
+                <a:tab pos="4572000" algn="l"/>
+                <a:tab pos="5029200" algn="l"/>
+                <a:tab pos="5486400" algn="l"/>
+                <a:tab pos="5943600" algn="l"/>
+                <a:tab pos="6400800" algn="l"/>
+                <a:tab pos="6858000" algn="l"/>
+                <a:tab pos="7315200" algn="l"/>
+                <a:tab pos="7772400" algn="l"/>
+                <a:tab pos="8229600" algn="l"/>
+                <a:tab pos="8686800" algn="l"/>
+                <a:tab pos="9144000" algn="l"/>
+                <a:tab pos="9410700" algn="l"/>
+              </a:tabLst>
+              <a:defRPr>
+                <a:solidFill>
+                  <a:srgbClr val="000000"/>
+                </a:solidFill>
+                <a:latin typeface="Arial" panose="020B0604020202020204" pitchFamily="34" charset="0"/>
+                <a:cs typeface="Arial" panose="020B0604020202020204" pitchFamily="34" charset="0"/>
+              </a:defRPr>
+            </a:lvl1pPr>
+            <a:lvl2pPr>
+              <a:tabLst>
+                <a:tab pos="0" algn="l"/>
+                <a:tab pos="457200" algn="l"/>
+                <a:tab pos="914400" algn="l"/>
+                <a:tab pos="1371600" algn="l"/>
+                <a:tab pos="1828800" algn="l"/>
+                <a:tab pos="2286000" algn="l"/>
+                <a:tab pos="2743200" algn="l"/>
+                <a:tab pos="3200400" algn="l"/>
+                <a:tab pos="3657600" algn="l"/>
+                <a:tab pos="4114800" algn="l"/>
+                <a:tab pos="4572000" algn="l"/>
+                <a:tab pos="5029200" algn="l"/>
+                <a:tab pos="5486400" algn="l"/>
+                <a:tab pos="5943600" algn="l"/>
+                <a:tab pos="6400800" algn="l"/>
+                <a:tab pos="6858000" algn="l"/>
+                <a:tab pos="7315200" algn="l"/>
+                <a:tab pos="7772400" algn="l"/>
+                <a:tab pos="8229600" algn="l"/>
+                <a:tab pos="8686800" algn="l"/>
+                <a:tab pos="9144000" algn="l"/>
+                <a:tab pos="9410700" algn="l"/>
+              </a:tabLst>
+              <a:defRPr>
+                <a:solidFill>
+                  <a:srgbClr val="000000"/>
+                </a:solidFill>
+                <a:latin typeface="Arial" panose="020B0604020202020204" pitchFamily="34" charset="0"/>
+                <a:cs typeface="Arial" panose="020B0604020202020204" pitchFamily="34" charset="0"/>
+              </a:defRPr>
+            </a:lvl2pPr>
+            <a:lvl3pPr>
+              <a:tabLst>
+                <a:tab pos="0" algn="l"/>
+                <a:tab pos="457200" algn="l"/>
+                <a:tab pos="914400" algn="l"/>
+                <a:tab pos="1371600" algn="l"/>
+                <a:tab pos="1828800" algn="l"/>
+                <a:tab pos="2286000" algn="l"/>
+                <a:tab pos="2743200" algn="l"/>
+                <a:tab pos="3200400" algn="l"/>
+                <a:tab pos="3657600" algn="l"/>
+                <a:tab pos="4114800" algn="l"/>
+                <a:tab pos="4572000" algn="l"/>
+                <a:tab pos="5029200" algn="l"/>
+                <a:tab pos="5486400" algn="l"/>
+                <a:tab pos="5943600" algn="l"/>
+                <a:tab pos="6400800" algn="l"/>
+                <a:tab pos="6858000" algn="l"/>
+                <a:tab pos="7315200" algn="l"/>
+                <a:tab pos="7772400" algn="l"/>
+                <a:tab pos="8229600" algn="l"/>
+                <a:tab pos="8686800" algn="l"/>
+                <a:tab pos="9144000" algn="l"/>
+                <a:tab pos="9410700" algn="l"/>
+              </a:tabLst>
+              <a:defRPr>
+                <a:solidFill>
+                  <a:srgbClr val="000000"/>
+                </a:solidFill>
+                <a:latin typeface="Arial" panose="020B0604020202020204" pitchFamily="34" charset="0"/>
+                <a:cs typeface="Arial" panose="020B0604020202020204" pitchFamily="34" charset="0"/>
+              </a:defRPr>
+            </a:lvl3pPr>
+            <a:lvl4pPr>
+              <a:tabLst>
+                <a:tab pos="0" algn="l"/>
+                <a:tab pos="457200" algn="l"/>
+                <a:tab pos="914400" algn="l"/>
+                <a:tab pos="1371600" algn="l"/>
+                <a:tab pos="1828800" algn="l"/>
+                <a:tab pos="2286000" algn="l"/>
+                <a:tab pos="2743200" algn="l"/>
+                <a:tab pos="3200400" algn="l"/>
+                <a:tab pos="3657600" algn="l"/>
+                <a:tab pos="4114800" algn="l"/>
+                <a:tab pos="4572000" algn="l"/>
+                <a:tab pos="5029200" algn="l"/>
+                <a:tab pos="5486400" algn="l"/>
+                <a:tab pos="5943600" algn="l"/>
+                <a:tab pos="6400800" algn="l"/>
+                <a:tab pos="6858000" algn="l"/>
+                <a:tab pos="7315200" algn="l"/>
+                <a:tab pos="7772400" algn="l"/>
+                <a:tab pos="8229600" algn="l"/>
+                <a:tab pos="8686800" algn="l"/>
+                <a:tab pos="9144000" algn="l"/>
+                <a:tab pos="9410700" algn="l"/>
+              </a:tabLst>
+              <a:defRPr>
+                <a:solidFill>
+                  <a:srgbClr val="000000"/>
+                </a:solidFill>
+                <a:latin typeface="Arial" panose="020B0604020202020204" pitchFamily="34" charset="0"/>
+                <a:cs typeface="Arial" panose="020B0604020202020204" pitchFamily="34" charset="0"/>
+              </a:defRPr>
+            </a:lvl4pPr>
+            <a:lvl5pPr>
+              <a:tabLst>
+                <a:tab pos="0" algn="l"/>
+                <a:tab pos="457200" algn="l"/>
+                <a:tab pos="914400" algn="l"/>
+                <a:tab pos="1371600" algn="l"/>
+                <a:tab pos="1828800" algn="l"/>
+                <a:tab pos="2286000" algn="l"/>
+                <a:tab pos="2743200" algn="l"/>
+                <a:tab pos="3200400" algn="l"/>
+                <a:tab pos="3657600" algn="l"/>
+                <a:tab pos="4114800" algn="l"/>
+                <a:tab pos="4572000" algn="l"/>
+                <a:tab pos="5029200" algn="l"/>
+                <a:tab pos="5486400" algn="l"/>
+                <a:tab pos="5943600" algn="l"/>
+                <a:tab pos="6400800" algn="l"/>
+                <a:tab pos="6858000" algn="l"/>
+                <a:tab pos="7315200" algn="l"/>
+                <a:tab pos="7772400" algn="l"/>
+                <a:tab pos="8229600" algn="l"/>
+                <a:tab pos="8686800" algn="l"/>
+                <a:tab pos="9144000" algn="l"/>
+                <a:tab pos="9410700" algn="l"/>
+              </a:tabLst>
+              <a:defRPr>
+                <a:solidFill>
+                  <a:srgbClr val="000000"/>
+                </a:solidFill>
+                <a:latin typeface="Arial" panose="020B0604020202020204" pitchFamily="34" charset="0"/>
+                <a:cs typeface="Arial" panose="020B0604020202020204" pitchFamily="34" charset="0"/>
+              </a:defRPr>
+            </a:lvl5pPr>
+            <a:lvl6pPr defTabSz="457200" fontAlgn="base">
+              <a:spcBef>
+                <a:spcPct val="0"/>
+              </a:spcBef>
+              <a:spcAft>
+                <a:spcPct val="0"/>
+              </a:spcAft>
+              <a:buClr>
+                <a:srgbClr val="000000"/>
+              </a:buClr>
+              <a:buSzPct val="100000"/>
+              <a:buFont typeface="Arial" panose="020B0604020202020204" pitchFamily="34" charset="0"/>
+              <a:tabLst>
+                <a:tab pos="0" algn="l"/>
+                <a:tab pos="457200" algn="l"/>
+                <a:tab pos="914400" algn="l"/>
+                <a:tab pos="1371600" algn="l"/>
+                <a:tab pos="1828800" algn="l"/>
+                <a:tab pos="2286000" algn="l"/>
+                <a:tab pos="2743200" algn="l"/>
+                <a:tab pos="3200400" algn="l"/>
+                <a:tab pos="3657600" algn="l"/>
+                <a:tab pos="4114800" algn="l"/>
+                <a:tab pos="4572000" algn="l"/>
+                <a:tab pos="5029200" algn="l"/>
+                <a:tab pos="5486400" algn="l"/>
+                <a:tab pos="5943600" algn="l"/>
+                <a:tab pos="6400800" algn="l"/>
+                <a:tab pos="6858000" algn="l"/>
+                <a:tab pos="7315200" algn="l"/>
+                <a:tab pos="7772400" algn="l"/>
+                <a:tab pos="8229600" algn="l"/>
+                <a:tab pos="8686800" algn="l"/>
+                <a:tab pos="9144000" algn="l"/>
+                <a:tab pos="9410700" algn="l"/>
+              </a:tabLst>
+              <a:defRPr>
+                <a:solidFill>
+                  <a:srgbClr val="000000"/>
+                </a:solidFill>
+                <a:latin typeface="Arial" panose="020B0604020202020204" pitchFamily="34" charset="0"/>
+                <a:cs typeface="Arial" panose="020B0604020202020204" pitchFamily="34" charset="0"/>
+              </a:defRPr>
+            </a:lvl6pPr>
+            <a:lvl7pPr defTabSz="457200" fontAlgn="base">
+              <a:spcBef>
+                <a:spcPct val="0"/>
+              </a:spcBef>
+              <a:spcAft>
+                <a:spcPct val="0"/>
+              </a:spcAft>
+              <a:buClr>
+                <a:srgbClr val="000000"/>
+              </a:buClr>
+              <a:buSzPct val="100000"/>
+              <a:buFont typeface="Arial" panose="020B0604020202020204" pitchFamily="34" charset="0"/>
+              <a:tabLst>
+                <a:tab pos="0" algn="l"/>
+                <a:tab pos="457200" algn="l"/>
+                <a:tab pos="914400" algn="l"/>
+                <a:tab pos="1371600" algn="l"/>
+                <a:tab pos="1828800" algn="l"/>
+                <a:tab pos="2286000" algn="l"/>
+                <a:tab pos="2743200" algn="l"/>
+                <a:tab pos="3200400" algn="l"/>
+                <a:tab pos="3657600" algn="l"/>
+                <a:tab pos="4114800" algn="l"/>
+                <a:tab pos="4572000" algn="l"/>
+                <a:tab pos="5029200" algn="l"/>
+                <a:tab pos="5486400" algn="l"/>
+                <a:tab pos="5943600" algn="l"/>
+                <a:tab pos="6400800" algn="l"/>
+                <a:tab pos="6858000" algn="l"/>
+                <a:tab pos="7315200" algn="l"/>
+                <a:tab pos="7772400" algn="l"/>
+                <a:tab pos="8229600" algn="l"/>
+                <a:tab pos="8686800" algn="l"/>
+                <a:tab pos="9144000" algn="l"/>
+                <a:tab pos="9410700" algn="l"/>
+              </a:tabLst>
+              <a:defRPr>
+                <a:solidFill>
+                  <a:srgbClr val="000000"/>
+                </a:solidFill>
+                <a:latin typeface="Arial" panose="020B0604020202020204" pitchFamily="34" charset="0"/>
+                <a:cs typeface="Arial" panose="020B0604020202020204" pitchFamily="34" charset="0"/>
+              </a:defRPr>
+            </a:lvl7pPr>
+            <a:lvl8pPr defTabSz="457200" fontAlgn="base">
+              <a:spcBef>
+                <a:spcPct val="0"/>
+              </a:spcBef>
+              <a:spcAft>
+                <a:spcPct val="0"/>
+              </a:spcAft>
+              <a:buClr>
+                <a:srgbClr val="000000"/>
+              </a:buClr>
+              <a:buSzPct val="100000"/>
+              <a:buFont typeface="Arial" panose="020B0604020202020204" pitchFamily="34" charset="0"/>
+              <a:tabLst>
+                <a:tab pos="0" algn="l"/>
+                <a:tab pos="457200" algn="l"/>
+                <a:tab pos="914400" algn="l"/>
+                <a:tab pos="1371600" algn="l"/>
+                <a:tab pos="1828800" algn="l"/>
+                <a:tab pos="2286000" algn="l"/>
+                <a:tab pos="2743200" algn="l"/>
+                <a:tab pos="3200400" algn="l"/>
+                <a:tab pos="3657600" algn="l"/>
+                <a:tab pos="4114800" algn="l"/>
+                <a:tab pos="4572000" algn="l"/>
+                <a:tab pos="5029200" algn="l"/>
+                <a:tab pos="5486400" algn="l"/>
+                <a:tab pos="5943600" algn="l"/>
+                <a:tab pos="6400800" algn="l"/>
+                <a:tab pos="6858000" algn="l"/>
+                <a:tab pos="7315200" algn="l"/>
+                <a:tab pos="7772400" algn="l"/>
+                <a:tab pos="8229600" algn="l"/>
+                <a:tab pos="8686800" algn="l"/>
+                <a:tab pos="9144000" algn="l"/>
+                <a:tab pos="9410700" algn="l"/>
+              </a:tabLst>
+              <a:defRPr>
+                <a:solidFill>
+                  <a:srgbClr val="000000"/>
+                </a:solidFill>
+                <a:latin typeface="Arial" panose="020B0604020202020204" pitchFamily="34" charset="0"/>
+                <a:cs typeface="Arial" panose="020B0604020202020204" pitchFamily="34" charset="0"/>
+              </a:defRPr>
+            </a:lvl8pPr>
+            <a:lvl9pPr defTabSz="457200" fontAlgn="base">
+              <a:spcBef>
+                <a:spcPct val="0"/>
+              </a:spcBef>
+              <a:spcAft>
+                <a:spcPct val="0"/>
+              </a:spcAft>
+              <a:buClr>
+                <a:srgbClr val="000000"/>
+              </a:buClr>
+              <a:buSzPct val="100000"/>
+              <a:buFont typeface="Arial" panose="020B0604020202020204" pitchFamily="34" charset="0"/>
+              <a:tabLst>
+                <a:tab pos="0" algn="l"/>
+                <a:tab pos="457200" algn="l"/>
+                <a:tab pos="914400" algn="l"/>
+                <a:tab pos="1371600" algn="l"/>
+                <a:tab pos="1828800" algn="l"/>
+                <a:tab pos="2286000" algn="l"/>
+                <a:tab pos="2743200" algn="l"/>
+                <a:tab pos="3200400" algn="l"/>
+                <a:tab pos="3657600" algn="l"/>
+                <a:tab pos="4114800" algn="l"/>
+                <a:tab pos="4572000" algn="l"/>
+                <a:tab pos="5029200" algn="l"/>
+                <a:tab pos="5486400" algn="l"/>
+                <a:tab pos="5943600" algn="l"/>
+                <a:tab pos="6400800" algn="l"/>
+                <a:tab pos="6858000" algn="l"/>
+                <a:tab pos="7315200" algn="l"/>
+                <a:tab pos="7772400" algn="l"/>
+                <a:tab pos="8229600" algn="l"/>
+                <a:tab pos="8686800" algn="l"/>
+                <a:tab pos="9144000" algn="l"/>
+                <a:tab pos="9410700" algn="l"/>
+              </a:tabLst>
+              <a:defRPr>
+                <a:solidFill>
+                  <a:srgbClr val="000000"/>
+                </a:solidFill>
+                <a:latin typeface="Arial" panose="020B0604020202020204" pitchFamily="34" charset="0"/>
+                <a:cs typeface="Arial" panose="020B0604020202020204" pitchFamily="34" charset="0"/>
+              </a:defRPr>
+            </a:lvl9pPr>
+          </a:lstStyle>
+          <a:p>
+            <a:pPr algn="l" rtl="0">
+              <a:spcBef>
+                <a:spcPts val="750"/>
+              </a:spcBef>
+            </a:pPr>
+            <a:r>
+              <a:rPr lang="en-US" altLang="en-US" sz="3200" b="1" dirty="0" err="1" smtClean="0">
+                <a:latin typeface="+mj-lt"/>
+              </a:rPr>
+              <a:t>Precision@top-k</a:t>
+            </a:r>
+            <a:r>
+              <a:rPr lang="en-US" altLang="en-US" sz="3200" dirty="0" smtClean="0">
+                <a:latin typeface="+mj-lt"/>
+              </a:rPr>
+              <a:t>, for </a:t>
+            </a:r>
+            <a:r>
+              <a:rPr lang="en-US" altLang="en-US" sz="3200" dirty="0" smtClean="0">
+                <a:latin typeface="+mj-lt"/>
+              </a:rPr>
+              <a:t>Reuters CV1.</a:t>
+            </a:r>
+            <a:endParaRPr lang="en-AU" altLang="en-US" sz="3200" dirty="0">
+              <a:latin typeface="+mj-lt"/>
+            </a:endParaRPr>
           </a:p>
         </p:txBody>
       </p:sp>

</xml_diff>

<commit_message>
minor touches. sending to gal
</commit_message>
<xml_diff>
--- a/COMET_poster.pptx
+++ b/COMET_poster.pptx
@@ -4062,7 +4062,7 @@
         </p:nvSpPr>
         <p:spPr bwMode="auto">
           <a:xfrm>
-            <a:off x="28049341" y="20038124"/>
+            <a:off x="28049341" y="19874433"/>
             <a:ext cx="3191456" cy="5613974"/>
           </a:xfrm>
           <a:prstGeom prst="rect">
@@ -12060,13 +12060,13 @@
         </p:nvPicPr>
         <p:blipFill rotWithShape="1">
           <a:blip r:embed="rId23"/>
-          <a:srcRect t="5723" r="50227"/>
+          <a:srcRect t="6757" r="50227"/>
           <a:stretch/>
         </p:blipFill>
         <p:spPr>
           <a:xfrm>
-            <a:off x="32768554" y="7849097"/>
-            <a:ext cx="8714132" cy="6563961"/>
+            <a:off x="32768554" y="7921105"/>
+            <a:ext cx="8714132" cy="6491953"/>
           </a:xfrm>
           <a:prstGeom prst="rect">
             <a:avLst/>
@@ -15735,7 +15735,7 @@
         </p:nvSpPr>
         <p:spPr bwMode="auto">
           <a:xfrm>
-            <a:off x="28049341" y="25846308"/>
+            <a:off x="28049341" y="25707081"/>
             <a:ext cx="3191456" cy="1079399"/>
           </a:xfrm>
           <a:prstGeom prst="rect">

</xml_diff>

<commit_message>
reduced the characters spacing on last header to make it fit into a single line
</commit_message>
<xml_diff>
--- a/COMET_poster.pptx
+++ b/COMET_poster.pptx
@@ -3817,11 +3817,7 @@
             </a:r>
             <a:r>
               <a:rPr lang="en-US" sz="3800" b="1" dirty="0" smtClean="0"/>
-              <a:t>NYU</a:t>
-            </a:r>
-            <a:r>
-              <a:rPr lang="en-US" sz="3800" b="1" dirty="0" smtClean="0"/>
-              <a:t>, </a:t>
+              <a:t>NYU, </a:t>
             </a:r>
             <a:r>
               <a:rPr lang="en-US" sz="4000" baseline="30000" dirty="0" smtClean="0"/>
@@ -3829,11 +3825,7 @@
             </a:r>
             <a:r>
               <a:rPr lang="en-US" sz="3800" b="1" dirty="0" smtClean="0"/>
-              <a:t>Google </a:t>
-            </a:r>
-            <a:r>
-              <a:rPr lang="en-US" sz="3800" b="1" dirty="0" smtClean="0"/>
-              <a:t>Research</a:t>
+              <a:t>Google Research</a:t>
             </a:r>
           </a:p>
         </p:txBody>
@@ -4607,8 +4599,8 @@
           </a:p>
         </p:txBody>
       </p:sp>
-      <mc:AlternateContent xmlns:mc="http://schemas.openxmlformats.org/markup-compatibility/2006">
-        <mc:Choice xmlns:a14="http://schemas.microsoft.com/office/drawing/2010/main" Requires="a14">
+      <mc:AlternateContent xmlns:mc="http://schemas.openxmlformats.org/markup-compatibility/2006" xmlns:a14="http://schemas.microsoft.com/office/drawing/2010/main">
+        <mc:Choice Requires="a14">
           <p:sp>
             <p:nvSpPr>
               <p:cNvPr id="39" name="Text Box 115"/>
@@ -5042,19 +5034,7 @@
                   <a:rPr lang="en-US" sz="3200" b="1" dirty="0" smtClean="0">
                     <a:latin typeface="+mj-lt"/>
                   </a:rPr>
-                  <a:t> the </a:t>
-                </a:r>
-                <a:r>
-                  <a:rPr lang="en-US" sz="3200" b="1" dirty="0" smtClean="0">
-                    <a:latin typeface="+mj-lt"/>
-                  </a:rPr>
-                  <a:t>information </a:t>
-                </a:r>
-                <a:r>
-                  <a:rPr lang="en-US" sz="3200" b="1" dirty="0" smtClean="0">
-                    <a:latin typeface="+mj-lt"/>
-                  </a:rPr>
-                  <a:t>gain</a:t>
+                  <a:t> the information gain</a:t>
                 </a:r>
                 <a:r>
                   <a:rPr lang="en-US" sz="3200" dirty="0" smtClean="0">
@@ -5088,7 +5068,7 @@
             </p:txBody>
           </p:sp>
         </mc:Choice>
-        <mc:Fallback>
+        <mc:Fallback xmlns="">
           <p:sp>
             <p:nvSpPr>
               <p:cNvPr id="39" name="Text Box 115"/>
@@ -9318,41 +9298,32 @@
               <a:rPr lang="en-US" sz="4400" b="1" dirty="0" err="1" smtClean="0">
                 <a:latin typeface="+mj-lt"/>
               </a:rPr>
-              <a:t>sCOMET</a:t>
-            </a:r>
-            <a:r>
-              <a:rPr lang="en-US" sz="4400" b="1" dirty="0" smtClean="0">
+              <a:t>spCOMET</a:t>
+            </a:r>
+            <a:r>
+              <a:rPr lang="en-US" sz="4400" b="1" spc="-150" dirty="0" smtClean="0">
                 <a:latin typeface="+mj-lt"/>
               </a:rPr>
               <a:t> </a:t>
             </a:r>
             <a:r>
-              <a:rPr lang="en-US" sz="4400" b="1" dirty="0" smtClean="0">
+              <a:rPr lang="en-US" sz="4400" b="1" spc="-150" dirty="0" smtClean="0">
                 <a:latin typeface="+mj-lt"/>
               </a:rPr>
               <a:t>selects </a:t>
             </a:r>
             <a:r>
-              <a:rPr lang="en-US" sz="4400" b="1" dirty="0">
+              <a:rPr lang="en-US" sz="4400" b="1" spc="-150" dirty="0">
                 <a:latin typeface="+mj-lt"/>
               </a:rPr>
               <a:t>i</a:t>
             </a:r>
             <a:r>
-              <a:rPr lang="en-US" sz="4400" b="1" dirty="0" smtClean="0">
+              <a:rPr lang="en-US" sz="4400" b="1" spc="-150" dirty="0" smtClean="0">
                 <a:latin typeface="+mj-lt"/>
               </a:rPr>
-              <a:t>nformative </a:t>
-            </a:r>
-            <a:r>
-              <a:rPr lang="en-US" sz="4400" b="1" dirty="0" smtClean="0">
-                <a:latin typeface="+mj-lt"/>
-              </a:rPr>
-              <a:t>features</a:t>
-            </a:r>
-            <a:endParaRPr lang="en-US" sz="4400" b="1" dirty="0" smtClean="0">
-              <a:latin typeface="+mj-lt"/>
-            </a:endParaRPr>
+              <a:t>nformative features</a:t>
+            </a:r>
           </a:p>
           <a:p>
             <a:pPr lvl="0" algn="l" rtl="0">
@@ -9366,15 +9337,7 @@
                   <a:prstClr val="black"/>
                 </a:solidFill>
               </a:rPr>
-              <a:t>Sparse COMET </a:t>
-            </a:r>
-            <a:r>
-              <a:rPr lang="en-US" sz="3200" dirty="0" smtClean="0">
-                <a:solidFill>
-                  <a:prstClr val="black"/>
-                </a:solidFill>
-              </a:rPr>
-              <a:t>assigns </a:t>
+              <a:t>Sparse COMET assigns </a:t>
             </a:r>
             <a:r>
               <a:rPr lang="en-US" sz="3200" dirty="0">

</xml_diff>